<commit_message>
PPT com lixeiras novas e LLd
</commit_message>
<xml_diff>
--- a/apresentação/MIT PPT (Projeto 2.0).pptx
+++ b/apresentação/MIT PPT (Projeto 2.0).pptx
@@ -5,7 +5,7 @@
     <p:sldMasterId id="2147483766" r:id="rId1"/>
   </p:sldMasterIdLst>
   <p:notesMasterIdLst>
-    <p:notesMasterId r:id="rId18"/>
+    <p:notesMasterId r:id="rId20"/>
   </p:notesMasterIdLst>
   <p:sldIdLst>
     <p:sldId id="257" r:id="rId2"/>
@@ -17,13 +17,15 @@
     <p:sldId id="350" r:id="rId8"/>
     <p:sldId id="351" r:id="rId9"/>
     <p:sldId id="352" r:id="rId10"/>
-    <p:sldId id="353" r:id="rId11"/>
-    <p:sldId id="354" r:id="rId12"/>
-    <p:sldId id="360" r:id="rId13"/>
-    <p:sldId id="355" r:id="rId14"/>
-    <p:sldId id="356" r:id="rId15"/>
-    <p:sldId id="357" r:id="rId16"/>
-    <p:sldId id="358" r:id="rId17"/>
+    <p:sldId id="361" r:id="rId11"/>
+    <p:sldId id="362" r:id="rId12"/>
+    <p:sldId id="353" r:id="rId13"/>
+    <p:sldId id="354" r:id="rId14"/>
+    <p:sldId id="360" r:id="rId15"/>
+    <p:sldId id="355" r:id="rId16"/>
+    <p:sldId id="356" r:id="rId17"/>
+    <p:sldId id="357" r:id="rId18"/>
+    <p:sldId id="358" r:id="rId19"/>
   </p:sldIdLst>
   <p:sldSz cx="12192000" cy="6858000"/>
   <p:notesSz cx="6858000" cy="9144000"/>
@@ -277,6 +279,11 @@
               </a:ln>
               <a:effectLst/>
             </c:spPr>
+            <c:extLst>
+              <c:ext xmlns:c16="http://schemas.microsoft.com/office/drawing/2014/chart" uri="{C3380CC4-5D6E-409C-BE32-E72D297353CC}">
+                <c16:uniqueId val="{00000001-DD83-4D13-9F66-F164FCCC4AD1}"/>
+              </c:ext>
+            </c:extLst>
           </c:dPt>
           <c:dPt>
             <c:idx val="1"/>
@@ -292,6 +299,11 @@
               </a:ln>
               <a:effectLst/>
             </c:spPr>
+            <c:extLst>
+              <c:ext xmlns:c16="http://schemas.microsoft.com/office/drawing/2014/chart" uri="{C3380CC4-5D6E-409C-BE32-E72D297353CC}">
+                <c16:uniqueId val="{00000003-DD83-4D13-9F66-F164FCCC4AD1}"/>
+              </c:ext>
+            </c:extLst>
           </c:dPt>
           <c:dPt>
             <c:idx val="2"/>
@@ -307,6 +319,11 @@
               </a:ln>
               <a:effectLst/>
             </c:spPr>
+            <c:extLst>
+              <c:ext xmlns:c16="http://schemas.microsoft.com/office/drawing/2014/chart" uri="{C3380CC4-5D6E-409C-BE32-E72D297353CC}">
+                <c16:uniqueId val="{00000005-DD83-4D13-9F66-F164FCCC4AD1}"/>
+              </c:ext>
+            </c:extLst>
           </c:dPt>
           <c:dPt>
             <c:idx val="3"/>
@@ -322,6 +339,11 @@
               </a:ln>
               <a:effectLst/>
             </c:spPr>
+            <c:extLst>
+              <c:ext xmlns:c16="http://schemas.microsoft.com/office/drawing/2014/chart" uri="{C3380CC4-5D6E-409C-BE32-E72D297353CC}">
+                <c16:uniqueId val="{00000007-DD83-4D13-9F66-F164FCCC4AD1}"/>
+              </c:ext>
+            </c:extLst>
           </c:dPt>
           <c:cat>
             <c:strRef>
@@ -391,7 +413,6 @@
     </c:plotArea>
     <c:legend>
       <c:legendPos val="b"/>
-      <c:layout/>
       <c:overlay val="0"/>
       <c:spPr>
         <a:noFill/>
@@ -959,7 +980,6 @@
     </c:plotArea>
     <c:legend>
       <c:legendPos val="b"/>
-      <c:layout/>
       <c:overlay val="0"/>
       <c:spPr>
         <a:noFill/>
@@ -2269,7 +2289,7 @@
           <a:p>
             <a:fld id="{4132B5A0-3D7C-4A8B-9857-D57DB7BEA661}" type="datetimeFigureOut">
               <a:rPr lang="pt-BR" smtClean="0"/>
-              <a:t>02/04/2020</a:t>
+              <a:t>03/04/2020</a:t>
             </a:fld>
             <a:endParaRPr lang="pt-BR"/>
           </a:p>
@@ -3258,7 +3278,7 @@
           <a:p>
             <a:fld id="{51C1A2F9-5E2E-41AF-8CA8-6F6A8CA531AC}" type="datetimeFigureOut">
               <a:rPr lang="pt-BR" smtClean="0"/>
-              <a:t>02/04/2020</a:t>
+              <a:t>03/04/2020</a:t>
             </a:fld>
             <a:endParaRPr lang="pt-BR"/>
           </a:p>
@@ -3509,7 +3529,7 @@
           <a:p>
             <a:fld id="{51C1A2F9-5E2E-41AF-8CA8-6F6A8CA531AC}" type="datetimeFigureOut">
               <a:rPr lang="pt-BR" smtClean="0"/>
-              <a:t>02/04/2020</a:t>
+              <a:t>03/04/2020</a:t>
             </a:fld>
             <a:endParaRPr lang="pt-BR"/>
           </a:p>
@@ -3823,7 +3843,7 @@
           <a:p>
             <a:fld id="{51C1A2F9-5E2E-41AF-8CA8-6F6A8CA531AC}" type="datetimeFigureOut">
               <a:rPr lang="pt-BR" smtClean="0"/>
-              <a:t>02/04/2020</a:t>
+              <a:t>03/04/2020</a:t>
             </a:fld>
             <a:endParaRPr lang="pt-BR"/>
           </a:p>
@@ -4164,7 +4184,7 @@
           <a:p>
             <a:fld id="{51C1A2F9-5E2E-41AF-8CA8-6F6A8CA531AC}" type="datetimeFigureOut">
               <a:rPr lang="pt-BR" smtClean="0"/>
-              <a:t>02/04/2020</a:t>
+              <a:t>03/04/2020</a:t>
             </a:fld>
             <a:endParaRPr lang="pt-BR"/>
           </a:p>
@@ -4478,7 +4498,7 @@
           <a:p>
             <a:fld id="{51C1A2F9-5E2E-41AF-8CA8-6F6A8CA531AC}" type="datetimeFigureOut">
               <a:rPr lang="pt-BR" smtClean="0"/>
-              <a:t>02/04/2020</a:t>
+              <a:t>03/04/2020</a:t>
             </a:fld>
             <a:endParaRPr lang="pt-BR"/>
           </a:p>
@@ -4871,7 +4891,7 @@
           <a:p>
             <a:fld id="{51C1A2F9-5E2E-41AF-8CA8-6F6A8CA531AC}" type="datetimeFigureOut">
               <a:rPr lang="pt-BR" smtClean="0"/>
-              <a:t>02/04/2020</a:t>
+              <a:t>03/04/2020</a:t>
             </a:fld>
             <a:endParaRPr lang="pt-BR"/>
           </a:p>
@@ -5041,7 +5061,7 @@
           <a:p>
             <a:fld id="{51C1A2F9-5E2E-41AF-8CA8-6F6A8CA531AC}" type="datetimeFigureOut">
               <a:rPr lang="pt-BR" smtClean="0"/>
-              <a:t>02/04/2020</a:t>
+              <a:t>03/04/2020</a:t>
             </a:fld>
             <a:endParaRPr lang="pt-BR"/>
           </a:p>
@@ -5221,7 +5241,7 @@
           <a:p>
             <a:fld id="{51C1A2F9-5E2E-41AF-8CA8-6F6A8CA531AC}" type="datetimeFigureOut">
               <a:rPr lang="pt-BR" smtClean="0"/>
-              <a:t>02/04/2020</a:t>
+              <a:t>03/04/2020</a:t>
             </a:fld>
             <a:endParaRPr lang="pt-BR"/>
           </a:p>
@@ -5380,7 +5400,7 @@
           <a:p>
             <a:fld id="{51C1A2F9-5E2E-41AF-8CA8-6F6A8CA531AC}" type="datetimeFigureOut">
               <a:rPr lang="pt-BR" smtClean="0"/>
-              <a:t>02/04/2020</a:t>
+              <a:t>03/04/2020</a:t>
             </a:fld>
             <a:endParaRPr lang="pt-BR"/>
           </a:p>
@@ -5537,7 +5557,7 @@
           <a:p>
             <a:fld id="{51C1A2F9-5E2E-41AF-8CA8-6F6A8CA531AC}" type="datetimeFigureOut">
               <a:rPr lang="pt-BR" smtClean="0"/>
-              <a:t>02/04/2020</a:t>
+              <a:t>03/04/2020</a:t>
             </a:fld>
             <a:endParaRPr lang="pt-BR"/>
           </a:p>
@@ -5678,7 +5698,7 @@
           <a:p>
             <a:fld id="{51C1A2F9-5E2E-41AF-8CA8-6F6A8CA531AC}" type="datetimeFigureOut">
               <a:rPr lang="pt-BR" smtClean="0"/>
-              <a:t>02/04/2020</a:t>
+              <a:t>03/04/2020</a:t>
             </a:fld>
             <a:endParaRPr lang="pt-BR"/>
           </a:p>
@@ -5866,7 +5886,7 @@
           <a:p>
             <a:fld id="{51C1A2F9-5E2E-41AF-8CA8-6F6A8CA531AC}" type="datetimeFigureOut">
               <a:rPr lang="pt-BR" smtClean="0"/>
-              <a:t>02/04/2020</a:t>
+              <a:t>03/04/2020</a:t>
             </a:fld>
             <a:endParaRPr lang="pt-BR"/>
           </a:p>
@@ -5995,7 +6015,7 @@
           <a:p>
             <a:fld id="{51C1A2F9-5E2E-41AF-8CA8-6F6A8CA531AC}" type="datetimeFigureOut">
               <a:rPr lang="pt-BR" smtClean="0"/>
-              <a:t>02/04/2020</a:t>
+              <a:t>03/04/2020</a:t>
             </a:fld>
             <a:endParaRPr lang="pt-BR"/>
           </a:p>
@@ -6254,7 +6274,7 @@
           <a:p>
             <a:fld id="{51C1A2F9-5E2E-41AF-8CA8-6F6A8CA531AC}" type="datetimeFigureOut">
               <a:rPr lang="pt-BR" smtClean="0"/>
-              <a:t>02/04/2020</a:t>
+              <a:t>03/04/2020</a:t>
             </a:fld>
             <a:endParaRPr lang="pt-BR"/>
           </a:p>
@@ -6486,7 +6506,7 @@
           <a:p>
             <a:fld id="{51C1A2F9-5E2E-41AF-8CA8-6F6A8CA531AC}" type="datetimeFigureOut">
               <a:rPr lang="pt-BR" smtClean="0"/>
-              <a:t>02/04/2020</a:t>
+              <a:t>03/04/2020</a:t>
             </a:fld>
             <a:endParaRPr lang="pt-BR"/>
           </a:p>
@@ -6860,7 +6880,7 @@
           <a:p>
             <a:fld id="{51C1A2F9-5E2E-41AF-8CA8-6F6A8CA531AC}" type="datetimeFigureOut">
               <a:rPr lang="pt-BR" smtClean="0"/>
-              <a:t>02/04/2020</a:t>
+              <a:t>03/04/2020</a:t>
             </a:fld>
             <a:endParaRPr lang="pt-BR"/>
           </a:p>
@@ -6983,7 +7003,7 @@
           <a:p>
             <a:fld id="{51C1A2F9-5E2E-41AF-8CA8-6F6A8CA531AC}" type="datetimeFigureOut">
               <a:rPr lang="pt-BR" smtClean="0"/>
-              <a:t>02/04/2020</a:t>
+              <a:t>03/04/2020</a:t>
             </a:fld>
             <a:endParaRPr lang="pt-BR"/>
           </a:p>
@@ -7078,7 +7098,7 @@
           <a:p>
             <a:fld id="{51C1A2F9-5E2E-41AF-8CA8-6F6A8CA531AC}" type="datetimeFigureOut">
               <a:rPr lang="pt-BR" smtClean="0"/>
-              <a:t>02/04/2020</a:t>
+              <a:t>03/04/2020</a:t>
             </a:fld>
             <a:endParaRPr lang="pt-BR"/>
           </a:p>
@@ -7333,7 +7353,7 @@
           <a:p>
             <a:fld id="{51C1A2F9-5E2E-41AF-8CA8-6F6A8CA531AC}" type="datetimeFigureOut">
               <a:rPr lang="pt-BR" smtClean="0"/>
-              <a:t>02/04/2020</a:t>
+              <a:t>03/04/2020</a:t>
             </a:fld>
             <a:endParaRPr lang="pt-BR"/>
           </a:p>
@@ -7596,7 +7616,7 @@
           <a:p>
             <a:fld id="{51C1A2F9-5E2E-41AF-8CA8-6F6A8CA531AC}" type="datetimeFigureOut">
               <a:rPr lang="pt-BR" smtClean="0"/>
-              <a:t>02/04/2020</a:t>
+              <a:t>03/04/2020</a:t>
             </a:fld>
             <a:endParaRPr lang="pt-BR"/>
           </a:p>
@@ -8339,7 +8359,7 @@
           <a:p>
             <a:fld id="{51C1A2F9-5E2E-41AF-8CA8-6F6A8CA531AC}" type="datetimeFigureOut">
               <a:rPr lang="pt-BR" smtClean="0"/>
-              <a:t>02/04/2020</a:t>
+              <a:t>03/04/2020</a:t>
             </a:fld>
             <a:endParaRPr lang="pt-BR"/>
           </a:p>
@@ -9106,6 +9126,213 @@
           <a:chExt cx="0" cy="0"/>
         </a:xfrm>
       </p:grpSpPr>
+      <p:pic>
+        <p:nvPicPr>
+          <p:cNvPr id="6" name="Imagem 5"/>
+          <p:cNvPicPr>
+            <a:picLocks noChangeAspect="1"/>
+          </p:cNvPicPr>
+          <p:nvPr/>
+        </p:nvPicPr>
+        <p:blipFill rotWithShape="1">
+          <a:blip r:embed="rId2">
+            <a:extLst>
+              <a:ext uri="{28A0092B-C50C-407E-A947-70E740481C1C}">
+                <a14:useLocalDpi xmlns:a14="http://schemas.microsoft.com/office/drawing/2010/main" val="0"/>
+              </a:ext>
+            </a:extLst>
+          </a:blip>
+          <a:srcRect l="1373" r="1215"/>
+          <a:stretch/>
+        </p:blipFill>
+        <p:spPr>
+          <a:xfrm>
+            <a:off x="101600" y="898543"/>
+            <a:ext cx="9372600" cy="5422097"/>
+          </a:xfrm>
+          <a:prstGeom prst="rect">
+            <a:avLst/>
+          </a:prstGeom>
+        </p:spPr>
+      </p:pic>
+      <p:sp>
+        <p:nvSpPr>
+          <p:cNvPr id="7" name="Seta: Pentágono 2">
+            <a:extLst>
+              <a:ext uri="{FF2B5EF4-FFF2-40B4-BE49-F238E27FC236}">
+                <a16:creationId xmlns:a16="http://schemas.microsoft.com/office/drawing/2014/main" id="{305FC1E8-F2E8-42C2-B81F-097C0FA4A259}"/>
+              </a:ext>
+            </a:extLst>
+          </p:cNvPr>
+          <p:cNvSpPr/>
+          <p:nvPr/>
+        </p:nvSpPr>
+        <p:spPr>
+          <a:xfrm>
+            <a:off x="0" y="720743"/>
+            <a:ext cx="1881051" cy="676257"/>
+          </a:xfrm>
+          <a:prstGeom prst="homePlate">
+            <a:avLst/>
+          </a:prstGeom>
+          <a:solidFill>
+            <a:srgbClr val="227EA4"/>
+          </a:solidFill>
+          <a:ln>
+            <a:noFill/>
+          </a:ln>
+        </p:spPr>
+        <p:style>
+          <a:lnRef idx="2">
+            <a:schemeClr val="accent1">
+              <a:shade val="50000"/>
+            </a:schemeClr>
+          </a:lnRef>
+          <a:fillRef idx="1">
+            <a:schemeClr val="accent1"/>
+          </a:fillRef>
+          <a:effectRef idx="0">
+            <a:schemeClr val="accent1"/>
+          </a:effectRef>
+          <a:fontRef idx="minor">
+            <a:schemeClr val="lt1"/>
+          </a:fontRef>
+        </p:style>
+        <p:txBody>
+          <a:bodyPr rtlCol="0" anchor="ctr"/>
+          <a:lstStyle/>
+          <a:p>
+            <a:r>
+              <a:rPr lang="pt-BR" sz="4400" dirty="0" smtClean="0">
+                <a:latin typeface="+mj-lt"/>
+              </a:rPr>
+              <a:t>LLD </a:t>
+            </a:r>
+            <a:endParaRPr lang="pt-BR" sz="4400" dirty="0">
+              <a:latin typeface="+mj-lt"/>
+            </a:endParaRPr>
+          </a:p>
+        </p:txBody>
+      </p:sp>
+    </p:spTree>
+    <p:extLst>
+      <p:ext uri="{BB962C8B-B14F-4D97-AF65-F5344CB8AC3E}">
+        <p14:creationId xmlns:p14="http://schemas.microsoft.com/office/powerpoint/2010/main" val="1938710460"/>
+      </p:ext>
+    </p:extLst>
+  </p:cSld>
+  <p:clrMapOvr>
+    <a:masterClrMapping/>
+  </p:clrMapOvr>
+</p:sld>
+</file>
+
+<file path=ppt/slides/slide11.xml><?xml version="1.0" encoding="utf-8"?>
+<p:sld xmlns:a="http://schemas.openxmlformats.org/drawingml/2006/main" xmlns:r="http://schemas.openxmlformats.org/officeDocument/2006/relationships" xmlns:p="http://schemas.openxmlformats.org/presentationml/2006/main">
+  <p:cSld>
+    <p:spTree>
+      <p:nvGrpSpPr>
+        <p:cNvPr id="1" name=""/>
+        <p:cNvGrpSpPr/>
+        <p:nvPr/>
+      </p:nvGrpSpPr>
+      <p:grpSpPr>
+        <a:xfrm>
+          <a:off x="0" y="0"/>
+          <a:ext cx="0" cy="0"/>
+          <a:chOff x="0" y="0"/>
+          <a:chExt cx="0" cy="0"/>
+        </a:xfrm>
+      </p:grpSpPr>
+      <p:sp>
+        <p:nvSpPr>
+          <p:cNvPr id="2" name="Seta: Pentágono 2">
+            <a:extLst>
+              <a:ext uri="{FF2B5EF4-FFF2-40B4-BE49-F238E27FC236}">
+                <a16:creationId xmlns:a16="http://schemas.microsoft.com/office/drawing/2014/main" id="{305FC1E8-F2E8-42C2-B81F-097C0FA4A259}"/>
+              </a:ext>
+            </a:extLst>
+          </p:cNvPr>
+          <p:cNvSpPr/>
+          <p:nvPr/>
+        </p:nvSpPr>
+        <p:spPr>
+          <a:xfrm>
+            <a:off x="0" y="720743"/>
+            <a:ext cx="1881051" cy="676257"/>
+          </a:xfrm>
+          <a:prstGeom prst="homePlate">
+            <a:avLst/>
+          </a:prstGeom>
+          <a:solidFill>
+            <a:srgbClr val="227EA4"/>
+          </a:solidFill>
+          <a:ln>
+            <a:noFill/>
+          </a:ln>
+        </p:spPr>
+        <p:style>
+          <a:lnRef idx="2">
+            <a:schemeClr val="accent1">
+              <a:shade val="50000"/>
+            </a:schemeClr>
+          </a:lnRef>
+          <a:fillRef idx="1">
+            <a:schemeClr val="accent1"/>
+          </a:fillRef>
+          <a:effectRef idx="0">
+            <a:schemeClr val="accent1"/>
+          </a:effectRef>
+          <a:fontRef idx="minor">
+            <a:schemeClr val="lt1"/>
+          </a:fontRef>
+        </p:style>
+        <p:txBody>
+          <a:bodyPr rtlCol="0" anchor="ctr"/>
+          <a:lstStyle/>
+          <a:p>
+            <a:r>
+              <a:rPr lang="pt-BR" sz="4400" dirty="0" smtClean="0">
+                <a:latin typeface="+mj-lt"/>
+              </a:rPr>
+              <a:t>HLD </a:t>
+            </a:r>
+            <a:endParaRPr lang="pt-BR" sz="4400" dirty="0">
+              <a:latin typeface="+mj-lt"/>
+            </a:endParaRPr>
+          </a:p>
+        </p:txBody>
+      </p:sp>
+    </p:spTree>
+    <p:extLst>
+      <p:ext uri="{BB962C8B-B14F-4D97-AF65-F5344CB8AC3E}">
+        <p14:creationId xmlns:p14="http://schemas.microsoft.com/office/powerpoint/2010/main" val="3320518194"/>
+      </p:ext>
+    </p:extLst>
+  </p:cSld>
+  <p:clrMapOvr>
+    <a:masterClrMapping/>
+  </p:clrMapOvr>
+</p:sld>
+</file>
+
+<file path=ppt/slides/slide12.xml><?xml version="1.0" encoding="utf-8"?>
+<p:sld xmlns:a="http://schemas.openxmlformats.org/drawingml/2006/main" xmlns:r="http://schemas.openxmlformats.org/officeDocument/2006/relationships" xmlns:p="http://schemas.openxmlformats.org/presentationml/2006/main">
+  <p:cSld>
+    <p:spTree>
+      <p:nvGrpSpPr>
+        <p:cNvPr id="1" name=""/>
+        <p:cNvGrpSpPr/>
+        <p:nvPr/>
+      </p:nvGrpSpPr>
+      <p:grpSpPr>
+        <a:xfrm>
+          <a:off x="0" y="0"/>
+          <a:ext cx="0" cy="0"/>
+          <a:chOff x="0" y="0"/>
+          <a:chExt cx="0" cy="0"/>
+        </a:xfrm>
+      </p:grpSpPr>
       <p:sp>
         <p:nvSpPr>
           <p:cNvPr id="2" name="Seta: Pentágono 2">
@@ -9874,7 +10101,7 @@
 </p:sld>
 </file>
 
-<file path=ppt/slides/slide11.xml><?xml version="1.0" encoding="utf-8"?>
+<file path=ppt/slides/slide13.xml><?xml version="1.0" encoding="utf-8"?>
 <p:sld xmlns:a="http://schemas.openxmlformats.org/drawingml/2006/main" xmlns:r="http://schemas.openxmlformats.org/officeDocument/2006/relationships" xmlns:p="http://schemas.openxmlformats.org/presentationml/2006/main">
   <p:cSld>
     <p:spTree>
@@ -9970,7 +10197,7 @@
 </p:sld>
 </file>
 
-<file path=ppt/slides/slide12.xml><?xml version="1.0" encoding="utf-8"?>
+<file path=ppt/slides/slide14.xml><?xml version="1.0" encoding="utf-8"?>
 <p:sld xmlns:a="http://schemas.openxmlformats.org/drawingml/2006/main" xmlns:r="http://schemas.openxmlformats.org/officeDocument/2006/relationships" xmlns:p="http://schemas.openxmlformats.org/presentationml/2006/main">
   <p:cSld>
     <p:spTree>
@@ -11257,7 +11484,7 @@
 </p:sld>
 </file>
 
-<file path=ppt/slides/slide13.xml><?xml version="1.0" encoding="utf-8"?>
+<file path=ppt/slides/slide15.xml><?xml version="1.0" encoding="utf-8"?>
 <p:sld xmlns:a="http://schemas.openxmlformats.org/drawingml/2006/main" xmlns:r="http://schemas.openxmlformats.org/officeDocument/2006/relationships" xmlns:p="http://schemas.openxmlformats.org/presentationml/2006/main">
   <p:cSld>
     <p:spTree>
@@ -11359,7 +11586,7 @@
 </p:sld>
 </file>
 
-<file path=ppt/slides/slide14.xml><?xml version="1.0" encoding="utf-8"?>
+<file path=ppt/slides/slide16.xml><?xml version="1.0" encoding="utf-8"?>
 <p:sld xmlns:a="http://schemas.openxmlformats.org/drawingml/2006/main" xmlns:r="http://schemas.openxmlformats.org/officeDocument/2006/relationships" xmlns:p="http://schemas.openxmlformats.org/presentationml/2006/main">
   <p:cSld>
     <p:spTree>
@@ -11427,19 +11654,7 @@
               <a:rPr lang="pt-BR" sz="4400" dirty="0" smtClean="0">
                 <a:latin typeface="+mj-lt"/>
               </a:rPr>
-              <a:t> </a:t>
-            </a:r>
-            <a:r>
-              <a:rPr lang="pt-BR" sz="4400" dirty="0" smtClean="0">
-                <a:latin typeface="+mj-lt"/>
-              </a:rPr>
-              <a:t>Modelagem conceitual</a:t>
-            </a:r>
-            <a:r>
-              <a:rPr lang="pt-BR" sz="4400" dirty="0" smtClean="0">
-                <a:latin typeface="+mj-lt"/>
-              </a:rPr>
-              <a:t> do banco de dados </a:t>
+              <a:t> Modelagem conceitual do banco de dados </a:t>
             </a:r>
             <a:endParaRPr lang="pt-BR" sz="4400" dirty="0">
               <a:latin typeface="+mj-lt"/>
@@ -11554,7 +11769,7 @@
 </p:sld>
 </file>
 
-<file path=ppt/slides/slide15.xml><?xml version="1.0" encoding="utf-8"?>
+<file path=ppt/slides/slide17.xml><?xml version="1.0" encoding="utf-8"?>
 <p:sld xmlns:a="http://schemas.openxmlformats.org/drawingml/2006/main" xmlns:r="http://schemas.openxmlformats.org/officeDocument/2006/relationships" xmlns:p="http://schemas.openxmlformats.org/presentationml/2006/main">
   <p:cSld>
     <p:spTree>
@@ -11694,7 +11909,7 @@
 </p:sld>
 </file>
 
-<file path=ppt/slides/slide16.xml><?xml version="1.0" encoding="utf-8"?>
+<file path=ppt/slides/slide18.xml><?xml version="1.0" encoding="utf-8"?>
 <p:sld xmlns:a="http://schemas.openxmlformats.org/drawingml/2006/main" xmlns:r="http://schemas.openxmlformats.org/officeDocument/2006/relationships" xmlns:p="http://schemas.openxmlformats.org/presentationml/2006/main">
   <p:cSld>
     <p:spTree>
@@ -11939,8 +12154,8 @@
         </p:nvSpPr>
         <p:spPr>
           <a:xfrm>
-            <a:off x="0" y="429321"/>
-            <a:ext cx="5237017" cy="700428"/>
+            <a:off x="1" y="392433"/>
+            <a:ext cx="4049486" cy="700428"/>
           </a:xfrm>
           <a:prstGeom prst="homePlate">
             <a:avLst/>
@@ -12040,19 +12255,7 @@
               <a:rPr lang="pt-BR" sz="2400" dirty="0" smtClean="0">
                 <a:latin typeface="+mj-lt"/>
               </a:rPr>
-              <a:t> Fazemos parte da MIT, criada para revolucionar e trazer uma </a:t>
-            </a:r>
-            <a:r>
-              <a:rPr lang="pt-BR" sz="2400" dirty="0" smtClean="0">
-                <a:latin typeface="+mj-lt"/>
-              </a:rPr>
-              <a:t>novas </a:t>
-            </a:r>
-            <a:r>
-              <a:rPr lang="pt-BR" sz="2400" dirty="0" smtClean="0">
-                <a:latin typeface="+mj-lt"/>
-              </a:rPr>
-              <a:t>maneira de lidar com o lixo.</a:t>
+              <a:t> Fazemos parte da MIT, criada para revolucionar e trazer uma novas maneira de lidar com o lixo.</a:t>
             </a:r>
             <a:endParaRPr lang="pt-BR" sz="2400" dirty="0">
               <a:latin typeface="+mj-lt"/>
@@ -12430,7 +12633,7 @@
         <p:spPr>
           <a:xfrm>
             <a:off x="0" y="429321"/>
-            <a:ext cx="5237017" cy="700428"/>
+            <a:ext cx="3056709" cy="700428"/>
           </a:xfrm>
           <a:prstGeom prst="homePlate">
             <a:avLst/>
@@ -12775,19 +12978,7 @@
               <a:rPr lang="pt-BR" sz="2400" dirty="0" smtClean="0">
                 <a:latin typeface="+mj-lt"/>
               </a:rPr>
-              <a:t>Ser líder nacional do segmento, revolucionando a forma de coletar </a:t>
-            </a:r>
-            <a:r>
-              <a:rPr lang="pt-BR" sz="2400" dirty="0" smtClean="0">
-                <a:latin typeface="+mj-lt"/>
-              </a:rPr>
-              <a:t>resíduos, </a:t>
-            </a:r>
-            <a:r>
-              <a:rPr lang="pt-BR" sz="2400" dirty="0" smtClean="0">
-                <a:latin typeface="+mj-lt"/>
-              </a:rPr>
-              <a:t>levando eficiência na logística da coleta.</a:t>
+              <a:t>Ser líder nacional do segmento, revolucionando a forma de coletar resíduos, levando eficiência na logística da coleta.</a:t>
             </a:r>
             <a:endParaRPr lang="pt-BR" sz="2400" dirty="0">
               <a:latin typeface="+mj-lt"/>
@@ -13299,8 +13490,8 @@
         </p:nvSpPr>
         <p:spPr>
           <a:xfrm>
-            <a:off x="0" y="361951"/>
-            <a:ext cx="5237017" cy="767798"/>
+            <a:off x="1" y="361951"/>
+            <a:ext cx="4049486" cy="767798"/>
           </a:xfrm>
           <a:prstGeom prst="homePlate">
             <a:avLst/>
@@ -13358,8 +13549,8 @@
         </p:nvSpPr>
         <p:spPr>
           <a:xfrm>
-            <a:off x="0" y="2990851"/>
-            <a:ext cx="3790950" cy="691598"/>
+            <a:off x="0" y="2766849"/>
+            <a:ext cx="2325189" cy="691598"/>
           </a:xfrm>
           <a:prstGeom prst="homePlate">
             <a:avLst/>
@@ -13602,8 +13793,8 @@
         </p:nvSpPr>
         <p:spPr>
           <a:xfrm>
-            <a:off x="0" y="429321"/>
-            <a:ext cx="5237017" cy="700428"/>
+            <a:off x="1" y="429321"/>
+            <a:ext cx="3291840" cy="700428"/>
           </a:xfrm>
           <a:prstGeom prst="homePlate">
             <a:avLst/>
@@ -14237,7 +14428,7 @@
         <p:spPr>
           <a:xfrm>
             <a:off x="0" y="361951"/>
-            <a:ext cx="5237017" cy="767798"/>
+            <a:ext cx="2756263" cy="767798"/>
           </a:xfrm>
           <a:prstGeom prst="homePlate">
             <a:avLst/>
@@ -14318,28 +14509,114 @@
       </p:sp>
       <p:pic>
         <p:nvPicPr>
-          <p:cNvPr id="7" name="Imagem 6"/>
+          <p:cNvPr id="2" name="Imagem 1"/>
           <p:cNvPicPr>
             <a:picLocks noChangeAspect="1"/>
           </p:cNvPicPr>
           <p:nvPr/>
         </p:nvPicPr>
-        <p:blipFill>
-          <a:blip r:embed="rId2">
+        <p:blipFill rotWithShape="1">
+          <a:blip r:embed="rId2" cstate="print">
             <a:extLst>
               <a:ext uri="{28A0092B-C50C-407E-A947-70E740481C1C}">
                 <a14:useLocalDpi xmlns:a14="http://schemas.microsoft.com/office/drawing/2010/main" val="0"/>
               </a:ext>
             </a:extLst>
           </a:blip>
-          <a:stretch>
-            <a:fillRect/>
-          </a:stretch>
+          <a:srcRect l="14747" t="7889" r="14091" b="4478"/>
+          <a:stretch/>
         </p:blipFill>
         <p:spPr>
           <a:xfrm>
-            <a:off x="1016000" y="4707110"/>
-            <a:ext cx="3689350" cy="1744489"/>
+            <a:off x="5237017" y="3983211"/>
+            <a:ext cx="874069" cy="1345476"/>
+          </a:xfrm>
+          <a:prstGeom prst="rect">
+            <a:avLst/>
+          </a:prstGeom>
+        </p:spPr>
+      </p:pic>
+      <p:pic>
+        <p:nvPicPr>
+          <p:cNvPr id="4" name="Imagem 3"/>
+          <p:cNvPicPr>
+            <a:picLocks noChangeAspect="1"/>
+          </p:cNvPicPr>
+          <p:nvPr/>
+        </p:nvPicPr>
+        <p:blipFill rotWithShape="1">
+          <a:blip r:embed="rId3" cstate="print">
+            <a:extLst>
+              <a:ext uri="{28A0092B-C50C-407E-A947-70E740481C1C}">
+                <a14:useLocalDpi xmlns:a14="http://schemas.microsoft.com/office/drawing/2010/main" val="0"/>
+              </a:ext>
+            </a:extLst>
+          </a:blip>
+          <a:srcRect l="14365" t="7619" r="13255" b="4190"/>
+          <a:stretch/>
+        </p:blipFill>
+        <p:spPr>
+          <a:xfrm>
+            <a:off x="4047236" y="3995315"/>
+            <a:ext cx="1096264" cy="1669640"/>
+          </a:xfrm>
+          <a:prstGeom prst="rect">
+            <a:avLst/>
+          </a:prstGeom>
+        </p:spPr>
+      </p:pic>
+      <p:pic>
+        <p:nvPicPr>
+          <p:cNvPr id="5" name="Imagem 4"/>
+          <p:cNvPicPr>
+            <a:picLocks noChangeAspect="1"/>
+          </p:cNvPicPr>
+          <p:nvPr/>
+        </p:nvPicPr>
+        <p:blipFill rotWithShape="1">
+          <a:blip r:embed="rId4" cstate="print">
+            <a:extLst>
+              <a:ext uri="{28A0092B-C50C-407E-A947-70E740481C1C}">
+                <a14:useLocalDpi xmlns:a14="http://schemas.microsoft.com/office/drawing/2010/main" val="0"/>
+              </a:ext>
+            </a:extLst>
+          </a:blip>
+          <a:srcRect l="14603" t="8000" r="13493" b="4191"/>
+          <a:stretch/>
+        </p:blipFill>
+        <p:spPr>
+          <a:xfrm>
+            <a:off x="2500724" y="3995315"/>
+            <a:ext cx="1452995" cy="2217983"/>
+          </a:xfrm>
+          <a:prstGeom prst="rect">
+            <a:avLst/>
+          </a:prstGeom>
+        </p:spPr>
+      </p:pic>
+      <p:pic>
+        <p:nvPicPr>
+          <p:cNvPr id="8" name="Imagem 7"/>
+          <p:cNvPicPr>
+            <a:picLocks noChangeAspect="1"/>
+          </p:cNvPicPr>
+          <p:nvPr/>
+        </p:nvPicPr>
+        <p:blipFill rotWithShape="1">
+          <a:blip r:embed="rId5" cstate="print">
+            <a:extLst>
+              <a:ext uri="{28A0092B-C50C-407E-A947-70E740481C1C}">
+                <a14:useLocalDpi xmlns:a14="http://schemas.microsoft.com/office/drawing/2010/main" val="0"/>
+              </a:ext>
+            </a:extLst>
+          </a:blip>
+          <a:srcRect l="14365" t="7810" r="12778" b="4190"/>
+          <a:stretch/>
+        </p:blipFill>
+        <p:spPr>
+          <a:xfrm>
+            <a:off x="521067" y="4010297"/>
+            <a:ext cx="1886140" cy="2847703"/>
           </a:xfrm>
           <a:prstGeom prst="rect">
             <a:avLst/>
@@ -14468,282 +14745,6 @@
       </p:pic>
       <p:pic>
         <p:nvPicPr>
-          <p:cNvPr id="4" name="Picture 2">
-            <a:extLst>
-              <a:ext uri="{FF2B5EF4-FFF2-40B4-BE49-F238E27FC236}">
-                <a16:creationId xmlns:a16="http://schemas.microsoft.com/office/drawing/2014/main" id="{C2452783-5B7F-4453-839C-8E59BC4A3FE5}"/>
-              </a:ext>
-            </a:extLst>
-          </p:cNvPr>
-          <p:cNvPicPr>
-            <a:picLocks noChangeAspect="1" noChangeArrowheads="1"/>
-          </p:cNvPicPr>
-          <p:nvPr/>
-        </p:nvPicPr>
-        <p:blipFill rotWithShape="1">
-          <a:blip r:embed="rId3">
-            <a:extLst>
-              <a:ext uri="{BEBA8EAE-BF5A-486C-A8C5-ECC9F3942E4B}">
-                <a14:imgProps xmlns:a14="http://schemas.microsoft.com/office/drawing/2010/main">
-                  <a14:imgLayer r:embed="rId4">
-                    <a14:imgEffect>
-                      <a14:backgroundRemoval t="17500" b="82292" l="10000" r="90000">
-                        <a14:foregroundMark x1="55156" y1="73542" x2="58125" y2="78542"/>
-                        <a14:foregroundMark x1="58125" y1="78542" x2="62187" y2="81875"/>
-                        <a14:foregroundMark x1="62187" y1="81875" x2="66094" y2="82292"/>
-                        <a14:foregroundMark x1="66094" y1="82292" x2="72500" y2="76875"/>
-                        <a14:foregroundMark x1="22344" y1="60625" x2="23438" y2="33958"/>
-                        <a14:foregroundMark x1="72344" y1="28333" x2="74341" y2="30615"/>
-                        <a14:foregroundMark x1="75807" y1="36932" x2="75784" y2="36308"/>
-                        <a14:foregroundMark x1="74860" y1="48971" x2="72656" y2="66458"/>
-                        <a14:foregroundMark x1="75491" y1="43961" x2="74941" y2="48329"/>
-                        <a14:foregroundMark x1="73224" y1="71433" x2="73750" y2="76042"/>
-                        <a14:foregroundMark x1="72656" y1="66458" x2="73187" y2="71110"/>
-                        <a14:backgroundMark x1="18281" y1="47708" x2="17344" y2="32500"/>
-                        <a14:backgroundMark x1="53281" y1="67500" x2="54063" y2="27083"/>
-                        <a14:backgroundMark x1="20156" y1="32917" x2="20156" y2="45000"/>
-                        <a14:backgroundMark x1="77813" y1="69792" x2="77813" y2="64375"/>
-                        <a14:backgroundMark x1="77813" y1="64375" x2="81719" y2="54167"/>
-                        <a14:backgroundMark x1="81719" y1="54167" x2="89219" y2="47917"/>
-                        <a14:backgroundMark x1="89219" y1="47917" x2="90469" y2="47708"/>
-                        <a14:backgroundMark x1="77969" y1="48958" x2="77031" y2="28542"/>
-                        <a14:backgroundMark x1="77031" y1="28542" x2="74063" y2="24375"/>
-                        <a14:backgroundMark x1="74063" y1="24375" x2="73906" y2="24375"/>
-                        <a14:backgroundMark x1="77344" y1="54167" x2="75156" y2="39167"/>
-                        <a14:backgroundMark x1="75156" y1="39167" x2="75938" y2="31250"/>
-                        <a14:backgroundMark x1="76094" y1="54375" x2="75156" y2="49167"/>
-                        <a14:backgroundMark x1="75156" y1="49167" x2="75313" y2="43750"/>
-                        <a14:backgroundMark x1="75313" y1="43750" x2="76875" y2="38750"/>
-                        <a14:backgroundMark x1="76875" y1="38750" x2="75938" y2="33125"/>
-                        <a14:backgroundMark x1="75938" y1="33125" x2="74844" y2="32083"/>
-                        <a14:backgroundMark x1="74063" y1="67500" x2="74844" y2="46667"/>
-                        <a14:backgroundMark x1="76250" y1="44375" x2="76563" y2="38542"/>
-                        <a14:backgroundMark x1="76563" y1="38542" x2="77500" y2="35000"/>
-                        <a14:backgroundMark x1="75313" y1="47083" x2="76406" y2="34792"/>
-                        <a14:backgroundMark x1="76406" y1="34792" x2="76875" y2="32917"/>
-                        <a14:backgroundMark x1="77188" y1="42917" x2="76094" y2="37500"/>
-                        <a14:backgroundMark x1="76094" y1="37500" x2="75469" y2="37708"/>
-                        <a14:backgroundMark x1="77188" y1="40417" x2="75781" y2="40208"/>
-                        <a14:backgroundMark x1="75938" y1="37708" x2="76563" y2="33958"/>
-                      </a14:backgroundRemoval>
-                    </a14:imgEffect>
-                  </a14:imgLayer>
-                </a14:imgProps>
-              </a:ext>
-              <a:ext uri="{28A0092B-C50C-407E-A947-70E740481C1C}">
-                <a14:useLocalDpi xmlns:a14="http://schemas.microsoft.com/office/drawing/2010/main" val="0"/>
-              </a:ext>
-            </a:extLst>
-          </a:blip>
-          <a:srcRect l="53214" t="25802" r="23678" b="14942"/>
-          <a:stretch/>
-        </p:blipFill>
-        <p:spPr bwMode="auto">
-          <a:xfrm>
-            <a:off x="1070442" y="1078994"/>
-            <a:ext cx="766740" cy="1774296"/>
-          </a:xfrm>
-          <a:prstGeom prst="rect">
-            <a:avLst/>
-          </a:prstGeom>
-          <a:noFill/>
-          <a:extLst>
-            <a:ext uri="{909E8E84-426E-40DD-AFC4-6F175D3DCCD1}">
-              <a14:hiddenFill xmlns:a14="http://schemas.microsoft.com/office/drawing/2010/main">
-                <a:solidFill>
-                  <a:srgbClr val="FFFFFF"/>
-                </a:solidFill>
-              </a14:hiddenFill>
-            </a:ext>
-          </a:extLst>
-        </p:spPr>
-      </p:pic>
-      <p:pic>
-        <p:nvPicPr>
-          <p:cNvPr id="5" name="Picture 2">
-            <a:extLst>
-              <a:ext uri="{FF2B5EF4-FFF2-40B4-BE49-F238E27FC236}">
-                <a16:creationId xmlns:a16="http://schemas.microsoft.com/office/drawing/2014/main" id="{87BF9445-3906-4250-AE2F-30ED595296D3}"/>
-              </a:ext>
-            </a:extLst>
-          </p:cNvPr>
-          <p:cNvPicPr>
-            <a:picLocks noChangeAspect="1" noChangeArrowheads="1"/>
-          </p:cNvPicPr>
-          <p:nvPr/>
-        </p:nvPicPr>
-        <p:blipFill rotWithShape="1">
-          <a:blip r:embed="rId3">
-            <a:extLst>
-              <a:ext uri="{BEBA8EAE-BF5A-486C-A8C5-ECC9F3942E4B}">
-                <a14:imgProps xmlns:a14="http://schemas.microsoft.com/office/drawing/2010/main">
-                  <a14:imgLayer r:embed="rId4">
-                    <a14:imgEffect>
-                      <a14:backgroundRemoval t="17500" b="82292" l="10000" r="90000">
-                        <a14:foregroundMark x1="55156" y1="73542" x2="58125" y2="78542"/>
-                        <a14:foregroundMark x1="58125" y1="78542" x2="62187" y2="81875"/>
-                        <a14:foregroundMark x1="62187" y1="81875" x2="66094" y2="82292"/>
-                        <a14:foregroundMark x1="66094" y1="82292" x2="72500" y2="76875"/>
-                        <a14:foregroundMark x1="22344" y1="60625" x2="23438" y2="33958"/>
-                        <a14:foregroundMark x1="72344" y1="28333" x2="74341" y2="30615"/>
-                        <a14:foregroundMark x1="75807" y1="36932" x2="75784" y2="36308"/>
-                        <a14:foregroundMark x1="74860" y1="48971" x2="72656" y2="66458"/>
-                        <a14:foregroundMark x1="75491" y1="43961" x2="74941" y2="48329"/>
-                        <a14:foregroundMark x1="73224" y1="71433" x2="73750" y2="76042"/>
-                        <a14:foregroundMark x1="72656" y1="66458" x2="73187" y2="71110"/>
-                        <a14:backgroundMark x1="18281" y1="47708" x2="17344" y2="32500"/>
-                        <a14:backgroundMark x1="53281" y1="67500" x2="54063" y2="27083"/>
-                        <a14:backgroundMark x1="20156" y1="32917" x2="20156" y2="45000"/>
-                        <a14:backgroundMark x1="77813" y1="69792" x2="77813" y2="64375"/>
-                        <a14:backgroundMark x1="77813" y1="64375" x2="81719" y2="54167"/>
-                        <a14:backgroundMark x1="81719" y1="54167" x2="89219" y2="47917"/>
-                        <a14:backgroundMark x1="89219" y1="47917" x2="90469" y2="47708"/>
-                        <a14:backgroundMark x1="77969" y1="48958" x2="77031" y2="28542"/>
-                        <a14:backgroundMark x1="77031" y1="28542" x2="74063" y2="24375"/>
-                        <a14:backgroundMark x1="74063" y1="24375" x2="73906" y2="24375"/>
-                        <a14:backgroundMark x1="77344" y1="54167" x2="75156" y2="39167"/>
-                        <a14:backgroundMark x1="75156" y1="39167" x2="75938" y2="31250"/>
-                        <a14:backgroundMark x1="76094" y1="54375" x2="75156" y2="49167"/>
-                        <a14:backgroundMark x1="75156" y1="49167" x2="75313" y2="43750"/>
-                        <a14:backgroundMark x1="75313" y1="43750" x2="76875" y2="38750"/>
-                        <a14:backgroundMark x1="76875" y1="38750" x2="75938" y2="33125"/>
-                        <a14:backgroundMark x1="75938" y1="33125" x2="74844" y2="32083"/>
-                        <a14:backgroundMark x1="74063" y1="67500" x2="74844" y2="46667"/>
-                        <a14:backgroundMark x1="76250" y1="44375" x2="76563" y2="38542"/>
-                        <a14:backgroundMark x1="76563" y1="38542" x2="77500" y2="35000"/>
-                        <a14:backgroundMark x1="75313" y1="47083" x2="76406" y2="34792"/>
-                        <a14:backgroundMark x1="76406" y1="34792" x2="76875" y2="32917"/>
-                        <a14:backgroundMark x1="77188" y1="42917" x2="76094" y2="37500"/>
-                        <a14:backgroundMark x1="76094" y1="37500" x2="75469" y2="37708"/>
-                        <a14:backgroundMark x1="77188" y1="40417" x2="75781" y2="40208"/>
-                        <a14:backgroundMark x1="75938" y1="37708" x2="76563" y2="33958"/>
-                      </a14:backgroundRemoval>
-                    </a14:imgEffect>
-                  </a14:imgLayer>
-                </a14:imgProps>
-              </a:ext>
-              <a:ext uri="{28A0092B-C50C-407E-A947-70E740481C1C}">
-                <a14:useLocalDpi xmlns:a14="http://schemas.microsoft.com/office/drawing/2010/main" val="0"/>
-              </a:ext>
-            </a:extLst>
-          </a:blip>
-          <a:srcRect l="34363" t="27965" r="46177" b="14941"/>
-          <a:stretch/>
-        </p:blipFill>
-        <p:spPr bwMode="auto">
-          <a:xfrm>
-            <a:off x="2080764" y="1013545"/>
-            <a:ext cx="724214" cy="1872325"/>
-          </a:xfrm>
-          <a:prstGeom prst="rect">
-            <a:avLst/>
-          </a:prstGeom>
-          <a:noFill/>
-          <a:extLst>
-            <a:ext uri="{909E8E84-426E-40DD-AFC4-6F175D3DCCD1}">
-              <a14:hiddenFill xmlns:a14="http://schemas.microsoft.com/office/drawing/2010/main">
-                <a:solidFill>
-                  <a:srgbClr val="FFFFFF"/>
-                </a:solidFill>
-              </a14:hiddenFill>
-            </a:ext>
-          </a:extLst>
-        </p:spPr>
-      </p:pic>
-      <p:pic>
-        <p:nvPicPr>
-          <p:cNvPr id="6" name="Picture 2">
-            <a:extLst>
-              <a:ext uri="{FF2B5EF4-FFF2-40B4-BE49-F238E27FC236}">
-                <a16:creationId xmlns:a16="http://schemas.microsoft.com/office/drawing/2014/main" id="{5A537892-DA3B-43DE-A5D6-1C0F4BF296DA}"/>
-              </a:ext>
-            </a:extLst>
-          </p:cNvPr>
-          <p:cNvPicPr>
-            <a:picLocks noChangeAspect="1" noChangeArrowheads="1"/>
-          </p:cNvPicPr>
-          <p:nvPr/>
-        </p:nvPicPr>
-        <p:blipFill rotWithShape="1">
-          <a:blip r:embed="rId3">
-            <a:extLst>
-              <a:ext uri="{BEBA8EAE-BF5A-486C-A8C5-ECC9F3942E4B}">
-                <a14:imgProps xmlns:a14="http://schemas.microsoft.com/office/drawing/2010/main">
-                  <a14:imgLayer r:embed="rId4">
-                    <a14:imgEffect>
-                      <a14:backgroundRemoval t="17500" b="82292" l="10000" r="90000">
-                        <a14:foregroundMark x1="55156" y1="73542" x2="58125" y2="78542"/>
-                        <a14:foregroundMark x1="58125" y1="78542" x2="62187" y2="81875"/>
-                        <a14:foregroundMark x1="62187" y1="81875" x2="66094" y2="82292"/>
-                        <a14:foregroundMark x1="66094" y1="82292" x2="72500" y2="76875"/>
-                        <a14:foregroundMark x1="22344" y1="60625" x2="23438" y2="33958"/>
-                        <a14:foregroundMark x1="72344" y1="28333" x2="74341" y2="30615"/>
-                        <a14:foregroundMark x1="75807" y1="36932" x2="75784" y2="36308"/>
-                        <a14:foregroundMark x1="74860" y1="48971" x2="72656" y2="66458"/>
-                        <a14:foregroundMark x1="75491" y1="43961" x2="74941" y2="48329"/>
-                        <a14:foregroundMark x1="73224" y1="71433" x2="73750" y2="76042"/>
-                        <a14:foregroundMark x1="72656" y1="66458" x2="73187" y2="71110"/>
-                        <a14:backgroundMark x1="18281" y1="47708" x2="17344" y2="32500"/>
-                        <a14:backgroundMark x1="53281" y1="67500" x2="54063" y2="27083"/>
-                        <a14:backgroundMark x1="20156" y1="32917" x2="20156" y2="45000"/>
-                        <a14:backgroundMark x1="77813" y1="69792" x2="77813" y2="64375"/>
-                        <a14:backgroundMark x1="77813" y1="64375" x2="81719" y2="54167"/>
-                        <a14:backgroundMark x1="81719" y1="54167" x2="89219" y2="47917"/>
-                        <a14:backgroundMark x1="89219" y1="47917" x2="90469" y2="47708"/>
-                        <a14:backgroundMark x1="77969" y1="48958" x2="77031" y2="28542"/>
-                        <a14:backgroundMark x1="77031" y1="28542" x2="74063" y2="24375"/>
-                        <a14:backgroundMark x1="74063" y1="24375" x2="73906" y2="24375"/>
-                        <a14:backgroundMark x1="77344" y1="54167" x2="75156" y2="39167"/>
-                        <a14:backgroundMark x1="75156" y1="39167" x2="75938" y2="31250"/>
-                        <a14:backgroundMark x1="76094" y1="54375" x2="75156" y2="49167"/>
-                        <a14:backgroundMark x1="75156" y1="49167" x2="75313" y2="43750"/>
-                        <a14:backgroundMark x1="75313" y1="43750" x2="76875" y2="38750"/>
-                        <a14:backgroundMark x1="76875" y1="38750" x2="75938" y2="33125"/>
-                        <a14:backgroundMark x1="75938" y1="33125" x2="74844" y2="32083"/>
-                        <a14:backgroundMark x1="74063" y1="67500" x2="74844" y2="46667"/>
-                        <a14:backgroundMark x1="76250" y1="44375" x2="76563" y2="38542"/>
-                        <a14:backgroundMark x1="76563" y1="38542" x2="77500" y2="35000"/>
-                        <a14:backgroundMark x1="75313" y1="47083" x2="76406" y2="34792"/>
-                        <a14:backgroundMark x1="76406" y1="34792" x2="76875" y2="32917"/>
-                        <a14:backgroundMark x1="77188" y1="42917" x2="76094" y2="37500"/>
-                        <a14:backgroundMark x1="76094" y1="37500" x2="75469" y2="37708"/>
-                        <a14:backgroundMark x1="77188" y1="40417" x2="75781" y2="40208"/>
-                        <a14:backgroundMark x1="75938" y1="37708" x2="76563" y2="33958"/>
-                      </a14:backgroundRemoval>
-                    </a14:imgEffect>
-                  </a14:imgLayer>
-                </a14:imgProps>
-              </a:ext>
-              <a:ext uri="{28A0092B-C50C-407E-A947-70E740481C1C}">
-                <a14:useLocalDpi xmlns:a14="http://schemas.microsoft.com/office/drawing/2010/main" val="0"/>
-              </a:ext>
-            </a:extLst>
-          </a:blip>
-          <a:srcRect l="18755" t="27422" r="65306" b="14943"/>
-          <a:stretch/>
-        </p:blipFill>
-        <p:spPr bwMode="auto">
-          <a:xfrm>
-            <a:off x="2876610" y="798512"/>
-            <a:ext cx="581862" cy="1780653"/>
-          </a:xfrm>
-          <a:prstGeom prst="rect">
-            <a:avLst/>
-          </a:prstGeom>
-          <a:noFill/>
-          <a:extLst>
-            <a:ext uri="{909E8E84-426E-40DD-AFC4-6F175D3DCCD1}">
-              <a14:hiddenFill xmlns:a14="http://schemas.microsoft.com/office/drawing/2010/main">
-                <a:solidFill>
-                  <a:srgbClr val="FFFFFF"/>
-                </a:solidFill>
-              </a14:hiddenFill>
-            </a:ext>
-          </a:extLst>
-        </p:spPr>
-      </p:pic>
-      <p:pic>
-        <p:nvPicPr>
           <p:cNvPr id="7" name="Imagem 6"/>
           <p:cNvPicPr>
             <a:picLocks noChangeAspect="1"/>
@@ -14751,7 +14752,7 @@
           <p:nvPr/>
         </p:nvPicPr>
         <p:blipFill rotWithShape="1">
-          <a:blip r:embed="rId5"/>
+          <a:blip r:embed="rId3"/>
           <a:srcRect r="33924" b="9899"/>
           <a:stretch/>
         </p:blipFill>
@@ -14774,7 +14775,7 @@
           <p:nvPr/>
         </p:nvPicPr>
         <p:blipFill>
-          <a:blip r:embed="rId6"/>
+          <a:blip r:embed="rId4"/>
           <a:stretch>
             <a:fillRect/>
           </a:stretch>
@@ -14798,7 +14799,7 @@
           <p:nvPr/>
         </p:nvPicPr>
         <p:blipFill>
-          <a:blip r:embed="rId7"/>
+          <a:blip r:embed="rId5"/>
           <a:stretch>
             <a:fillRect/>
           </a:stretch>
@@ -14822,7 +14823,7 @@
           <p:nvPr/>
         </p:nvPicPr>
         <p:blipFill>
-          <a:blip r:embed="rId5"/>
+          <a:blip r:embed="rId3"/>
           <a:stretch>
             <a:fillRect/>
           </a:stretch>
@@ -14846,7 +14847,7 @@
           <p:nvPr/>
         </p:nvPicPr>
         <p:blipFill>
-          <a:blip r:embed="rId8"/>
+          <a:blip r:embed="rId6"/>
           <a:stretch>
             <a:fillRect/>
           </a:stretch>
@@ -14959,30 +14960,6 @@
       </p:sp>
       <p:pic>
         <p:nvPicPr>
-          <p:cNvPr id="15" name="Imagem 14"/>
-          <p:cNvPicPr>
-            <a:picLocks noChangeAspect="1"/>
-          </p:cNvPicPr>
-          <p:nvPr/>
-        </p:nvPicPr>
-        <p:blipFill>
-          <a:blip r:embed="rId9"/>
-          <a:stretch>
-            <a:fillRect/>
-          </a:stretch>
-        </p:blipFill>
-        <p:spPr>
-          <a:xfrm rot="2517929">
-            <a:off x="3643122" y="1649908"/>
-            <a:ext cx="390525" cy="495300"/>
-          </a:xfrm>
-          <a:prstGeom prst="rect">
-            <a:avLst/>
-          </a:prstGeom>
-        </p:spPr>
-      </p:pic>
-      <p:pic>
-        <p:nvPicPr>
           <p:cNvPr id="17" name="Imagem 16"/>
           <p:cNvPicPr>
             <a:picLocks noChangeAspect="1"/>
@@ -14990,7 +14967,7 @@
           <p:nvPr/>
         </p:nvPicPr>
         <p:blipFill>
-          <a:blip r:embed="rId10" cstate="print">
+          <a:blip r:embed="rId7" cstate="print">
             <a:extLst>
               <a:ext uri="{28A0092B-C50C-407E-A947-70E740481C1C}">
                 <a14:useLocalDpi xmlns:a14="http://schemas.microsoft.com/office/drawing/2010/main" val="0"/>
@@ -15020,7 +14997,7 @@
           <p:nvPr/>
         </p:nvPicPr>
         <p:blipFill>
-          <a:blip r:embed="rId9"/>
+          <a:blip r:embed="rId8"/>
           <a:stretch>
             <a:fillRect/>
           </a:stretch>
@@ -15043,7 +15020,7 @@
         </p:nvSpPr>
         <p:spPr>
           <a:xfrm>
-            <a:off x="4304575" y="1063858"/>
+            <a:off x="5729982" y="1124544"/>
             <a:ext cx="3751594" cy="923330"/>
           </a:xfrm>
           <a:prstGeom prst="rect">
@@ -15088,7 +15065,7 @@
         </p:nvSpPr>
         <p:spPr>
           <a:xfrm>
-            <a:off x="3762424" y="3491046"/>
+            <a:off x="4397051" y="3607642"/>
             <a:ext cx="3894206" cy="923330"/>
           </a:xfrm>
           <a:prstGeom prst="rect">
@@ -15159,13 +15136,13 @@
           <p:nvPr/>
         </p:nvPicPr>
         <p:blipFill rotWithShape="1">
-          <a:blip r:embed="rId5"/>
+          <a:blip r:embed="rId3"/>
           <a:srcRect r="33924" b="9899"/>
           <a:stretch/>
         </p:blipFill>
         <p:spPr>
           <a:xfrm>
-            <a:off x="3626137" y="4682979"/>
+            <a:off x="3835456" y="4669996"/>
             <a:ext cx="4678467" cy="274331"/>
           </a:xfrm>
           <a:prstGeom prst="rect">
@@ -15182,7 +15159,7 @@
           <p:nvPr/>
         </p:nvPicPr>
         <p:blipFill>
-          <a:blip r:embed="rId11">
+          <a:blip r:embed="rId9">
             <a:extLst>
               <a:ext uri="{28A0092B-C50C-407E-A947-70E740481C1C}">
                 <a14:useLocalDpi xmlns:a14="http://schemas.microsoft.com/office/drawing/2010/main" val="0"/>
@@ -15203,282 +15180,6 @@
           </a:prstGeom>
         </p:spPr>
       </p:pic>
-      <p:pic>
-        <p:nvPicPr>
-          <p:cNvPr id="25" name="Picture 2">
-            <a:extLst>
-              <a:ext uri="{FF2B5EF4-FFF2-40B4-BE49-F238E27FC236}">
-                <a16:creationId xmlns:a16="http://schemas.microsoft.com/office/drawing/2014/main" id="{C2452783-5B7F-4453-839C-8E59BC4A3FE5}"/>
-              </a:ext>
-            </a:extLst>
-          </p:cNvPr>
-          <p:cNvPicPr>
-            <a:picLocks noChangeAspect="1" noChangeArrowheads="1"/>
-          </p:cNvPicPr>
-          <p:nvPr/>
-        </p:nvPicPr>
-        <p:blipFill rotWithShape="1">
-          <a:blip r:embed="rId3" cstate="print">
-            <a:extLst>
-              <a:ext uri="{BEBA8EAE-BF5A-486C-A8C5-ECC9F3942E4B}">
-                <a14:imgProps xmlns:a14="http://schemas.microsoft.com/office/drawing/2010/main">
-                  <a14:imgLayer r:embed="rId4">
-                    <a14:imgEffect>
-                      <a14:backgroundRemoval t="17500" b="82292" l="10000" r="90000">
-                        <a14:foregroundMark x1="55156" y1="73542" x2="58125" y2="78542"/>
-                        <a14:foregroundMark x1="58125" y1="78542" x2="62187" y2="81875"/>
-                        <a14:foregroundMark x1="62187" y1="81875" x2="66094" y2="82292"/>
-                        <a14:foregroundMark x1="66094" y1="82292" x2="72500" y2="76875"/>
-                        <a14:foregroundMark x1="22344" y1="60625" x2="23438" y2="33958"/>
-                        <a14:foregroundMark x1="72344" y1="28333" x2="74341" y2="30615"/>
-                        <a14:foregroundMark x1="75807" y1="36932" x2="75784" y2="36308"/>
-                        <a14:foregroundMark x1="74860" y1="48971" x2="72656" y2="66458"/>
-                        <a14:foregroundMark x1="75491" y1="43961" x2="74941" y2="48329"/>
-                        <a14:foregroundMark x1="73224" y1="71433" x2="73750" y2="76042"/>
-                        <a14:foregroundMark x1="72656" y1="66458" x2="73187" y2="71110"/>
-                        <a14:backgroundMark x1="18281" y1="47708" x2="17344" y2="32500"/>
-                        <a14:backgroundMark x1="53281" y1="67500" x2="54063" y2="27083"/>
-                        <a14:backgroundMark x1="20156" y1="32917" x2="20156" y2="45000"/>
-                        <a14:backgroundMark x1="77813" y1="69792" x2="77813" y2="64375"/>
-                        <a14:backgroundMark x1="77813" y1="64375" x2="81719" y2="54167"/>
-                        <a14:backgroundMark x1="81719" y1="54167" x2="89219" y2="47917"/>
-                        <a14:backgroundMark x1="89219" y1="47917" x2="90469" y2="47708"/>
-                        <a14:backgroundMark x1="77969" y1="48958" x2="77031" y2="28542"/>
-                        <a14:backgroundMark x1="77031" y1="28542" x2="74063" y2="24375"/>
-                        <a14:backgroundMark x1="74063" y1="24375" x2="73906" y2="24375"/>
-                        <a14:backgroundMark x1="77344" y1="54167" x2="75156" y2="39167"/>
-                        <a14:backgroundMark x1="75156" y1="39167" x2="75938" y2="31250"/>
-                        <a14:backgroundMark x1="76094" y1="54375" x2="75156" y2="49167"/>
-                        <a14:backgroundMark x1="75156" y1="49167" x2="75313" y2="43750"/>
-                        <a14:backgroundMark x1="75313" y1="43750" x2="76875" y2="38750"/>
-                        <a14:backgroundMark x1="76875" y1="38750" x2="75938" y2="33125"/>
-                        <a14:backgroundMark x1="75938" y1="33125" x2="74844" y2="32083"/>
-                        <a14:backgroundMark x1="74063" y1="67500" x2="74844" y2="46667"/>
-                        <a14:backgroundMark x1="76250" y1="44375" x2="76563" y2="38542"/>
-                        <a14:backgroundMark x1="76563" y1="38542" x2="77500" y2="35000"/>
-                        <a14:backgroundMark x1="75313" y1="47083" x2="76406" y2="34792"/>
-                        <a14:backgroundMark x1="76406" y1="34792" x2="76875" y2="32917"/>
-                        <a14:backgroundMark x1="77188" y1="42917" x2="76094" y2="37500"/>
-                        <a14:backgroundMark x1="76094" y1="37500" x2="75469" y2="37708"/>
-                        <a14:backgroundMark x1="77188" y1="40417" x2="75781" y2="40208"/>
-                        <a14:backgroundMark x1="75938" y1="37708" x2="76563" y2="33958"/>
-                      </a14:backgroundRemoval>
-                    </a14:imgEffect>
-                  </a14:imgLayer>
-                </a14:imgProps>
-              </a:ext>
-              <a:ext uri="{28A0092B-C50C-407E-A947-70E740481C1C}">
-                <a14:useLocalDpi xmlns:a14="http://schemas.microsoft.com/office/drawing/2010/main" val="0"/>
-              </a:ext>
-            </a:extLst>
-          </a:blip>
-          <a:srcRect l="53214" t="25802" r="23678" b="14942"/>
-          <a:stretch/>
-        </p:blipFill>
-        <p:spPr bwMode="auto">
-          <a:xfrm>
-            <a:off x="3186960" y="4111958"/>
-            <a:ext cx="361768" cy="837160"/>
-          </a:xfrm>
-          <a:prstGeom prst="rect">
-            <a:avLst/>
-          </a:prstGeom>
-          <a:noFill/>
-          <a:extLst>
-            <a:ext uri="{909E8E84-426E-40DD-AFC4-6F175D3DCCD1}">
-              <a14:hiddenFill xmlns:a14="http://schemas.microsoft.com/office/drawing/2010/main">
-                <a:solidFill>
-                  <a:srgbClr val="FFFFFF"/>
-                </a:solidFill>
-              </a14:hiddenFill>
-            </a:ext>
-          </a:extLst>
-        </p:spPr>
-      </p:pic>
-      <p:pic>
-        <p:nvPicPr>
-          <p:cNvPr id="26" name="Picture 2">
-            <a:extLst>
-              <a:ext uri="{FF2B5EF4-FFF2-40B4-BE49-F238E27FC236}">
-                <a16:creationId xmlns:a16="http://schemas.microsoft.com/office/drawing/2014/main" id="{87BF9445-3906-4250-AE2F-30ED595296D3}"/>
-              </a:ext>
-            </a:extLst>
-          </p:cNvPr>
-          <p:cNvPicPr>
-            <a:picLocks noChangeAspect="1" noChangeArrowheads="1"/>
-          </p:cNvPicPr>
-          <p:nvPr/>
-        </p:nvPicPr>
-        <p:blipFill rotWithShape="1">
-          <a:blip r:embed="rId3" cstate="print">
-            <a:extLst>
-              <a:ext uri="{BEBA8EAE-BF5A-486C-A8C5-ECC9F3942E4B}">
-                <a14:imgProps xmlns:a14="http://schemas.microsoft.com/office/drawing/2010/main">
-                  <a14:imgLayer r:embed="rId4">
-                    <a14:imgEffect>
-                      <a14:backgroundRemoval t="17500" b="82292" l="10000" r="90000">
-                        <a14:foregroundMark x1="55156" y1="73542" x2="58125" y2="78542"/>
-                        <a14:foregroundMark x1="58125" y1="78542" x2="62187" y2="81875"/>
-                        <a14:foregroundMark x1="62187" y1="81875" x2="66094" y2="82292"/>
-                        <a14:foregroundMark x1="66094" y1="82292" x2="72500" y2="76875"/>
-                        <a14:foregroundMark x1="22344" y1="60625" x2="23438" y2="33958"/>
-                        <a14:foregroundMark x1="72344" y1="28333" x2="74341" y2="30615"/>
-                        <a14:foregroundMark x1="75807" y1="36932" x2="75784" y2="36308"/>
-                        <a14:foregroundMark x1="74860" y1="48971" x2="72656" y2="66458"/>
-                        <a14:foregroundMark x1="75491" y1="43961" x2="74941" y2="48329"/>
-                        <a14:foregroundMark x1="73224" y1="71433" x2="73750" y2="76042"/>
-                        <a14:foregroundMark x1="72656" y1="66458" x2="73187" y2="71110"/>
-                        <a14:backgroundMark x1="18281" y1="47708" x2="17344" y2="32500"/>
-                        <a14:backgroundMark x1="53281" y1="67500" x2="54063" y2="27083"/>
-                        <a14:backgroundMark x1="20156" y1="32917" x2="20156" y2="45000"/>
-                        <a14:backgroundMark x1="77813" y1="69792" x2="77813" y2="64375"/>
-                        <a14:backgroundMark x1="77813" y1="64375" x2="81719" y2="54167"/>
-                        <a14:backgroundMark x1="81719" y1="54167" x2="89219" y2="47917"/>
-                        <a14:backgroundMark x1="89219" y1="47917" x2="90469" y2="47708"/>
-                        <a14:backgroundMark x1="77969" y1="48958" x2="77031" y2="28542"/>
-                        <a14:backgroundMark x1="77031" y1="28542" x2="74063" y2="24375"/>
-                        <a14:backgroundMark x1="74063" y1="24375" x2="73906" y2="24375"/>
-                        <a14:backgroundMark x1="77344" y1="54167" x2="75156" y2="39167"/>
-                        <a14:backgroundMark x1="75156" y1="39167" x2="75938" y2="31250"/>
-                        <a14:backgroundMark x1="76094" y1="54375" x2="75156" y2="49167"/>
-                        <a14:backgroundMark x1="75156" y1="49167" x2="75313" y2="43750"/>
-                        <a14:backgroundMark x1="75313" y1="43750" x2="76875" y2="38750"/>
-                        <a14:backgroundMark x1="76875" y1="38750" x2="75938" y2="33125"/>
-                        <a14:backgroundMark x1="75938" y1="33125" x2="74844" y2="32083"/>
-                        <a14:backgroundMark x1="74063" y1="67500" x2="74844" y2="46667"/>
-                        <a14:backgroundMark x1="76250" y1="44375" x2="76563" y2="38542"/>
-                        <a14:backgroundMark x1="76563" y1="38542" x2="77500" y2="35000"/>
-                        <a14:backgroundMark x1="75313" y1="47083" x2="76406" y2="34792"/>
-                        <a14:backgroundMark x1="76406" y1="34792" x2="76875" y2="32917"/>
-                        <a14:backgroundMark x1="77188" y1="42917" x2="76094" y2="37500"/>
-                        <a14:backgroundMark x1="76094" y1="37500" x2="75469" y2="37708"/>
-                        <a14:backgroundMark x1="77188" y1="40417" x2="75781" y2="40208"/>
-                        <a14:backgroundMark x1="75938" y1="37708" x2="76563" y2="33958"/>
-                      </a14:backgroundRemoval>
-                    </a14:imgEffect>
-                  </a14:imgLayer>
-                </a14:imgProps>
-              </a:ext>
-              <a:ext uri="{28A0092B-C50C-407E-A947-70E740481C1C}">
-                <a14:useLocalDpi xmlns:a14="http://schemas.microsoft.com/office/drawing/2010/main" val="0"/>
-              </a:ext>
-            </a:extLst>
-          </a:blip>
-          <a:srcRect l="34363" t="27965" r="46177" b="14941"/>
-          <a:stretch/>
-        </p:blipFill>
-        <p:spPr bwMode="auto">
-          <a:xfrm>
-            <a:off x="2935879" y="4154846"/>
-            <a:ext cx="405871" cy="1049306"/>
-          </a:xfrm>
-          <a:prstGeom prst="rect">
-            <a:avLst/>
-          </a:prstGeom>
-          <a:noFill/>
-          <a:extLst>
-            <a:ext uri="{909E8E84-426E-40DD-AFC4-6F175D3DCCD1}">
-              <a14:hiddenFill xmlns:a14="http://schemas.microsoft.com/office/drawing/2010/main">
-                <a:solidFill>
-                  <a:srgbClr val="FFFFFF"/>
-                </a:solidFill>
-              </a14:hiddenFill>
-            </a:ext>
-          </a:extLst>
-        </p:spPr>
-      </p:pic>
-      <p:pic>
-        <p:nvPicPr>
-          <p:cNvPr id="27" name="Picture 2">
-            <a:extLst>
-              <a:ext uri="{FF2B5EF4-FFF2-40B4-BE49-F238E27FC236}">
-                <a16:creationId xmlns:a16="http://schemas.microsoft.com/office/drawing/2014/main" id="{5A537892-DA3B-43DE-A5D6-1C0F4BF296DA}"/>
-              </a:ext>
-            </a:extLst>
-          </p:cNvPr>
-          <p:cNvPicPr>
-            <a:picLocks noChangeAspect="1" noChangeArrowheads="1"/>
-          </p:cNvPicPr>
-          <p:nvPr/>
-        </p:nvPicPr>
-        <p:blipFill rotWithShape="1">
-          <a:blip r:embed="rId3">
-            <a:extLst>
-              <a:ext uri="{BEBA8EAE-BF5A-486C-A8C5-ECC9F3942E4B}">
-                <a14:imgProps xmlns:a14="http://schemas.microsoft.com/office/drawing/2010/main">
-                  <a14:imgLayer r:embed="rId4">
-                    <a14:imgEffect>
-                      <a14:backgroundRemoval t="17500" b="82292" l="10000" r="90000">
-                        <a14:foregroundMark x1="55156" y1="73542" x2="58125" y2="78542"/>
-                        <a14:foregroundMark x1="58125" y1="78542" x2="62187" y2="81875"/>
-                        <a14:foregroundMark x1="62187" y1="81875" x2="66094" y2="82292"/>
-                        <a14:foregroundMark x1="66094" y1="82292" x2="72500" y2="76875"/>
-                        <a14:foregroundMark x1="22344" y1="60625" x2="23438" y2="33958"/>
-                        <a14:foregroundMark x1="72344" y1="28333" x2="74341" y2="30615"/>
-                        <a14:foregroundMark x1="75807" y1="36932" x2="75784" y2="36308"/>
-                        <a14:foregroundMark x1="74860" y1="48971" x2="72656" y2="66458"/>
-                        <a14:foregroundMark x1="75491" y1="43961" x2="74941" y2="48329"/>
-                        <a14:foregroundMark x1="73224" y1="71433" x2="73750" y2="76042"/>
-                        <a14:foregroundMark x1="72656" y1="66458" x2="73187" y2="71110"/>
-                        <a14:backgroundMark x1="18281" y1="47708" x2="17344" y2="32500"/>
-                        <a14:backgroundMark x1="53281" y1="67500" x2="54063" y2="27083"/>
-                        <a14:backgroundMark x1="20156" y1="32917" x2="20156" y2="45000"/>
-                        <a14:backgroundMark x1="77813" y1="69792" x2="77813" y2="64375"/>
-                        <a14:backgroundMark x1="77813" y1="64375" x2="81719" y2="54167"/>
-                        <a14:backgroundMark x1="81719" y1="54167" x2="89219" y2="47917"/>
-                        <a14:backgroundMark x1="89219" y1="47917" x2="90469" y2="47708"/>
-                        <a14:backgroundMark x1="77969" y1="48958" x2="77031" y2="28542"/>
-                        <a14:backgroundMark x1="77031" y1="28542" x2="74063" y2="24375"/>
-                        <a14:backgroundMark x1="74063" y1="24375" x2="73906" y2="24375"/>
-                        <a14:backgroundMark x1="77344" y1="54167" x2="75156" y2="39167"/>
-                        <a14:backgroundMark x1="75156" y1="39167" x2="75938" y2="31250"/>
-                        <a14:backgroundMark x1="76094" y1="54375" x2="75156" y2="49167"/>
-                        <a14:backgroundMark x1="75156" y1="49167" x2="75313" y2="43750"/>
-                        <a14:backgroundMark x1="75313" y1="43750" x2="76875" y2="38750"/>
-                        <a14:backgroundMark x1="76875" y1="38750" x2="75938" y2="33125"/>
-                        <a14:backgroundMark x1="75938" y1="33125" x2="74844" y2="32083"/>
-                        <a14:backgroundMark x1="74063" y1="67500" x2="74844" y2="46667"/>
-                        <a14:backgroundMark x1="76250" y1="44375" x2="76563" y2="38542"/>
-                        <a14:backgroundMark x1="76563" y1="38542" x2="77500" y2="35000"/>
-                        <a14:backgroundMark x1="75313" y1="47083" x2="76406" y2="34792"/>
-                        <a14:backgroundMark x1="76406" y1="34792" x2="76875" y2="32917"/>
-                        <a14:backgroundMark x1="77188" y1="42917" x2="76094" y2="37500"/>
-                        <a14:backgroundMark x1="76094" y1="37500" x2="75469" y2="37708"/>
-                        <a14:backgroundMark x1="77188" y1="40417" x2="75781" y2="40208"/>
-                        <a14:backgroundMark x1="75938" y1="37708" x2="76563" y2="33958"/>
-                      </a14:backgroundRemoval>
-                    </a14:imgEffect>
-                  </a14:imgLayer>
-                </a14:imgProps>
-              </a:ext>
-              <a:ext uri="{28A0092B-C50C-407E-A947-70E740481C1C}">
-                <a14:useLocalDpi xmlns:a14="http://schemas.microsoft.com/office/drawing/2010/main" val="0"/>
-              </a:ext>
-            </a:extLst>
-          </a:blip>
-          <a:srcRect l="18755" t="27422" r="65306" b="14943"/>
-          <a:stretch/>
-        </p:blipFill>
-        <p:spPr bwMode="auto">
-          <a:xfrm>
-            <a:off x="2559079" y="4169107"/>
-            <a:ext cx="434573" cy="1329908"/>
-          </a:xfrm>
-          <a:prstGeom prst="rect">
-            <a:avLst/>
-          </a:prstGeom>
-          <a:noFill/>
-          <a:extLst>
-            <a:ext uri="{909E8E84-426E-40DD-AFC4-6F175D3DCCD1}">
-              <a14:hiddenFill xmlns:a14="http://schemas.microsoft.com/office/drawing/2010/main">
-                <a:solidFill>
-                  <a:srgbClr val="FFFFFF"/>
-                </a:solidFill>
-              </a14:hiddenFill>
-            </a:ext>
-          </a:extLst>
-        </p:spPr>
-      </p:pic>
       <p:sp>
         <p:nvSpPr>
           <p:cNvPr id="28" name="CaixaDeTexto 27"/>
@@ -15533,7 +15234,7 @@
           <p:nvPr/>
         </p:nvPicPr>
         <p:blipFill>
-          <a:blip r:embed="rId12">
+          <a:blip r:embed="rId10">
             <a:extLst>
               <a:ext uri="{28A0092B-C50C-407E-A947-70E740481C1C}">
                 <a14:useLocalDpi xmlns:a14="http://schemas.microsoft.com/office/drawing/2010/main" val="0"/>
@@ -15563,7 +15264,7 @@
           <p:nvPr/>
         </p:nvPicPr>
         <p:blipFill>
-          <a:blip r:embed="rId13" cstate="print">
+          <a:blip r:embed="rId11" cstate="print">
             <a:extLst>
               <a:ext uri="{28A0092B-C50C-407E-A947-70E740481C1C}">
                 <a14:useLocalDpi xmlns:a14="http://schemas.microsoft.com/office/drawing/2010/main" val="0"/>
@@ -15578,6 +15279,238 @@
           <a:xfrm>
             <a:off x="6554084" y="5083352"/>
             <a:ext cx="1051695" cy="1069294"/>
+          </a:xfrm>
+          <a:prstGeom prst="rect">
+            <a:avLst/>
+          </a:prstGeom>
+        </p:spPr>
+      </p:pic>
+      <p:pic>
+        <p:nvPicPr>
+          <p:cNvPr id="29" name="Imagem 28"/>
+          <p:cNvPicPr>
+            <a:picLocks noChangeAspect="1"/>
+          </p:cNvPicPr>
+          <p:nvPr/>
+        </p:nvPicPr>
+        <p:blipFill rotWithShape="1">
+          <a:blip r:embed="rId12" cstate="print">
+            <a:extLst>
+              <a:ext uri="{28A0092B-C50C-407E-A947-70E740481C1C}">
+                <a14:useLocalDpi xmlns:a14="http://schemas.microsoft.com/office/drawing/2010/main" val="0"/>
+              </a:ext>
+            </a:extLst>
+          </a:blip>
+          <a:srcRect l="14365" t="7810" r="12778" b="4190"/>
+          <a:stretch/>
+        </p:blipFill>
+        <p:spPr>
+          <a:xfrm>
+            <a:off x="958286" y="896150"/>
+            <a:ext cx="813440" cy="1228136"/>
+          </a:xfrm>
+          <a:prstGeom prst="rect">
+            <a:avLst/>
+          </a:prstGeom>
+        </p:spPr>
+      </p:pic>
+      <p:pic>
+        <p:nvPicPr>
+          <p:cNvPr id="30" name="Imagem 29"/>
+          <p:cNvPicPr>
+            <a:picLocks noChangeAspect="1"/>
+          </p:cNvPicPr>
+          <p:nvPr/>
+        </p:nvPicPr>
+        <p:blipFill rotWithShape="1">
+          <a:blip r:embed="rId13" cstate="print">
+            <a:extLst>
+              <a:ext uri="{28A0092B-C50C-407E-A947-70E740481C1C}">
+                <a14:useLocalDpi xmlns:a14="http://schemas.microsoft.com/office/drawing/2010/main" val="0"/>
+              </a:ext>
+            </a:extLst>
+          </a:blip>
+          <a:srcRect l="14365" t="7810" r="12778" b="4190"/>
+          <a:stretch/>
+        </p:blipFill>
+        <p:spPr>
+          <a:xfrm>
+            <a:off x="3511231" y="4232701"/>
+            <a:ext cx="413222" cy="623885"/>
+          </a:xfrm>
+          <a:prstGeom prst="rect">
+            <a:avLst/>
+          </a:prstGeom>
+        </p:spPr>
+      </p:pic>
+      <p:pic>
+        <p:nvPicPr>
+          <p:cNvPr id="31" name="Imagem 30"/>
+          <p:cNvPicPr>
+            <a:picLocks noChangeAspect="1"/>
+          </p:cNvPicPr>
+          <p:nvPr/>
+        </p:nvPicPr>
+        <p:blipFill rotWithShape="1">
+          <a:blip r:embed="rId14" cstate="print">
+            <a:extLst>
+              <a:ext uri="{28A0092B-C50C-407E-A947-70E740481C1C}">
+                <a14:useLocalDpi xmlns:a14="http://schemas.microsoft.com/office/drawing/2010/main" val="0"/>
+              </a:ext>
+            </a:extLst>
+          </a:blip>
+          <a:srcRect l="14603" t="8000" r="13493" b="4191"/>
+          <a:stretch/>
+        </p:blipFill>
+        <p:spPr>
+          <a:xfrm>
+            <a:off x="1956418" y="1010135"/>
+            <a:ext cx="897656" cy="1376182"/>
+          </a:xfrm>
+          <a:prstGeom prst="rect">
+            <a:avLst/>
+          </a:prstGeom>
+        </p:spPr>
+      </p:pic>
+      <p:pic>
+        <p:nvPicPr>
+          <p:cNvPr id="34" name="Imagem 33"/>
+          <p:cNvPicPr>
+            <a:picLocks noChangeAspect="1"/>
+          </p:cNvPicPr>
+          <p:nvPr/>
+        </p:nvPicPr>
+        <p:blipFill rotWithShape="1">
+          <a:blip r:embed="rId15" cstate="print">
+            <a:extLst>
+              <a:ext uri="{28A0092B-C50C-407E-A947-70E740481C1C}">
+                <a14:useLocalDpi xmlns:a14="http://schemas.microsoft.com/office/drawing/2010/main" val="0"/>
+              </a:ext>
+            </a:extLst>
+          </a:blip>
+          <a:srcRect l="14603" t="8000" r="13493" b="4191"/>
+          <a:stretch/>
+        </p:blipFill>
+        <p:spPr>
+          <a:xfrm>
+            <a:off x="3113636" y="4385264"/>
+            <a:ext cx="409186" cy="624618"/>
+          </a:xfrm>
+          <a:prstGeom prst="rect">
+            <a:avLst/>
+          </a:prstGeom>
+        </p:spPr>
+      </p:pic>
+      <p:pic>
+        <p:nvPicPr>
+          <p:cNvPr id="35" name="Imagem 34"/>
+          <p:cNvPicPr>
+            <a:picLocks noChangeAspect="1"/>
+          </p:cNvPicPr>
+          <p:nvPr/>
+        </p:nvPicPr>
+        <p:blipFill rotWithShape="1">
+          <a:blip r:embed="rId16" cstate="print">
+            <a:extLst>
+              <a:ext uri="{28A0092B-C50C-407E-A947-70E740481C1C}">
+                <a14:useLocalDpi xmlns:a14="http://schemas.microsoft.com/office/drawing/2010/main" val="0"/>
+              </a:ext>
+            </a:extLst>
+          </a:blip>
+          <a:srcRect l="14365" t="7619" r="13255" b="4190"/>
+          <a:stretch/>
+        </p:blipFill>
+        <p:spPr>
+          <a:xfrm>
+            <a:off x="3041782" y="1273547"/>
+            <a:ext cx="938898" cy="1386832"/>
+          </a:xfrm>
+          <a:prstGeom prst="rect">
+            <a:avLst/>
+          </a:prstGeom>
+        </p:spPr>
+      </p:pic>
+      <p:pic>
+        <p:nvPicPr>
+          <p:cNvPr id="36" name="Imagem 35"/>
+          <p:cNvPicPr>
+            <a:picLocks noChangeAspect="1"/>
+          </p:cNvPicPr>
+          <p:nvPr/>
+        </p:nvPicPr>
+        <p:blipFill rotWithShape="1">
+          <a:blip r:embed="rId17" cstate="print">
+            <a:extLst>
+              <a:ext uri="{28A0092B-C50C-407E-A947-70E740481C1C}">
+                <a14:useLocalDpi xmlns:a14="http://schemas.microsoft.com/office/drawing/2010/main" val="0"/>
+              </a:ext>
+            </a:extLst>
+          </a:blip>
+          <a:srcRect l="14365" t="7619" r="13255" b="4190"/>
+          <a:stretch/>
+        </p:blipFill>
+        <p:spPr>
+          <a:xfrm>
+            <a:off x="2689868" y="4487596"/>
+            <a:ext cx="431367" cy="656983"/>
+          </a:xfrm>
+          <a:prstGeom prst="rect">
+            <a:avLst/>
+          </a:prstGeom>
+        </p:spPr>
+      </p:pic>
+      <p:pic>
+        <p:nvPicPr>
+          <p:cNvPr id="37" name="Imagem 36"/>
+          <p:cNvPicPr>
+            <a:picLocks noChangeAspect="1"/>
+          </p:cNvPicPr>
+          <p:nvPr/>
+        </p:nvPicPr>
+        <p:blipFill rotWithShape="1">
+          <a:blip r:embed="rId18" cstate="print">
+            <a:extLst>
+              <a:ext uri="{28A0092B-C50C-407E-A947-70E740481C1C}">
+                <a14:useLocalDpi xmlns:a14="http://schemas.microsoft.com/office/drawing/2010/main" val="0"/>
+              </a:ext>
+            </a:extLst>
+          </a:blip>
+          <a:srcRect l="14747" t="7889" r="14091" b="4478"/>
+          <a:stretch/>
+        </p:blipFill>
+        <p:spPr>
+          <a:xfrm>
+            <a:off x="4207775" y="1440253"/>
+            <a:ext cx="939124" cy="1445617"/>
+          </a:xfrm>
+          <a:prstGeom prst="rect">
+            <a:avLst/>
+          </a:prstGeom>
+        </p:spPr>
+      </p:pic>
+      <p:pic>
+        <p:nvPicPr>
+          <p:cNvPr id="38" name="Imagem 37"/>
+          <p:cNvPicPr>
+            <a:picLocks noChangeAspect="1"/>
+          </p:cNvPicPr>
+          <p:nvPr/>
+        </p:nvPicPr>
+        <p:blipFill rotWithShape="1">
+          <a:blip r:embed="rId19" cstate="print">
+            <a:extLst>
+              <a:ext uri="{28A0092B-C50C-407E-A947-70E740481C1C}">
+                <a14:useLocalDpi xmlns:a14="http://schemas.microsoft.com/office/drawing/2010/main" val="0"/>
+              </a:ext>
+            </a:extLst>
+          </a:blip>
+          <a:srcRect l="14747" t="7889" r="14091" b="4478"/>
+          <a:stretch/>
+        </p:blipFill>
+        <p:spPr>
+          <a:xfrm>
+            <a:off x="2364272" y="4682639"/>
+            <a:ext cx="381744" cy="587627"/>
           </a:xfrm>
           <a:prstGeom prst="rect">
             <a:avLst/>

</xml_diff>

<commit_message>
PPT atualizado, pagina cadastro criada, simulado financeiro melhorado
</commit_message>
<xml_diff>
--- a/apresentação/MIT PPT (Projeto 2.0).pptx
+++ b/apresentação/MIT PPT (Projeto 2.0).pptx
@@ -11,8 +11,8 @@
     <p:sldId id="257" r:id="rId2"/>
     <p:sldId id="346" r:id="rId3"/>
     <p:sldId id="260" r:id="rId4"/>
-    <p:sldId id="347" r:id="rId5"/>
-    <p:sldId id="348" r:id="rId6"/>
+    <p:sldId id="348" r:id="rId5"/>
+    <p:sldId id="347" r:id="rId6"/>
     <p:sldId id="349" r:id="rId7"/>
     <p:sldId id="350" r:id="rId8"/>
     <p:sldId id="351" r:id="rId9"/>
@@ -413,6 +413,7 @@
     </c:plotArea>
     <c:legend>
       <c:legendPos val="b"/>
+      <c:layout/>
       <c:overlay val="0"/>
       <c:spPr>
         <a:noFill/>
@@ -980,6 +981,7 @@
     </c:plotArea>
     <c:legend>
       <c:legendPos val="b"/>
+      <c:layout/>
       <c:overlay val="0"/>
       <c:spPr>
         <a:noFill/>
@@ -2289,7 +2291,7 @@
           <a:p>
             <a:fld id="{4132B5A0-3D7C-4A8B-9857-D57DB7BEA661}" type="datetimeFigureOut">
               <a:rPr lang="pt-BR" smtClean="0"/>
-              <a:t>03/04/2020</a:t>
+              <a:t>05/04/2020</a:t>
             </a:fld>
             <a:endParaRPr lang="pt-BR"/>
           </a:p>
@@ -3278,7 +3280,7 @@
           <a:p>
             <a:fld id="{51C1A2F9-5E2E-41AF-8CA8-6F6A8CA531AC}" type="datetimeFigureOut">
               <a:rPr lang="pt-BR" smtClean="0"/>
-              <a:t>03/04/2020</a:t>
+              <a:t>05/04/2020</a:t>
             </a:fld>
             <a:endParaRPr lang="pt-BR"/>
           </a:p>
@@ -3529,7 +3531,7 @@
           <a:p>
             <a:fld id="{51C1A2F9-5E2E-41AF-8CA8-6F6A8CA531AC}" type="datetimeFigureOut">
               <a:rPr lang="pt-BR" smtClean="0"/>
-              <a:t>03/04/2020</a:t>
+              <a:t>05/04/2020</a:t>
             </a:fld>
             <a:endParaRPr lang="pt-BR"/>
           </a:p>
@@ -3843,7 +3845,7 @@
           <a:p>
             <a:fld id="{51C1A2F9-5E2E-41AF-8CA8-6F6A8CA531AC}" type="datetimeFigureOut">
               <a:rPr lang="pt-BR" smtClean="0"/>
-              <a:t>03/04/2020</a:t>
+              <a:t>05/04/2020</a:t>
             </a:fld>
             <a:endParaRPr lang="pt-BR"/>
           </a:p>
@@ -4184,7 +4186,7 @@
           <a:p>
             <a:fld id="{51C1A2F9-5E2E-41AF-8CA8-6F6A8CA531AC}" type="datetimeFigureOut">
               <a:rPr lang="pt-BR" smtClean="0"/>
-              <a:t>03/04/2020</a:t>
+              <a:t>05/04/2020</a:t>
             </a:fld>
             <a:endParaRPr lang="pt-BR"/>
           </a:p>
@@ -4498,7 +4500,7 @@
           <a:p>
             <a:fld id="{51C1A2F9-5E2E-41AF-8CA8-6F6A8CA531AC}" type="datetimeFigureOut">
               <a:rPr lang="pt-BR" smtClean="0"/>
-              <a:t>03/04/2020</a:t>
+              <a:t>05/04/2020</a:t>
             </a:fld>
             <a:endParaRPr lang="pt-BR"/>
           </a:p>
@@ -4891,7 +4893,7 @@
           <a:p>
             <a:fld id="{51C1A2F9-5E2E-41AF-8CA8-6F6A8CA531AC}" type="datetimeFigureOut">
               <a:rPr lang="pt-BR" smtClean="0"/>
-              <a:t>03/04/2020</a:t>
+              <a:t>05/04/2020</a:t>
             </a:fld>
             <a:endParaRPr lang="pt-BR"/>
           </a:p>
@@ -5061,7 +5063,7 @@
           <a:p>
             <a:fld id="{51C1A2F9-5E2E-41AF-8CA8-6F6A8CA531AC}" type="datetimeFigureOut">
               <a:rPr lang="pt-BR" smtClean="0"/>
-              <a:t>03/04/2020</a:t>
+              <a:t>05/04/2020</a:t>
             </a:fld>
             <a:endParaRPr lang="pt-BR"/>
           </a:p>
@@ -5241,7 +5243,7 @@
           <a:p>
             <a:fld id="{51C1A2F9-5E2E-41AF-8CA8-6F6A8CA531AC}" type="datetimeFigureOut">
               <a:rPr lang="pt-BR" smtClean="0"/>
-              <a:t>03/04/2020</a:t>
+              <a:t>05/04/2020</a:t>
             </a:fld>
             <a:endParaRPr lang="pt-BR"/>
           </a:p>
@@ -5400,7 +5402,7 @@
           <a:p>
             <a:fld id="{51C1A2F9-5E2E-41AF-8CA8-6F6A8CA531AC}" type="datetimeFigureOut">
               <a:rPr lang="pt-BR" smtClean="0"/>
-              <a:t>03/04/2020</a:t>
+              <a:t>05/04/2020</a:t>
             </a:fld>
             <a:endParaRPr lang="pt-BR"/>
           </a:p>
@@ -5557,7 +5559,7 @@
           <a:p>
             <a:fld id="{51C1A2F9-5E2E-41AF-8CA8-6F6A8CA531AC}" type="datetimeFigureOut">
               <a:rPr lang="pt-BR" smtClean="0"/>
-              <a:t>03/04/2020</a:t>
+              <a:t>05/04/2020</a:t>
             </a:fld>
             <a:endParaRPr lang="pt-BR"/>
           </a:p>
@@ -5698,7 +5700,7 @@
           <a:p>
             <a:fld id="{51C1A2F9-5E2E-41AF-8CA8-6F6A8CA531AC}" type="datetimeFigureOut">
               <a:rPr lang="pt-BR" smtClean="0"/>
-              <a:t>03/04/2020</a:t>
+              <a:t>05/04/2020</a:t>
             </a:fld>
             <a:endParaRPr lang="pt-BR"/>
           </a:p>
@@ -5886,7 +5888,7 @@
           <a:p>
             <a:fld id="{51C1A2F9-5E2E-41AF-8CA8-6F6A8CA531AC}" type="datetimeFigureOut">
               <a:rPr lang="pt-BR" smtClean="0"/>
-              <a:t>03/04/2020</a:t>
+              <a:t>05/04/2020</a:t>
             </a:fld>
             <a:endParaRPr lang="pt-BR"/>
           </a:p>
@@ -6015,7 +6017,7 @@
           <a:p>
             <a:fld id="{51C1A2F9-5E2E-41AF-8CA8-6F6A8CA531AC}" type="datetimeFigureOut">
               <a:rPr lang="pt-BR" smtClean="0"/>
-              <a:t>03/04/2020</a:t>
+              <a:t>05/04/2020</a:t>
             </a:fld>
             <a:endParaRPr lang="pt-BR"/>
           </a:p>
@@ -6274,7 +6276,7 @@
           <a:p>
             <a:fld id="{51C1A2F9-5E2E-41AF-8CA8-6F6A8CA531AC}" type="datetimeFigureOut">
               <a:rPr lang="pt-BR" smtClean="0"/>
-              <a:t>03/04/2020</a:t>
+              <a:t>05/04/2020</a:t>
             </a:fld>
             <a:endParaRPr lang="pt-BR"/>
           </a:p>
@@ -6506,7 +6508,7 @@
           <a:p>
             <a:fld id="{51C1A2F9-5E2E-41AF-8CA8-6F6A8CA531AC}" type="datetimeFigureOut">
               <a:rPr lang="pt-BR" smtClean="0"/>
-              <a:t>03/04/2020</a:t>
+              <a:t>05/04/2020</a:t>
             </a:fld>
             <a:endParaRPr lang="pt-BR"/>
           </a:p>
@@ -6880,7 +6882,7 @@
           <a:p>
             <a:fld id="{51C1A2F9-5E2E-41AF-8CA8-6F6A8CA531AC}" type="datetimeFigureOut">
               <a:rPr lang="pt-BR" smtClean="0"/>
-              <a:t>03/04/2020</a:t>
+              <a:t>05/04/2020</a:t>
             </a:fld>
             <a:endParaRPr lang="pt-BR"/>
           </a:p>
@@ -7003,7 +7005,7 @@
           <a:p>
             <a:fld id="{51C1A2F9-5E2E-41AF-8CA8-6F6A8CA531AC}" type="datetimeFigureOut">
               <a:rPr lang="pt-BR" smtClean="0"/>
-              <a:t>03/04/2020</a:t>
+              <a:t>05/04/2020</a:t>
             </a:fld>
             <a:endParaRPr lang="pt-BR"/>
           </a:p>
@@ -7098,7 +7100,7 @@
           <a:p>
             <a:fld id="{51C1A2F9-5E2E-41AF-8CA8-6F6A8CA531AC}" type="datetimeFigureOut">
               <a:rPr lang="pt-BR" smtClean="0"/>
-              <a:t>03/04/2020</a:t>
+              <a:t>05/04/2020</a:t>
             </a:fld>
             <a:endParaRPr lang="pt-BR"/>
           </a:p>
@@ -7353,7 +7355,7 @@
           <a:p>
             <a:fld id="{51C1A2F9-5E2E-41AF-8CA8-6F6A8CA531AC}" type="datetimeFigureOut">
               <a:rPr lang="pt-BR" smtClean="0"/>
-              <a:t>03/04/2020</a:t>
+              <a:t>05/04/2020</a:t>
             </a:fld>
             <a:endParaRPr lang="pt-BR"/>
           </a:p>
@@ -7616,7 +7618,7 @@
           <a:p>
             <a:fld id="{51C1A2F9-5E2E-41AF-8CA8-6F6A8CA531AC}" type="datetimeFigureOut">
               <a:rPr lang="pt-BR" smtClean="0"/>
-              <a:t>03/04/2020</a:t>
+              <a:t>05/04/2020</a:t>
             </a:fld>
             <a:endParaRPr lang="pt-BR"/>
           </a:p>
@@ -8359,7 +8361,7 @@
           <a:p>
             <a:fld id="{51C1A2F9-5E2E-41AF-8CA8-6F6A8CA531AC}" type="datetimeFigureOut">
               <a:rPr lang="pt-BR" smtClean="0"/>
-              <a:t>03/04/2020</a:t>
+              <a:t>05/04/2020</a:t>
             </a:fld>
             <a:endParaRPr lang="pt-BR"/>
           </a:p>
@@ -9224,6 +9226,13 @@
   <p:clrMapOvr>
     <a:masterClrMapping/>
   </p:clrMapOvr>
+  <p:timing>
+    <p:tnLst>
+      <p:par>
+        <p:cTn id="1" dur="indefinite" restart="never" nodeType="tmRoot"/>
+      </p:par>
+    </p:tnLst>
+  </p:timing>
 </p:sld>
 </file>
 
@@ -9303,6 +9312,36 @@
           </a:p>
         </p:txBody>
       </p:sp>
+      <p:pic>
+        <p:nvPicPr>
+          <p:cNvPr id="3" name="Imagem 2"/>
+          <p:cNvPicPr>
+            <a:picLocks noChangeAspect="1"/>
+          </p:cNvPicPr>
+          <p:nvPr/>
+        </p:nvPicPr>
+        <p:blipFill>
+          <a:blip r:embed="rId2" cstate="print">
+            <a:extLst>
+              <a:ext uri="{28A0092B-C50C-407E-A947-70E740481C1C}">
+                <a14:useLocalDpi xmlns:a14="http://schemas.microsoft.com/office/drawing/2010/main" val="0"/>
+              </a:ext>
+            </a:extLst>
+          </a:blip>
+          <a:stretch>
+            <a:fillRect/>
+          </a:stretch>
+        </p:blipFill>
+        <p:spPr>
+          <a:xfrm>
+            <a:off x="352695" y="1136469"/>
+            <a:ext cx="10550544" cy="5275272"/>
+          </a:xfrm>
+          <a:prstGeom prst="rect">
+            <a:avLst/>
+          </a:prstGeom>
+        </p:spPr>
+      </p:pic>
     </p:spTree>
     <p:extLst>
       <p:ext uri="{BB962C8B-B14F-4D97-AF65-F5344CB8AC3E}">
@@ -9313,6 +9352,13 @@
   <p:clrMapOvr>
     <a:masterClrMapping/>
   </p:clrMapOvr>
+  <p:timing>
+    <p:tnLst>
+      <p:par>
+        <p:cTn id="1" dur="indefinite" restart="never" nodeType="tmRoot"/>
+      </p:par>
+    </p:tnLst>
+  </p:timing>
 </p:sld>
 </file>
 
@@ -11515,8 +11561,8 @@
         </p:nvSpPr>
         <p:spPr>
           <a:xfrm>
-            <a:off x="0" y="361951"/>
-            <a:ext cx="5581650" cy="767798"/>
+            <a:off x="-1" y="1759677"/>
+            <a:ext cx="7080069" cy="1479912"/>
           </a:xfrm>
           <a:prstGeom prst="homePlate">
             <a:avLst/>
@@ -13426,6 +13472,189 @@
 <file path=ppt/slides/slide4.xml><?xml version="1.0" encoding="utf-8"?>
 <p:sld xmlns:a="http://schemas.openxmlformats.org/drawingml/2006/main" xmlns:r="http://schemas.openxmlformats.org/officeDocument/2006/relationships" xmlns:p="http://schemas.openxmlformats.org/presentationml/2006/main">
   <p:cSld>
+    <p:bg>
+      <p:bgPr>
+        <a:solidFill>
+          <a:schemeClr val="bg1"/>
+        </a:solidFill>
+        <a:effectLst/>
+      </p:bgPr>
+    </p:bg>
+    <p:spTree>
+      <p:nvGrpSpPr>
+        <p:cNvPr id="1" name=""/>
+        <p:cNvGrpSpPr/>
+        <p:nvPr/>
+      </p:nvGrpSpPr>
+      <p:grpSpPr>
+        <a:xfrm>
+          <a:off x="0" y="0"/>
+          <a:ext cx="0" cy="0"/>
+          <a:chOff x="0" y="0"/>
+          <a:chExt cx="0" cy="0"/>
+        </a:xfrm>
+      </p:grpSpPr>
+      <p:sp>
+        <p:nvSpPr>
+          <p:cNvPr id="2" name="Seta: Pentágono 2">
+            <a:extLst>
+              <a:ext uri="{FF2B5EF4-FFF2-40B4-BE49-F238E27FC236}">
+                <a16:creationId xmlns:a16="http://schemas.microsoft.com/office/drawing/2014/main" id="{305FC1E8-F2E8-42C2-B81F-097C0FA4A259}"/>
+              </a:ext>
+            </a:extLst>
+          </p:cNvPr>
+          <p:cNvSpPr/>
+          <p:nvPr/>
+        </p:nvSpPr>
+        <p:spPr>
+          <a:xfrm>
+            <a:off x="1" y="429321"/>
+            <a:ext cx="3291840" cy="700428"/>
+          </a:xfrm>
+          <a:prstGeom prst="homePlate">
+            <a:avLst/>
+          </a:prstGeom>
+          <a:solidFill>
+            <a:srgbClr val="227EA4"/>
+          </a:solidFill>
+          <a:ln>
+            <a:noFill/>
+          </a:ln>
+        </p:spPr>
+        <p:style>
+          <a:lnRef idx="2">
+            <a:schemeClr val="accent1">
+              <a:shade val="50000"/>
+            </a:schemeClr>
+          </a:lnRef>
+          <a:fillRef idx="1">
+            <a:schemeClr val="accent1"/>
+          </a:fillRef>
+          <a:effectRef idx="0">
+            <a:schemeClr val="accent1"/>
+          </a:effectRef>
+          <a:fontRef idx="minor">
+            <a:schemeClr val="lt1"/>
+          </a:fontRef>
+        </p:style>
+        <p:txBody>
+          <a:bodyPr rtlCol="0" anchor="ctr"/>
+          <a:lstStyle/>
+          <a:p>
+            <a:r>
+              <a:rPr lang="pt-BR" sz="4400" dirty="0" smtClean="0">
+                <a:latin typeface="+mj-lt"/>
+              </a:rPr>
+              <a:t> Contexto</a:t>
+            </a:r>
+            <a:endParaRPr lang="pt-BR" sz="4400" dirty="0">
+              <a:latin typeface="+mj-lt"/>
+            </a:endParaRPr>
+          </a:p>
+        </p:txBody>
+      </p:sp>
+      <p:sp>
+        <p:nvSpPr>
+          <p:cNvPr id="4" name="CaixaDeTexto 3"/>
+          <p:cNvSpPr txBox="1"/>
+          <p:nvPr/>
+        </p:nvSpPr>
+        <p:spPr>
+          <a:xfrm>
+            <a:off x="207817" y="1885950"/>
+            <a:ext cx="9450533" cy="1846659"/>
+          </a:xfrm>
+          <a:prstGeom prst="rect">
+            <a:avLst/>
+          </a:prstGeom>
+          <a:solidFill>
+            <a:schemeClr val="bg1">
+              <a:alpha val="90000"/>
+            </a:schemeClr>
+          </a:solidFill>
+        </p:spPr>
+        <p:txBody>
+          <a:bodyPr wrap="square" rtlCol="0">
+            <a:spAutoFit/>
+          </a:bodyPr>
+          <a:lstStyle/>
+          <a:p>
+            <a:pPr algn="just"/>
+            <a:r>
+              <a:rPr lang="pt-BR" sz="2400" dirty="0" smtClean="0">
+                <a:latin typeface="+mj-lt"/>
+              </a:rPr>
+              <a:t>Mais de 27 mil toneladas de lixo são produzidas por dia na região metropolitana de São Paulo, segundo o portal de noticias G1 para </a:t>
+            </a:r>
+            <a:r>
+              <a:rPr lang="pt-BR" sz="2400" dirty="0">
+                <a:latin typeface="+mj-lt"/>
+              </a:rPr>
+              <a:t>carregar todo o lixo da região são necessárias pelo menos 2.282 viagens de caminhões trucados todos os dias.</a:t>
+            </a:r>
+            <a:endParaRPr lang="pt-BR" sz="3200" dirty="0" smtClean="0">
+              <a:latin typeface="+mj-lt"/>
+            </a:endParaRPr>
+          </a:p>
+          <a:p>
+            <a:endParaRPr lang="pt-BR" dirty="0">
+              <a:latin typeface="+mj-lt"/>
+            </a:endParaRPr>
+          </a:p>
+        </p:txBody>
+      </p:sp>
+      <p:pic>
+        <p:nvPicPr>
+          <p:cNvPr id="7" name="Imagem 6"/>
+          <p:cNvPicPr>
+            <a:picLocks noChangeAspect="1"/>
+          </p:cNvPicPr>
+          <p:nvPr/>
+        </p:nvPicPr>
+        <p:blipFill rotWithShape="1">
+          <a:blip r:embed="rId2">
+            <a:extLst>
+              <a:ext uri="{28A0092B-C50C-407E-A947-70E740481C1C}">
+                <a14:useLocalDpi xmlns:a14="http://schemas.microsoft.com/office/drawing/2010/main" val="0"/>
+              </a:ext>
+            </a:extLst>
+          </a:blip>
+          <a:srcRect t="50628" r="48040"/>
+          <a:stretch/>
+        </p:blipFill>
+        <p:spPr>
+          <a:xfrm>
+            <a:off x="752476" y="3974460"/>
+            <a:ext cx="2947150" cy="2670571"/>
+          </a:xfrm>
+          <a:prstGeom prst="rect">
+            <a:avLst/>
+          </a:prstGeom>
+        </p:spPr>
+      </p:pic>
+    </p:spTree>
+    <p:extLst>
+      <p:ext uri="{BB962C8B-B14F-4D97-AF65-F5344CB8AC3E}">
+        <p14:creationId xmlns:p14="http://schemas.microsoft.com/office/powerpoint/2010/main" val="4200639498"/>
+      </p:ext>
+    </p:extLst>
+  </p:cSld>
+  <p:clrMapOvr>
+    <a:masterClrMapping/>
+  </p:clrMapOvr>
+  <p:timing>
+    <p:tnLst>
+      <p:par>
+        <p:cTn id="1" dur="indefinite" restart="never" nodeType="tmRoot"/>
+      </p:par>
+    </p:tnLst>
+  </p:timing>
+</p:sld>
+</file>
+
+<file path=ppt/slides/slide5.xml><?xml version="1.0" encoding="utf-8"?>
+<p:sld xmlns:a="http://schemas.openxmlformats.org/drawingml/2006/main" xmlns:r="http://schemas.openxmlformats.org/officeDocument/2006/relationships" xmlns:p="http://schemas.openxmlformats.org/presentationml/2006/main">
+  <p:cSld>
     <p:spTree>
       <p:nvGrpSpPr>
         <p:cNvPr id="1" name=""/>
@@ -13738,189 +13967,6 @@
     <p:extLst>
       <p:ext uri="{BB962C8B-B14F-4D97-AF65-F5344CB8AC3E}">
         <p14:creationId xmlns:p14="http://schemas.microsoft.com/office/powerpoint/2010/main" val="2481023164"/>
-      </p:ext>
-    </p:extLst>
-  </p:cSld>
-  <p:clrMapOvr>
-    <a:masterClrMapping/>
-  </p:clrMapOvr>
-  <p:timing>
-    <p:tnLst>
-      <p:par>
-        <p:cTn id="1" dur="indefinite" restart="never" nodeType="tmRoot"/>
-      </p:par>
-    </p:tnLst>
-  </p:timing>
-</p:sld>
-</file>
-
-<file path=ppt/slides/slide5.xml><?xml version="1.0" encoding="utf-8"?>
-<p:sld xmlns:a="http://schemas.openxmlformats.org/drawingml/2006/main" xmlns:r="http://schemas.openxmlformats.org/officeDocument/2006/relationships" xmlns:p="http://schemas.openxmlformats.org/presentationml/2006/main">
-  <p:cSld>
-    <p:bg>
-      <p:bgPr>
-        <a:solidFill>
-          <a:schemeClr val="bg1"/>
-        </a:solidFill>
-        <a:effectLst/>
-      </p:bgPr>
-    </p:bg>
-    <p:spTree>
-      <p:nvGrpSpPr>
-        <p:cNvPr id="1" name=""/>
-        <p:cNvGrpSpPr/>
-        <p:nvPr/>
-      </p:nvGrpSpPr>
-      <p:grpSpPr>
-        <a:xfrm>
-          <a:off x="0" y="0"/>
-          <a:ext cx="0" cy="0"/>
-          <a:chOff x="0" y="0"/>
-          <a:chExt cx="0" cy="0"/>
-        </a:xfrm>
-      </p:grpSpPr>
-      <p:sp>
-        <p:nvSpPr>
-          <p:cNvPr id="2" name="Seta: Pentágono 2">
-            <a:extLst>
-              <a:ext uri="{FF2B5EF4-FFF2-40B4-BE49-F238E27FC236}">
-                <a16:creationId xmlns:a16="http://schemas.microsoft.com/office/drawing/2014/main" id="{305FC1E8-F2E8-42C2-B81F-097C0FA4A259}"/>
-              </a:ext>
-            </a:extLst>
-          </p:cNvPr>
-          <p:cNvSpPr/>
-          <p:nvPr/>
-        </p:nvSpPr>
-        <p:spPr>
-          <a:xfrm>
-            <a:off x="1" y="429321"/>
-            <a:ext cx="3291840" cy="700428"/>
-          </a:xfrm>
-          <a:prstGeom prst="homePlate">
-            <a:avLst/>
-          </a:prstGeom>
-          <a:solidFill>
-            <a:srgbClr val="227EA4"/>
-          </a:solidFill>
-          <a:ln>
-            <a:noFill/>
-          </a:ln>
-        </p:spPr>
-        <p:style>
-          <a:lnRef idx="2">
-            <a:schemeClr val="accent1">
-              <a:shade val="50000"/>
-            </a:schemeClr>
-          </a:lnRef>
-          <a:fillRef idx="1">
-            <a:schemeClr val="accent1"/>
-          </a:fillRef>
-          <a:effectRef idx="0">
-            <a:schemeClr val="accent1"/>
-          </a:effectRef>
-          <a:fontRef idx="minor">
-            <a:schemeClr val="lt1"/>
-          </a:fontRef>
-        </p:style>
-        <p:txBody>
-          <a:bodyPr rtlCol="0" anchor="ctr"/>
-          <a:lstStyle/>
-          <a:p>
-            <a:r>
-              <a:rPr lang="pt-BR" sz="4400" dirty="0" smtClean="0">
-                <a:latin typeface="+mj-lt"/>
-              </a:rPr>
-              <a:t> Contexto</a:t>
-            </a:r>
-            <a:endParaRPr lang="pt-BR" sz="4400" dirty="0">
-              <a:latin typeface="+mj-lt"/>
-            </a:endParaRPr>
-          </a:p>
-        </p:txBody>
-      </p:sp>
-      <p:sp>
-        <p:nvSpPr>
-          <p:cNvPr id="4" name="CaixaDeTexto 3"/>
-          <p:cNvSpPr txBox="1"/>
-          <p:nvPr/>
-        </p:nvSpPr>
-        <p:spPr>
-          <a:xfrm>
-            <a:off x="207817" y="1885950"/>
-            <a:ext cx="9450533" cy="1846659"/>
-          </a:xfrm>
-          <a:prstGeom prst="rect">
-            <a:avLst/>
-          </a:prstGeom>
-          <a:solidFill>
-            <a:schemeClr val="bg1">
-              <a:alpha val="90000"/>
-            </a:schemeClr>
-          </a:solidFill>
-        </p:spPr>
-        <p:txBody>
-          <a:bodyPr wrap="square" rtlCol="0">
-            <a:spAutoFit/>
-          </a:bodyPr>
-          <a:lstStyle/>
-          <a:p>
-            <a:pPr algn="just"/>
-            <a:r>
-              <a:rPr lang="pt-BR" sz="2400" dirty="0" smtClean="0">
-                <a:latin typeface="+mj-lt"/>
-              </a:rPr>
-              <a:t>Mais de 27 mil toneladas de lixo são produzidas por dia na região metropolitana de São Paulo, segundo o portal de noticias G1 para </a:t>
-            </a:r>
-            <a:r>
-              <a:rPr lang="pt-BR" sz="2400" dirty="0">
-                <a:latin typeface="+mj-lt"/>
-              </a:rPr>
-              <a:t>carregar todo o lixo da região são necessárias pelo menos 2.282 viagens de caminhões trucados todos os dias.</a:t>
-            </a:r>
-            <a:endParaRPr lang="pt-BR" sz="3200" dirty="0" smtClean="0">
-              <a:latin typeface="+mj-lt"/>
-            </a:endParaRPr>
-          </a:p>
-          <a:p>
-            <a:endParaRPr lang="pt-BR" dirty="0">
-              <a:latin typeface="+mj-lt"/>
-            </a:endParaRPr>
-          </a:p>
-        </p:txBody>
-      </p:sp>
-      <p:pic>
-        <p:nvPicPr>
-          <p:cNvPr id="7" name="Imagem 6"/>
-          <p:cNvPicPr>
-            <a:picLocks noChangeAspect="1"/>
-          </p:cNvPicPr>
-          <p:nvPr/>
-        </p:nvPicPr>
-        <p:blipFill rotWithShape="1">
-          <a:blip r:embed="rId2">
-            <a:extLst>
-              <a:ext uri="{28A0092B-C50C-407E-A947-70E740481C1C}">
-                <a14:useLocalDpi xmlns:a14="http://schemas.microsoft.com/office/drawing/2010/main" val="0"/>
-              </a:ext>
-            </a:extLst>
-          </a:blip>
-          <a:srcRect t="50628" r="48040"/>
-          <a:stretch/>
-        </p:blipFill>
-        <p:spPr>
-          <a:xfrm>
-            <a:off x="752476" y="3974460"/>
-            <a:ext cx="2947150" cy="2670571"/>
-          </a:xfrm>
-          <a:prstGeom prst="rect">
-            <a:avLst/>
-          </a:prstGeom>
-        </p:spPr>
-      </p:pic>
-    </p:spTree>
-    <p:extLst>
-      <p:ext uri="{BB962C8B-B14F-4D97-AF65-F5344CB8AC3E}">
-        <p14:creationId xmlns:p14="http://schemas.microsoft.com/office/powerpoint/2010/main" val="4200639498"/>
       </p:ext>
     </p:extLst>
   </p:cSld>

</xml_diff>

<commit_message>
atualizado. HLD, LLD, MODELO CONCEITUAL
</commit_message>
<xml_diff>
--- a/apresentação/MIT PPT (Projeto 2.0).pptx
+++ b/apresentação/MIT PPT (Projeto 2.0).pptx
@@ -5,7 +5,7 @@
     <p:sldMasterId id="2147483766" r:id="rId1"/>
   </p:sldMasterIdLst>
   <p:notesMasterIdLst>
-    <p:notesMasterId r:id="rId20"/>
+    <p:notesMasterId r:id="rId19"/>
   </p:notesMasterIdLst>
   <p:sldIdLst>
     <p:sldId id="257" r:id="rId2"/>
@@ -21,11 +21,10 @@
     <p:sldId id="362" r:id="rId12"/>
     <p:sldId id="353" r:id="rId13"/>
     <p:sldId id="354" r:id="rId14"/>
-    <p:sldId id="360" r:id="rId15"/>
-    <p:sldId id="355" r:id="rId16"/>
-    <p:sldId id="356" r:id="rId17"/>
-    <p:sldId id="357" r:id="rId18"/>
-    <p:sldId id="358" r:id="rId19"/>
+    <p:sldId id="355" r:id="rId15"/>
+    <p:sldId id="356" r:id="rId16"/>
+    <p:sldId id="357" r:id="rId17"/>
+    <p:sldId id="358" r:id="rId18"/>
   </p:sldIdLst>
   <p:sldSz cx="12192000" cy="6858000"/>
   <p:notesSz cx="6858000" cy="9144000"/>
@@ -3464,7 +3463,7 @@
           <a:p>
             <a:fld id="{4132B5A0-3D7C-4A8B-9857-D57DB7BEA661}" type="datetimeFigureOut">
               <a:rPr lang="pt-BR" smtClean="0"/>
-              <a:t>15/04/2020</a:t>
+              <a:t>18/04/2020</a:t>
             </a:fld>
             <a:endParaRPr lang="pt-BR"/>
           </a:p>
@@ -4453,7 +4452,7 @@
           <a:p>
             <a:fld id="{51C1A2F9-5E2E-41AF-8CA8-6F6A8CA531AC}" type="datetimeFigureOut">
               <a:rPr lang="pt-BR" smtClean="0"/>
-              <a:t>15/04/2020</a:t>
+              <a:t>18/04/2020</a:t>
             </a:fld>
             <a:endParaRPr lang="pt-BR"/>
           </a:p>
@@ -4704,7 +4703,7 @@
           <a:p>
             <a:fld id="{51C1A2F9-5E2E-41AF-8CA8-6F6A8CA531AC}" type="datetimeFigureOut">
               <a:rPr lang="pt-BR" smtClean="0"/>
-              <a:t>15/04/2020</a:t>
+              <a:t>18/04/2020</a:t>
             </a:fld>
             <a:endParaRPr lang="pt-BR"/>
           </a:p>
@@ -5018,7 +5017,7 @@
           <a:p>
             <a:fld id="{51C1A2F9-5E2E-41AF-8CA8-6F6A8CA531AC}" type="datetimeFigureOut">
               <a:rPr lang="pt-BR" smtClean="0"/>
-              <a:t>15/04/2020</a:t>
+              <a:t>18/04/2020</a:t>
             </a:fld>
             <a:endParaRPr lang="pt-BR"/>
           </a:p>
@@ -5359,7 +5358,7 @@
           <a:p>
             <a:fld id="{51C1A2F9-5E2E-41AF-8CA8-6F6A8CA531AC}" type="datetimeFigureOut">
               <a:rPr lang="pt-BR" smtClean="0"/>
-              <a:t>15/04/2020</a:t>
+              <a:t>18/04/2020</a:t>
             </a:fld>
             <a:endParaRPr lang="pt-BR"/>
           </a:p>
@@ -5673,7 +5672,7 @@
           <a:p>
             <a:fld id="{51C1A2F9-5E2E-41AF-8CA8-6F6A8CA531AC}" type="datetimeFigureOut">
               <a:rPr lang="pt-BR" smtClean="0"/>
-              <a:t>15/04/2020</a:t>
+              <a:t>18/04/2020</a:t>
             </a:fld>
             <a:endParaRPr lang="pt-BR"/>
           </a:p>
@@ -6066,7 +6065,7 @@
           <a:p>
             <a:fld id="{51C1A2F9-5E2E-41AF-8CA8-6F6A8CA531AC}" type="datetimeFigureOut">
               <a:rPr lang="pt-BR" smtClean="0"/>
-              <a:t>15/04/2020</a:t>
+              <a:t>18/04/2020</a:t>
             </a:fld>
             <a:endParaRPr lang="pt-BR"/>
           </a:p>
@@ -6236,7 +6235,7 @@
           <a:p>
             <a:fld id="{51C1A2F9-5E2E-41AF-8CA8-6F6A8CA531AC}" type="datetimeFigureOut">
               <a:rPr lang="pt-BR" smtClean="0"/>
-              <a:t>15/04/2020</a:t>
+              <a:t>18/04/2020</a:t>
             </a:fld>
             <a:endParaRPr lang="pt-BR"/>
           </a:p>
@@ -6416,7 +6415,7 @@
           <a:p>
             <a:fld id="{51C1A2F9-5E2E-41AF-8CA8-6F6A8CA531AC}" type="datetimeFigureOut">
               <a:rPr lang="pt-BR" smtClean="0"/>
-              <a:t>15/04/2020</a:t>
+              <a:t>18/04/2020</a:t>
             </a:fld>
             <a:endParaRPr lang="pt-BR"/>
           </a:p>
@@ -6575,7 +6574,7 @@
           <a:p>
             <a:fld id="{51C1A2F9-5E2E-41AF-8CA8-6F6A8CA531AC}" type="datetimeFigureOut">
               <a:rPr lang="pt-BR" smtClean="0"/>
-              <a:t>15/04/2020</a:t>
+              <a:t>18/04/2020</a:t>
             </a:fld>
             <a:endParaRPr lang="pt-BR"/>
           </a:p>
@@ -6732,7 +6731,7 @@
           <a:p>
             <a:fld id="{51C1A2F9-5E2E-41AF-8CA8-6F6A8CA531AC}" type="datetimeFigureOut">
               <a:rPr lang="pt-BR" smtClean="0"/>
-              <a:t>15/04/2020</a:t>
+              <a:t>18/04/2020</a:t>
             </a:fld>
             <a:endParaRPr lang="pt-BR"/>
           </a:p>
@@ -6873,7 +6872,7 @@
           <a:p>
             <a:fld id="{51C1A2F9-5E2E-41AF-8CA8-6F6A8CA531AC}" type="datetimeFigureOut">
               <a:rPr lang="pt-BR" smtClean="0"/>
-              <a:t>15/04/2020</a:t>
+              <a:t>18/04/2020</a:t>
             </a:fld>
             <a:endParaRPr lang="pt-BR"/>
           </a:p>
@@ -7061,7 +7060,7 @@
           <a:p>
             <a:fld id="{51C1A2F9-5E2E-41AF-8CA8-6F6A8CA531AC}" type="datetimeFigureOut">
               <a:rPr lang="pt-BR" smtClean="0"/>
-              <a:t>15/04/2020</a:t>
+              <a:t>18/04/2020</a:t>
             </a:fld>
             <a:endParaRPr lang="pt-BR"/>
           </a:p>
@@ -7190,7 +7189,7 @@
           <a:p>
             <a:fld id="{51C1A2F9-5E2E-41AF-8CA8-6F6A8CA531AC}" type="datetimeFigureOut">
               <a:rPr lang="pt-BR" smtClean="0"/>
-              <a:t>15/04/2020</a:t>
+              <a:t>18/04/2020</a:t>
             </a:fld>
             <a:endParaRPr lang="pt-BR"/>
           </a:p>
@@ -7449,7 +7448,7 @@
           <a:p>
             <a:fld id="{51C1A2F9-5E2E-41AF-8CA8-6F6A8CA531AC}" type="datetimeFigureOut">
               <a:rPr lang="pt-BR" smtClean="0"/>
-              <a:t>15/04/2020</a:t>
+              <a:t>18/04/2020</a:t>
             </a:fld>
             <a:endParaRPr lang="pt-BR"/>
           </a:p>
@@ -7681,7 +7680,7 @@
           <a:p>
             <a:fld id="{51C1A2F9-5E2E-41AF-8CA8-6F6A8CA531AC}" type="datetimeFigureOut">
               <a:rPr lang="pt-BR" smtClean="0"/>
-              <a:t>15/04/2020</a:t>
+              <a:t>18/04/2020</a:t>
             </a:fld>
             <a:endParaRPr lang="pt-BR"/>
           </a:p>
@@ -8055,7 +8054,7 @@
           <a:p>
             <a:fld id="{51C1A2F9-5E2E-41AF-8CA8-6F6A8CA531AC}" type="datetimeFigureOut">
               <a:rPr lang="pt-BR" smtClean="0"/>
-              <a:t>15/04/2020</a:t>
+              <a:t>18/04/2020</a:t>
             </a:fld>
             <a:endParaRPr lang="pt-BR"/>
           </a:p>
@@ -8178,7 +8177,7 @@
           <a:p>
             <a:fld id="{51C1A2F9-5E2E-41AF-8CA8-6F6A8CA531AC}" type="datetimeFigureOut">
               <a:rPr lang="pt-BR" smtClean="0"/>
-              <a:t>15/04/2020</a:t>
+              <a:t>18/04/2020</a:t>
             </a:fld>
             <a:endParaRPr lang="pt-BR"/>
           </a:p>
@@ -8273,7 +8272,7 @@
           <a:p>
             <a:fld id="{51C1A2F9-5E2E-41AF-8CA8-6F6A8CA531AC}" type="datetimeFigureOut">
               <a:rPr lang="pt-BR" smtClean="0"/>
-              <a:t>15/04/2020</a:t>
+              <a:t>18/04/2020</a:t>
             </a:fld>
             <a:endParaRPr lang="pt-BR"/>
           </a:p>
@@ -8528,7 +8527,7 @@
           <a:p>
             <a:fld id="{51C1A2F9-5E2E-41AF-8CA8-6F6A8CA531AC}" type="datetimeFigureOut">
               <a:rPr lang="pt-BR" smtClean="0"/>
-              <a:t>15/04/2020</a:t>
+              <a:t>18/04/2020</a:t>
             </a:fld>
             <a:endParaRPr lang="pt-BR"/>
           </a:p>
@@ -8791,7 +8790,7 @@
           <a:p>
             <a:fld id="{51C1A2F9-5E2E-41AF-8CA8-6F6A8CA531AC}" type="datetimeFigureOut">
               <a:rPr lang="pt-BR" smtClean="0"/>
-              <a:t>15/04/2020</a:t>
+              <a:t>18/04/2020</a:t>
             </a:fld>
             <a:endParaRPr lang="pt-BR"/>
           </a:p>
@@ -9534,7 +9533,7 @@
           <a:p>
             <a:fld id="{51C1A2F9-5E2E-41AF-8CA8-6F6A8CA531AC}" type="datetimeFigureOut">
               <a:rPr lang="pt-BR" smtClean="0"/>
-              <a:t>15/04/2020</a:t>
+              <a:t>18/04/2020</a:t>
             </a:fld>
             <a:endParaRPr lang="pt-BR"/>
           </a:p>
@@ -10301,35 +10300,6 @@
           <a:chExt cx="0" cy="0"/>
         </a:xfrm>
       </p:grpSpPr>
-      <p:pic>
-        <p:nvPicPr>
-          <p:cNvPr id="6" name="Imagem 5"/>
-          <p:cNvPicPr>
-            <a:picLocks noChangeAspect="1"/>
-          </p:cNvPicPr>
-          <p:nvPr/>
-        </p:nvPicPr>
-        <p:blipFill rotWithShape="1">
-          <a:blip r:embed="rId2">
-            <a:extLst>
-              <a:ext uri="{28A0092B-C50C-407E-A947-70E740481C1C}">
-                <a14:useLocalDpi xmlns:a14="http://schemas.microsoft.com/office/drawing/2010/main" val="0"/>
-              </a:ext>
-            </a:extLst>
-          </a:blip>
-          <a:srcRect l="1373" r="1215"/>
-          <a:stretch/>
-        </p:blipFill>
-        <p:spPr>
-          <a:xfrm>
-            <a:off x="101600" y="898543"/>
-            <a:ext cx="9372600" cy="5422097"/>
-          </a:xfrm>
-          <a:prstGeom prst="rect">
-            <a:avLst/>
-          </a:prstGeom>
-        </p:spPr>
-      </p:pic>
       <p:sp>
         <p:nvSpPr>
           <p:cNvPr id="7" name="Seta: Pentágono 2">
@@ -10389,6 +10359,1641 @@
           </a:p>
         </p:txBody>
       </p:sp>
+      <p:grpSp>
+        <p:nvGrpSpPr>
+          <p:cNvPr id="4" name="Grupo 77"/>
+          <p:cNvGrpSpPr/>
+          <p:nvPr/>
+        </p:nvGrpSpPr>
+        <p:grpSpPr>
+          <a:xfrm>
+            <a:off x="356871" y="130629"/>
+            <a:ext cx="10968628" cy="6606903"/>
+            <a:chOff x="130" y="73"/>
+            <a:chExt cx="19309" cy="10599"/>
+          </a:xfrm>
+        </p:grpSpPr>
+        <p:grpSp>
+          <p:nvGrpSpPr>
+            <p:cNvPr id="5" name="Grupo 28"/>
+            <p:cNvGrpSpPr/>
+            <p:nvPr/>
+          </p:nvGrpSpPr>
+          <p:grpSpPr>
+            <a:xfrm>
+              <a:off x="130" y="4668"/>
+              <a:ext cx="7879" cy="5934"/>
+              <a:chOff x="270" y="324"/>
+              <a:chExt cx="10379" cy="9596"/>
+            </a:xfrm>
+          </p:grpSpPr>
+          <p:sp>
+            <p:nvSpPr>
+              <p:cNvPr id="50" name="Retângulo arredondado 3"/>
+              <p:cNvSpPr/>
+              <p:nvPr/>
+            </p:nvSpPr>
+            <p:spPr>
+              <a:xfrm>
+                <a:off x="270" y="362"/>
+                <a:ext cx="9378" cy="9558"/>
+              </a:xfrm>
+              <a:prstGeom prst="roundRect">
+                <a:avLst/>
+              </a:prstGeom>
+              <a:noFill/>
+              <a:ln w="28575">
+                <a:solidFill>
+                  <a:schemeClr val="tx1"/>
+                </a:solidFill>
+              </a:ln>
+            </p:spPr>
+            <p:style>
+              <a:lnRef idx="2">
+                <a:schemeClr val="accent1">
+                  <a:shade val="50000"/>
+                </a:schemeClr>
+              </a:lnRef>
+              <a:fillRef idx="1">
+                <a:schemeClr val="accent1"/>
+              </a:fillRef>
+              <a:effectRef idx="0">
+                <a:schemeClr val="accent1"/>
+              </a:effectRef>
+              <a:fontRef idx="minor">
+                <a:schemeClr val="lt1"/>
+              </a:fontRef>
+            </p:style>
+            <p:txBody>
+              <a:bodyPr rtlCol="0" anchor="ctr"/>
+              <a:lstStyle/>
+              <a:p>
+                <a:pPr algn="ctr"/>
+                <a:endParaRPr lang="pt-BR" altLang="en-US"/>
+              </a:p>
+            </p:txBody>
+          </p:sp>
+          <p:grpSp>
+            <p:nvGrpSpPr>
+              <p:cNvPr id="51" name="Grupo 27"/>
+              <p:cNvGrpSpPr/>
+              <p:nvPr/>
+            </p:nvGrpSpPr>
+            <p:grpSpPr>
+              <a:xfrm>
+                <a:off x="270" y="324"/>
+                <a:ext cx="10379" cy="9263"/>
+                <a:chOff x="270" y="511"/>
+                <a:chExt cx="10379" cy="9263"/>
+              </a:xfrm>
+            </p:grpSpPr>
+            <p:grpSp>
+              <p:nvGrpSpPr>
+                <p:cNvPr id="52" name="Grupo 26"/>
+                <p:cNvGrpSpPr/>
+                <p:nvPr/>
+              </p:nvGrpSpPr>
+              <p:grpSpPr>
+                <a:xfrm>
+                  <a:off x="270" y="2493"/>
+                  <a:ext cx="10379" cy="7281"/>
+                  <a:chOff x="270" y="2299"/>
+                  <a:chExt cx="10379" cy="7281"/>
+                </a:xfrm>
+              </p:grpSpPr>
+              <p:grpSp>
+                <p:nvGrpSpPr>
+                  <p:cNvPr id="57" name="Grupo 13"/>
+                  <p:cNvGrpSpPr/>
+                  <p:nvPr/>
+                </p:nvGrpSpPr>
+                <p:grpSpPr>
+                  <a:xfrm>
+                    <a:off x="270" y="2299"/>
+                    <a:ext cx="9800" cy="7281"/>
+                    <a:chOff x="270" y="2299"/>
+                    <a:chExt cx="9800" cy="7281"/>
+                  </a:xfrm>
+                </p:grpSpPr>
+                <p:grpSp>
+                  <p:nvGrpSpPr>
+                    <p:cNvPr id="59" name="Grupo 10"/>
+                    <p:cNvGrpSpPr/>
+                    <p:nvPr/>
+                  </p:nvGrpSpPr>
+                  <p:grpSpPr>
+                    <a:xfrm>
+                      <a:off x="270" y="2299"/>
+                      <a:ext cx="6959" cy="7281"/>
+                      <a:chOff x="-70" y="2079"/>
+                      <a:chExt cx="6959" cy="7281"/>
+                    </a:xfrm>
+                  </p:grpSpPr>
+                  <p:pic>
+                    <p:nvPicPr>
+                      <p:cNvPr id="62" name="Imagem 61" descr="icon_prototipo"/>
+                      <p:cNvPicPr>
+                        <a:picLocks noChangeAspect="1"/>
+                      </p:cNvPicPr>
+                      <p:nvPr/>
+                    </p:nvPicPr>
+                    <p:blipFill>
+                      <a:blip r:embed="rId2">
+                        <a:clrChange>
+                          <a:clrFrom>
+                            <a:srgbClr val="F4F5F6">
+                              <a:alpha val="100000"/>
+                            </a:srgbClr>
+                          </a:clrFrom>
+                          <a:clrTo>
+                            <a:srgbClr val="F4F5F6">
+                              <a:alpha val="100000"/>
+                              <a:alpha val="0"/>
+                            </a:srgbClr>
+                          </a:clrTo>
+                        </a:clrChange>
+                      </a:blip>
+                      <a:stretch>
+                        <a:fillRect/>
+                      </a:stretch>
+                    </p:blipFill>
+                    <p:spPr>
+                      <a:xfrm>
+                        <a:off x="-70" y="3061"/>
+                        <a:ext cx="6959" cy="6299"/>
+                      </a:xfrm>
+                      <a:prstGeom prst="rect">
+                        <a:avLst/>
+                      </a:prstGeom>
+                    </p:spPr>
+                  </p:pic>
+                  <p:sp>
+                    <p:nvSpPr>
+                      <p:cNvPr id="63" name="Caixa de Texto 5"/>
+                      <p:cNvSpPr txBox="1"/>
+                      <p:nvPr/>
+                    </p:nvSpPr>
+                    <p:spPr>
+                      <a:xfrm>
+                        <a:off x="-70" y="2079"/>
+                        <a:ext cx="5420" cy="1172"/>
+                      </a:xfrm>
+                      <a:prstGeom prst="rect">
+                        <a:avLst/>
+                      </a:prstGeom>
+                      <a:noFill/>
+                    </p:spPr>
+                    <p:txBody>
+                      <a:bodyPr wrap="square" rtlCol="0">
+                        <a:spAutoFit/>
+                      </a:bodyPr>
+                      <a:lstStyle/>
+                      <a:p>
+                        <a:r>
+                          <a:rPr lang="en-US" altLang="pt-BR" sz="1200" b="1"/>
+                          <a:t>modulo de internet </a:t>
+                        </a:r>
+                      </a:p>
+                      <a:p>
+                        <a:r>
+                          <a:rPr lang="en-US" altLang="pt-BR" sz="1200" b="1"/>
+                          <a:t>esp-8266</a:t>
+                        </a:r>
+                      </a:p>
+                    </p:txBody>
+                  </p:sp>
+                  <p:cxnSp>
+                    <p:nvCxnSpPr>
+                      <p:cNvPr id="64" name="Conector de Seta Reta 63"/>
+                      <p:cNvCxnSpPr/>
+                      <p:nvPr/>
+                    </p:nvCxnSpPr>
+                    <p:spPr>
+                      <a:xfrm flipH="1">
+                        <a:off x="940" y="3154"/>
+                        <a:ext cx="2" cy="497"/>
+                      </a:xfrm>
+                      <a:prstGeom prst="straightConnector1">
+                        <a:avLst/>
+                      </a:prstGeom>
+                      <a:ln w="28575" cmpd="sng">
+                        <a:solidFill>
+                          <a:schemeClr val="tx1"/>
+                        </a:solidFill>
+                        <a:prstDash val="solid"/>
+                        <a:tailEnd type="arrow"/>
+                      </a:ln>
+                    </p:spPr>
+                    <p:style>
+                      <a:lnRef idx="1">
+                        <a:schemeClr val="accent1"/>
+                      </a:lnRef>
+                      <a:fillRef idx="0">
+                        <a:schemeClr val="accent1"/>
+                      </a:fillRef>
+                      <a:effectRef idx="0">
+                        <a:schemeClr val="accent1"/>
+                      </a:effectRef>
+                      <a:fontRef idx="minor">
+                        <a:schemeClr val="tx1"/>
+                      </a:fontRef>
+                    </p:style>
+                  </p:cxnSp>
+                </p:grpSp>
+                <p:sp>
+                  <p:nvSpPr>
+                    <p:cNvPr id="60" name="Caixa de Texto 11"/>
+                    <p:cNvSpPr txBox="1"/>
+                    <p:nvPr/>
+                  </p:nvSpPr>
+                  <p:spPr>
+                    <a:xfrm>
+                      <a:off x="7310" y="3657"/>
+                      <a:ext cx="2760" cy="1643"/>
+                    </a:xfrm>
+                    <a:prstGeom prst="rect">
+                      <a:avLst/>
+                    </a:prstGeom>
+                    <a:noFill/>
+                  </p:spPr>
+                  <p:txBody>
+                    <a:bodyPr wrap="square" rtlCol="0">
+                      <a:spAutoFit/>
+                    </a:bodyPr>
+                    <a:lstStyle/>
+                    <a:p>
+                      <a:r>
+                        <a:rPr lang="en-US" altLang="pt-BR" sz="1200" b="1"/>
+                        <a:t>sensores opticos </a:t>
+                      </a:r>
+                    </a:p>
+                    <a:p>
+                      <a:r>
+                        <a:rPr lang="en-US" altLang="pt-BR" sz="1200" b="1"/>
+                        <a:t>TX, RX</a:t>
+                      </a:r>
+                    </a:p>
+                  </p:txBody>
+                </p:sp>
+                <p:cxnSp>
+                  <p:nvCxnSpPr>
+                    <p:cNvPr id="61" name="Conector de Seta Reta 60"/>
+                    <p:cNvCxnSpPr/>
+                    <p:nvPr/>
+                  </p:nvCxnSpPr>
+                  <p:spPr>
+                    <a:xfrm flipH="1">
+                      <a:off x="6930" y="4307"/>
+                      <a:ext cx="380" cy="7"/>
+                    </a:xfrm>
+                    <a:prstGeom prst="straightConnector1">
+                      <a:avLst/>
+                    </a:prstGeom>
+                    <a:ln w="28575" cmpd="sng">
+                      <a:solidFill>
+                        <a:schemeClr val="tx1"/>
+                      </a:solidFill>
+                      <a:prstDash val="solid"/>
+                      <a:tailEnd type="arrow"/>
+                    </a:ln>
+                  </p:spPr>
+                  <p:style>
+                    <a:lnRef idx="1">
+                      <a:schemeClr val="accent1"/>
+                    </a:lnRef>
+                    <a:fillRef idx="0">
+                      <a:schemeClr val="accent1"/>
+                    </a:fillRef>
+                    <a:effectRef idx="0">
+                      <a:schemeClr val="accent1"/>
+                    </a:effectRef>
+                    <a:fontRef idx="minor">
+                      <a:schemeClr val="tx1"/>
+                    </a:fontRef>
+                  </p:style>
+                </p:cxnSp>
+              </p:grpSp>
+              <p:sp>
+                <p:nvSpPr>
+                  <p:cNvPr id="58" name="Caixa de Texto 20"/>
+                  <p:cNvSpPr txBox="1"/>
+                  <p:nvPr/>
+                </p:nvSpPr>
+                <p:spPr>
+                  <a:xfrm>
+                    <a:off x="7089" y="7032"/>
+                    <a:ext cx="3560" cy="702"/>
+                  </a:xfrm>
+                  <a:prstGeom prst="rect">
+                    <a:avLst/>
+                  </a:prstGeom>
+                  <a:noFill/>
+                </p:spPr>
+                <p:txBody>
+                  <a:bodyPr wrap="square" rtlCol="0">
+                    <a:spAutoFit/>
+                  </a:bodyPr>
+                  <a:lstStyle/>
+                  <a:p>
+                    <a:r>
+                      <a:rPr lang="en-US" altLang="en-US" sz="1200" b="1"/>
+                      <a:t>Arduino Uno</a:t>
+                    </a:r>
+                  </a:p>
+                </p:txBody>
+              </p:sp>
+            </p:grpSp>
+            <p:pic>
+              <p:nvPicPr>
+                <p:cNvPr id="53" name="Imagem 52" descr="icon_sinal"/>
+                <p:cNvPicPr>
+                  <a:picLocks noChangeAspect="1"/>
+                </p:cNvPicPr>
+                <p:nvPr/>
+              </p:nvPicPr>
+              <p:blipFill>
+                <a:blip r:embed="rId3"/>
+                <a:stretch>
+                  <a:fillRect/>
+                </a:stretch>
+              </p:blipFill>
+              <p:spPr>
+                <a:xfrm>
+                  <a:off x="501" y="1285"/>
+                  <a:ext cx="1539" cy="1539"/>
+                </a:xfrm>
+                <a:prstGeom prst="rect">
+                  <a:avLst/>
+                </a:prstGeom>
+              </p:spPr>
+            </p:pic>
+            <p:grpSp>
+              <p:nvGrpSpPr>
+                <p:cNvPr id="54" name="Grupo 22"/>
+                <p:cNvGrpSpPr/>
+                <p:nvPr/>
+              </p:nvGrpSpPr>
+              <p:grpSpPr>
+                <a:xfrm>
+                  <a:off x="4150" y="511"/>
+                  <a:ext cx="3561" cy="2686"/>
+                  <a:chOff x="6970" y="81"/>
+                  <a:chExt cx="3561" cy="2686"/>
+                </a:xfrm>
+              </p:grpSpPr>
+              <p:pic>
+                <p:nvPicPr>
+                  <p:cNvPr id="55" name="Imagem 54" descr="icon_rotiador"/>
+                  <p:cNvPicPr>
+                    <a:picLocks noChangeAspect="1"/>
+                  </p:cNvPicPr>
+                  <p:nvPr/>
+                </p:nvPicPr>
+                <p:blipFill>
+                  <a:blip r:embed="rId4"/>
+                  <a:stretch>
+                    <a:fillRect/>
+                  </a:stretch>
+                </p:blipFill>
+                <p:spPr>
+                  <a:xfrm>
+                    <a:off x="7630" y="81"/>
+                    <a:ext cx="2120" cy="2120"/>
+                  </a:xfrm>
+                  <a:prstGeom prst="rect">
+                    <a:avLst/>
+                  </a:prstGeom>
+                </p:spPr>
+              </p:pic>
+              <p:sp>
+                <p:nvSpPr>
+                  <p:cNvPr id="56" name="Caixa de Texto 24"/>
+                  <p:cNvSpPr txBox="1"/>
+                  <p:nvPr/>
+                </p:nvSpPr>
+                <p:spPr>
+                  <a:xfrm>
+                    <a:off x="6970" y="2065"/>
+                    <a:ext cx="3561" cy="702"/>
+                  </a:xfrm>
+                  <a:prstGeom prst="rect">
+                    <a:avLst/>
+                  </a:prstGeom>
+                  <a:noFill/>
+                </p:spPr>
+                <p:txBody>
+                  <a:bodyPr wrap="square" rtlCol="0">
+                    <a:spAutoFit/>
+                  </a:bodyPr>
+                  <a:lstStyle/>
+                  <a:p>
+                    <a:r>
+                      <a:rPr lang="en-US" altLang="pt-BR" sz="1200" b="1"/>
+                      <a:t>Modem LAN/WIFI</a:t>
+                    </a:r>
+                  </a:p>
+                </p:txBody>
+              </p:sp>
+            </p:grpSp>
+          </p:grpSp>
+        </p:grpSp>
+        <p:grpSp>
+          <p:nvGrpSpPr>
+            <p:cNvPr id="8" name="Grupo 29"/>
+            <p:cNvGrpSpPr/>
+            <p:nvPr/>
+          </p:nvGrpSpPr>
+          <p:grpSpPr>
+            <a:xfrm>
+              <a:off x="10499" y="4692"/>
+              <a:ext cx="8940" cy="5980"/>
+              <a:chOff x="1565" y="2662"/>
+              <a:chExt cx="12246" cy="7577"/>
+            </a:xfrm>
+          </p:grpSpPr>
+          <p:sp>
+            <p:nvSpPr>
+              <p:cNvPr id="31" name="Retângulo arredondado 30"/>
+              <p:cNvSpPr/>
+              <p:nvPr/>
+            </p:nvSpPr>
+            <p:spPr>
+              <a:xfrm>
+                <a:off x="1565" y="2662"/>
+                <a:ext cx="11492" cy="7577"/>
+              </a:xfrm>
+              <a:prstGeom prst="roundRect">
+                <a:avLst/>
+              </a:prstGeom>
+              <a:noFill/>
+              <a:ln w="28575" cmpd="sng">
+                <a:solidFill>
+                  <a:schemeClr val="tx1"/>
+                </a:solidFill>
+                <a:prstDash val="solid"/>
+              </a:ln>
+            </p:spPr>
+            <p:style>
+              <a:lnRef idx="2">
+                <a:schemeClr val="accent1">
+                  <a:shade val="50000"/>
+                </a:schemeClr>
+              </a:lnRef>
+              <a:fillRef idx="1">
+                <a:schemeClr val="accent1"/>
+              </a:fillRef>
+              <a:effectRef idx="0">
+                <a:schemeClr val="accent1"/>
+              </a:effectRef>
+              <a:fontRef idx="minor">
+                <a:schemeClr val="lt1"/>
+              </a:fontRef>
+            </p:style>
+            <p:txBody>
+              <a:bodyPr rtlCol="0" anchor="ctr"/>
+              <a:lstStyle/>
+              <a:p>
+                <a:pPr algn="ctr"/>
+                <a:endParaRPr lang="pt-BR" altLang="en-US"/>
+              </a:p>
+            </p:txBody>
+          </p:sp>
+          <p:grpSp>
+            <p:nvGrpSpPr>
+              <p:cNvPr id="32" name="Grupo 31"/>
+              <p:cNvGrpSpPr/>
+              <p:nvPr/>
+            </p:nvGrpSpPr>
+            <p:grpSpPr>
+              <a:xfrm>
+                <a:off x="2055" y="3672"/>
+                <a:ext cx="5850" cy="6303"/>
+                <a:chOff x="1635" y="2613"/>
+                <a:chExt cx="5850" cy="6303"/>
+              </a:xfrm>
+            </p:grpSpPr>
+            <p:pic>
+              <p:nvPicPr>
+                <p:cNvPr id="44" name="Imagem 43" descr="icon_pc"/>
+                <p:cNvPicPr>
+                  <a:picLocks noChangeAspect="1"/>
+                </p:cNvPicPr>
+                <p:nvPr/>
+              </p:nvPicPr>
+              <p:blipFill>
+                <a:blip r:embed="rId5"/>
+                <a:stretch>
+                  <a:fillRect/>
+                </a:stretch>
+              </p:blipFill>
+              <p:spPr>
+                <a:xfrm>
+                  <a:off x="1636" y="3577"/>
+                  <a:ext cx="5849" cy="3645"/>
+                </a:xfrm>
+                <a:prstGeom prst="rect">
+                  <a:avLst/>
+                </a:prstGeom>
+              </p:spPr>
+            </p:pic>
+            <p:pic>
+              <p:nvPicPr>
+                <p:cNvPr id="45" name="Imagem 44" descr="icon_mapa"/>
+                <p:cNvPicPr>
+                  <a:picLocks noChangeAspect="1"/>
+                </p:cNvPicPr>
+                <p:nvPr/>
+              </p:nvPicPr>
+              <p:blipFill>
+                <a:blip r:embed="rId6"/>
+                <a:stretch>
+                  <a:fillRect/>
+                </a:stretch>
+              </p:blipFill>
+              <p:spPr>
+                <a:xfrm>
+                  <a:off x="3426" y="3953"/>
+                  <a:ext cx="3323" cy="1884"/>
+                </a:xfrm>
+                <a:prstGeom prst="roundRect">
+                  <a:avLst/>
+                </a:prstGeom>
+                <a:ln w="0">
+                  <a:solidFill>
+                    <a:schemeClr val="tx1"/>
+                  </a:solidFill>
+                </a:ln>
+              </p:spPr>
+            </p:pic>
+            <p:sp>
+              <p:nvSpPr>
+                <p:cNvPr id="46" name="Caixa de Texto 34"/>
+                <p:cNvSpPr txBox="1"/>
+                <p:nvPr/>
+              </p:nvSpPr>
+              <p:spPr>
+                <a:xfrm>
+                  <a:off x="1635" y="7014"/>
+                  <a:ext cx="5544" cy="919"/>
+                </a:xfrm>
+                <a:prstGeom prst="rect">
+                  <a:avLst/>
+                </a:prstGeom>
+                <a:noFill/>
+              </p:spPr>
+              <p:txBody>
+                <a:bodyPr wrap="square" rtlCol="0">
+                  <a:spAutoFit/>
+                </a:bodyPr>
+                <a:lstStyle/>
+                <a:p>
+                  <a:r>
+                    <a:rPr lang="pt-BR" altLang="en-US" sz="1200" b="1"/>
+                    <a:t>EasyPC Intel Core i3 4GB HD 320GB </a:t>
+                  </a:r>
+                  <a:r>
+                    <a:rPr lang="en-US" altLang="pt-BR" sz="1200" b="1"/>
+                    <a:t>windows 10</a:t>
+                  </a:r>
+                </a:p>
+              </p:txBody>
+            </p:sp>
+            <p:pic>
+              <p:nvPicPr>
+                <p:cNvPr id="47" name="Imagem 46" descr="navegadores_icon"/>
+                <p:cNvPicPr>
+                  <a:picLocks noChangeAspect="1"/>
+                </p:cNvPicPr>
+                <p:nvPr/>
+              </p:nvPicPr>
+              <p:blipFill>
+                <a:blip r:embed="rId7">
+                  <a:clrChange>
+                    <a:clrFrom>
+                      <a:srgbClr val="FFFFFF">
+                        <a:alpha val="100000"/>
+                      </a:srgbClr>
+                    </a:clrFrom>
+                    <a:clrTo>
+                      <a:srgbClr val="FFFFFF">
+                        <a:alpha val="100000"/>
+                        <a:alpha val="0"/>
+                      </a:srgbClr>
+                    </a:clrTo>
+                  </a:clrChange>
+                </a:blip>
+                <a:stretch>
+                  <a:fillRect/>
+                </a:stretch>
+              </p:blipFill>
+              <p:spPr>
+                <a:xfrm>
+                  <a:off x="1636" y="7676"/>
+                  <a:ext cx="3080" cy="1240"/>
+                </a:xfrm>
+                <a:prstGeom prst="rect">
+                  <a:avLst/>
+                </a:prstGeom>
+              </p:spPr>
+            </p:pic>
+            <p:pic>
+              <p:nvPicPr>
+                <p:cNvPr id="48" name="Imagem 47" descr="sistemas_pc_icon"/>
+                <p:cNvPicPr>
+                  <a:picLocks noChangeAspect="1"/>
+                </p:cNvPicPr>
+                <p:nvPr/>
+              </p:nvPicPr>
+              <p:blipFill>
+                <a:blip r:embed="rId8">
+                  <a:clrChange>
+                    <a:clrFrom>
+                      <a:srgbClr val="000000">
+                        <a:alpha val="0"/>
+                      </a:srgbClr>
+                    </a:clrFrom>
+                    <a:clrTo>
+                      <a:srgbClr val="000000">
+                        <a:alpha val="0"/>
+                        <a:alpha val="0"/>
+                      </a:srgbClr>
+                    </a:clrTo>
+                  </a:clrChange>
+                </a:blip>
+                <a:stretch>
+                  <a:fillRect/>
+                </a:stretch>
+              </p:blipFill>
+              <p:spPr>
+                <a:xfrm>
+                  <a:off x="5259" y="7955"/>
+                  <a:ext cx="1921" cy="682"/>
+                </a:xfrm>
+                <a:prstGeom prst="rect">
+                  <a:avLst/>
+                </a:prstGeom>
+              </p:spPr>
+            </p:pic>
+            <p:pic>
+              <p:nvPicPr>
+                <p:cNvPr id="49" name="Imagem 48" descr="icon_sinal"/>
+                <p:cNvPicPr>
+                  <a:picLocks noChangeAspect="1"/>
+                </p:cNvPicPr>
+                <p:nvPr/>
+              </p:nvPicPr>
+              <p:blipFill>
+                <a:blip r:embed="rId3"/>
+                <a:stretch>
+                  <a:fillRect/>
+                </a:stretch>
+              </p:blipFill>
+              <p:spPr>
+                <a:xfrm>
+                  <a:off x="4418" y="2613"/>
+                  <a:ext cx="1340" cy="1340"/>
+                </a:xfrm>
+                <a:prstGeom prst="rect">
+                  <a:avLst/>
+                </a:prstGeom>
+              </p:spPr>
+            </p:pic>
+          </p:grpSp>
+          <p:grpSp>
+            <p:nvGrpSpPr>
+              <p:cNvPr id="33" name="Grupo 38"/>
+              <p:cNvGrpSpPr/>
+              <p:nvPr/>
+            </p:nvGrpSpPr>
+            <p:grpSpPr>
+              <a:xfrm>
+                <a:off x="9064" y="3081"/>
+                <a:ext cx="4747" cy="6773"/>
+                <a:chOff x="9064" y="3081"/>
+                <a:chExt cx="4747" cy="6773"/>
+              </a:xfrm>
+            </p:grpSpPr>
+            <p:grpSp>
+              <p:nvGrpSpPr>
+                <p:cNvPr id="37" name="Grupo 39"/>
+                <p:cNvGrpSpPr/>
+                <p:nvPr/>
+              </p:nvGrpSpPr>
+              <p:grpSpPr>
+                <a:xfrm>
+                  <a:off x="9064" y="4421"/>
+                  <a:ext cx="4747" cy="5433"/>
+                  <a:chOff x="10340" y="4421"/>
+                  <a:chExt cx="4747" cy="5433"/>
+                </a:xfrm>
+              </p:grpSpPr>
+              <p:grpSp>
+                <p:nvGrpSpPr>
+                  <p:cNvPr id="39" name="Grupo 40"/>
+                  <p:cNvGrpSpPr/>
+                  <p:nvPr/>
+                </p:nvGrpSpPr>
+                <p:grpSpPr>
+                  <a:xfrm>
+                    <a:off x="10947" y="4421"/>
+                    <a:ext cx="3374" cy="3374"/>
+                    <a:chOff x="12789" y="3712"/>
+                    <a:chExt cx="3374" cy="3374"/>
+                  </a:xfrm>
+                </p:grpSpPr>
+                <p:pic>
+                  <p:nvPicPr>
+                    <p:cNvPr id="42" name="Imagem 41" descr="icon_celular"/>
+                    <p:cNvPicPr>
+                      <a:picLocks noChangeAspect="1"/>
+                    </p:cNvPicPr>
+                    <p:nvPr/>
+                  </p:nvPicPr>
+                  <p:blipFill>
+                    <a:blip r:embed="rId9">
+                      <a:clrChange>
+                        <a:clrFrom>
+                          <a:srgbClr val="FFFFFF">
+                            <a:alpha val="100000"/>
+                          </a:srgbClr>
+                        </a:clrFrom>
+                        <a:clrTo>
+                          <a:srgbClr val="FFFFFF">
+                            <a:alpha val="100000"/>
+                            <a:alpha val="0"/>
+                          </a:srgbClr>
+                        </a:clrTo>
+                      </a:clrChange>
+                    </a:blip>
+                    <a:stretch>
+                      <a:fillRect/>
+                    </a:stretch>
+                  </p:blipFill>
+                  <p:spPr>
+                    <a:xfrm>
+                      <a:off x="12789" y="3712"/>
+                      <a:ext cx="3375" cy="3375"/>
+                    </a:xfrm>
+                    <a:prstGeom prst="rect">
+                      <a:avLst/>
+                    </a:prstGeom>
+                  </p:spPr>
+                </p:pic>
+                <p:pic>
+                  <p:nvPicPr>
+                    <p:cNvPr id="43" name="Imagem 42" descr="icon_mapa"/>
+                    <p:cNvPicPr>
+                      <a:picLocks noChangeAspect="1"/>
+                    </p:cNvPicPr>
+                    <p:nvPr/>
+                  </p:nvPicPr>
+                  <p:blipFill>
+                    <a:blip r:embed="rId6"/>
+                    <a:stretch>
+                      <a:fillRect/>
+                    </a:stretch>
+                  </p:blipFill>
+                  <p:spPr>
+                    <a:xfrm>
+                      <a:off x="13737" y="4074"/>
+                      <a:ext cx="1492" cy="2342"/>
+                    </a:xfrm>
+                    <a:prstGeom prst="rect">
+                      <a:avLst/>
+                    </a:prstGeom>
+                    <a:ln w="0">
+                      <a:solidFill>
+                        <a:schemeClr val="tx1"/>
+                      </a:solidFill>
+                    </a:ln>
+                  </p:spPr>
+                </p:pic>
+              </p:grpSp>
+              <p:sp>
+                <p:nvSpPr>
+                  <p:cNvPr id="40" name="Caixa de Texto 43"/>
+                  <p:cNvSpPr txBox="1"/>
+                  <p:nvPr/>
+                </p:nvSpPr>
+                <p:spPr>
+                  <a:xfrm>
+                    <a:off x="10340" y="7796"/>
+                    <a:ext cx="4747" cy="919"/>
+                  </a:xfrm>
+                  <a:prstGeom prst="rect">
+                    <a:avLst/>
+                  </a:prstGeom>
+                  <a:noFill/>
+                </p:spPr>
+                <p:txBody>
+                  <a:bodyPr wrap="square" rtlCol="0">
+                    <a:spAutoFit/>
+                  </a:bodyPr>
+                  <a:lstStyle/>
+                  <a:p>
+                    <a:r>
+                      <a:rPr lang="en-US" altLang="pt-BR" sz="1200" b="1"/>
+                      <a:t>android versao 7+</a:t>
+                    </a:r>
+                  </a:p>
+                  <a:p>
+                    <a:r>
+                      <a:rPr lang="en-US" altLang="pt-BR" sz="1200" b="1"/>
+                      <a:t>ios versao 10+</a:t>
+                    </a:r>
+                  </a:p>
+                </p:txBody>
+              </p:sp>
+              <p:pic>
+                <p:nvPicPr>
+                  <p:cNvPr id="41" name="Imagem 40" descr="icon_sistema_celular"/>
+                  <p:cNvPicPr>
+                    <a:picLocks noChangeAspect="1"/>
+                  </p:cNvPicPr>
+                  <p:nvPr/>
+                </p:nvPicPr>
+                <p:blipFill>
+                  <a:blip r:embed="rId10">
+                    <a:clrChange>
+                      <a:clrFrom>
+                        <a:srgbClr val="F6F6F6">
+                          <a:alpha val="100000"/>
+                        </a:srgbClr>
+                      </a:clrFrom>
+                      <a:clrTo>
+                        <a:srgbClr val="F6F6F6">
+                          <a:alpha val="100000"/>
+                          <a:alpha val="0"/>
+                        </a:srgbClr>
+                      </a:clrTo>
+                    </a:clrChange>
+                  </a:blip>
+                  <a:stretch>
+                    <a:fillRect/>
+                  </a:stretch>
+                </p:blipFill>
+                <p:spPr>
+                  <a:xfrm>
+                    <a:off x="11639" y="8899"/>
+                    <a:ext cx="2150" cy="955"/>
+                  </a:xfrm>
+                  <a:prstGeom prst="rect">
+                    <a:avLst/>
+                  </a:prstGeom>
+                </p:spPr>
+              </p:pic>
+            </p:grpSp>
+            <p:pic>
+              <p:nvPicPr>
+                <p:cNvPr id="38" name="Imagem 37" descr="icon_sinal"/>
+                <p:cNvPicPr>
+                  <a:picLocks noChangeAspect="1"/>
+                </p:cNvPicPr>
+                <p:nvPr/>
+              </p:nvPicPr>
+              <p:blipFill>
+                <a:blip r:embed="rId3"/>
+                <a:stretch>
+                  <a:fillRect/>
+                </a:stretch>
+              </p:blipFill>
+              <p:spPr>
+                <a:xfrm>
+                  <a:off x="10695" y="3081"/>
+                  <a:ext cx="1340" cy="1340"/>
+                </a:xfrm>
+                <a:prstGeom prst="rect">
+                  <a:avLst/>
+                </a:prstGeom>
+              </p:spPr>
+            </p:pic>
+          </p:grpSp>
+          <p:grpSp>
+            <p:nvGrpSpPr>
+              <p:cNvPr id="34" name="Grupo 46"/>
+              <p:cNvGrpSpPr/>
+              <p:nvPr/>
+            </p:nvGrpSpPr>
+            <p:grpSpPr>
+              <a:xfrm>
+                <a:off x="7273" y="2662"/>
+                <a:ext cx="3090" cy="2222"/>
+                <a:chOff x="9073" y="2541"/>
+                <a:chExt cx="3090" cy="2222"/>
+              </a:xfrm>
+            </p:grpSpPr>
+            <p:pic>
+              <p:nvPicPr>
+                <p:cNvPr id="35" name="Imagem 34" descr="icon_rotiador"/>
+                <p:cNvPicPr>
+                  <a:picLocks noChangeAspect="1"/>
+                </p:cNvPicPr>
+                <p:nvPr/>
+              </p:nvPicPr>
+              <p:blipFill>
+                <a:blip r:embed="rId4"/>
+                <a:stretch>
+                  <a:fillRect/>
+                </a:stretch>
+              </p:blipFill>
+              <p:spPr>
+                <a:xfrm>
+                  <a:off x="9073" y="2541"/>
+                  <a:ext cx="1791" cy="1370"/>
+                </a:xfrm>
+                <a:prstGeom prst="rect">
+                  <a:avLst/>
+                </a:prstGeom>
+              </p:spPr>
+            </p:pic>
+            <p:sp>
+              <p:nvSpPr>
+                <p:cNvPr id="36" name="Caixa de Texto 48"/>
+                <p:cNvSpPr txBox="1"/>
+                <p:nvPr/>
+              </p:nvSpPr>
+              <p:spPr>
+                <a:xfrm>
+                  <a:off x="9154" y="3844"/>
+                  <a:ext cx="3009" cy="919"/>
+                </a:xfrm>
+                <a:prstGeom prst="rect">
+                  <a:avLst/>
+                </a:prstGeom>
+                <a:noFill/>
+              </p:spPr>
+              <p:txBody>
+                <a:bodyPr wrap="square" rtlCol="0">
+                  <a:spAutoFit/>
+                </a:bodyPr>
+                <a:lstStyle/>
+                <a:p>
+                  <a:r>
+                    <a:rPr lang="en-US" altLang="pt-BR" sz="1200" b="1"/>
+                    <a:t>Modem LAN/WIFI</a:t>
+                  </a:r>
+                </a:p>
+              </p:txBody>
+            </p:sp>
+          </p:grpSp>
+        </p:grpSp>
+        <p:grpSp>
+          <p:nvGrpSpPr>
+            <p:cNvPr id="9" name="Grupo 49"/>
+            <p:cNvGrpSpPr/>
+            <p:nvPr/>
+          </p:nvGrpSpPr>
+          <p:grpSpPr>
+            <a:xfrm>
+              <a:off x="6121" y="73"/>
+              <a:ext cx="6815" cy="3920"/>
+              <a:chOff x="4351" y="1305"/>
+              <a:chExt cx="10886" cy="5148"/>
+            </a:xfrm>
+          </p:grpSpPr>
+          <p:sp>
+            <p:nvSpPr>
+              <p:cNvPr id="23" name="Retângulo arredondado 50"/>
+              <p:cNvSpPr/>
+              <p:nvPr/>
+            </p:nvSpPr>
+            <p:spPr>
+              <a:xfrm>
+                <a:off x="4351" y="1305"/>
+                <a:ext cx="10540" cy="5148"/>
+              </a:xfrm>
+              <a:prstGeom prst="roundRect">
+                <a:avLst/>
+              </a:prstGeom>
+              <a:noFill/>
+              <a:ln w="28575" cmpd="sng">
+                <a:solidFill>
+                  <a:schemeClr val="tx1"/>
+                </a:solidFill>
+                <a:prstDash val="solid"/>
+              </a:ln>
+            </p:spPr>
+            <p:style>
+              <a:lnRef idx="2">
+                <a:schemeClr val="accent1">
+                  <a:shade val="50000"/>
+                </a:schemeClr>
+              </a:lnRef>
+              <a:fillRef idx="1">
+                <a:schemeClr val="accent1"/>
+              </a:fillRef>
+              <a:effectRef idx="0">
+                <a:schemeClr val="accent1"/>
+              </a:effectRef>
+              <a:fontRef idx="minor">
+                <a:schemeClr val="lt1"/>
+              </a:fontRef>
+            </p:style>
+            <p:txBody>
+              <a:bodyPr rtlCol="0" anchor="ctr"/>
+              <a:lstStyle/>
+              <a:p>
+                <a:pPr algn="ctr"/>
+                <a:endParaRPr lang="pt-BR" altLang="en-US"/>
+              </a:p>
+            </p:txBody>
+          </p:sp>
+          <p:grpSp>
+            <p:nvGrpSpPr>
+              <p:cNvPr id="24" name="Grupo 51"/>
+              <p:cNvGrpSpPr/>
+              <p:nvPr/>
+            </p:nvGrpSpPr>
+            <p:grpSpPr>
+              <a:xfrm>
+                <a:off x="10732" y="2338"/>
+                <a:ext cx="4505" cy="3682"/>
+                <a:chOff x="10708" y="2882"/>
+                <a:chExt cx="4505" cy="3682"/>
+              </a:xfrm>
+            </p:grpSpPr>
+            <p:pic>
+              <p:nvPicPr>
+                <p:cNvPr id="29" name="Imagem 28" descr="icon_server"/>
+                <p:cNvPicPr>
+                  <a:picLocks noChangeAspect="1"/>
+                </p:cNvPicPr>
+                <p:nvPr/>
+              </p:nvPicPr>
+              <p:blipFill>
+                <a:blip r:embed="rId11"/>
+                <a:stretch>
+                  <a:fillRect/>
+                </a:stretch>
+              </p:blipFill>
+              <p:spPr>
+                <a:xfrm>
+                  <a:off x="11055" y="2882"/>
+                  <a:ext cx="2573" cy="2575"/>
+                </a:xfrm>
+                <a:prstGeom prst="rect">
+                  <a:avLst/>
+                </a:prstGeom>
+              </p:spPr>
+            </p:pic>
+            <p:sp>
+              <p:nvSpPr>
+                <p:cNvPr id="30" name="Caixa de Texto 53"/>
+                <p:cNvSpPr txBox="1"/>
+                <p:nvPr/>
+              </p:nvSpPr>
+              <p:spPr>
+                <a:xfrm>
+                  <a:off x="10708" y="5227"/>
+                  <a:ext cx="4505" cy="1337"/>
+                </a:xfrm>
+                <a:prstGeom prst="rect">
+                  <a:avLst/>
+                </a:prstGeom>
+                <a:noFill/>
+              </p:spPr>
+              <p:txBody>
+                <a:bodyPr wrap="square" rtlCol="0">
+                  <a:spAutoFit/>
+                </a:bodyPr>
+                <a:lstStyle/>
+                <a:p>
+                  <a:r>
+                    <a:rPr lang="pt-BR" altLang="en-US" sz="1200" b="1" dirty="0"/>
+                    <a:t>Servidor Aplicações </a:t>
+                  </a:r>
+                </a:p>
+                <a:p>
+                  <a:r>
+                    <a:rPr lang="pt-BR" altLang="en-US" sz="1200" b="1" dirty="0"/>
+                    <a:t>nodeJS/HTML/CSS/</a:t>
+                  </a:r>
+                </a:p>
+                <a:p>
+                  <a:r>
+                    <a:rPr lang="pt-BR" altLang="en-US" sz="1200" b="1" dirty="0"/>
+                    <a:t>javascript</a:t>
+                  </a:r>
+                </a:p>
+              </p:txBody>
+            </p:sp>
+          </p:grpSp>
+          <p:sp>
+            <p:nvSpPr>
+              <p:cNvPr id="25" name="Caixa de Texto 54"/>
+              <p:cNvSpPr txBox="1"/>
+              <p:nvPr/>
+            </p:nvSpPr>
+            <p:spPr>
+              <a:xfrm>
+                <a:off x="7552" y="1548"/>
+                <a:ext cx="6065" cy="697"/>
+              </a:xfrm>
+              <a:prstGeom prst="rect">
+                <a:avLst/>
+              </a:prstGeom>
+              <a:noFill/>
+            </p:spPr>
+            <p:txBody>
+              <a:bodyPr wrap="square" rtlCol="0">
+                <a:spAutoFit/>
+              </a:bodyPr>
+              <a:lstStyle/>
+              <a:p>
+                <a:r>
+                  <a:rPr lang="en-US" altLang="pt-BR" sz="1600" b="1"/>
+                  <a:t>microsoft</a:t>
+                </a:r>
+                <a:r>
+                  <a:rPr lang="en-US" altLang="pt-BR" sz="1600" b="1" dirty="0"/>
+                  <a:t> azure</a:t>
+                </a:r>
+              </a:p>
+            </p:txBody>
+          </p:sp>
+          <p:grpSp>
+            <p:nvGrpSpPr>
+              <p:cNvPr id="26" name="Grupo 55"/>
+              <p:cNvGrpSpPr/>
+              <p:nvPr/>
+            </p:nvGrpSpPr>
+            <p:grpSpPr>
+              <a:xfrm>
+                <a:off x="4825" y="2996"/>
+                <a:ext cx="4562" cy="2487"/>
+                <a:chOff x="4825" y="2996"/>
+                <a:chExt cx="4562" cy="2487"/>
+              </a:xfrm>
+            </p:grpSpPr>
+            <p:pic>
+              <p:nvPicPr>
+                <p:cNvPr id="27" name="Imagem 26" descr="icon_database"/>
+                <p:cNvPicPr>
+                  <a:picLocks noChangeAspect="1"/>
+                </p:cNvPicPr>
+                <p:nvPr/>
+              </p:nvPicPr>
+              <p:blipFill>
+                <a:blip r:embed="rId12">
+                  <a:lum bright="-100000"/>
+                </a:blip>
+                <a:stretch>
+                  <a:fillRect/>
+                </a:stretch>
+              </p:blipFill>
+              <p:spPr>
+                <a:xfrm>
+                  <a:off x="6147" y="2996"/>
+                  <a:ext cx="1917" cy="1917"/>
+                </a:xfrm>
+                <a:prstGeom prst="rect">
+                  <a:avLst/>
+                </a:prstGeom>
+              </p:spPr>
+            </p:pic>
+            <p:sp>
+              <p:nvSpPr>
+                <p:cNvPr id="28" name="Caixa de Texto 57"/>
+                <p:cNvSpPr txBox="1"/>
+                <p:nvPr/>
+              </p:nvSpPr>
+              <p:spPr>
+                <a:xfrm>
+                  <a:off x="4825" y="4913"/>
+                  <a:ext cx="4562" cy="570"/>
+                </a:xfrm>
+                <a:prstGeom prst="rect">
+                  <a:avLst/>
+                </a:prstGeom>
+                <a:noFill/>
+              </p:spPr>
+              <p:txBody>
+                <a:bodyPr wrap="square" rtlCol="0">
+                  <a:spAutoFit/>
+                </a:bodyPr>
+                <a:lstStyle/>
+                <a:p>
+                  <a:r>
+                    <a:rPr lang="en-US" altLang="en-US" sz="1200" b="1"/>
+                    <a:t>BD SQL SERVER</a:t>
+                  </a:r>
+                </a:p>
+              </p:txBody>
+            </p:sp>
+          </p:grpSp>
+        </p:grpSp>
+        <p:pic>
+          <p:nvPicPr>
+            <p:cNvPr id="10" name="Imagem 9" descr="antena_icon"/>
+            <p:cNvPicPr>
+              <a:picLocks noChangeAspect="1"/>
+            </p:cNvPicPr>
+            <p:nvPr/>
+          </p:nvPicPr>
+          <p:blipFill>
+            <a:blip r:embed="rId13"/>
+            <a:stretch>
+              <a:fillRect/>
+            </a:stretch>
+          </p:blipFill>
+          <p:spPr>
+            <a:xfrm>
+              <a:off x="1559" y="3255"/>
+              <a:ext cx="1255" cy="1255"/>
+            </a:xfrm>
+            <a:prstGeom prst="rect">
+              <a:avLst/>
+            </a:prstGeom>
+          </p:spPr>
+        </p:pic>
+        <p:pic>
+          <p:nvPicPr>
+            <p:cNvPr id="11" name="Imagem 10" descr="antena_icon"/>
+            <p:cNvPicPr>
+              <a:picLocks noChangeAspect="1"/>
+            </p:cNvPicPr>
+            <p:nvPr/>
+          </p:nvPicPr>
+          <p:blipFill>
+            <a:blip r:embed="rId13"/>
+            <a:stretch>
+              <a:fillRect/>
+            </a:stretch>
+          </p:blipFill>
+          <p:spPr>
+            <a:xfrm>
+              <a:off x="15667" y="3255"/>
+              <a:ext cx="1255" cy="1255"/>
+            </a:xfrm>
+            <a:prstGeom prst="rect">
+              <a:avLst/>
+            </a:prstGeom>
+          </p:spPr>
+        </p:pic>
+        <p:pic>
+          <p:nvPicPr>
+            <p:cNvPr id="12" name="Imagem 11" descr="cloud_icon"/>
+            <p:cNvPicPr>
+              <a:picLocks noChangeAspect="1"/>
+            </p:cNvPicPr>
+            <p:nvPr/>
+          </p:nvPicPr>
+          <p:blipFill>
+            <a:blip r:embed="rId14"/>
+            <a:stretch>
+              <a:fillRect/>
+            </a:stretch>
+          </p:blipFill>
+          <p:spPr>
+            <a:xfrm>
+              <a:off x="7424" y="3927"/>
+              <a:ext cx="2692" cy="2692"/>
+            </a:xfrm>
+            <a:prstGeom prst="rect">
+              <a:avLst/>
+            </a:prstGeom>
+          </p:spPr>
+        </p:pic>
+        <p:sp>
+          <p:nvSpPr>
+            <p:cNvPr id="13" name="Caixa de Texto 61"/>
+            <p:cNvSpPr txBox="1"/>
+            <p:nvPr/>
+          </p:nvSpPr>
+          <p:spPr>
+            <a:xfrm>
+              <a:off x="8169" y="6185"/>
+              <a:ext cx="1492" cy="434"/>
+            </a:xfrm>
+            <a:prstGeom prst="rect">
+              <a:avLst/>
+            </a:prstGeom>
+            <a:noFill/>
+          </p:spPr>
+          <p:txBody>
+            <a:bodyPr wrap="square" rtlCol="0">
+              <a:spAutoFit/>
+            </a:bodyPr>
+            <a:lstStyle/>
+            <a:p>
+              <a:r>
+                <a:rPr lang="en-US" altLang="pt-BR" sz="1200" b="1"/>
+                <a:t>internet</a:t>
+              </a:r>
+            </a:p>
+          </p:txBody>
+        </p:sp>
+        <p:sp>
+          <p:nvSpPr>
+            <p:cNvPr id="14" name="Caixa de Texto 64"/>
+            <p:cNvSpPr txBox="1"/>
+            <p:nvPr/>
+          </p:nvSpPr>
+          <p:spPr>
+            <a:xfrm>
+              <a:off x="2814" y="3421"/>
+              <a:ext cx="1708" cy="434"/>
+            </a:xfrm>
+            <a:prstGeom prst="rect">
+              <a:avLst/>
+            </a:prstGeom>
+            <a:noFill/>
+          </p:spPr>
+          <p:txBody>
+            <a:bodyPr wrap="square" rtlCol="0">
+              <a:spAutoFit/>
+            </a:bodyPr>
+            <a:lstStyle/>
+            <a:p>
+              <a:r>
+                <a:rPr lang="en-US" altLang="pt-BR" sz="1200" b="1"/>
+                <a:t>antena</a:t>
+              </a:r>
+            </a:p>
+          </p:txBody>
+        </p:sp>
+        <p:sp>
+          <p:nvSpPr>
+            <p:cNvPr id="15" name="Caixa de Texto 65"/>
+            <p:cNvSpPr txBox="1"/>
+            <p:nvPr/>
+          </p:nvSpPr>
+          <p:spPr>
+            <a:xfrm>
+              <a:off x="16784" y="3666"/>
+              <a:ext cx="1708" cy="434"/>
+            </a:xfrm>
+            <a:prstGeom prst="rect">
+              <a:avLst/>
+            </a:prstGeom>
+            <a:noFill/>
+          </p:spPr>
+          <p:txBody>
+            <a:bodyPr wrap="square" rtlCol="0">
+              <a:spAutoFit/>
+            </a:bodyPr>
+            <a:lstStyle/>
+            <a:p>
+              <a:r>
+                <a:rPr lang="en-US" altLang="pt-BR" sz="1200" b="1"/>
+                <a:t>antena</a:t>
+              </a:r>
+            </a:p>
+          </p:txBody>
+        </p:sp>
+        <p:sp>
+          <p:nvSpPr>
+            <p:cNvPr id="16" name="Caixa de Texto 66"/>
+            <p:cNvSpPr txBox="1"/>
+            <p:nvPr/>
+          </p:nvSpPr>
+          <p:spPr>
+            <a:xfrm>
+              <a:off x="4244" y="10022"/>
+              <a:ext cx="2647" cy="580"/>
+            </a:xfrm>
+            <a:prstGeom prst="rect">
+              <a:avLst/>
+            </a:prstGeom>
+            <a:noFill/>
+          </p:spPr>
+          <p:txBody>
+            <a:bodyPr wrap="square" rtlCol="0">
+              <a:spAutoFit/>
+            </a:bodyPr>
+            <a:lstStyle/>
+            <a:p>
+              <a:r>
+                <a:rPr lang="en-US" altLang="pt-BR" b="1"/>
+                <a:t>produto</a:t>
+              </a:r>
+            </a:p>
+          </p:txBody>
+        </p:sp>
+        <p:sp>
+          <p:nvSpPr>
+            <p:cNvPr id="17" name="Caixa de Texto 68"/>
+            <p:cNvSpPr txBox="1"/>
+            <p:nvPr/>
+          </p:nvSpPr>
+          <p:spPr>
+            <a:xfrm>
+              <a:off x="10857" y="4909"/>
+              <a:ext cx="2647" cy="580"/>
+            </a:xfrm>
+            <a:prstGeom prst="rect">
+              <a:avLst/>
+            </a:prstGeom>
+            <a:noFill/>
+          </p:spPr>
+          <p:txBody>
+            <a:bodyPr wrap="square" rtlCol="0">
+              <a:spAutoFit/>
+            </a:bodyPr>
+            <a:lstStyle/>
+            <a:p>
+              <a:r>
+                <a:rPr lang="en-US" altLang="en-US" b="1"/>
+                <a:t>cliente</a:t>
+              </a:r>
+            </a:p>
+          </p:txBody>
+        </p:sp>
+        <p:cxnSp>
+          <p:nvCxnSpPr>
+            <p:cNvPr id="18" name="Conector de Seta Reta 17"/>
+            <p:cNvCxnSpPr>
+              <a:endCxn id="55" idx="1"/>
+            </p:cNvCxnSpPr>
+            <p:nvPr/>
+          </p:nvCxnSpPr>
+          <p:spPr>
+            <a:xfrm>
+              <a:off x="2694" y="4617"/>
+              <a:ext cx="882" cy="707"/>
+            </a:xfrm>
+            <a:prstGeom prst="straightConnector1">
+              <a:avLst/>
+            </a:prstGeom>
+            <a:ln w="28575" cmpd="sng">
+              <a:solidFill>
+                <a:schemeClr val="tx1"/>
+              </a:solidFill>
+              <a:prstDash val="sysDash"/>
+              <a:headEnd type="arrow" w="med" len="med"/>
+              <a:tailEnd type="arrow" w="med" len="med"/>
+            </a:ln>
+          </p:spPr>
+          <p:style>
+            <a:lnRef idx="1">
+              <a:schemeClr val="accent6"/>
+            </a:lnRef>
+            <a:fillRef idx="0">
+              <a:schemeClr val="accent6"/>
+            </a:fillRef>
+            <a:effectRef idx="0">
+              <a:schemeClr val="accent6"/>
+            </a:effectRef>
+            <a:fontRef idx="minor">
+              <a:schemeClr val="tx1"/>
+            </a:fontRef>
+          </p:style>
+        </p:cxnSp>
+        <p:cxnSp>
+          <p:nvCxnSpPr>
+            <p:cNvPr id="19" name="Conector de Seta Reta 18"/>
+            <p:cNvCxnSpPr/>
+            <p:nvPr/>
+          </p:nvCxnSpPr>
+          <p:spPr>
+            <a:xfrm flipH="1">
+              <a:off x="15536" y="4099"/>
+              <a:ext cx="347" cy="809"/>
+            </a:xfrm>
+            <a:prstGeom prst="straightConnector1">
+              <a:avLst/>
+            </a:prstGeom>
+            <a:ln w="28575" cmpd="sng">
+              <a:solidFill>
+                <a:schemeClr val="tx1"/>
+              </a:solidFill>
+              <a:prstDash val="dash"/>
+              <a:headEnd type="arrow" w="med" len="med"/>
+              <a:tailEnd type="arrow" w="med" len="med"/>
+            </a:ln>
+          </p:spPr>
+          <p:style>
+            <a:lnRef idx="1">
+              <a:schemeClr val="accent6"/>
+            </a:lnRef>
+            <a:fillRef idx="0">
+              <a:schemeClr val="accent6"/>
+            </a:fillRef>
+            <a:effectRef idx="0">
+              <a:schemeClr val="accent6"/>
+            </a:effectRef>
+            <a:fontRef idx="minor">
+              <a:schemeClr val="tx1"/>
+            </a:fontRef>
+          </p:style>
+        </p:cxnSp>
+        <p:cxnSp>
+          <p:nvCxnSpPr>
+            <p:cNvPr id="20" name="Conector de Seta Reta 19"/>
+            <p:cNvCxnSpPr>
+              <a:stCxn id="10" idx="3"/>
+            </p:cNvCxnSpPr>
+            <p:nvPr/>
+          </p:nvCxnSpPr>
+          <p:spPr>
+            <a:xfrm>
+              <a:off x="2814" y="3883"/>
+              <a:ext cx="5270" cy="782"/>
+            </a:xfrm>
+            <a:prstGeom prst="straightConnector1">
+              <a:avLst/>
+            </a:prstGeom>
+            <a:ln w="28575" cmpd="sng">
+              <a:solidFill>
+                <a:schemeClr val="tx1"/>
+              </a:solidFill>
+              <a:prstDash val="sysDash"/>
+              <a:tailEnd type="arrow"/>
+            </a:ln>
+          </p:spPr>
+          <p:style>
+            <a:lnRef idx="1">
+              <a:schemeClr val="accent1"/>
+            </a:lnRef>
+            <a:fillRef idx="0">
+              <a:schemeClr val="accent1"/>
+            </a:fillRef>
+            <a:effectRef idx="0">
+              <a:schemeClr val="accent1"/>
+            </a:effectRef>
+            <a:fontRef idx="minor">
+              <a:schemeClr val="tx1"/>
+            </a:fontRef>
+          </p:style>
+        </p:cxnSp>
+        <p:cxnSp>
+          <p:nvCxnSpPr>
+            <p:cNvPr id="21" name="Conector de Seta Reta 20"/>
+            <p:cNvCxnSpPr>
+              <a:endCxn id="11" idx="1"/>
+            </p:cNvCxnSpPr>
+            <p:nvPr/>
+          </p:nvCxnSpPr>
+          <p:spPr>
+            <a:xfrm flipV="1">
+              <a:off x="9911" y="3883"/>
+              <a:ext cx="5756" cy="903"/>
+            </a:xfrm>
+            <a:prstGeom prst="straightConnector1">
+              <a:avLst/>
+            </a:prstGeom>
+            <a:ln w="28575" cmpd="sng">
+              <a:solidFill>
+                <a:schemeClr val="tx1"/>
+              </a:solidFill>
+              <a:prstDash val="sysDash"/>
+              <a:tailEnd type="arrow"/>
+            </a:ln>
+          </p:spPr>
+          <p:style>
+            <a:lnRef idx="1">
+              <a:schemeClr val="accent1"/>
+            </a:lnRef>
+            <a:fillRef idx="0">
+              <a:schemeClr val="accent1"/>
+            </a:fillRef>
+            <a:effectRef idx="0">
+              <a:schemeClr val="accent1"/>
+            </a:effectRef>
+            <a:fontRef idx="minor">
+              <a:schemeClr val="tx1"/>
+            </a:fontRef>
+          </p:style>
+        </p:cxnSp>
+        <p:cxnSp>
+          <p:nvCxnSpPr>
+            <p:cNvPr id="22" name="Conector de Seta Reta 21"/>
+            <p:cNvCxnSpPr/>
+            <p:nvPr/>
+          </p:nvCxnSpPr>
+          <p:spPr>
+            <a:xfrm flipH="1">
+              <a:off x="9088" y="3255"/>
+              <a:ext cx="3" cy="1100"/>
+            </a:xfrm>
+            <a:prstGeom prst="straightConnector1">
+              <a:avLst/>
+            </a:prstGeom>
+            <a:ln w="28575" cmpd="sng">
+              <a:solidFill>
+                <a:schemeClr val="tx1"/>
+              </a:solidFill>
+              <a:prstDash val="sysDash"/>
+              <a:headEnd type="arrow" w="med" len="med"/>
+              <a:tailEnd type="arrow" w="med" len="med"/>
+            </a:ln>
+          </p:spPr>
+          <p:style>
+            <a:lnRef idx="1">
+              <a:schemeClr val="accent6"/>
+            </a:lnRef>
+            <a:fillRef idx="0">
+              <a:schemeClr val="accent6"/>
+            </a:fillRef>
+            <a:effectRef idx="0">
+              <a:schemeClr val="accent6"/>
+            </a:effectRef>
+            <a:fontRef idx="minor">
+              <a:schemeClr val="tx1"/>
+            </a:fontRef>
+          </p:style>
+        </p:cxnSp>
+      </p:grpSp>
     </p:spTree>
     <p:extLst>
       <p:ext uri="{BB962C8B-B14F-4D97-AF65-F5344CB8AC3E}">
@@ -10426,6 +12031,42 @@
           <a:chExt cx="0" cy="0"/>
         </a:xfrm>
       </p:grpSpPr>
+      <p:pic>
+        <p:nvPicPr>
+          <p:cNvPr id="4" name="Picture 2">
+            <a:extLst>
+              <a:ext uri="{FF2B5EF4-FFF2-40B4-BE49-F238E27FC236}">
+                <a16:creationId xmlns:a16="http://schemas.microsoft.com/office/drawing/2014/main" id="{1CF03E58-0B96-4176-890C-5C38BB20B555}"/>
+              </a:ext>
+            </a:extLst>
+          </p:cNvPr>
+          <p:cNvPicPr>
+            <a:picLocks noChangeAspect="1"/>
+          </p:cNvPicPr>
+          <p:nvPr/>
+        </p:nvPicPr>
+        <p:blipFill>
+          <a:blip r:embed="rId2">
+            <a:extLst>
+              <a:ext uri="{28A0092B-C50C-407E-A947-70E740481C1C}">
+                <a14:useLocalDpi xmlns:a14="http://schemas.microsoft.com/office/drawing/2010/main" val="0"/>
+              </a:ext>
+            </a:extLst>
+          </a:blip>
+          <a:stretch>
+            <a:fillRect/>
+          </a:stretch>
+        </p:blipFill>
+        <p:spPr>
+          <a:xfrm>
+            <a:off x="0" y="666206"/>
+            <a:ext cx="10985775" cy="6191794"/>
+          </a:xfrm>
+          <a:prstGeom prst="rect">
+            <a:avLst/>
+          </a:prstGeom>
+        </p:spPr>
+      </p:pic>
       <p:sp>
         <p:nvSpPr>
           <p:cNvPr id="2" name="Seta: Pentágono 2">
@@ -10440,7 +12081,7 @@
         </p:nvSpPr>
         <p:spPr>
           <a:xfrm>
-            <a:off x="0" y="720743"/>
+            <a:off x="0" y="119851"/>
             <a:ext cx="1881051" cy="676257"/>
           </a:xfrm>
           <a:prstGeom prst="homePlate">
@@ -10485,36 +12126,6 @@
           </a:p>
         </p:txBody>
       </p:sp>
-      <p:pic>
-        <p:nvPicPr>
-          <p:cNvPr id="3" name="Imagem 2"/>
-          <p:cNvPicPr>
-            <a:picLocks noChangeAspect="1"/>
-          </p:cNvPicPr>
-          <p:nvPr/>
-        </p:nvPicPr>
-        <p:blipFill>
-          <a:blip r:embed="rId2" cstate="print">
-            <a:extLst>
-              <a:ext uri="{28A0092B-C50C-407E-A947-70E740481C1C}">
-                <a14:useLocalDpi xmlns:a14="http://schemas.microsoft.com/office/drawing/2010/main" val="0"/>
-              </a:ext>
-            </a:extLst>
-          </a:blip>
-          <a:stretch>
-            <a:fillRect/>
-          </a:stretch>
-        </p:blipFill>
-        <p:spPr>
-          <a:xfrm>
-            <a:off x="352695" y="1136469"/>
-            <a:ext cx="10550544" cy="5275272"/>
-          </a:xfrm>
-          <a:prstGeom prst="rect">
-            <a:avLst/>
-          </a:prstGeom>
-        </p:spPr>
-      </p:pic>
     </p:spTree>
     <p:extLst>
       <p:ext uri="{BB962C8B-B14F-4D97-AF65-F5344CB8AC3E}">
@@ -11351,8 +12962,8 @@
         </p:nvSpPr>
         <p:spPr>
           <a:xfrm>
-            <a:off x="0" y="2788171"/>
-            <a:ext cx="8424473" cy="1024818"/>
+            <a:off x="1" y="1063874"/>
+            <a:ext cx="6492240" cy="1444195"/>
           </a:xfrm>
           <a:prstGeom prst="homePlate">
             <a:avLst/>
@@ -11388,7 +12999,25 @@
               <a:rPr lang="pt-BR" sz="4400" dirty="0" smtClean="0">
                 <a:latin typeface="+mj-lt"/>
               </a:rPr>
-              <a:t> Protótipo do site institucional</a:t>
+              <a:t> </a:t>
+            </a:r>
+            <a:r>
+              <a:rPr lang="pt-BR" sz="4400" dirty="0">
+                <a:latin typeface="+mj-lt"/>
+              </a:rPr>
+              <a:t>S</a:t>
+            </a:r>
+            <a:r>
+              <a:rPr lang="pt-BR" sz="4400" dirty="0" smtClean="0">
+                <a:latin typeface="+mj-lt"/>
+              </a:rPr>
+              <a:t>ite </a:t>
+            </a:r>
+            <a:r>
+              <a:rPr lang="pt-BR" sz="4400" dirty="0" smtClean="0">
+                <a:latin typeface="+mj-lt"/>
+              </a:rPr>
+              <a:t>institucional</a:t>
             </a:r>
             <a:endParaRPr lang="pt-BR" sz="4400" dirty="0">
               <a:latin typeface="+mj-lt"/>
@@ -11433,1293 +13062,6 @@
           <a:chExt cx="0" cy="0"/>
         </a:xfrm>
       </p:grpSpPr>
-      <p:pic>
-        <p:nvPicPr>
-          <p:cNvPr id="4" name="Imagem 3" descr="Uma imagem contendo céu, água, ao ar livre, edifício&#10;&#10;Descrição gerada com muito alta confiança">
-            <a:extLst>
-              <a:ext uri="{FF2B5EF4-FFF2-40B4-BE49-F238E27FC236}">
-                <a16:creationId xmlns:a16="http://schemas.microsoft.com/office/drawing/2014/main" id="{98B20FDD-4380-4FB5-9DDF-B80D26779B5D}"/>
-              </a:ext>
-            </a:extLst>
-          </p:cNvPr>
-          <p:cNvPicPr>
-            <a:picLocks noChangeAspect="1"/>
-          </p:cNvPicPr>
-          <p:nvPr/>
-        </p:nvPicPr>
-        <p:blipFill>
-          <a:blip r:embed="rId2">
-            <a:extLst>
-              <a:ext uri="{BEBA8EAE-BF5A-486C-A8C5-ECC9F3942E4B}">
-                <a14:imgProps xmlns:a14="http://schemas.microsoft.com/office/drawing/2010/main">
-                  <a14:imgLayer r:embed="rId3">
-                    <a14:imgEffect>
-                      <a14:artisticBlur radius="23"/>
-                    </a14:imgEffect>
-                    <a14:imgEffect>
-                      <a14:saturation sat="66000"/>
-                    </a14:imgEffect>
-                  </a14:imgLayer>
-                </a14:imgProps>
-              </a:ext>
-              <a:ext uri="{28A0092B-C50C-407E-A947-70E740481C1C}">
-                <a14:useLocalDpi xmlns:a14="http://schemas.microsoft.com/office/drawing/2010/main" val="0"/>
-              </a:ext>
-            </a:extLst>
-          </a:blip>
-          <a:stretch>
-            <a:fillRect/>
-          </a:stretch>
-        </p:blipFill>
-        <p:spPr>
-          <a:xfrm>
-            <a:off x="0" y="0"/>
-            <a:ext cx="14695714" cy="6858000"/>
-          </a:xfrm>
-          <a:prstGeom prst="rect">
-            <a:avLst/>
-          </a:prstGeom>
-        </p:spPr>
-      </p:pic>
-      <p:pic>
-        <p:nvPicPr>
-          <p:cNvPr id="5" name="Imagem 4" descr="Uma imagem contendo objeto&#10;&#10;Descrição gerada com alta confiança">
-            <a:extLst>
-              <a:ext uri="{FF2B5EF4-FFF2-40B4-BE49-F238E27FC236}">
-                <a16:creationId xmlns:a16="http://schemas.microsoft.com/office/drawing/2014/main" id="{52FE44C5-1264-4AB5-8D21-08FA91A1A009}"/>
-              </a:ext>
-            </a:extLst>
-          </p:cNvPr>
-          <p:cNvPicPr>
-            <a:picLocks noChangeAspect="1"/>
-          </p:cNvPicPr>
-          <p:nvPr/>
-        </p:nvPicPr>
-        <p:blipFill>
-          <a:blip r:embed="rId4">
-            <a:extLst>
-              <a:ext uri="{28A0092B-C50C-407E-A947-70E740481C1C}">
-                <a14:useLocalDpi xmlns:a14="http://schemas.microsoft.com/office/drawing/2010/main" val="0"/>
-              </a:ext>
-            </a:extLst>
-          </a:blip>
-          <a:stretch>
-            <a:fillRect/>
-          </a:stretch>
-        </p:blipFill>
-        <p:spPr>
-          <a:xfrm>
-            <a:off x="3232399" y="1269672"/>
-            <a:ext cx="4175673" cy="4163709"/>
-          </a:xfrm>
-          <a:prstGeom prst="rect">
-            <a:avLst/>
-          </a:prstGeom>
-        </p:spPr>
-      </p:pic>
-      <p:sp>
-        <p:nvSpPr>
-          <p:cNvPr id="6" name="CaixaDeTexto 5">
-            <a:extLst>
-              <a:ext uri="{FF2B5EF4-FFF2-40B4-BE49-F238E27FC236}">
-                <a16:creationId xmlns:a16="http://schemas.microsoft.com/office/drawing/2014/main" id="{C33A1C92-6782-4FDC-BE20-481113E86A33}"/>
-              </a:ext>
-            </a:extLst>
-          </p:cNvPr>
-          <p:cNvSpPr txBox="1"/>
-          <p:nvPr/>
-        </p:nvSpPr>
-        <p:spPr>
-          <a:xfrm>
-            <a:off x="1513623" y="5648513"/>
-            <a:ext cx="9164753" cy="646331"/>
-          </a:xfrm>
-          <a:prstGeom prst="rect">
-            <a:avLst/>
-          </a:prstGeom>
-          <a:noFill/>
-        </p:spPr>
-        <p:txBody>
-          <a:bodyPr wrap="square" rtlCol="0">
-            <a:spAutoFit/>
-          </a:bodyPr>
-          <a:lstStyle/>
-          <a:p>
-            <a:pPr algn="ctr"/>
-            <a:r>
-              <a:rPr lang="pt-BR" sz="3600" b="1" dirty="0">
-                <a:solidFill>
-                  <a:schemeClr val="bg1"/>
-                </a:solidFill>
-                <a:latin typeface="Segoe UI Emoji" panose="020B0502040204020203" pitchFamily="34" charset="0"/>
-                <a:ea typeface="Segoe UI Emoji" panose="020B0502040204020203" pitchFamily="34" charset="0"/>
-                <a:cs typeface="Segoe UI" panose="020B0502040204020203" pitchFamily="34" charset="0"/>
-              </a:rPr>
-              <a:t>MUNDO, INOVAÇÃO E TECNOLOGIA</a:t>
-            </a:r>
-          </a:p>
-        </p:txBody>
-      </p:sp>
-      <p:sp>
-        <p:nvSpPr>
-          <p:cNvPr id="7" name="Retângulo 6">
-            <a:extLst>
-              <a:ext uri="{FF2B5EF4-FFF2-40B4-BE49-F238E27FC236}">
-                <a16:creationId xmlns:a16="http://schemas.microsoft.com/office/drawing/2014/main" id="{D6CA0DBD-C15F-45BC-A90B-A42C4D8DD389}"/>
-              </a:ext>
-            </a:extLst>
-          </p:cNvPr>
-          <p:cNvSpPr/>
-          <p:nvPr/>
-        </p:nvSpPr>
-        <p:spPr>
-          <a:xfrm>
-            <a:off x="1169823" y="5571395"/>
-            <a:ext cx="157531" cy="646331"/>
-          </a:xfrm>
-          <a:prstGeom prst="rect">
-            <a:avLst/>
-          </a:prstGeom>
-          <a:solidFill>
-            <a:schemeClr val="bg1"/>
-          </a:solidFill>
-          <a:ln>
-            <a:noFill/>
-          </a:ln>
-        </p:spPr>
-        <p:style>
-          <a:lnRef idx="2">
-            <a:schemeClr val="accent1">
-              <a:shade val="50000"/>
-            </a:schemeClr>
-          </a:lnRef>
-          <a:fillRef idx="1">
-            <a:schemeClr val="accent1"/>
-          </a:fillRef>
-          <a:effectRef idx="0">
-            <a:schemeClr val="accent1"/>
-          </a:effectRef>
-          <a:fontRef idx="minor">
-            <a:schemeClr val="lt1"/>
-          </a:fontRef>
-        </p:style>
-        <p:txBody>
-          <a:bodyPr rtlCol="0" anchor="ctr"/>
-          <a:lstStyle/>
-          <a:p>
-            <a:pPr algn="ctr"/>
-            <a:endParaRPr lang="pt-BR" dirty="0"/>
-          </a:p>
-        </p:txBody>
-      </p:sp>
-      <p:grpSp>
-        <p:nvGrpSpPr>
-          <p:cNvPr id="8" name="Google Shape;106;p13">
-            <a:extLst>
-              <a:ext uri="{FF2B5EF4-FFF2-40B4-BE49-F238E27FC236}">
-                <a16:creationId xmlns:a16="http://schemas.microsoft.com/office/drawing/2014/main" id="{DD957B2C-86D5-4A89-9027-4E659ED17DEA}"/>
-              </a:ext>
-            </a:extLst>
-          </p:cNvPr>
-          <p:cNvGrpSpPr/>
-          <p:nvPr/>
-        </p:nvGrpSpPr>
-        <p:grpSpPr>
-          <a:xfrm>
-            <a:off x="2552894" y="478763"/>
-            <a:ext cx="6861026" cy="369343"/>
-            <a:chOff x="2744244" y="-217775"/>
-            <a:chExt cx="6861026" cy="369343"/>
-          </a:xfrm>
-        </p:grpSpPr>
-        <p:sp>
-          <p:nvSpPr>
-            <p:cNvPr id="9" name="Google Shape;107;p13">
-              <a:extLst>
-                <a:ext uri="{FF2B5EF4-FFF2-40B4-BE49-F238E27FC236}">
-                  <a16:creationId xmlns:a16="http://schemas.microsoft.com/office/drawing/2014/main" id="{BF70C316-B901-4F84-90C0-76E4D532BC0B}"/>
-                </a:ext>
-              </a:extLst>
-            </p:cNvPr>
-            <p:cNvSpPr txBox="1"/>
-            <p:nvPr/>
-          </p:nvSpPr>
-          <p:spPr>
-            <a:xfrm>
-              <a:off x="3508641" y="-217732"/>
-              <a:ext cx="1713000" cy="369300"/>
-            </a:xfrm>
-            <a:prstGeom prst="rect">
-              <a:avLst/>
-            </a:prstGeom>
-            <a:noFill/>
-            <a:ln>
-              <a:noFill/>
-            </a:ln>
-          </p:spPr>
-          <p:txBody>
-            <a:bodyPr spcFirstLastPara="1" wrap="square" lIns="91425" tIns="45700" rIns="91425" bIns="45700" anchor="t" anchorCtr="0">
-              <a:noAutofit/>
-            </a:bodyPr>
-            <a:lstStyle/>
-            <a:p>
-              <a:pPr marL="0" marR="0" lvl="0" indent="0" algn="l" rtl="0">
-                <a:spcBef>
-                  <a:spcPts val="0"/>
-                </a:spcBef>
-                <a:spcAft>
-                  <a:spcPts val="0"/>
-                </a:spcAft>
-                <a:buNone/>
-              </a:pPr>
-              <a:r>
-                <a:rPr lang="pt-BR" sz="1800">
-                  <a:solidFill>
-                    <a:schemeClr val="dk1"/>
-                  </a:solidFill>
-                  <a:latin typeface="Calibri"/>
-                  <a:ea typeface="Calibri"/>
-                  <a:cs typeface="Calibri"/>
-                  <a:sym typeface="Calibri"/>
-                </a:rPr>
-                <a:t>História</a:t>
-              </a:r>
-              <a:endParaRPr/>
-            </a:p>
-          </p:txBody>
-        </p:sp>
-        <p:sp>
-          <p:nvSpPr>
-            <p:cNvPr id="10" name="Google Shape;108;p13">
-              <a:extLst>
-                <a:ext uri="{FF2B5EF4-FFF2-40B4-BE49-F238E27FC236}">
-                  <a16:creationId xmlns:a16="http://schemas.microsoft.com/office/drawing/2014/main" id="{C47733C3-D356-4AEC-9566-399505B69700}"/>
-                </a:ext>
-              </a:extLst>
-            </p:cNvPr>
-            <p:cNvSpPr txBox="1"/>
-            <p:nvPr/>
-          </p:nvSpPr>
-          <p:spPr>
-            <a:xfrm>
-              <a:off x="7465444" y="-217737"/>
-              <a:ext cx="1141800" cy="369300"/>
-            </a:xfrm>
-            <a:prstGeom prst="rect">
-              <a:avLst/>
-            </a:prstGeom>
-            <a:noFill/>
-            <a:ln>
-              <a:noFill/>
-            </a:ln>
-          </p:spPr>
-          <p:txBody>
-            <a:bodyPr spcFirstLastPara="1" wrap="square" lIns="91425" tIns="45700" rIns="91425" bIns="45700" anchor="t" anchorCtr="0">
-              <a:noAutofit/>
-            </a:bodyPr>
-            <a:lstStyle/>
-            <a:p>
-              <a:pPr marL="0" marR="0" lvl="0" indent="0" algn="l" rtl="0">
-                <a:spcBef>
-                  <a:spcPts val="0"/>
-                </a:spcBef>
-                <a:spcAft>
-                  <a:spcPts val="0"/>
-                </a:spcAft>
-                <a:buNone/>
-              </a:pPr>
-              <a:r>
-                <a:rPr lang="pt-BR" sz="1800">
-                  <a:solidFill>
-                    <a:schemeClr val="dk1"/>
-                  </a:solidFill>
-                  <a:latin typeface="Calibri"/>
-                  <a:ea typeface="Calibri"/>
-                  <a:cs typeface="Calibri"/>
-                  <a:sym typeface="Calibri"/>
-                </a:rPr>
-                <a:t>Cadastro</a:t>
-              </a:r>
-              <a:endParaRPr/>
-            </a:p>
-          </p:txBody>
-        </p:sp>
-        <p:sp>
-          <p:nvSpPr>
-            <p:cNvPr id="11" name="Google Shape;109;p13">
-              <a:extLst>
-                <a:ext uri="{FF2B5EF4-FFF2-40B4-BE49-F238E27FC236}">
-                  <a16:creationId xmlns:a16="http://schemas.microsoft.com/office/drawing/2014/main" id="{11C8690A-6CE6-4027-A3D0-D9555D00006D}"/>
-                </a:ext>
-              </a:extLst>
-            </p:cNvPr>
-            <p:cNvSpPr txBox="1"/>
-            <p:nvPr/>
-          </p:nvSpPr>
-          <p:spPr>
-            <a:xfrm>
-              <a:off x="8578970" y="-217737"/>
-              <a:ext cx="1026300" cy="369300"/>
-            </a:xfrm>
-            <a:prstGeom prst="rect">
-              <a:avLst/>
-            </a:prstGeom>
-            <a:noFill/>
-            <a:ln>
-              <a:noFill/>
-            </a:ln>
-          </p:spPr>
-          <p:txBody>
-            <a:bodyPr spcFirstLastPara="1" wrap="square" lIns="91425" tIns="45700" rIns="91425" bIns="45700" anchor="t" anchorCtr="0">
-              <a:noAutofit/>
-            </a:bodyPr>
-            <a:lstStyle/>
-            <a:p>
-              <a:pPr marL="0" marR="0" lvl="0" indent="0" algn="l" rtl="0">
-                <a:spcBef>
-                  <a:spcPts val="0"/>
-                </a:spcBef>
-                <a:spcAft>
-                  <a:spcPts val="0"/>
-                </a:spcAft>
-                <a:buNone/>
-              </a:pPr>
-              <a:r>
-                <a:rPr lang="pt-BR" sz="1800">
-                  <a:solidFill>
-                    <a:schemeClr val="dk1"/>
-                  </a:solidFill>
-                  <a:latin typeface="Calibri"/>
-                  <a:ea typeface="Calibri"/>
-                  <a:cs typeface="Calibri"/>
-                  <a:sym typeface="Calibri"/>
-                </a:rPr>
-                <a:t>Contato   </a:t>
-              </a:r>
-              <a:endParaRPr/>
-            </a:p>
-          </p:txBody>
-        </p:sp>
-        <p:sp>
-          <p:nvSpPr>
-            <p:cNvPr id="12" name="Google Shape;110;p13">
-              <a:extLst>
-                <a:ext uri="{FF2B5EF4-FFF2-40B4-BE49-F238E27FC236}">
-                  <a16:creationId xmlns:a16="http://schemas.microsoft.com/office/drawing/2014/main" id="{1F65C07C-22D3-49C2-87CA-F539DF01BFCA}"/>
-                </a:ext>
-              </a:extLst>
-            </p:cNvPr>
-            <p:cNvSpPr txBox="1"/>
-            <p:nvPr/>
-          </p:nvSpPr>
-          <p:spPr>
-            <a:xfrm>
-              <a:off x="2744244" y="-217737"/>
-              <a:ext cx="764400" cy="369300"/>
-            </a:xfrm>
-            <a:prstGeom prst="rect">
-              <a:avLst/>
-            </a:prstGeom>
-            <a:noFill/>
-            <a:ln>
-              <a:noFill/>
-            </a:ln>
-          </p:spPr>
-          <p:txBody>
-            <a:bodyPr spcFirstLastPara="1" wrap="square" lIns="91425" tIns="45700" rIns="91425" bIns="45700" anchor="t" anchorCtr="0">
-              <a:noAutofit/>
-            </a:bodyPr>
-            <a:lstStyle/>
-            <a:p>
-              <a:pPr marL="0" marR="0" lvl="0" indent="0" algn="l" rtl="0">
-                <a:spcBef>
-                  <a:spcPts val="0"/>
-                </a:spcBef>
-                <a:spcAft>
-                  <a:spcPts val="0"/>
-                </a:spcAft>
-                <a:buNone/>
-              </a:pPr>
-              <a:r>
-                <a:rPr lang="pt-BR" sz="1800" b="1" i="0" u="none" strike="noStrike" cap="none">
-                  <a:solidFill>
-                    <a:schemeClr val="dk1"/>
-                  </a:solidFill>
-                  <a:latin typeface="Calibri"/>
-                  <a:ea typeface="Calibri"/>
-                  <a:cs typeface="Calibri"/>
-                  <a:sym typeface="Calibri"/>
-                </a:rPr>
-                <a:t>Início </a:t>
-              </a:r>
-              <a:endParaRPr b="1"/>
-            </a:p>
-          </p:txBody>
-        </p:sp>
-        <p:sp>
-          <p:nvSpPr>
-            <p:cNvPr id="13" name="Google Shape;111;p13">
-              <a:extLst>
-                <a:ext uri="{FF2B5EF4-FFF2-40B4-BE49-F238E27FC236}">
-                  <a16:creationId xmlns:a16="http://schemas.microsoft.com/office/drawing/2014/main" id="{2C186174-848F-4925-907B-7378A6D2B361}"/>
-                </a:ext>
-              </a:extLst>
-            </p:cNvPr>
-            <p:cNvSpPr txBox="1"/>
-            <p:nvPr/>
-          </p:nvSpPr>
-          <p:spPr>
-            <a:xfrm>
-              <a:off x="4471416" y="-217732"/>
-              <a:ext cx="1713000" cy="369300"/>
-            </a:xfrm>
-            <a:prstGeom prst="rect">
-              <a:avLst/>
-            </a:prstGeom>
-            <a:noFill/>
-            <a:ln>
-              <a:noFill/>
-            </a:ln>
-          </p:spPr>
-          <p:txBody>
-            <a:bodyPr spcFirstLastPara="1" wrap="square" lIns="91425" tIns="45700" rIns="91425" bIns="45700" anchor="t" anchorCtr="0">
-              <a:noAutofit/>
-            </a:bodyPr>
-            <a:lstStyle/>
-            <a:p>
-              <a:pPr marL="0" marR="0" lvl="0" indent="0" algn="l" rtl="0">
-                <a:spcBef>
-                  <a:spcPts val="0"/>
-                </a:spcBef>
-                <a:spcAft>
-                  <a:spcPts val="0"/>
-                </a:spcAft>
-                <a:buNone/>
-              </a:pPr>
-              <a:r>
-                <a:rPr lang="pt-BR" sz="1800">
-                  <a:solidFill>
-                    <a:schemeClr val="dk1"/>
-                  </a:solidFill>
-                  <a:latin typeface="Calibri"/>
-                  <a:ea typeface="Calibri"/>
-                  <a:cs typeface="Calibri"/>
-                  <a:sym typeface="Calibri"/>
-                </a:rPr>
-                <a:t>Produto</a:t>
-              </a:r>
-              <a:endParaRPr/>
-            </a:p>
-          </p:txBody>
-        </p:sp>
-        <p:sp>
-          <p:nvSpPr>
-            <p:cNvPr id="14" name="Google Shape;112;p13">
-              <a:extLst>
-                <a:ext uri="{FF2B5EF4-FFF2-40B4-BE49-F238E27FC236}">
-                  <a16:creationId xmlns:a16="http://schemas.microsoft.com/office/drawing/2014/main" id="{A045FD1A-0435-443C-B16A-3CB64455CD3A}"/>
-                </a:ext>
-              </a:extLst>
-            </p:cNvPr>
-            <p:cNvSpPr txBox="1"/>
-            <p:nvPr/>
-          </p:nvSpPr>
-          <p:spPr>
-            <a:xfrm>
-              <a:off x="5442764" y="-217775"/>
-              <a:ext cx="1919700" cy="369300"/>
-            </a:xfrm>
-            <a:prstGeom prst="rect">
-              <a:avLst/>
-            </a:prstGeom>
-            <a:noFill/>
-            <a:ln>
-              <a:noFill/>
-            </a:ln>
-          </p:spPr>
-          <p:txBody>
-            <a:bodyPr spcFirstLastPara="1" wrap="square" lIns="91425" tIns="45700" rIns="91425" bIns="45700" anchor="t" anchorCtr="0">
-              <a:noAutofit/>
-            </a:bodyPr>
-            <a:lstStyle/>
-            <a:p>
-              <a:pPr marL="0" marR="0" lvl="0" indent="0" algn="l" rtl="0">
-                <a:spcBef>
-                  <a:spcPts val="0"/>
-                </a:spcBef>
-                <a:spcAft>
-                  <a:spcPts val="0"/>
-                </a:spcAft>
-                <a:buNone/>
-              </a:pPr>
-              <a:r>
-                <a:rPr lang="pt-BR" sz="1800"/>
-                <a:t>Aplicativo</a:t>
-              </a:r>
-              <a:endParaRPr sz="1800"/>
-            </a:p>
-          </p:txBody>
-        </p:sp>
-      </p:grpSp>
-      <p:sp>
-        <p:nvSpPr>
-          <p:cNvPr id="15" name="Google Shape;114;p13">
-            <a:extLst>
-              <a:ext uri="{FF2B5EF4-FFF2-40B4-BE49-F238E27FC236}">
-                <a16:creationId xmlns:a16="http://schemas.microsoft.com/office/drawing/2014/main" id="{10EB6997-02C7-4369-B6D4-5FABCC21CCE2}"/>
-              </a:ext>
-            </a:extLst>
-          </p:cNvPr>
-          <p:cNvSpPr/>
-          <p:nvPr/>
-        </p:nvSpPr>
-        <p:spPr>
-          <a:xfrm>
-            <a:off x="2469475" y="485176"/>
-            <a:ext cx="883278" cy="369306"/>
-          </a:xfrm>
-          <a:prstGeom prst="flowChartTerminator">
-            <a:avLst/>
-          </a:prstGeom>
-          <a:solidFill>
-            <a:schemeClr val="bg1">
-              <a:alpha val="29800"/>
-            </a:schemeClr>
-          </a:solidFill>
-          <a:ln w="12700" cap="flat" cmpd="sng">
-            <a:solidFill>
-              <a:srgbClr val="31538F"/>
-            </a:solidFill>
-            <a:prstDash val="solid"/>
-            <a:miter lim="800000"/>
-            <a:headEnd type="none" w="sm" len="sm"/>
-            <a:tailEnd type="none" w="sm" len="sm"/>
-          </a:ln>
-        </p:spPr>
-        <p:txBody>
-          <a:bodyPr spcFirstLastPara="1" wrap="square" lIns="91425" tIns="45700" rIns="91425" bIns="45700" anchor="ctr" anchorCtr="0">
-            <a:noAutofit/>
-          </a:bodyPr>
-          <a:lstStyle/>
-          <a:p>
-            <a:pPr marL="0" marR="0" lvl="0" indent="0" algn="ctr" rtl="0">
-              <a:spcBef>
-                <a:spcPts val="0"/>
-              </a:spcBef>
-              <a:spcAft>
-                <a:spcPts val="0"/>
-              </a:spcAft>
-              <a:buNone/>
-            </a:pPr>
-            <a:endParaRPr sz="1800">
-              <a:solidFill>
-                <a:schemeClr val="lt1"/>
-              </a:solidFill>
-              <a:latin typeface="Calibri"/>
-              <a:ea typeface="Calibri"/>
-              <a:cs typeface="Calibri"/>
-              <a:sym typeface="Calibri"/>
-            </a:endParaRPr>
-          </a:p>
-        </p:txBody>
-      </p:sp>
-      <p:grpSp>
-        <p:nvGrpSpPr>
-          <p:cNvPr id="16" name="Google Shape;85;p13">
-            <a:extLst>
-              <a:ext uri="{FF2B5EF4-FFF2-40B4-BE49-F238E27FC236}">
-                <a16:creationId xmlns:a16="http://schemas.microsoft.com/office/drawing/2014/main" id="{EAC71889-C08B-478C-924A-F378FF340FA6}"/>
-              </a:ext>
-            </a:extLst>
-          </p:cNvPr>
-          <p:cNvGrpSpPr/>
-          <p:nvPr/>
-        </p:nvGrpSpPr>
-        <p:grpSpPr>
-          <a:xfrm>
-            <a:off x="7674206" y="1223488"/>
-            <a:ext cx="4346462" cy="769441"/>
-            <a:chOff x="7562722" y="-39696"/>
-            <a:chExt cx="5234451" cy="1116084"/>
-          </a:xfrm>
-        </p:grpSpPr>
-        <p:sp>
-          <p:nvSpPr>
-            <p:cNvPr id="17" name="Google Shape;86;p13">
-              <a:extLst>
-                <a:ext uri="{FF2B5EF4-FFF2-40B4-BE49-F238E27FC236}">
-                  <a16:creationId xmlns:a16="http://schemas.microsoft.com/office/drawing/2014/main" id="{5BB402C5-D305-4B33-AD10-82377D611D2E}"/>
-                </a:ext>
-              </a:extLst>
-            </p:cNvPr>
-            <p:cNvSpPr/>
-            <p:nvPr/>
-          </p:nvSpPr>
-          <p:spPr>
-            <a:xfrm>
-              <a:off x="10433041" y="521193"/>
-              <a:ext cx="1076700" cy="274200"/>
-            </a:xfrm>
-            <a:prstGeom prst="roundRect">
-              <a:avLst>
-                <a:gd name="adj" fmla="val 16667"/>
-              </a:avLst>
-            </a:prstGeom>
-            <a:solidFill>
-              <a:srgbClr val="D9D9D9"/>
-            </a:solidFill>
-            <a:ln>
-              <a:noFill/>
-            </a:ln>
-          </p:spPr>
-          <p:txBody>
-            <a:bodyPr spcFirstLastPara="1" wrap="square" lIns="91425" tIns="45700" rIns="91425" bIns="45700" anchor="ctr" anchorCtr="0">
-              <a:noAutofit/>
-            </a:bodyPr>
-            <a:lstStyle/>
-            <a:p>
-              <a:pPr marL="0" marR="0" lvl="0" indent="0" algn="ctr" rtl="0">
-                <a:spcBef>
-                  <a:spcPts val="0"/>
-                </a:spcBef>
-                <a:spcAft>
-                  <a:spcPts val="0"/>
-                </a:spcAft>
-                <a:buNone/>
-              </a:pPr>
-              <a:endParaRPr sz="1800">
-                <a:solidFill>
-                  <a:schemeClr val="lt1"/>
-                </a:solidFill>
-                <a:latin typeface="Calibri"/>
-                <a:ea typeface="Calibri"/>
-                <a:cs typeface="Calibri"/>
-                <a:sym typeface="Calibri"/>
-              </a:endParaRPr>
-            </a:p>
-          </p:txBody>
-        </p:sp>
-        <p:sp>
-          <p:nvSpPr>
-            <p:cNvPr id="18" name="Google Shape;87;p13">
-              <a:extLst>
-                <a:ext uri="{FF2B5EF4-FFF2-40B4-BE49-F238E27FC236}">
-                  <a16:creationId xmlns:a16="http://schemas.microsoft.com/office/drawing/2014/main" id="{EAB29ED5-868D-434B-ABB5-FC92E7E509B9}"/>
-                </a:ext>
-              </a:extLst>
-            </p:cNvPr>
-            <p:cNvSpPr txBox="1"/>
-            <p:nvPr/>
-          </p:nvSpPr>
-          <p:spPr>
-            <a:xfrm>
-              <a:off x="8714856" y="-39696"/>
-              <a:ext cx="1547400" cy="369300"/>
-            </a:xfrm>
-            <a:prstGeom prst="rect">
-              <a:avLst/>
-            </a:prstGeom>
-            <a:noFill/>
-            <a:ln>
-              <a:noFill/>
-            </a:ln>
-          </p:spPr>
-          <p:txBody>
-            <a:bodyPr spcFirstLastPara="1" wrap="square" lIns="91425" tIns="45700" rIns="91425" bIns="45700" anchor="t" anchorCtr="0">
-              <a:noAutofit/>
-            </a:bodyPr>
-            <a:lstStyle/>
-            <a:p>
-              <a:pPr marL="0" marR="0" lvl="0" indent="0" algn="l" rtl="0">
-                <a:spcBef>
-                  <a:spcPts val="0"/>
-                </a:spcBef>
-                <a:spcAft>
-                  <a:spcPts val="0"/>
-                </a:spcAft>
-                <a:buNone/>
-              </a:pPr>
-              <a:r>
-                <a:rPr lang="pt-BR" sz="1800" dirty="0">
-                  <a:solidFill>
-                    <a:schemeClr val="dk1"/>
-                  </a:solidFill>
-                  <a:latin typeface="Calibri"/>
-                  <a:ea typeface="Calibri"/>
-                  <a:cs typeface="Calibri"/>
-                  <a:sym typeface="Calibri"/>
-                </a:rPr>
-                <a:t>Usuário</a:t>
-              </a:r>
-              <a:endParaRPr dirty="0"/>
-            </a:p>
-          </p:txBody>
-        </p:sp>
-        <p:sp>
-          <p:nvSpPr>
-            <p:cNvPr id="19" name="Google Shape;88;p13">
-              <a:extLst>
-                <a:ext uri="{FF2B5EF4-FFF2-40B4-BE49-F238E27FC236}">
-                  <a16:creationId xmlns:a16="http://schemas.microsoft.com/office/drawing/2014/main" id="{A65CE429-43B7-47D0-9F12-A351D33753CD}"/>
-                </a:ext>
-              </a:extLst>
-            </p:cNvPr>
-            <p:cNvSpPr txBox="1"/>
-            <p:nvPr/>
-          </p:nvSpPr>
-          <p:spPr>
-            <a:xfrm>
-              <a:off x="10367187" y="-39696"/>
-              <a:ext cx="1208400" cy="369300"/>
-            </a:xfrm>
-            <a:prstGeom prst="rect">
-              <a:avLst/>
-            </a:prstGeom>
-            <a:noFill/>
-            <a:ln>
-              <a:noFill/>
-            </a:ln>
-          </p:spPr>
-          <p:txBody>
-            <a:bodyPr spcFirstLastPara="1" wrap="square" lIns="91425" tIns="45700" rIns="91425" bIns="45700" anchor="t" anchorCtr="0">
-              <a:noAutofit/>
-            </a:bodyPr>
-            <a:lstStyle/>
-            <a:p>
-              <a:pPr marL="0" marR="0" lvl="0" indent="0" algn="l" rtl="0">
-                <a:spcBef>
-                  <a:spcPts val="0"/>
-                </a:spcBef>
-                <a:spcAft>
-                  <a:spcPts val="0"/>
-                </a:spcAft>
-                <a:buNone/>
-              </a:pPr>
-              <a:r>
-                <a:rPr lang="pt-BR" sz="1800">
-                  <a:solidFill>
-                    <a:schemeClr val="dk1"/>
-                  </a:solidFill>
-                  <a:latin typeface="Calibri"/>
-                  <a:ea typeface="Calibri"/>
-                  <a:cs typeface="Calibri"/>
-                  <a:sym typeface="Calibri"/>
-                </a:rPr>
-                <a:t>Senha</a:t>
-              </a:r>
-              <a:endParaRPr/>
-            </a:p>
-          </p:txBody>
-        </p:sp>
-        <p:pic>
-          <p:nvPicPr>
-            <p:cNvPr id="20" name="Google Shape;89;p13">
-              <a:extLst>
-                <a:ext uri="{FF2B5EF4-FFF2-40B4-BE49-F238E27FC236}">
-                  <a16:creationId xmlns:a16="http://schemas.microsoft.com/office/drawing/2014/main" id="{741CC00B-6618-4A53-B178-E940770B5252}"/>
-                </a:ext>
-              </a:extLst>
-            </p:cNvPr>
-            <p:cNvPicPr preferRelativeResize="0"/>
-            <p:nvPr/>
-          </p:nvPicPr>
-          <p:blipFill rotWithShape="1">
-            <a:blip r:embed="rId5">
-              <a:alphaModFix/>
-            </a:blip>
-            <a:srcRect/>
-            <a:stretch/>
-          </p:blipFill>
-          <p:spPr>
-            <a:xfrm>
-              <a:off x="11720612" y="439246"/>
-              <a:ext cx="1076561" cy="637142"/>
-            </a:xfrm>
-            <a:prstGeom prst="rect">
-              <a:avLst/>
-            </a:prstGeom>
-            <a:noFill/>
-            <a:ln>
-              <a:noFill/>
-            </a:ln>
-          </p:spPr>
-        </p:pic>
-        <p:sp>
-          <p:nvSpPr>
-            <p:cNvPr id="21" name="Google Shape;90;p13">
-              <a:extLst>
-                <a:ext uri="{FF2B5EF4-FFF2-40B4-BE49-F238E27FC236}">
-                  <a16:creationId xmlns:a16="http://schemas.microsoft.com/office/drawing/2014/main" id="{B33E69AA-2BE4-43C6-B00C-D5F1DA18A7F1}"/>
-                </a:ext>
-              </a:extLst>
-            </p:cNvPr>
-            <p:cNvSpPr txBox="1"/>
-            <p:nvPr/>
-          </p:nvSpPr>
-          <p:spPr>
-            <a:xfrm>
-              <a:off x="7562722" y="365007"/>
-              <a:ext cx="1076700" cy="400199"/>
-            </a:xfrm>
-            <a:prstGeom prst="rect">
-              <a:avLst/>
-            </a:prstGeom>
-            <a:noFill/>
-            <a:ln>
-              <a:noFill/>
-            </a:ln>
-          </p:spPr>
-          <p:txBody>
-            <a:bodyPr spcFirstLastPara="1" wrap="square" lIns="91425" tIns="45700" rIns="91425" bIns="45700" anchor="t" anchorCtr="0">
-              <a:noAutofit/>
-            </a:bodyPr>
-            <a:lstStyle/>
-            <a:p>
-              <a:pPr marL="0" marR="0" lvl="0" indent="0" algn="l" rtl="0">
-                <a:spcBef>
-                  <a:spcPts val="0"/>
-                </a:spcBef>
-                <a:spcAft>
-                  <a:spcPts val="0"/>
-                </a:spcAft>
-                <a:buNone/>
-              </a:pPr>
-              <a:r>
-                <a:rPr lang="pt-BR" sz="2000" dirty="0">
-                  <a:solidFill>
-                    <a:srgbClr val="1A6EB7"/>
-                  </a:solidFill>
-                  <a:latin typeface="Aharoni"/>
-                  <a:ea typeface="Aharoni"/>
-                  <a:cs typeface="Aharoni"/>
-                  <a:sym typeface="Aharoni"/>
-                </a:rPr>
-                <a:t>Login </a:t>
-              </a:r>
-              <a:endParaRPr dirty="0"/>
-            </a:p>
-          </p:txBody>
-        </p:sp>
-      </p:grpSp>
-      <p:sp>
-        <p:nvSpPr>
-          <p:cNvPr id="22" name="Google Shape;91;p13">
-            <a:extLst>
-              <a:ext uri="{FF2B5EF4-FFF2-40B4-BE49-F238E27FC236}">
-                <a16:creationId xmlns:a16="http://schemas.microsoft.com/office/drawing/2014/main" id="{A7922020-EDAE-488E-82EC-33D7D3D88DFB}"/>
-              </a:ext>
-            </a:extLst>
-          </p:cNvPr>
-          <p:cNvSpPr/>
-          <p:nvPr/>
-        </p:nvSpPr>
-        <p:spPr>
-          <a:xfrm>
-            <a:off x="8765161" y="1610171"/>
-            <a:ext cx="1026300" cy="189037"/>
-          </a:xfrm>
-          <a:prstGeom prst="roundRect">
-            <a:avLst>
-              <a:gd name="adj" fmla="val 16667"/>
-            </a:avLst>
-          </a:prstGeom>
-          <a:solidFill>
-            <a:srgbClr val="D9D9D9"/>
-          </a:solidFill>
-          <a:ln>
-            <a:noFill/>
-          </a:ln>
-        </p:spPr>
-        <p:txBody>
-          <a:bodyPr spcFirstLastPara="1" wrap="square" lIns="91425" tIns="45700" rIns="91425" bIns="45700" anchor="ctr" anchorCtr="0">
-            <a:noAutofit/>
-          </a:bodyPr>
-          <a:lstStyle/>
-          <a:p>
-            <a:pPr marL="0" marR="0" lvl="0" indent="0" algn="ctr" rtl="0">
-              <a:spcBef>
-                <a:spcPts val="0"/>
-              </a:spcBef>
-              <a:spcAft>
-                <a:spcPts val="0"/>
-              </a:spcAft>
-              <a:buNone/>
-            </a:pPr>
-            <a:endParaRPr sz="1800">
-              <a:solidFill>
-                <a:schemeClr val="lt1"/>
-              </a:solidFill>
-              <a:latin typeface="Calibri"/>
-              <a:ea typeface="Calibri"/>
-              <a:cs typeface="Calibri"/>
-              <a:sym typeface="Calibri"/>
-            </a:endParaRPr>
-          </a:p>
-        </p:txBody>
-      </p:sp>
-      <p:sp>
-        <p:nvSpPr>
-          <p:cNvPr id="24" name="Google Shape;113;p13">
-            <a:extLst>
-              <a:ext uri="{FF2B5EF4-FFF2-40B4-BE49-F238E27FC236}">
-                <a16:creationId xmlns:a16="http://schemas.microsoft.com/office/drawing/2014/main" id="{1EC03320-FB65-4ED2-A8F4-7604C698AE96}"/>
-              </a:ext>
-            </a:extLst>
-          </p:cNvPr>
-          <p:cNvSpPr txBox="1"/>
-          <p:nvPr/>
-        </p:nvSpPr>
-        <p:spPr>
-          <a:xfrm>
-            <a:off x="6385743" y="431663"/>
-            <a:ext cx="1609200" cy="463500"/>
-          </a:xfrm>
-          <a:prstGeom prst="rect">
-            <a:avLst/>
-          </a:prstGeom>
-          <a:noFill/>
-          <a:ln>
-            <a:noFill/>
-          </a:ln>
-        </p:spPr>
-        <p:txBody>
-          <a:bodyPr spcFirstLastPara="1" wrap="square" lIns="91425" tIns="91425" rIns="91425" bIns="91425" anchor="t" anchorCtr="0">
-            <a:noAutofit/>
-          </a:bodyPr>
-          <a:lstStyle/>
-          <a:p>
-            <a:pPr marL="0" lvl="0" indent="0" algn="l" rtl="0">
-              <a:spcBef>
-                <a:spcPts val="0"/>
-              </a:spcBef>
-              <a:spcAft>
-                <a:spcPts val="0"/>
-              </a:spcAft>
-              <a:buNone/>
-            </a:pPr>
-            <a:r>
-              <a:rPr lang="pt-BR" sz="1800" dirty="0">
-                <a:solidFill>
-                  <a:schemeClr val="dk1"/>
-                </a:solidFill>
-                <a:latin typeface="Calibri"/>
-                <a:ea typeface="Calibri"/>
-                <a:cs typeface="Calibri"/>
-                <a:sym typeface="Calibri"/>
-              </a:rPr>
-              <a:t>Gráfico </a:t>
-            </a:r>
-            <a:endParaRPr dirty="0"/>
-          </a:p>
-        </p:txBody>
-      </p:sp>
-    </p:spTree>
-    <p:extLst>
-      <p:ext uri="{BB962C8B-B14F-4D97-AF65-F5344CB8AC3E}">
-        <p14:creationId xmlns:p14="http://schemas.microsoft.com/office/powerpoint/2010/main" val="2352288819"/>
-      </p:ext>
-    </p:extLst>
-  </p:cSld>
-  <p:clrMapOvr>
-    <a:masterClrMapping/>
-  </p:clrMapOvr>
-  <p:timing>
-    <p:tnLst>
-      <p:par>
-        <p:cTn id="1" dur="indefinite" restart="never" nodeType="tmRoot">
-          <p:childTnLst>
-            <p:seq concurrent="1" nextAc="seek">
-              <p:cTn id="2" dur="indefinite" nodeType="mainSeq">
-                <p:childTnLst>
-                  <p:par>
-                    <p:cTn id="3" fill="hold">
-                      <p:stCondLst>
-                        <p:cond delay="indefinite"/>
-                        <p:cond evt="onBegin" delay="0">
-                          <p:tn val="2"/>
-                        </p:cond>
-                      </p:stCondLst>
-                      <p:childTnLst>
-                        <p:par>
-                          <p:cTn id="4" fill="hold">
-                            <p:stCondLst>
-                              <p:cond delay="0"/>
-                            </p:stCondLst>
-                            <p:childTnLst>
-                              <p:par>
-                                <p:cTn id="5" presetID="10" presetClass="entr" presetSubtype="0" fill="hold" nodeType="afterEffect">
-                                  <p:stCondLst>
-                                    <p:cond delay="0"/>
-                                  </p:stCondLst>
-                                  <p:childTnLst>
-                                    <p:set>
-                                      <p:cBhvr>
-                                        <p:cTn id="6" dur="1" fill="hold">
-                                          <p:stCondLst>
-                                            <p:cond delay="0"/>
-                                          </p:stCondLst>
-                                        </p:cTn>
-                                        <p:tgtEl>
-                                          <p:spTgt spid="4"/>
-                                        </p:tgtEl>
-                                        <p:attrNameLst>
-                                          <p:attrName>style.visibility</p:attrName>
-                                        </p:attrNameLst>
-                                      </p:cBhvr>
-                                      <p:to>
-                                        <p:strVal val="visible"/>
-                                      </p:to>
-                                    </p:set>
-                                    <p:animEffect transition="in" filter="fade">
-                                      <p:cBhvr>
-                                        <p:cTn id="7" dur="500"/>
-                                        <p:tgtEl>
-                                          <p:spTgt spid="4"/>
-                                        </p:tgtEl>
-                                      </p:cBhvr>
-                                    </p:animEffect>
-                                  </p:childTnLst>
-                                </p:cTn>
-                              </p:par>
-                              <p:par>
-                                <p:cTn id="8" presetID="35" presetClass="path" presetSubtype="0" accel="50000" decel="50000" fill="hold" nodeType="withEffect">
-                                  <p:stCondLst>
-                                    <p:cond delay="0"/>
-                                  </p:stCondLst>
-                                  <p:childTnLst>
-                                    <p:animMotion origin="layout" path="M -4.16667E-6 0 L -0.20312 0 " pathEditMode="relative" rAng="0" ptsTypes="AA">
-                                      <p:cBhvr>
-                                        <p:cTn id="9" dur="5000" fill="hold"/>
-                                        <p:tgtEl>
-                                          <p:spTgt spid="4"/>
-                                        </p:tgtEl>
-                                        <p:attrNameLst>
-                                          <p:attrName>ppt_x</p:attrName>
-                                          <p:attrName>ppt_y</p:attrName>
-                                        </p:attrNameLst>
-                                      </p:cBhvr>
-                                      <p:rCtr x="-10156" y="0"/>
-                                    </p:animMotion>
-                                  </p:childTnLst>
-                                </p:cTn>
-                              </p:par>
-                              <p:par>
-                                <p:cTn id="10" presetID="22" presetClass="entr" presetSubtype="8" fill="hold" grpId="0" nodeType="withEffect">
-                                  <p:stCondLst>
-                                    <p:cond delay="900"/>
-                                  </p:stCondLst>
-                                  <p:childTnLst>
-                                    <p:set>
-                                      <p:cBhvr>
-                                        <p:cTn id="11" dur="1" fill="hold">
-                                          <p:stCondLst>
-                                            <p:cond delay="0"/>
-                                          </p:stCondLst>
-                                        </p:cTn>
-                                        <p:tgtEl>
-                                          <p:spTgt spid="6"/>
-                                        </p:tgtEl>
-                                        <p:attrNameLst>
-                                          <p:attrName>style.visibility</p:attrName>
-                                        </p:attrNameLst>
-                                      </p:cBhvr>
-                                      <p:to>
-                                        <p:strVal val="visible"/>
-                                      </p:to>
-                                    </p:set>
-                                    <p:animEffect transition="in" filter="wipe(left)">
-                                      <p:cBhvr>
-                                        <p:cTn id="12" dur="2300"/>
-                                        <p:tgtEl>
-                                          <p:spTgt spid="6"/>
-                                        </p:tgtEl>
-                                      </p:cBhvr>
-                                    </p:animEffect>
-                                  </p:childTnLst>
-                                </p:cTn>
-                              </p:par>
-                              <p:par>
-                                <p:cTn id="13" presetID="10" presetClass="entr" presetSubtype="0" fill="hold" grpId="0" nodeType="withEffect">
-                                  <p:stCondLst>
-                                    <p:cond delay="0"/>
-                                  </p:stCondLst>
-                                  <p:childTnLst>
-                                    <p:set>
-                                      <p:cBhvr>
-                                        <p:cTn id="14" dur="1" fill="hold">
-                                          <p:stCondLst>
-                                            <p:cond delay="0"/>
-                                          </p:stCondLst>
-                                        </p:cTn>
-                                        <p:tgtEl>
-                                          <p:spTgt spid="7"/>
-                                        </p:tgtEl>
-                                        <p:attrNameLst>
-                                          <p:attrName>style.visibility</p:attrName>
-                                        </p:attrNameLst>
-                                      </p:cBhvr>
-                                      <p:to>
-                                        <p:strVal val="visible"/>
-                                      </p:to>
-                                    </p:set>
-                                    <p:animEffect transition="in" filter="fade">
-                                      <p:cBhvr>
-                                        <p:cTn id="15" dur="200"/>
-                                        <p:tgtEl>
-                                          <p:spTgt spid="7"/>
-                                        </p:tgtEl>
-                                      </p:cBhvr>
-                                    </p:animEffect>
-                                  </p:childTnLst>
-                                </p:cTn>
-                              </p:par>
-                              <p:par>
-                                <p:cTn id="16" presetID="10" presetClass="entr" presetSubtype="0" fill="hold" grpId="1" nodeType="withEffect">
-                                  <p:stCondLst>
-                                    <p:cond delay="700"/>
-                                  </p:stCondLst>
-                                  <p:childTnLst>
-                                    <p:set>
-                                      <p:cBhvr>
-                                        <p:cTn id="17" dur="1" fill="hold">
-                                          <p:stCondLst>
-                                            <p:cond delay="0"/>
-                                          </p:stCondLst>
-                                        </p:cTn>
-                                        <p:tgtEl>
-                                          <p:spTgt spid="7"/>
-                                        </p:tgtEl>
-                                        <p:attrNameLst>
-                                          <p:attrName>style.visibility</p:attrName>
-                                        </p:attrNameLst>
-                                      </p:cBhvr>
-                                      <p:to>
-                                        <p:strVal val="visible"/>
-                                      </p:to>
-                                    </p:set>
-                                    <p:animEffect transition="in" filter="fade">
-                                      <p:cBhvr>
-                                        <p:cTn id="18" dur="200"/>
-                                        <p:tgtEl>
-                                          <p:spTgt spid="7"/>
-                                        </p:tgtEl>
-                                      </p:cBhvr>
-                                    </p:animEffect>
-                                  </p:childTnLst>
-                                </p:cTn>
-                              </p:par>
-                              <p:par>
-                                <p:cTn id="19" presetID="10" presetClass="entr" presetSubtype="0" fill="hold" grpId="2" nodeType="withEffect">
-                                  <p:stCondLst>
-                                    <p:cond delay="900"/>
-                                  </p:stCondLst>
-                                  <p:childTnLst>
-                                    <p:set>
-                                      <p:cBhvr>
-                                        <p:cTn id="20" dur="1" fill="hold">
-                                          <p:stCondLst>
-                                            <p:cond delay="0"/>
-                                          </p:stCondLst>
-                                        </p:cTn>
-                                        <p:tgtEl>
-                                          <p:spTgt spid="7"/>
-                                        </p:tgtEl>
-                                        <p:attrNameLst>
-                                          <p:attrName>style.visibility</p:attrName>
-                                        </p:attrNameLst>
-                                      </p:cBhvr>
-                                      <p:to>
-                                        <p:strVal val="visible"/>
-                                      </p:to>
-                                    </p:set>
-                                    <p:animEffect transition="in" filter="fade">
-                                      <p:cBhvr>
-                                        <p:cTn id="21" dur="200"/>
-                                        <p:tgtEl>
-                                          <p:spTgt spid="7"/>
-                                        </p:tgtEl>
-                                      </p:cBhvr>
-                                    </p:animEffect>
-                                  </p:childTnLst>
-                                </p:cTn>
-                              </p:par>
-                              <p:par>
-                                <p:cTn id="22" presetID="63" presetClass="path" presetSubtype="0" fill="hold" grpId="3" nodeType="withEffect">
-                                  <p:stCondLst>
-                                    <p:cond delay="900"/>
-                                  </p:stCondLst>
-                                  <p:childTnLst>
-                                    <p:animMotion origin="layout" path="M -4.16667E-7 1.48148E-6 L 0.80612 1.48148E-6 " pathEditMode="relative" rAng="0" ptsTypes="AA">
-                                      <p:cBhvr>
-                                        <p:cTn id="23" dur="2000" fill="hold"/>
-                                        <p:tgtEl>
-                                          <p:spTgt spid="7"/>
-                                        </p:tgtEl>
-                                        <p:attrNameLst>
-                                          <p:attrName>ppt_x</p:attrName>
-                                          <p:attrName>ppt_y</p:attrName>
-                                        </p:attrNameLst>
-                                      </p:cBhvr>
-                                      <p:rCtr x="40299" y="0"/>
-                                    </p:animMotion>
-                                  </p:childTnLst>
-                                </p:cTn>
-                              </p:par>
-                            </p:childTnLst>
-                          </p:cTn>
-                        </p:par>
-                      </p:childTnLst>
-                    </p:cTn>
-                  </p:par>
-                </p:childTnLst>
-              </p:cTn>
-              <p:prevCondLst>
-                <p:cond evt="onPrev" delay="0">
-                  <p:tgtEl>
-                    <p:sldTgt/>
-                  </p:tgtEl>
-                </p:cond>
-              </p:prevCondLst>
-              <p:nextCondLst>
-                <p:cond evt="onNext" delay="0">
-                  <p:tgtEl>
-                    <p:sldTgt/>
-                  </p:tgtEl>
-                </p:cond>
-              </p:nextCondLst>
-            </p:seq>
-          </p:childTnLst>
-        </p:cTn>
-      </p:par>
-    </p:tnLst>
-    <p:bldLst>
-      <p:bldP spid="6" grpId="0"/>
-      <p:bldP spid="7" grpId="0" animBg="1"/>
-      <p:bldP spid="7" grpId="1" animBg="1"/>
-      <p:bldP spid="7" grpId="2" animBg="1"/>
-      <p:bldP spid="7" grpId="3" animBg="1"/>
-    </p:bldLst>
-  </p:timing>
-</p:sld>
-</file>
-
-<file path=ppt/slides/slide15.xml><?xml version="1.0" encoding="utf-8"?>
-<p:sld xmlns:a="http://schemas.openxmlformats.org/drawingml/2006/main" xmlns:r="http://schemas.openxmlformats.org/officeDocument/2006/relationships" xmlns:p="http://schemas.openxmlformats.org/presentationml/2006/main">
-  <p:cSld>
-    <p:spTree>
-      <p:nvGrpSpPr>
-        <p:cNvPr id="1" name=""/>
-        <p:cNvGrpSpPr/>
-        <p:nvPr/>
-      </p:nvGrpSpPr>
-      <p:grpSpPr>
-        <a:xfrm>
-          <a:off x="0" y="0"/>
-          <a:ext cx="0" cy="0"/>
-          <a:chOff x="0" y="0"/>
-          <a:chExt cx="0" cy="0"/>
-        </a:xfrm>
-      </p:grpSpPr>
       <p:sp>
         <p:nvSpPr>
           <p:cNvPr id="2" name="Seta: Pentágono 2">
@@ -12734,7 +13076,7 @@
         </p:nvSpPr>
         <p:spPr>
           <a:xfrm>
-            <a:off x="-1" y="1759677"/>
+            <a:off x="0" y="1106534"/>
             <a:ext cx="7080069" cy="1479912"/>
           </a:xfrm>
           <a:prstGeom prst="homePlate">
@@ -12805,7 +13147,7 @@
 </p:sld>
 </file>
 
-<file path=ppt/slides/slide16.xml><?xml version="1.0" encoding="utf-8"?>
+<file path=ppt/slides/slide15.xml><?xml version="1.0" encoding="utf-8"?>
 <p:sld xmlns:a="http://schemas.openxmlformats.org/drawingml/2006/main" xmlns:r="http://schemas.openxmlformats.org/officeDocument/2006/relationships" xmlns:p="http://schemas.openxmlformats.org/presentationml/2006/main">
   <p:cSld>
     <p:spTree>
@@ -12836,7 +13178,7 @@
         </p:nvSpPr>
         <p:spPr>
           <a:xfrm>
-            <a:off x="0" y="513567"/>
+            <a:off x="0" y="61163"/>
             <a:ext cx="7734925" cy="1154243"/>
           </a:xfrm>
           <a:prstGeom prst="homePlate">
@@ -12883,13 +13225,13 @@
       </p:sp>
       <p:pic>
         <p:nvPicPr>
-          <p:cNvPr id="9" name="Imagem 8"/>
+          <p:cNvPr id="4" name="Imagem 3"/>
           <p:cNvPicPr>
             <a:picLocks noChangeAspect="1"/>
           </p:cNvPicPr>
           <p:nvPr/>
         </p:nvPicPr>
-        <p:blipFill rotWithShape="1">
+        <p:blipFill>
           <a:blip r:embed="rId2">
             <a:extLst>
               <a:ext uri="{28A0092B-C50C-407E-A947-70E740481C1C}">
@@ -12897,71 +13239,14 @@
               </a:ext>
             </a:extLst>
           </a:blip>
-          <a:srcRect l="55674" t="16247" r="3857" b="63627"/>
-          <a:stretch/>
+          <a:stretch>
+            <a:fillRect/>
+          </a:stretch>
         </p:blipFill>
         <p:spPr>
           <a:xfrm>
-            <a:off x="5846164" y="2394833"/>
-            <a:ext cx="3777522" cy="1079292"/>
-          </a:xfrm>
-          <a:prstGeom prst="rect">
-            <a:avLst/>
-          </a:prstGeom>
-        </p:spPr>
-      </p:pic>
-      <p:pic>
-        <p:nvPicPr>
-          <p:cNvPr id="10" name="Imagem 9"/>
-          <p:cNvPicPr>
-            <a:picLocks noChangeAspect="1"/>
-          </p:cNvPicPr>
-          <p:nvPr/>
-        </p:nvPicPr>
-        <p:blipFill rotWithShape="1">
-          <a:blip r:embed="rId2">
-            <a:extLst>
-              <a:ext uri="{28A0092B-C50C-407E-A947-70E740481C1C}">
-                <a14:useLocalDpi xmlns:a14="http://schemas.microsoft.com/office/drawing/2010/main" val="0"/>
-              </a:ext>
-            </a:extLst>
-          </a:blip>
-          <a:srcRect t="10656" r="48180" b="58876"/>
-          <a:stretch/>
-        </p:blipFill>
-        <p:spPr>
-          <a:xfrm>
-            <a:off x="1009027" y="2095029"/>
-            <a:ext cx="4837137" cy="1633929"/>
-          </a:xfrm>
-          <a:prstGeom prst="rect">
-            <a:avLst/>
-          </a:prstGeom>
-        </p:spPr>
-      </p:pic>
-      <p:pic>
-        <p:nvPicPr>
-          <p:cNvPr id="11" name="Imagem 10"/>
-          <p:cNvPicPr>
-            <a:picLocks noChangeAspect="1"/>
-          </p:cNvPicPr>
-          <p:nvPr/>
-        </p:nvPicPr>
-        <p:blipFill rotWithShape="1">
-          <a:blip r:embed="rId2">
-            <a:extLst>
-              <a:ext uri="{28A0092B-C50C-407E-A947-70E740481C1C}">
-                <a14:useLocalDpi xmlns:a14="http://schemas.microsoft.com/office/drawing/2010/main" val="0"/>
-              </a:ext>
-            </a:extLst>
-          </a:blip>
-          <a:srcRect t="41651" r="34102" b="-1"/>
-          <a:stretch/>
-        </p:blipFill>
-        <p:spPr>
-          <a:xfrm>
-            <a:off x="1009027" y="3728958"/>
-            <a:ext cx="6151276" cy="3129042"/>
+            <a:off x="-95250" y="638284"/>
+            <a:ext cx="10493284" cy="6153039"/>
           </a:xfrm>
           <a:prstGeom prst="rect">
             <a:avLst/>
@@ -12988,7 +13273,7 @@
 </p:sld>
 </file>
 
-<file path=ppt/slides/slide17.xml><?xml version="1.0" encoding="utf-8"?>
+<file path=ppt/slides/slide16.xml><?xml version="1.0" encoding="utf-8"?>
 <p:sld xmlns:a="http://schemas.openxmlformats.org/drawingml/2006/main" xmlns:r="http://schemas.openxmlformats.org/officeDocument/2006/relationships" xmlns:p="http://schemas.openxmlformats.org/presentationml/2006/main">
   <p:cSld>
     <p:spTree>
@@ -13150,7 +13435,7 @@
 </p:sld>
 </file>
 
-<file path=ppt/slides/slide18.xml><?xml version="1.0" encoding="utf-8"?>
+<file path=ppt/slides/slide17.xml><?xml version="1.0" encoding="utf-8"?>
 <p:sld xmlns:a="http://schemas.openxmlformats.org/drawingml/2006/main" xmlns:r="http://schemas.openxmlformats.org/officeDocument/2006/relationships" xmlns:p="http://schemas.openxmlformats.org/presentationml/2006/main">
   <p:cSld>
     <p:spTree>
@@ -13496,7 +13781,19 @@
               <a:rPr lang="pt-BR" sz="2400" dirty="0" smtClean="0">
                 <a:latin typeface="+mj-lt"/>
               </a:rPr>
-              <a:t> Fazemos parte da MIT, criada para revolucionar e trazer uma novas maneira de lidar com o lixo.</a:t>
+              <a:t> Fazemos parte da MIT, criada para revolucionar e </a:t>
+            </a:r>
+            <a:r>
+              <a:rPr lang="pt-BR" sz="2400" dirty="0" smtClean="0">
+                <a:latin typeface="+mj-lt"/>
+              </a:rPr>
+              <a:t>trazer </a:t>
+            </a:r>
+            <a:r>
+              <a:rPr lang="pt-BR" sz="2400" dirty="0" smtClean="0">
+                <a:latin typeface="+mj-lt"/>
+              </a:rPr>
+              <a:t>novas maneira de lidar com o lixo.</a:t>
             </a:r>
             <a:endParaRPr lang="pt-BR" sz="2400" dirty="0">
               <a:latin typeface="+mj-lt"/>
@@ -14219,7 +14516,19 @@
               <a:rPr lang="pt-BR" sz="2400" dirty="0" smtClean="0">
                 <a:latin typeface="+mj-lt"/>
               </a:rPr>
-              <a:t>Ser líder nacional do segmento, revolucionando a forma de coletar resíduos, levando eficiência na logística da coleta.</a:t>
+              <a:t>Ser líder nacional do segmento, revolucionando a forma de coletar resíduos, levando eficiência </a:t>
+            </a:r>
+            <a:r>
+              <a:rPr lang="pt-BR" sz="2400" dirty="0" smtClean="0">
+                <a:latin typeface="+mj-lt"/>
+              </a:rPr>
+              <a:t>para </a:t>
+            </a:r>
+            <a:r>
+              <a:rPr lang="pt-BR" sz="2400" dirty="0" smtClean="0">
+                <a:latin typeface="+mj-lt"/>
+              </a:rPr>
+              <a:t>logística da coleta.</a:t>
             </a:r>
             <a:endParaRPr lang="pt-BR" sz="2400" dirty="0">
               <a:latin typeface="+mj-lt"/>
@@ -14973,7 +15282,7 @@
         </p:nvSpPr>
         <p:spPr>
           <a:xfrm>
-            <a:off x="0" y="2766849"/>
+            <a:off x="1" y="3184860"/>
             <a:ext cx="2325189" cy="691598"/>
           </a:xfrm>
           <a:prstGeom prst="homePlate">
@@ -15028,7 +15337,7 @@
         </p:nvSpPr>
         <p:spPr>
           <a:xfrm>
-            <a:off x="410634" y="4215118"/>
+            <a:off x="306132" y="4388529"/>
             <a:ext cx="8596668" cy="704850"/>
           </a:xfrm>
           <a:prstGeom prst="rect">
@@ -15118,7 +15427,23 @@
                   <a:schemeClr val="tx1"/>
                 </a:solidFill>
               </a:rPr>
-              <a:t>Grandes geradores de resíduo </a:t>
+              <a:t>Coletores de g</a:t>
+            </a:r>
+            <a:r>
+              <a:rPr lang="pt-BR" dirty="0" smtClean="0">
+                <a:solidFill>
+                  <a:schemeClr val="tx1"/>
+                </a:solidFill>
+              </a:rPr>
+              <a:t>randes </a:t>
+            </a:r>
+            <a:r>
+              <a:rPr lang="pt-BR" dirty="0" smtClean="0">
+                <a:solidFill>
+                  <a:schemeClr val="tx1"/>
+                </a:solidFill>
+              </a:rPr>
+              <a:t>geradores de resíduo </a:t>
             </a:r>
             <a:endParaRPr lang="pt-BR" dirty="0">
               <a:solidFill>

</xml_diff>

<commit_message>
lixeira de plastico inclusa
</commit_message>
<xml_diff>
--- a/apresentação/MIT PPT (Projeto 2.0).pptx
+++ b/apresentação/MIT PPT (Projeto 2.0).pptx
@@ -3463,7 +3463,7 @@
           <a:p>
             <a:fld id="{4132B5A0-3D7C-4A8B-9857-D57DB7BEA661}" type="datetimeFigureOut">
               <a:rPr lang="pt-BR" smtClean="0"/>
-              <a:t>18/04/2020</a:t>
+              <a:t>23/04/2020</a:t>
             </a:fld>
             <a:endParaRPr lang="pt-BR"/>
           </a:p>
@@ -4452,7 +4452,7 @@
           <a:p>
             <a:fld id="{51C1A2F9-5E2E-41AF-8CA8-6F6A8CA531AC}" type="datetimeFigureOut">
               <a:rPr lang="pt-BR" smtClean="0"/>
-              <a:t>18/04/2020</a:t>
+              <a:t>23/04/2020</a:t>
             </a:fld>
             <a:endParaRPr lang="pt-BR"/>
           </a:p>
@@ -4703,7 +4703,7 @@
           <a:p>
             <a:fld id="{51C1A2F9-5E2E-41AF-8CA8-6F6A8CA531AC}" type="datetimeFigureOut">
               <a:rPr lang="pt-BR" smtClean="0"/>
-              <a:t>18/04/2020</a:t>
+              <a:t>23/04/2020</a:t>
             </a:fld>
             <a:endParaRPr lang="pt-BR"/>
           </a:p>
@@ -5017,7 +5017,7 @@
           <a:p>
             <a:fld id="{51C1A2F9-5E2E-41AF-8CA8-6F6A8CA531AC}" type="datetimeFigureOut">
               <a:rPr lang="pt-BR" smtClean="0"/>
-              <a:t>18/04/2020</a:t>
+              <a:t>23/04/2020</a:t>
             </a:fld>
             <a:endParaRPr lang="pt-BR"/>
           </a:p>
@@ -5358,7 +5358,7 @@
           <a:p>
             <a:fld id="{51C1A2F9-5E2E-41AF-8CA8-6F6A8CA531AC}" type="datetimeFigureOut">
               <a:rPr lang="pt-BR" smtClean="0"/>
-              <a:t>18/04/2020</a:t>
+              <a:t>23/04/2020</a:t>
             </a:fld>
             <a:endParaRPr lang="pt-BR"/>
           </a:p>
@@ -5672,7 +5672,7 @@
           <a:p>
             <a:fld id="{51C1A2F9-5E2E-41AF-8CA8-6F6A8CA531AC}" type="datetimeFigureOut">
               <a:rPr lang="pt-BR" smtClean="0"/>
-              <a:t>18/04/2020</a:t>
+              <a:t>23/04/2020</a:t>
             </a:fld>
             <a:endParaRPr lang="pt-BR"/>
           </a:p>
@@ -6065,7 +6065,7 @@
           <a:p>
             <a:fld id="{51C1A2F9-5E2E-41AF-8CA8-6F6A8CA531AC}" type="datetimeFigureOut">
               <a:rPr lang="pt-BR" smtClean="0"/>
-              <a:t>18/04/2020</a:t>
+              <a:t>23/04/2020</a:t>
             </a:fld>
             <a:endParaRPr lang="pt-BR"/>
           </a:p>
@@ -6235,7 +6235,7 @@
           <a:p>
             <a:fld id="{51C1A2F9-5E2E-41AF-8CA8-6F6A8CA531AC}" type="datetimeFigureOut">
               <a:rPr lang="pt-BR" smtClean="0"/>
-              <a:t>18/04/2020</a:t>
+              <a:t>23/04/2020</a:t>
             </a:fld>
             <a:endParaRPr lang="pt-BR"/>
           </a:p>
@@ -6415,7 +6415,7 @@
           <a:p>
             <a:fld id="{51C1A2F9-5E2E-41AF-8CA8-6F6A8CA531AC}" type="datetimeFigureOut">
               <a:rPr lang="pt-BR" smtClean="0"/>
-              <a:t>18/04/2020</a:t>
+              <a:t>23/04/2020</a:t>
             </a:fld>
             <a:endParaRPr lang="pt-BR"/>
           </a:p>
@@ -6574,7 +6574,7 @@
           <a:p>
             <a:fld id="{51C1A2F9-5E2E-41AF-8CA8-6F6A8CA531AC}" type="datetimeFigureOut">
               <a:rPr lang="pt-BR" smtClean="0"/>
-              <a:t>18/04/2020</a:t>
+              <a:t>23/04/2020</a:t>
             </a:fld>
             <a:endParaRPr lang="pt-BR"/>
           </a:p>
@@ -6731,7 +6731,7 @@
           <a:p>
             <a:fld id="{51C1A2F9-5E2E-41AF-8CA8-6F6A8CA531AC}" type="datetimeFigureOut">
               <a:rPr lang="pt-BR" smtClean="0"/>
-              <a:t>18/04/2020</a:t>
+              <a:t>23/04/2020</a:t>
             </a:fld>
             <a:endParaRPr lang="pt-BR"/>
           </a:p>
@@ -6872,7 +6872,7 @@
           <a:p>
             <a:fld id="{51C1A2F9-5E2E-41AF-8CA8-6F6A8CA531AC}" type="datetimeFigureOut">
               <a:rPr lang="pt-BR" smtClean="0"/>
-              <a:t>18/04/2020</a:t>
+              <a:t>23/04/2020</a:t>
             </a:fld>
             <a:endParaRPr lang="pt-BR"/>
           </a:p>
@@ -7060,7 +7060,7 @@
           <a:p>
             <a:fld id="{51C1A2F9-5E2E-41AF-8CA8-6F6A8CA531AC}" type="datetimeFigureOut">
               <a:rPr lang="pt-BR" smtClean="0"/>
-              <a:t>18/04/2020</a:t>
+              <a:t>23/04/2020</a:t>
             </a:fld>
             <a:endParaRPr lang="pt-BR"/>
           </a:p>
@@ -7189,7 +7189,7 @@
           <a:p>
             <a:fld id="{51C1A2F9-5E2E-41AF-8CA8-6F6A8CA531AC}" type="datetimeFigureOut">
               <a:rPr lang="pt-BR" smtClean="0"/>
-              <a:t>18/04/2020</a:t>
+              <a:t>23/04/2020</a:t>
             </a:fld>
             <a:endParaRPr lang="pt-BR"/>
           </a:p>
@@ -7448,7 +7448,7 @@
           <a:p>
             <a:fld id="{51C1A2F9-5E2E-41AF-8CA8-6F6A8CA531AC}" type="datetimeFigureOut">
               <a:rPr lang="pt-BR" smtClean="0"/>
-              <a:t>18/04/2020</a:t>
+              <a:t>23/04/2020</a:t>
             </a:fld>
             <a:endParaRPr lang="pt-BR"/>
           </a:p>
@@ -7680,7 +7680,7 @@
           <a:p>
             <a:fld id="{51C1A2F9-5E2E-41AF-8CA8-6F6A8CA531AC}" type="datetimeFigureOut">
               <a:rPr lang="pt-BR" smtClean="0"/>
-              <a:t>18/04/2020</a:t>
+              <a:t>23/04/2020</a:t>
             </a:fld>
             <a:endParaRPr lang="pt-BR"/>
           </a:p>
@@ -8054,7 +8054,7 @@
           <a:p>
             <a:fld id="{51C1A2F9-5E2E-41AF-8CA8-6F6A8CA531AC}" type="datetimeFigureOut">
               <a:rPr lang="pt-BR" smtClean="0"/>
-              <a:t>18/04/2020</a:t>
+              <a:t>23/04/2020</a:t>
             </a:fld>
             <a:endParaRPr lang="pt-BR"/>
           </a:p>
@@ -8177,7 +8177,7 @@
           <a:p>
             <a:fld id="{51C1A2F9-5E2E-41AF-8CA8-6F6A8CA531AC}" type="datetimeFigureOut">
               <a:rPr lang="pt-BR" smtClean="0"/>
-              <a:t>18/04/2020</a:t>
+              <a:t>23/04/2020</a:t>
             </a:fld>
             <a:endParaRPr lang="pt-BR"/>
           </a:p>
@@ -8272,7 +8272,7 @@
           <a:p>
             <a:fld id="{51C1A2F9-5E2E-41AF-8CA8-6F6A8CA531AC}" type="datetimeFigureOut">
               <a:rPr lang="pt-BR" smtClean="0"/>
-              <a:t>18/04/2020</a:t>
+              <a:t>23/04/2020</a:t>
             </a:fld>
             <a:endParaRPr lang="pt-BR"/>
           </a:p>
@@ -8527,7 +8527,7 @@
           <a:p>
             <a:fld id="{51C1A2F9-5E2E-41AF-8CA8-6F6A8CA531AC}" type="datetimeFigureOut">
               <a:rPr lang="pt-BR" smtClean="0"/>
-              <a:t>18/04/2020</a:t>
+              <a:t>23/04/2020</a:t>
             </a:fld>
             <a:endParaRPr lang="pt-BR"/>
           </a:p>
@@ -8790,7 +8790,7 @@
           <a:p>
             <a:fld id="{51C1A2F9-5E2E-41AF-8CA8-6F6A8CA531AC}" type="datetimeFigureOut">
               <a:rPr lang="pt-BR" smtClean="0"/>
-              <a:t>18/04/2020</a:t>
+              <a:t>23/04/2020</a:t>
             </a:fld>
             <a:endParaRPr lang="pt-BR"/>
           </a:p>
@@ -9533,7 +9533,7 @@
           <a:p>
             <a:fld id="{51C1A2F9-5E2E-41AF-8CA8-6F6A8CA531AC}" type="datetimeFigureOut">
               <a:rPr lang="pt-BR" smtClean="0"/>
-              <a:t>18/04/2020</a:t>
+              <a:t>23/04/2020</a:t>
             </a:fld>
             <a:endParaRPr lang="pt-BR"/>
           </a:p>
@@ -13011,13 +13011,7 @@
               <a:rPr lang="pt-BR" sz="4400" dirty="0" smtClean="0">
                 <a:latin typeface="+mj-lt"/>
               </a:rPr>
-              <a:t>ite </a:t>
-            </a:r>
-            <a:r>
-              <a:rPr lang="pt-BR" sz="4400" dirty="0" smtClean="0">
-                <a:latin typeface="+mj-lt"/>
-              </a:rPr>
-              <a:t>institucional</a:t>
+              <a:t>ite institucional</a:t>
             </a:r>
             <a:endParaRPr lang="pt-BR" sz="4400" dirty="0">
               <a:latin typeface="+mj-lt"/>
@@ -13781,19 +13775,7 @@
               <a:rPr lang="pt-BR" sz="2400" dirty="0" smtClean="0">
                 <a:latin typeface="+mj-lt"/>
               </a:rPr>
-              <a:t> Fazemos parte da MIT, criada para revolucionar e </a:t>
-            </a:r>
-            <a:r>
-              <a:rPr lang="pt-BR" sz="2400" dirty="0" smtClean="0">
-                <a:latin typeface="+mj-lt"/>
-              </a:rPr>
-              <a:t>trazer </a:t>
-            </a:r>
-            <a:r>
-              <a:rPr lang="pt-BR" sz="2400" dirty="0" smtClean="0">
-                <a:latin typeface="+mj-lt"/>
-              </a:rPr>
-              <a:t>novas maneira de lidar com o lixo.</a:t>
+              <a:t> Fazemos parte da MIT, criada para revolucionar e trazer novas maneira de lidar com o lixo.</a:t>
             </a:r>
             <a:endParaRPr lang="pt-BR" sz="2400" dirty="0">
               <a:latin typeface="+mj-lt"/>
@@ -14516,19 +14498,7 @@
               <a:rPr lang="pt-BR" sz="2400" dirty="0" smtClean="0">
                 <a:latin typeface="+mj-lt"/>
               </a:rPr>
-              <a:t>Ser líder nacional do segmento, revolucionando a forma de coletar resíduos, levando eficiência </a:t>
-            </a:r>
-            <a:r>
-              <a:rPr lang="pt-BR" sz="2400" dirty="0" smtClean="0">
-                <a:latin typeface="+mj-lt"/>
-              </a:rPr>
-              <a:t>para </a:t>
-            </a:r>
-            <a:r>
-              <a:rPr lang="pt-BR" sz="2400" dirty="0" smtClean="0">
-                <a:latin typeface="+mj-lt"/>
-              </a:rPr>
-              <a:t>logística da coleta.</a:t>
+              <a:t>Ser líder nacional do segmento, revolucionando a forma de coletar resíduos, levando eficiência para logística da coleta.</a:t>
             </a:r>
             <a:endParaRPr lang="pt-BR" sz="2400" dirty="0">
               <a:latin typeface="+mj-lt"/>
@@ -15427,23 +15397,7 @@
                   <a:schemeClr val="tx1"/>
                 </a:solidFill>
               </a:rPr>
-              <a:t>Coletores de g</a:t>
-            </a:r>
-            <a:r>
-              <a:rPr lang="pt-BR" dirty="0" smtClean="0">
-                <a:solidFill>
-                  <a:schemeClr val="tx1"/>
-                </a:solidFill>
-              </a:rPr>
-              <a:t>randes </a:t>
-            </a:r>
-            <a:r>
-              <a:rPr lang="pt-BR" dirty="0" smtClean="0">
-                <a:solidFill>
-                  <a:schemeClr val="tx1"/>
-                </a:solidFill>
-              </a:rPr>
-              <a:t>geradores de resíduo </a:t>
+              <a:t>Coletores de grandes geradores de resíduo </a:t>
             </a:r>
             <a:endParaRPr lang="pt-BR" dirty="0">
               <a:solidFill>
@@ -16189,6 +16143,36 @@
           </a:prstGeom>
         </p:spPr>
       </p:pic>
+      <p:pic>
+        <p:nvPicPr>
+          <p:cNvPr id="7" name="Imagem 6"/>
+          <p:cNvPicPr>
+            <a:picLocks noChangeAspect="1"/>
+          </p:cNvPicPr>
+          <p:nvPr/>
+        </p:nvPicPr>
+        <p:blipFill>
+          <a:blip r:embed="rId6" cstate="print">
+            <a:extLst>
+              <a:ext uri="{28A0092B-C50C-407E-A947-70E740481C1C}">
+                <a14:useLocalDpi xmlns:a14="http://schemas.microsoft.com/office/drawing/2010/main" val="0"/>
+              </a:ext>
+            </a:extLst>
+          </a:blip>
+          <a:stretch>
+            <a:fillRect/>
+          </a:stretch>
+        </p:blipFill>
+        <p:spPr>
+          <a:xfrm>
+            <a:off x="6111086" y="3827417"/>
+            <a:ext cx="1021511" cy="1276889"/>
+          </a:xfrm>
+          <a:prstGeom prst="rect">
+            <a:avLst/>
+          </a:prstGeom>
+        </p:spPr>
+      </p:pic>
     </p:spTree>
     <p:extLst>
       <p:ext uri="{BB962C8B-B14F-4D97-AF65-F5344CB8AC3E}">
@@ -16240,7 +16224,7 @@
         </p:nvSpPr>
         <p:spPr>
           <a:xfrm>
-            <a:off x="0" y="94451"/>
+            <a:off x="0" y="68419"/>
             <a:ext cx="5237017" cy="767798"/>
           </a:xfrm>
           <a:prstGeom prst="homePlate">
@@ -16570,7 +16554,7 @@
         </p:blipFill>
         <p:spPr>
           <a:xfrm rot="13357651">
-            <a:off x="580357" y="1441189"/>
+            <a:off x="262219" y="1206902"/>
             <a:ext cx="390525" cy="495300"/>
           </a:xfrm>
           <a:prstGeom prst="rect">
@@ -16872,7 +16856,7 @@
         </p:blipFill>
         <p:spPr>
           <a:xfrm>
-            <a:off x="958286" y="896150"/>
+            <a:off x="667637" y="862658"/>
             <a:ext cx="813440" cy="1228136"/>
           </a:xfrm>
           <a:prstGeom prst="rect">
@@ -16930,7 +16914,7 @@
         </p:blipFill>
         <p:spPr>
           <a:xfrm>
-            <a:off x="1956418" y="1010135"/>
+            <a:off x="1515601" y="1231545"/>
             <a:ext cx="897656" cy="1376182"/>
           </a:xfrm>
           <a:prstGeom prst="rect">
@@ -16988,7 +16972,7 @@
         </p:blipFill>
         <p:spPr>
           <a:xfrm>
-            <a:off x="3041782" y="1273547"/>
+            <a:off x="2409525" y="862704"/>
             <a:ext cx="938898" cy="1386832"/>
           </a:xfrm>
           <a:prstGeom prst="rect">
@@ -17046,7 +17030,7 @@
         </p:blipFill>
         <p:spPr>
           <a:xfrm>
-            <a:off x="4207775" y="1440253"/>
+            <a:off x="3365894" y="1283777"/>
             <a:ext cx="939124" cy="1445617"/>
           </a:xfrm>
           <a:prstGeom prst="rect">
@@ -17077,6 +17061,64 @@
           <a:xfrm>
             <a:off x="2364272" y="4682639"/>
             <a:ext cx="381744" cy="587627"/>
+          </a:xfrm>
+          <a:prstGeom prst="rect">
+            <a:avLst/>
+          </a:prstGeom>
+        </p:spPr>
+      </p:pic>
+      <p:pic>
+        <p:nvPicPr>
+          <p:cNvPr id="39" name="Imagem 38"/>
+          <p:cNvPicPr>
+            <a:picLocks noChangeAspect="1"/>
+          </p:cNvPicPr>
+          <p:nvPr/>
+        </p:nvPicPr>
+        <p:blipFill rotWithShape="1">
+          <a:blip r:embed="rId20" cstate="print">
+            <a:extLst>
+              <a:ext uri="{28A0092B-C50C-407E-A947-70E740481C1C}">
+                <a14:useLocalDpi xmlns:a14="http://schemas.microsoft.com/office/drawing/2010/main" val="0"/>
+              </a:ext>
+            </a:extLst>
+          </a:blip>
+          <a:srcRect l="14451" t="6077" r="12663" b="2535"/>
+          <a:stretch/>
+        </p:blipFill>
+        <p:spPr>
+          <a:xfrm>
+            <a:off x="4310292" y="913626"/>
+            <a:ext cx="969048" cy="1518797"/>
+          </a:xfrm>
+          <a:prstGeom prst="rect">
+            <a:avLst/>
+          </a:prstGeom>
+        </p:spPr>
+      </p:pic>
+      <p:pic>
+        <p:nvPicPr>
+          <p:cNvPr id="40" name="Imagem 39"/>
+          <p:cNvPicPr>
+            <a:picLocks noChangeAspect="1"/>
+          </p:cNvPicPr>
+          <p:nvPr/>
+        </p:nvPicPr>
+        <p:blipFill rotWithShape="1">
+          <a:blip r:embed="rId20" cstate="print">
+            <a:extLst>
+              <a:ext uri="{28A0092B-C50C-407E-A947-70E740481C1C}">
+                <a14:useLocalDpi xmlns:a14="http://schemas.microsoft.com/office/drawing/2010/main" val="0"/>
+              </a:ext>
+            </a:extLst>
+          </a:blip>
+          <a:srcRect l="14451" t="6077" r="12663" b="2535"/>
+          <a:stretch/>
+        </p:blipFill>
+        <p:spPr>
+          <a:xfrm>
+            <a:off x="3900423" y="4093676"/>
+            <a:ext cx="394935" cy="618985"/>
           </a:xfrm>
           <a:prstGeom prst="rect">
             <a:avLst/>

</xml_diff>

<commit_message>
pequena alteração no slide de requisitos
</commit_message>
<xml_diff>
--- a/apresentação/MIT PPT (Projeto 2.0).pptx
+++ b/apresentação/MIT PPT (Projeto 2.0).pptx
@@ -282,7 +282,7 @@
           <a:p>
             <a:fld id="{4132B5A0-3D7C-4A8B-9857-D57DB7BEA661}" type="datetimeFigureOut">
               <a:rPr lang="pt-BR" smtClean="0"/>
-              <a:t>26/04/2020</a:t>
+              <a:t>27/04/2020</a:t>
             </a:fld>
             <a:endParaRPr lang="pt-BR"/>
           </a:p>
@@ -1271,7 +1271,7 @@
           <a:p>
             <a:fld id="{51C1A2F9-5E2E-41AF-8CA8-6F6A8CA531AC}" type="datetimeFigureOut">
               <a:rPr lang="pt-BR" smtClean="0"/>
-              <a:t>26/04/2020</a:t>
+              <a:t>27/04/2020</a:t>
             </a:fld>
             <a:endParaRPr lang="pt-BR"/>
           </a:p>
@@ -1522,7 +1522,7 @@
           <a:p>
             <a:fld id="{51C1A2F9-5E2E-41AF-8CA8-6F6A8CA531AC}" type="datetimeFigureOut">
               <a:rPr lang="pt-BR" smtClean="0"/>
-              <a:t>26/04/2020</a:t>
+              <a:t>27/04/2020</a:t>
             </a:fld>
             <a:endParaRPr lang="pt-BR"/>
           </a:p>
@@ -1836,7 +1836,7 @@
           <a:p>
             <a:fld id="{51C1A2F9-5E2E-41AF-8CA8-6F6A8CA531AC}" type="datetimeFigureOut">
               <a:rPr lang="pt-BR" smtClean="0"/>
-              <a:t>26/04/2020</a:t>
+              <a:t>27/04/2020</a:t>
             </a:fld>
             <a:endParaRPr lang="pt-BR"/>
           </a:p>
@@ -2177,7 +2177,7 @@
           <a:p>
             <a:fld id="{51C1A2F9-5E2E-41AF-8CA8-6F6A8CA531AC}" type="datetimeFigureOut">
               <a:rPr lang="pt-BR" smtClean="0"/>
-              <a:t>26/04/2020</a:t>
+              <a:t>27/04/2020</a:t>
             </a:fld>
             <a:endParaRPr lang="pt-BR"/>
           </a:p>
@@ -2491,7 +2491,7 @@
           <a:p>
             <a:fld id="{51C1A2F9-5E2E-41AF-8CA8-6F6A8CA531AC}" type="datetimeFigureOut">
               <a:rPr lang="pt-BR" smtClean="0"/>
-              <a:t>26/04/2020</a:t>
+              <a:t>27/04/2020</a:t>
             </a:fld>
             <a:endParaRPr lang="pt-BR"/>
           </a:p>
@@ -2884,7 +2884,7 @@
           <a:p>
             <a:fld id="{51C1A2F9-5E2E-41AF-8CA8-6F6A8CA531AC}" type="datetimeFigureOut">
               <a:rPr lang="pt-BR" smtClean="0"/>
-              <a:t>26/04/2020</a:t>
+              <a:t>27/04/2020</a:t>
             </a:fld>
             <a:endParaRPr lang="pt-BR"/>
           </a:p>
@@ -3054,7 +3054,7 @@
           <a:p>
             <a:fld id="{51C1A2F9-5E2E-41AF-8CA8-6F6A8CA531AC}" type="datetimeFigureOut">
               <a:rPr lang="pt-BR" smtClean="0"/>
-              <a:t>26/04/2020</a:t>
+              <a:t>27/04/2020</a:t>
             </a:fld>
             <a:endParaRPr lang="pt-BR"/>
           </a:p>
@@ -3234,7 +3234,7 @@
           <a:p>
             <a:fld id="{51C1A2F9-5E2E-41AF-8CA8-6F6A8CA531AC}" type="datetimeFigureOut">
               <a:rPr lang="pt-BR" smtClean="0"/>
-              <a:t>26/04/2020</a:t>
+              <a:t>27/04/2020</a:t>
             </a:fld>
             <a:endParaRPr lang="pt-BR"/>
           </a:p>
@@ -3393,7 +3393,7 @@
           <a:p>
             <a:fld id="{51C1A2F9-5E2E-41AF-8CA8-6F6A8CA531AC}" type="datetimeFigureOut">
               <a:rPr lang="pt-BR" smtClean="0"/>
-              <a:t>26/04/2020</a:t>
+              <a:t>27/04/2020</a:t>
             </a:fld>
             <a:endParaRPr lang="pt-BR"/>
           </a:p>
@@ -3550,7 +3550,7 @@
           <a:p>
             <a:fld id="{51C1A2F9-5E2E-41AF-8CA8-6F6A8CA531AC}" type="datetimeFigureOut">
               <a:rPr lang="pt-BR" smtClean="0"/>
-              <a:t>26/04/2020</a:t>
+              <a:t>27/04/2020</a:t>
             </a:fld>
             <a:endParaRPr lang="pt-BR"/>
           </a:p>
@@ -3691,7 +3691,7 @@
           <a:p>
             <a:fld id="{51C1A2F9-5E2E-41AF-8CA8-6F6A8CA531AC}" type="datetimeFigureOut">
               <a:rPr lang="pt-BR" smtClean="0"/>
-              <a:t>26/04/2020</a:t>
+              <a:t>27/04/2020</a:t>
             </a:fld>
             <a:endParaRPr lang="pt-BR"/>
           </a:p>
@@ -3879,7 +3879,7 @@
           <a:p>
             <a:fld id="{51C1A2F9-5E2E-41AF-8CA8-6F6A8CA531AC}" type="datetimeFigureOut">
               <a:rPr lang="pt-BR" smtClean="0"/>
-              <a:t>26/04/2020</a:t>
+              <a:t>27/04/2020</a:t>
             </a:fld>
             <a:endParaRPr lang="pt-BR"/>
           </a:p>
@@ -4008,7 +4008,7 @@
           <a:p>
             <a:fld id="{51C1A2F9-5E2E-41AF-8CA8-6F6A8CA531AC}" type="datetimeFigureOut">
               <a:rPr lang="pt-BR" smtClean="0"/>
-              <a:t>26/04/2020</a:t>
+              <a:t>27/04/2020</a:t>
             </a:fld>
             <a:endParaRPr lang="pt-BR"/>
           </a:p>
@@ -4267,7 +4267,7 @@
           <a:p>
             <a:fld id="{51C1A2F9-5E2E-41AF-8CA8-6F6A8CA531AC}" type="datetimeFigureOut">
               <a:rPr lang="pt-BR" smtClean="0"/>
-              <a:t>26/04/2020</a:t>
+              <a:t>27/04/2020</a:t>
             </a:fld>
             <a:endParaRPr lang="pt-BR"/>
           </a:p>
@@ -4499,7 +4499,7 @@
           <a:p>
             <a:fld id="{51C1A2F9-5E2E-41AF-8CA8-6F6A8CA531AC}" type="datetimeFigureOut">
               <a:rPr lang="pt-BR" smtClean="0"/>
-              <a:t>26/04/2020</a:t>
+              <a:t>27/04/2020</a:t>
             </a:fld>
             <a:endParaRPr lang="pt-BR"/>
           </a:p>
@@ -4873,7 +4873,7 @@
           <a:p>
             <a:fld id="{51C1A2F9-5E2E-41AF-8CA8-6F6A8CA531AC}" type="datetimeFigureOut">
               <a:rPr lang="pt-BR" smtClean="0"/>
-              <a:t>26/04/2020</a:t>
+              <a:t>27/04/2020</a:t>
             </a:fld>
             <a:endParaRPr lang="pt-BR"/>
           </a:p>
@@ -4996,7 +4996,7 @@
           <a:p>
             <a:fld id="{51C1A2F9-5E2E-41AF-8CA8-6F6A8CA531AC}" type="datetimeFigureOut">
               <a:rPr lang="pt-BR" smtClean="0"/>
-              <a:t>26/04/2020</a:t>
+              <a:t>27/04/2020</a:t>
             </a:fld>
             <a:endParaRPr lang="pt-BR"/>
           </a:p>
@@ -5091,7 +5091,7 @@
           <a:p>
             <a:fld id="{51C1A2F9-5E2E-41AF-8CA8-6F6A8CA531AC}" type="datetimeFigureOut">
               <a:rPr lang="pt-BR" smtClean="0"/>
-              <a:t>26/04/2020</a:t>
+              <a:t>27/04/2020</a:t>
             </a:fld>
             <a:endParaRPr lang="pt-BR"/>
           </a:p>
@@ -5346,7 +5346,7 @@
           <a:p>
             <a:fld id="{51C1A2F9-5E2E-41AF-8CA8-6F6A8CA531AC}" type="datetimeFigureOut">
               <a:rPr lang="pt-BR" smtClean="0"/>
-              <a:t>26/04/2020</a:t>
+              <a:t>27/04/2020</a:t>
             </a:fld>
             <a:endParaRPr lang="pt-BR"/>
           </a:p>
@@ -5609,7 +5609,7 @@
           <a:p>
             <a:fld id="{51C1A2F9-5E2E-41AF-8CA8-6F6A8CA531AC}" type="datetimeFigureOut">
               <a:rPr lang="pt-BR" smtClean="0"/>
-              <a:t>26/04/2020</a:t>
+              <a:t>27/04/2020</a:t>
             </a:fld>
             <a:endParaRPr lang="pt-BR"/>
           </a:p>
@@ -6352,7 +6352,7 @@
           <a:p>
             <a:fld id="{51C1A2F9-5E2E-41AF-8CA8-6F6A8CA531AC}" type="datetimeFigureOut">
               <a:rPr lang="pt-BR" smtClean="0"/>
-              <a:t>26/04/2020</a:t>
+              <a:t>27/04/2020</a:t>
             </a:fld>
             <a:endParaRPr lang="pt-BR"/>
           </a:p>
@@ -9213,10 +9213,8 @@
           </a:p>
           <a:p>
             <a:r>
-              <a:rPr lang="pt-BR" altLang="pt-BR" sz="2800" dirty="0" smtClean="0">
-                <a:latin typeface="+mj-lt"/>
-              </a:rPr>
-              <a:t>Banco de dados</a:t>
+              <a:rPr lang="pt-BR" altLang="pt-BR" sz="2800" dirty="0"/>
+              <a:t>Website</a:t>
             </a:r>
           </a:p>
           <a:p>
@@ -9224,14 +9222,10 @@
               <a:buNone/>
             </a:pPr>
             <a:r>
-              <a:rPr lang="pt-BR" altLang="pt-BR" sz="2200" dirty="0" smtClean="0">
-                <a:latin typeface="+mj-lt"/>
-              </a:rPr>
-              <a:t>Através dos dados gerados por nossos sensores informações irão auxiliar em tomadas de decisões.</a:t>
-            </a:r>
-            <a:endParaRPr lang="pt-BR" altLang="pt-BR" sz="2200" dirty="0">
-              <a:latin typeface="+mj-lt"/>
-            </a:endParaRPr>
+              <a:rPr lang="pt-BR" altLang="pt-BR" sz="2200" dirty="0"/>
+              <a:t>Empresas parceiras poderão ver seus indicadores de geração de resíduos  dentre outras funcionalidades</a:t>
+            </a:r>
+            <a:endParaRPr lang="pt-BR" altLang="pt-BR" sz="2200" dirty="0"/>
           </a:p>
         </p:txBody>
       </p:sp>
@@ -9499,24 +9493,29 @@
               <a:rPr lang="pt-BR" altLang="pt-BR" sz="2400" dirty="0" smtClean="0">
                 <a:latin typeface="+mj-lt"/>
               </a:rPr>
-              <a:t>Coletarão dados em tempo real.</a:t>
+              <a:t>Coletarão dados em tempo </a:t>
+            </a:r>
+            <a:r>
+              <a:rPr lang="pt-BR" altLang="pt-BR" sz="2400" dirty="0" smtClean="0">
+                <a:latin typeface="+mj-lt"/>
+              </a:rPr>
+              <a:t>real.</a:t>
             </a:r>
             <a:endParaRPr lang="pt-BR" altLang="pt-BR" sz="1800" dirty="0" smtClean="0">
               <a:latin typeface="+mj-lt"/>
             </a:endParaRPr>
           </a:p>
           <a:p>
-            <a:pPr lvl="1"/>
-            <a:endParaRPr lang="pt-BR" altLang="pt-BR" sz="1800" dirty="0" smtClean="0">
-              <a:latin typeface="+mj-lt"/>
-            </a:endParaRPr>
-          </a:p>
-          <a:p>
-            <a:r>
-              <a:rPr lang="pt-BR" altLang="pt-BR" sz="2800" dirty="0" smtClean="0">
-                <a:latin typeface="+mj-lt"/>
-              </a:rPr>
-              <a:t>Website</a:t>
+            <a:endParaRPr lang="pt-BR" altLang="pt-BR" sz="2800" dirty="0" smtClean="0"/>
+          </a:p>
+          <a:p>
+            <a:r>
+              <a:rPr lang="pt-BR" altLang="pt-BR" sz="2800" dirty="0" smtClean="0"/>
+              <a:t>Banco </a:t>
+            </a:r>
+            <a:r>
+              <a:rPr lang="pt-BR" altLang="pt-BR" sz="2800" dirty="0"/>
+              <a:t>de dados</a:t>
             </a:r>
           </a:p>
           <a:p>
@@ -9524,12 +9523,13 @@
               <a:buNone/>
             </a:pPr>
             <a:r>
-              <a:rPr lang="pt-BR" altLang="pt-BR" sz="2200" dirty="0" smtClean="0">
-                <a:latin typeface="+mj-lt"/>
-              </a:rPr>
-              <a:t>Empresas parceiras poderão ver seus indicadores de geração de resíduos  dentre outras funcionalidades</a:t>
-            </a:r>
-            <a:endParaRPr lang="pt-BR" altLang="pt-BR" sz="2200" dirty="0">
+              <a:rPr lang="pt-BR" altLang="pt-BR" sz="2200" dirty="0" smtClean="0"/>
+              <a:t>Através dos dados gerados por nossos sensores informações irão auxiliar em tomadas de decisões.</a:t>
+            </a:r>
+          </a:p>
+          <a:p>
+            <a:pPr lvl="1"/>
+            <a:endParaRPr lang="pt-BR" altLang="pt-BR" sz="1800" dirty="0" smtClean="0">
               <a:latin typeface="+mj-lt"/>
             </a:endParaRPr>
           </a:p>
@@ -9779,13 +9779,7 @@
               <a:rPr lang="pt-BR" sz="4400" dirty="0" smtClean="0">
                 <a:latin typeface="+mj-lt"/>
               </a:rPr>
-              <a:t> Modelagem </a:t>
-            </a:r>
-            <a:r>
-              <a:rPr lang="pt-BR" sz="4400" dirty="0" smtClean="0">
-                <a:latin typeface="+mj-lt"/>
-              </a:rPr>
-              <a:t>- AZURE</a:t>
+              <a:t> Modelagem - AZURE</a:t>
             </a:r>
             <a:endParaRPr lang="pt-BR" sz="4400" dirty="0">
               <a:latin typeface="+mj-lt"/>
@@ -9893,13 +9887,7 @@
               <a:rPr lang="pt-BR" sz="4400" dirty="0" smtClean="0">
                 <a:latin typeface="+mj-lt"/>
               </a:rPr>
-              <a:t>ite </a:t>
-            </a:r>
-            <a:r>
-              <a:rPr lang="pt-BR" sz="4400" dirty="0" smtClean="0">
-                <a:latin typeface="+mj-lt"/>
-              </a:rPr>
-              <a:t>institucional </a:t>
+              <a:t>ite institucional </a:t>
             </a:r>
             <a:r>
               <a:rPr lang="pt-BR" sz="4400" dirty="0" smtClean="0">
@@ -10002,19 +9990,13 @@
               <a:rPr lang="pt-BR" sz="4400" dirty="0" smtClean="0">
                 <a:latin typeface="+mj-lt"/>
               </a:rPr>
-              <a:t> Ferramenta </a:t>
+              <a:t> Ferramenta de gestão do </a:t>
             </a:r>
             <a:r>
               <a:rPr lang="pt-BR" sz="4400" dirty="0" smtClean="0">
                 <a:latin typeface="+mj-lt"/>
               </a:rPr>
-              <a:t>de </a:t>
-            </a:r>
-            <a:r>
-              <a:rPr lang="pt-BR" sz="4400" dirty="0" smtClean="0">
-                <a:latin typeface="+mj-lt"/>
-              </a:rPr>
-              <a:t>gestão do projeto </a:t>
+              <a:t>projeto </a:t>
             </a:r>
             <a:endParaRPr lang="pt-BR" sz="4400" dirty="0">
               <a:latin typeface="+mj-lt"/>
@@ -10708,19 +10690,7 @@
               <a:rPr lang="pt-BR" altLang="pt-BR" sz="2800" dirty="0" smtClean="0">
                 <a:latin typeface="+mj-lt"/>
               </a:rPr>
-              <a:t>Graziela Batista De </a:t>
-            </a:r>
-            <a:r>
-              <a:rPr lang="pt-BR" altLang="pt-BR" sz="2800" dirty="0" smtClean="0">
-                <a:latin typeface="+mj-lt"/>
-              </a:rPr>
-              <a:t>Lucena </a:t>
-            </a:r>
-            <a:r>
-              <a:rPr lang="pt-BR" altLang="pt-BR" sz="2800" dirty="0" smtClean="0">
-                <a:latin typeface="+mj-lt"/>
-              </a:rPr>
-              <a:t>Lima</a:t>
+              <a:t>Graziela Batista De Lucena Lima</a:t>
             </a:r>
           </a:p>
           <a:p>

</xml_diff>

<commit_message>
Alteração no slide 2 organograma
</commit_message>
<xml_diff>
--- a/apresentação/MIT PPT (Projeto 2.0).pptx
+++ b/apresentação/MIT PPT (Projeto 2.0).pptx
@@ -9,7 +9,7 @@
   </p:notesMasterIdLst>
   <p:sldIdLst>
     <p:sldId id="257" r:id="rId2"/>
-    <p:sldId id="346" r:id="rId3"/>
+    <p:sldId id="292" r:id="rId3"/>
     <p:sldId id="260" r:id="rId4"/>
     <p:sldId id="348" r:id="rId5"/>
     <p:sldId id="347" r:id="rId6"/>
@@ -10208,14 +10208,6 @@
 <file path=ppt/slides/slide2.xml><?xml version="1.0" encoding="utf-8"?>
 <p:sld xmlns:a="http://schemas.openxmlformats.org/drawingml/2006/main" xmlns:r="http://schemas.openxmlformats.org/officeDocument/2006/relationships" xmlns:p="http://schemas.openxmlformats.org/presentationml/2006/main">
   <p:cSld>
-    <p:bg>
-      <p:bgPr>
-        <a:solidFill>
-          <a:schemeClr val="bg1"/>
-        </a:solidFill>
-        <a:effectLst/>
-      </p:bgPr>
-    </p:bg>
     <p:spTree>
       <p:nvGrpSpPr>
         <p:cNvPr id="1" name=""/>
@@ -10230,12 +10222,2297 @@
           <a:chExt cx="0" cy="0"/>
         </a:xfrm>
       </p:grpSpPr>
-      <p:sp>
-        <p:nvSpPr>
-          <p:cNvPr id="58" name="Seta: Pentágono 2">
+      <p:cxnSp>
+        <p:nvCxnSpPr>
+          <p:cNvPr id="3" name="Conector reto 2">
             <a:extLst>
               <a:ext uri="{FF2B5EF4-FFF2-40B4-BE49-F238E27FC236}">
-                <a16:creationId xmlns:a16="http://schemas.microsoft.com/office/drawing/2014/main" id="{305FC1E8-F2E8-42C2-B81F-097C0FA4A259}"/>
+                <a16:creationId xmlns:a16="http://schemas.microsoft.com/office/drawing/2014/main" id="{DD6C33C7-9B38-4411-89BB-D63ECB014968}"/>
+              </a:ext>
+            </a:extLst>
+          </p:cNvPr>
+          <p:cNvCxnSpPr>
+            <a:cxnSpLocks/>
+            <a:endCxn id="101" idx="0"/>
+          </p:cNvCxnSpPr>
+          <p:nvPr/>
+        </p:nvCxnSpPr>
+        <p:spPr>
+          <a:xfrm>
+            <a:off x="6479536" y="1927477"/>
+            <a:ext cx="0" cy="607894"/>
+          </a:xfrm>
+          <a:prstGeom prst="line">
+            <a:avLst/>
+          </a:prstGeom>
+          <a:ln>
+            <a:solidFill>
+              <a:srgbClr val="7F0E31"/>
+            </a:solidFill>
+          </a:ln>
+        </p:spPr>
+        <p:style>
+          <a:lnRef idx="1">
+            <a:schemeClr val="accent1"/>
+          </a:lnRef>
+          <a:fillRef idx="0">
+            <a:schemeClr val="accent1"/>
+          </a:fillRef>
+          <a:effectRef idx="0">
+            <a:schemeClr val="accent1"/>
+          </a:effectRef>
+          <a:fontRef idx="minor">
+            <a:schemeClr val="tx1"/>
+          </a:fontRef>
+        </p:style>
+      </p:cxnSp>
+      <p:cxnSp>
+        <p:nvCxnSpPr>
+          <p:cNvPr id="115" name="Conector reto 114">
+            <a:extLst>
+              <a:ext uri="{FF2B5EF4-FFF2-40B4-BE49-F238E27FC236}">
+                <a16:creationId xmlns:a16="http://schemas.microsoft.com/office/drawing/2014/main" id="{9798DC25-5AC1-4D4A-AE69-7996DF5F9156}"/>
+              </a:ext>
+            </a:extLst>
+          </p:cNvPr>
+          <p:cNvCxnSpPr>
+            <a:cxnSpLocks/>
+          </p:cNvCxnSpPr>
+          <p:nvPr/>
+        </p:nvCxnSpPr>
+        <p:spPr>
+          <a:xfrm>
+            <a:off x="10688720" y="4227850"/>
+            <a:ext cx="0" cy="430217"/>
+          </a:xfrm>
+          <a:prstGeom prst="line">
+            <a:avLst/>
+          </a:prstGeom>
+          <a:ln>
+            <a:solidFill>
+              <a:srgbClr val="7F0E31"/>
+            </a:solidFill>
+          </a:ln>
+        </p:spPr>
+        <p:style>
+          <a:lnRef idx="1">
+            <a:schemeClr val="accent1"/>
+          </a:lnRef>
+          <a:fillRef idx="0">
+            <a:schemeClr val="accent1"/>
+          </a:fillRef>
+          <a:effectRef idx="0">
+            <a:schemeClr val="accent1"/>
+          </a:effectRef>
+          <a:fontRef idx="minor">
+            <a:schemeClr val="tx1"/>
+          </a:fontRef>
+        </p:style>
+      </p:cxnSp>
+      <p:cxnSp>
+        <p:nvCxnSpPr>
+          <p:cNvPr id="114" name="Conector reto 113">
+            <a:extLst>
+              <a:ext uri="{FF2B5EF4-FFF2-40B4-BE49-F238E27FC236}">
+                <a16:creationId xmlns:a16="http://schemas.microsoft.com/office/drawing/2014/main" id="{0C19BE31-6AB9-4F40-9D6A-F376F4244BE8}"/>
+              </a:ext>
+            </a:extLst>
+          </p:cNvPr>
+          <p:cNvCxnSpPr>
+            <a:cxnSpLocks/>
+          </p:cNvCxnSpPr>
+          <p:nvPr/>
+        </p:nvCxnSpPr>
+        <p:spPr>
+          <a:xfrm>
+            <a:off x="7637845" y="4198518"/>
+            <a:ext cx="0" cy="459549"/>
+          </a:xfrm>
+          <a:prstGeom prst="line">
+            <a:avLst/>
+          </a:prstGeom>
+          <a:ln>
+            <a:solidFill>
+              <a:srgbClr val="7F0E31"/>
+            </a:solidFill>
+          </a:ln>
+        </p:spPr>
+        <p:style>
+          <a:lnRef idx="1">
+            <a:schemeClr val="accent1"/>
+          </a:lnRef>
+          <a:fillRef idx="0">
+            <a:schemeClr val="accent1"/>
+          </a:fillRef>
+          <a:effectRef idx="0">
+            <a:schemeClr val="accent1"/>
+          </a:effectRef>
+          <a:fontRef idx="minor">
+            <a:schemeClr val="tx1"/>
+          </a:fontRef>
+        </p:style>
+      </p:cxnSp>
+      <p:cxnSp>
+        <p:nvCxnSpPr>
+          <p:cNvPr id="11" name="Conector reto 10">
+            <a:extLst>
+              <a:ext uri="{FF2B5EF4-FFF2-40B4-BE49-F238E27FC236}">
+                <a16:creationId xmlns:a16="http://schemas.microsoft.com/office/drawing/2014/main" id="{82C3EFEE-F526-4D12-8898-E698BB20E26F}"/>
+              </a:ext>
+            </a:extLst>
+          </p:cNvPr>
+          <p:cNvCxnSpPr>
+            <a:cxnSpLocks/>
+            <a:endCxn id="104" idx="0"/>
+          </p:cNvCxnSpPr>
+          <p:nvPr/>
+        </p:nvCxnSpPr>
+        <p:spPr>
+          <a:xfrm flipV="1">
+            <a:off x="6452826" y="3655385"/>
+            <a:ext cx="0" cy="529970"/>
+          </a:xfrm>
+          <a:prstGeom prst="line">
+            <a:avLst/>
+          </a:prstGeom>
+          <a:ln>
+            <a:solidFill>
+              <a:srgbClr val="7F0E31"/>
+            </a:solidFill>
+          </a:ln>
+        </p:spPr>
+        <p:style>
+          <a:lnRef idx="1">
+            <a:schemeClr val="accent1"/>
+          </a:lnRef>
+          <a:fillRef idx="0">
+            <a:schemeClr val="accent1"/>
+          </a:fillRef>
+          <a:effectRef idx="0">
+            <a:schemeClr val="accent1"/>
+          </a:effectRef>
+          <a:fontRef idx="minor">
+            <a:schemeClr val="tx1"/>
+          </a:fontRef>
+        </p:style>
+      </p:cxnSp>
+      <p:grpSp>
+        <p:nvGrpSpPr>
+          <p:cNvPr id="34" name="Agrupar 33">
+            <a:extLst>
+              <a:ext uri="{FF2B5EF4-FFF2-40B4-BE49-F238E27FC236}">
+                <a16:creationId xmlns:a16="http://schemas.microsoft.com/office/drawing/2014/main" id="{D75B1CC6-DC01-4D6D-A051-F383765396E7}"/>
+              </a:ext>
+            </a:extLst>
+          </p:cNvPr>
+          <p:cNvGrpSpPr/>
+          <p:nvPr/>
+        </p:nvGrpSpPr>
+        <p:grpSpPr>
+          <a:xfrm>
+            <a:off x="4960146" y="766119"/>
+            <a:ext cx="3038781" cy="1914750"/>
+            <a:chOff x="4487791" y="1310492"/>
+            <a:chExt cx="3513774" cy="2214046"/>
+          </a:xfrm>
+        </p:grpSpPr>
+        <p:sp>
+          <p:nvSpPr>
+            <p:cNvPr id="35" name="Retângulo 34">
+              <a:extLst>
+                <a:ext uri="{FF2B5EF4-FFF2-40B4-BE49-F238E27FC236}">
+                  <a16:creationId xmlns:a16="http://schemas.microsoft.com/office/drawing/2014/main" id="{14B2C8D6-7A7C-4553-9244-5C7B82B5528E}"/>
+                </a:ext>
+              </a:extLst>
+            </p:cNvPr>
+            <p:cNvSpPr/>
+            <p:nvPr/>
+          </p:nvSpPr>
+          <p:spPr>
+            <a:xfrm>
+              <a:off x="4575237" y="1310492"/>
+              <a:ext cx="3338880" cy="1812535"/>
+            </a:xfrm>
+            <a:prstGeom prst="rect">
+              <a:avLst/>
+            </a:prstGeom>
+            <a:solidFill>
+              <a:srgbClr val="237DA2"/>
+            </a:solidFill>
+            <a:ln>
+              <a:noFill/>
+            </a:ln>
+          </p:spPr>
+          <p:style>
+            <a:lnRef idx="2">
+              <a:schemeClr val="accent1">
+                <a:shade val="50000"/>
+              </a:schemeClr>
+            </a:lnRef>
+            <a:fillRef idx="1">
+              <a:schemeClr val="accent1"/>
+            </a:fillRef>
+            <a:effectRef idx="0">
+              <a:schemeClr val="accent1"/>
+            </a:effectRef>
+            <a:fontRef idx="minor">
+              <a:schemeClr val="lt1"/>
+            </a:fontRef>
+          </p:style>
+          <p:txBody>
+            <a:bodyPr rot="0" spcFirstLastPara="0" vert="horz" wrap="square" lIns="91440" tIns="45720" rIns="91440" bIns="45720" numCol="1" spcCol="0" rtlCol="0" fromWordArt="0" anchor="ctr" anchorCtr="0" forceAA="0" compatLnSpc="1">
+              <a:prstTxWarp prst="textNoShape">
+                <a:avLst/>
+              </a:prstTxWarp>
+              <a:noAutofit/>
+            </a:bodyPr>
+            <a:lstStyle/>
+            <a:p>
+              <a:endParaRPr lang="pt-BR" dirty="0"/>
+            </a:p>
+          </p:txBody>
+        </p:sp>
+        <p:sp>
+          <p:nvSpPr>
+            <p:cNvPr id="36" name="Retângulo 35">
+              <a:extLst>
+                <a:ext uri="{FF2B5EF4-FFF2-40B4-BE49-F238E27FC236}">
+                  <a16:creationId xmlns:a16="http://schemas.microsoft.com/office/drawing/2014/main" id="{92A15866-18EA-4590-87E0-C606973AED26}"/>
+                </a:ext>
+              </a:extLst>
+            </p:cNvPr>
+            <p:cNvSpPr/>
+            <p:nvPr/>
+          </p:nvSpPr>
+          <p:spPr>
+            <a:xfrm>
+              <a:off x="4737411" y="1678298"/>
+              <a:ext cx="1076922" cy="1076921"/>
+            </a:xfrm>
+            <a:prstGeom prst="rect">
+              <a:avLst/>
+            </a:prstGeom>
+            <a:solidFill>
+              <a:schemeClr val="bg1"/>
+            </a:solidFill>
+            <a:ln>
+              <a:noFill/>
+            </a:ln>
+          </p:spPr>
+          <p:style>
+            <a:lnRef idx="2">
+              <a:schemeClr val="accent1">
+                <a:shade val="50000"/>
+              </a:schemeClr>
+            </a:lnRef>
+            <a:fillRef idx="1">
+              <a:schemeClr val="accent1"/>
+            </a:fillRef>
+            <a:effectRef idx="0">
+              <a:schemeClr val="accent1"/>
+            </a:effectRef>
+            <a:fontRef idx="minor">
+              <a:schemeClr val="lt1"/>
+            </a:fontRef>
+          </p:style>
+          <p:txBody>
+            <a:bodyPr rot="0" spcFirstLastPara="0" vert="horz" wrap="square" lIns="91440" tIns="45720" rIns="91440" bIns="45720" numCol="1" spcCol="0" rtlCol="0" fromWordArt="0" anchor="ctr" anchorCtr="0" forceAA="0" compatLnSpc="1">
+              <a:prstTxWarp prst="textNoShape">
+                <a:avLst/>
+              </a:prstTxWarp>
+              <a:noAutofit/>
+            </a:bodyPr>
+            <a:lstStyle/>
+            <a:p>
+              <a:endParaRPr lang="pt-BR" dirty="0"/>
+            </a:p>
+          </p:txBody>
+        </p:sp>
+        <p:sp>
+          <p:nvSpPr>
+            <p:cNvPr id="37" name="Retângulo 36">
+              <a:extLst>
+                <a:ext uri="{FF2B5EF4-FFF2-40B4-BE49-F238E27FC236}">
+                  <a16:creationId xmlns:a16="http://schemas.microsoft.com/office/drawing/2014/main" id="{83967359-A3E7-474D-9F37-75B05FF8CED7}"/>
+                </a:ext>
+              </a:extLst>
+            </p:cNvPr>
+            <p:cNvSpPr/>
+            <p:nvPr/>
+          </p:nvSpPr>
+          <p:spPr>
+            <a:xfrm>
+              <a:off x="4487791" y="2700090"/>
+              <a:ext cx="3513774" cy="322228"/>
+            </a:xfrm>
+            <a:prstGeom prst="rect">
+              <a:avLst/>
+            </a:prstGeom>
+            <a:solidFill>
+              <a:schemeClr val="bg1"/>
+            </a:solidFill>
+            <a:ln>
+              <a:noFill/>
+            </a:ln>
+          </p:spPr>
+          <p:style>
+            <a:lnRef idx="2">
+              <a:schemeClr val="accent1">
+                <a:shade val="50000"/>
+              </a:schemeClr>
+            </a:lnRef>
+            <a:fillRef idx="1">
+              <a:schemeClr val="accent1"/>
+            </a:fillRef>
+            <a:effectRef idx="0">
+              <a:schemeClr val="accent1"/>
+            </a:effectRef>
+            <a:fontRef idx="minor">
+              <a:schemeClr val="lt1"/>
+            </a:fontRef>
+          </p:style>
+          <p:txBody>
+            <a:bodyPr rot="0" spcFirstLastPara="0" vert="horz" wrap="square" lIns="91440" tIns="45720" rIns="91440" bIns="45720" numCol="1" spcCol="0" rtlCol="0" fromWordArt="0" anchor="ctr" anchorCtr="0" forceAA="0" compatLnSpc="1">
+              <a:prstTxWarp prst="textNoShape">
+                <a:avLst/>
+              </a:prstTxWarp>
+              <a:noAutofit/>
+            </a:bodyPr>
+            <a:lstStyle/>
+            <a:p>
+              <a:pPr>
+                <a:lnSpc>
+                  <a:spcPct val="107000"/>
+                </a:lnSpc>
+                <a:spcAft>
+                  <a:spcPts val="800"/>
+                </a:spcAft>
+              </a:pPr>
+              <a:r>
+                <a:rPr lang="pt-BR" sz="1100" dirty="0">
+                  <a:effectLst/>
+                  <a:ea typeface="Calibri" panose="020F0502020204030204" pitchFamily="34" charset="0"/>
+                  <a:cs typeface="Times New Roman" panose="02020603050405020304" pitchFamily="18" charset="0"/>
+                </a:rPr>
+                <a:t> </a:t>
+              </a:r>
+            </a:p>
+          </p:txBody>
+        </p:sp>
+        <p:sp>
+          <p:nvSpPr>
+            <p:cNvPr id="38" name="CaixaDeTexto 37">
+              <a:extLst>
+                <a:ext uri="{FF2B5EF4-FFF2-40B4-BE49-F238E27FC236}">
+                  <a16:creationId xmlns:a16="http://schemas.microsoft.com/office/drawing/2014/main" id="{0605B371-F207-40B6-9C45-38B5B052B4DC}"/>
+                </a:ext>
+              </a:extLst>
+            </p:cNvPr>
+            <p:cNvSpPr txBox="1"/>
+            <p:nvPr/>
+          </p:nvSpPr>
+          <p:spPr>
+            <a:xfrm>
+              <a:off x="4575236" y="2634825"/>
+              <a:ext cx="3338880" cy="889713"/>
+            </a:xfrm>
+            <a:prstGeom prst="rect">
+              <a:avLst/>
+            </a:prstGeom>
+            <a:noFill/>
+          </p:spPr>
+          <p:txBody>
+            <a:bodyPr wrap="square" rtlCol="0">
+              <a:spAutoFit/>
+            </a:bodyPr>
+            <a:lstStyle/>
+            <a:p>
+              <a:pPr algn="ctr"/>
+              <a:r>
+                <a:rPr lang="pt-BR" sz="2200" dirty="0">
+                  <a:solidFill>
+                    <a:schemeClr val="tx1">
+                      <a:lumMod val="85000"/>
+                      <a:lumOff val="15000"/>
+                    </a:schemeClr>
+                  </a:solidFill>
+                </a:rPr>
+                <a:t>Gabriel Bezerra</a:t>
+              </a:r>
+            </a:p>
+            <a:p>
+              <a:pPr algn="ctr"/>
+              <a:endParaRPr lang="pt-BR" sz="2200" dirty="0">
+                <a:solidFill>
+                  <a:schemeClr val="bg2">
+                    <a:lumMod val="25000"/>
+                  </a:schemeClr>
+                </a:solidFill>
+              </a:endParaRPr>
+            </a:p>
+          </p:txBody>
+        </p:sp>
+        <p:sp>
+          <p:nvSpPr>
+            <p:cNvPr id="39" name="CaixaDeTexto 38">
+              <a:extLst>
+                <a:ext uri="{FF2B5EF4-FFF2-40B4-BE49-F238E27FC236}">
+                  <a16:creationId xmlns:a16="http://schemas.microsoft.com/office/drawing/2014/main" id="{C8D01FAD-1511-43B1-A769-9B58B9D1D922}"/>
+                </a:ext>
+              </a:extLst>
+            </p:cNvPr>
+            <p:cNvSpPr txBox="1"/>
+            <p:nvPr/>
+          </p:nvSpPr>
+          <p:spPr>
+            <a:xfrm>
+              <a:off x="5831661" y="1872497"/>
+              <a:ext cx="2099784" cy="533828"/>
+            </a:xfrm>
+            <a:prstGeom prst="rect">
+              <a:avLst/>
+            </a:prstGeom>
+            <a:noFill/>
+          </p:spPr>
+          <p:txBody>
+            <a:bodyPr wrap="square" rtlCol="0">
+              <a:spAutoFit/>
+            </a:bodyPr>
+            <a:lstStyle/>
+            <a:p>
+              <a:pPr algn="ctr"/>
+              <a:endParaRPr lang="pt-BR" sz="2400" b="1" dirty="0">
+                <a:solidFill>
+                  <a:schemeClr val="bg1"/>
+                </a:solidFill>
+              </a:endParaRPr>
+            </a:p>
+          </p:txBody>
+        </p:sp>
+      </p:grpSp>
+      <p:grpSp>
+        <p:nvGrpSpPr>
+          <p:cNvPr id="76" name="Agrupar 75">
+            <a:extLst>
+              <a:ext uri="{FF2B5EF4-FFF2-40B4-BE49-F238E27FC236}">
+                <a16:creationId xmlns:a16="http://schemas.microsoft.com/office/drawing/2014/main" id="{F719BD54-8E10-4B91-B7A4-1A000BEF8607}"/>
+              </a:ext>
+            </a:extLst>
+          </p:cNvPr>
+          <p:cNvGrpSpPr/>
+          <p:nvPr/>
+        </p:nvGrpSpPr>
+        <p:grpSpPr>
+          <a:xfrm>
+            <a:off x="9108323" y="4389927"/>
+            <a:ext cx="3038781" cy="1576196"/>
+            <a:chOff x="4487791" y="1310492"/>
+            <a:chExt cx="3513774" cy="1822572"/>
+          </a:xfrm>
+        </p:grpSpPr>
+        <p:sp>
+          <p:nvSpPr>
+            <p:cNvPr id="77" name="Retângulo 76">
+              <a:extLst>
+                <a:ext uri="{FF2B5EF4-FFF2-40B4-BE49-F238E27FC236}">
+                  <a16:creationId xmlns:a16="http://schemas.microsoft.com/office/drawing/2014/main" id="{9C319662-C0A2-40B1-A68E-3D922DB28A23}"/>
+                </a:ext>
+              </a:extLst>
+            </p:cNvPr>
+            <p:cNvSpPr/>
+            <p:nvPr/>
+          </p:nvSpPr>
+          <p:spPr>
+            <a:xfrm>
+              <a:off x="4575237" y="1310492"/>
+              <a:ext cx="3338880" cy="1812535"/>
+            </a:xfrm>
+            <a:prstGeom prst="rect">
+              <a:avLst/>
+            </a:prstGeom>
+            <a:solidFill>
+              <a:srgbClr val="237DA2"/>
+            </a:solidFill>
+            <a:ln>
+              <a:noFill/>
+            </a:ln>
+          </p:spPr>
+          <p:style>
+            <a:lnRef idx="2">
+              <a:schemeClr val="accent1">
+                <a:shade val="50000"/>
+              </a:schemeClr>
+            </a:lnRef>
+            <a:fillRef idx="1">
+              <a:schemeClr val="accent1"/>
+            </a:fillRef>
+            <a:effectRef idx="0">
+              <a:schemeClr val="accent1"/>
+            </a:effectRef>
+            <a:fontRef idx="minor">
+              <a:schemeClr val="lt1"/>
+            </a:fontRef>
+          </p:style>
+          <p:txBody>
+            <a:bodyPr rot="0" spcFirstLastPara="0" vert="horz" wrap="square" lIns="91440" tIns="45720" rIns="91440" bIns="45720" numCol="1" spcCol="0" rtlCol="0" fromWordArt="0" anchor="ctr" anchorCtr="0" forceAA="0" compatLnSpc="1">
+              <a:prstTxWarp prst="textNoShape">
+                <a:avLst/>
+              </a:prstTxWarp>
+              <a:noAutofit/>
+            </a:bodyPr>
+            <a:lstStyle/>
+            <a:p>
+              <a:endParaRPr lang="pt-BR" dirty="0"/>
+            </a:p>
+          </p:txBody>
+        </p:sp>
+        <p:sp>
+          <p:nvSpPr>
+            <p:cNvPr id="78" name="Retângulo 77">
+              <a:extLst>
+                <a:ext uri="{FF2B5EF4-FFF2-40B4-BE49-F238E27FC236}">
+                  <a16:creationId xmlns:a16="http://schemas.microsoft.com/office/drawing/2014/main" id="{27865FBB-7D6C-46E8-B451-E9C985E956F2}"/>
+                </a:ext>
+              </a:extLst>
+            </p:cNvPr>
+            <p:cNvSpPr/>
+            <p:nvPr/>
+          </p:nvSpPr>
+          <p:spPr>
+            <a:xfrm>
+              <a:off x="4737411" y="1678298"/>
+              <a:ext cx="1076922" cy="1076921"/>
+            </a:xfrm>
+            <a:prstGeom prst="rect">
+              <a:avLst/>
+            </a:prstGeom>
+            <a:solidFill>
+              <a:schemeClr val="bg1"/>
+            </a:solidFill>
+            <a:ln>
+              <a:noFill/>
+            </a:ln>
+          </p:spPr>
+          <p:style>
+            <a:lnRef idx="2">
+              <a:schemeClr val="accent1">
+                <a:shade val="50000"/>
+              </a:schemeClr>
+            </a:lnRef>
+            <a:fillRef idx="1">
+              <a:schemeClr val="accent1"/>
+            </a:fillRef>
+            <a:effectRef idx="0">
+              <a:schemeClr val="accent1"/>
+            </a:effectRef>
+            <a:fontRef idx="minor">
+              <a:schemeClr val="lt1"/>
+            </a:fontRef>
+          </p:style>
+          <p:txBody>
+            <a:bodyPr rot="0" spcFirstLastPara="0" vert="horz" wrap="square" lIns="91440" tIns="45720" rIns="91440" bIns="45720" numCol="1" spcCol="0" rtlCol="0" fromWordArt="0" anchor="ctr" anchorCtr="0" forceAA="0" compatLnSpc="1">
+              <a:prstTxWarp prst="textNoShape">
+                <a:avLst/>
+              </a:prstTxWarp>
+              <a:noAutofit/>
+            </a:bodyPr>
+            <a:lstStyle/>
+            <a:p>
+              <a:endParaRPr lang="pt-BR"/>
+            </a:p>
+          </p:txBody>
+        </p:sp>
+        <p:sp>
+          <p:nvSpPr>
+            <p:cNvPr id="79" name="Retângulo 78">
+              <a:extLst>
+                <a:ext uri="{FF2B5EF4-FFF2-40B4-BE49-F238E27FC236}">
+                  <a16:creationId xmlns:a16="http://schemas.microsoft.com/office/drawing/2014/main" id="{3CF57288-7681-4FFD-817D-949664FE2240}"/>
+                </a:ext>
+              </a:extLst>
+            </p:cNvPr>
+            <p:cNvSpPr/>
+            <p:nvPr/>
+          </p:nvSpPr>
+          <p:spPr>
+            <a:xfrm>
+              <a:off x="4487791" y="2700090"/>
+              <a:ext cx="3513774" cy="322228"/>
+            </a:xfrm>
+            <a:prstGeom prst="rect">
+              <a:avLst/>
+            </a:prstGeom>
+            <a:solidFill>
+              <a:schemeClr val="bg1"/>
+            </a:solidFill>
+            <a:ln>
+              <a:noFill/>
+            </a:ln>
+          </p:spPr>
+          <p:style>
+            <a:lnRef idx="2">
+              <a:schemeClr val="accent1">
+                <a:shade val="50000"/>
+              </a:schemeClr>
+            </a:lnRef>
+            <a:fillRef idx="1">
+              <a:schemeClr val="accent1"/>
+            </a:fillRef>
+            <a:effectRef idx="0">
+              <a:schemeClr val="accent1"/>
+            </a:effectRef>
+            <a:fontRef idx="minor">
+              <a:schemeClr val="lt1"/>
+            </a:fontRef>
+          </p:style>
+          <p:txBody>
+            <a:bodyPr rot="0" spcFirstLastPara="0" vert="horz" wrap="square" lIns="91440" tIns="45720" rIns="91440" bIns="45720" numCol="1" spcCol="0" rtlCol="0" fromWordArt="0" anchor="ctr" anchorCtr="0" forceAA="0" compatLnSpc="1">
+              <a:prstTxWarp prst="textNoShape">
+                <a:avLst/>
+              </a:prstTxWarp>
+              <a:noAutofit/>
+            </a:bodyPr>
+            <a:lstStyle/>
+            <a:p>
+              <a:pPr>
+                <a:lnSpc>
+                  <a:spcPct val="107000"/>
+                </a:lnSpc>
+                <a:spcAft>
+                  <a:spcPts val="800"/>
+                </a:spcAft>
+              </a:pPr>
+              <a:r>
+                <a:rPr lang="pt-BR" sz="1100">
+                  <a:effectLst/>
+                  <a:ea typeface="Calibri" panose="020F0502020204030204" pitchFamily="34" charset="0"/>
+                  <a:cs typeface="Times New Roman" panose="02020603050405020304" pitchFamily="18" charset="0"/>
+                </a:rPr>
+                <a:t> </a:t>
+              </a:r>
+            </a:p>
+          </p:txBody>
+        </p:sp>
+        <p:sp>
+          <p:nvSpPr>
+            <p:cNvPr id="80" name="CaixaDeTexto 79">
+              <a:extLst>
+                <a:ext uri="{FF2B5EF4-FFF2-40B4-BE49-F238E27FC236}">
+                  <a16:creationId xmlns:a16="http://schemas.microsoft.com/office/drawing/2014/main" id="{F290B15D-1D58-4EA7-9827-8DF895936A8C}"/>
+                </a:ext>
+              </a:extLst>
+            </p:cNvPr>
+            <p:cNvSpPr txBox="1"/>
+            <p:nvPr/>
+          </p:nvSpPr>
+          <p:spPr>
+            <a:xfrm>
+              <a:off x="4575236" y="2634825"/>
+              <a:ext cx="3338880" cy="498239"/>
+            </a:xfrm>
+            <a:prstGeom prst="rect">
+              <a:avLst/>
+            </a:prstGeom>
+            <a:noFill/>
+          </p:spPr>
+          <p:txBody>
+            <a:bodyPr wrap="square" rtlCol="0">
+              <a:spAutoFit/>
+            </a:bodyPr>
+            <a:lstStyle/>
+            <a:p>
+              <a:pPr algn="ctr"/>
+              <a:r>
+                <a:rPr lang="pt-BR" sz="2200" dirty="0">
+                  <a:solidFill>
+                    <a:schemeClr val="bg2">
+                      <a:lumMod val="25000"/>
+                    </a:schemeClr>
+                  </a:solidFill>
+                </a:rPr>
+                <a:t>Bruno Santana</a:t>
+              </a:r>
+            </a:p>
+          </p:txBody>
+        </p:sp>
+      </p:grpSp>
+      <p:grpSp>
+        <p:nvGrpSpPr>
+          <p:cNvPr id="82" name="Agrupar 81">
+            <a:extLst>
+              <a:ext uri="{FF2B5EF4-FFF2-40B4-BE49-F238E27FC236}">
+                <a16:creationId xmlns:a16="http://schemas.microsoft.com/office/drawing/2014/main" id="{C9670946-4125-464C-A08F-C3F1BD7AF90A}"/>
+              </a:ext>
+            </a:extLst>
+          </p:cNvPr>
+          <p:cNvGrpSpPr/>
+          <p:nvPr/>
+        </p:nvGrpSpPr>
+        <p:grpSpPr>
+          <a:xfrm>
+            <a:off x="6078063" y="4384599"/>
+            <a:ext cx="3038781" cy="1576196"/>
+            <a:chOff x="4487791" y="1310492"/>
+            <a:chExt cx="3513774" cy="1822572"/>
+          </a:xfrm>
+        </p:grpSpPr>
+        <p:sp>
+          <p:nvSpPr>
+            <p:cNvPr id="83" name="Retângulo 82">
+              <a:extLst>
+                <a:ext uri="{FF2B5EF4-FFF2-40B4-BE49-F238E27FC236}">
+                  <a16:creationId xmlns:a16="http://schemas.microsoft.com/office/drawing/2014/main" id="{C3E2A5BF-4249-445D-B7FC-0C39BE64FFE2}"/>
+                </a:ext>
+              </a:extLst>
+            </p:cNvPr>
+            <p:cNvSpPr/>
+            <p:nvPr/>
+          </p:nvSpPr>
+          <p:spPr>
+            <a:xfrm>
+              <a:off x="4575237" y="1310492"/>
+              <a:ext cx="3338880" cy="1812535"/>
+            </a:xfrm>
+            <a:prstGeom prst="rect">
+              <a:avLst/>
+            </a:prstGeom>
+            <a:solidFill>
+              <a:srgbClr val="237DA2"/>
+            </a:solidFill>
+            <a:ln>
+              <a:noFill/>
+            </a:ln>
+          </p:spPr>
+          <p:style>
+            <a:lnRef idx="2">
+              <a:schemeClr val="accent1">
+                <a:shade val="50000"/>
+              </a:schemeClr>
+            </a:lnRef>
+            <a:fillRef idx="1">
+              <a:schemeClr val="accent1"/>
+            </a:fillRef>
+            <a:effectRef idx="0">
+              <a:schemeClr val="accent1"/>
+            </a:effectRef>
+            <a:fontRef idx="minor">
+              <a:schemeClr val="lt1"/>
+            </a:fontRef>
+          </p:style>
+          <p:txBody>
+            <a:bodyPr rot="0" spcFirstLastPara="0" vert="horz" wrap="square" lIns="91440" tIns="45720" rIns="91440" bIns="45720" numCol="1" spcCol="0" rtlCol="0" fromWordArt="0" anchor="ctr" anchorCtr="0" forceAA="0" compatLnSpc="1">
+              <a:prstTxWarp prst="textNoShape">
+                <a:avLst/>
+              </a:prstTxWarp>
+              <a:noAutofit/>
+            </a:bodyPr>
+            <a:lstStyle/>
+            <a:p>
+              <a:endParaRPr lang="pt-BR" dirty="0"/>
+            </a:p>
+          </p:txBody>
+        </p:sp>
+        <p:sp>
+          <p:nvSpPr>
+            <p:cNvPr id="84" name="Retângulo 83">
+              <a:extLst>
+                <a:ext uri="{FF2B5EF4-FFF2-40B4-BE49-F238E27FC236}">
+                  <a16:creationId xmlns:a16="http://schemas.microsoft.com/office/drawing/2014/main" id="{AA38B9F0-400C-4903-AEDE-3676E0809C9D}"/>
+                </a:ext>
+              </a:extLst>
+            </p:cNvPr>
+            <p:cNvSpPr/>
+            <p:nvPr/>
+          </p:nvSpPr>
+          <p:spPr>
+            <a:xfrm>
+              <a:off x="4737411" y="1678298"/>
+              <a:ext cx="1076922" cy="1076921"/>
+            </a:xfrm>
+            <a:prstGeom prst="rect">
+              <a:avLst/>
+            </a:prstGeom>
+            <a:solidFill>
+              <a:schemeClr val="bg1"/>
+            </a:solidFill>
+            <a:ln>
+              <a:noFill/>
+            </a:ln>
+          </p:spPr>
+          <p:style>
+            <a:lnRef idx="2">
+              <a:schemeClr val="accent1">
+                <a:shade val="50000"/>
+              </a:schemeClr>
+            </a:lnRef>
+            <a:fillRef idx="1">
+              <a:schemeClr val="accent1"/>
+            </a:fillRef>
+            <a:effectRef idx="0">
+              <a:schemeClr val="accent1"/>
+            </a:effectRef>
+            <a:fontRef idx="minor">
+              <a:schemeClr val="lt1"/>
+            </a:fontRef>
+          </p:style>
+          <p:txBody>
+            <a:bodyPr rot="0" spcFirstLastPara="0" vert="horz" wrap="square" lIns="91440" tIns="45720" rIns="91440" bIns="45720" numCol="1" spcCol="0" rtlCol="0" fromWordArt="0" anchor="ctr" anchorCtr="0" forceAA="0" compatLnSpc="1">
+              <a:prstTxWarp prst="textNoShape">
+                <a:avLst/>
+              </a:prstTxWarp>
+              <a:noAutofit/>
+            </a:bodyPr>
+            <a:lstStyle/>
+            <a:p>
+              <a:endParaRPr lang="pt-BR"/>
+            </a:p>
+          </p:txBody>
+        </p:sp>
+        <p:sp>
+          <p:nvSpPr>
+            <p:cNvPr id="85" name="Retângulo 84">
+              <a:extLst>
+                <a:ext uri="{FF2B5EF4-FFF2-40B4-BE49-F238E27FC236}">
+                  <a16:creationId xmlns:a16="http://schemas.microsoft.com/office/drawing/2014/main" id="{EF73F66A-0BEC-493E-8A5A-E95A5CA0C3DD}"/>
+                </a:ext>
+              </a:extLst>
+            </p:cNvPr>
+            <p:cNvSpPr/>
+            <p:nvPr/>
+          </p:nvSpPr>
+          <p:spPr>
+            <a:xfrm>
+              <a:off x="4487791" y="2700090"/>
+              <a:ext cx="3513774" cy="322228"/>
+            </a:xfrm>
+            <a:prstGeom prst="rect">
+              <a:avLst/>
+            </a:prstGeom>
+            <a:solidFill>
+              <a:schemeClr val="bg1"/>
+            </a:solidFill>
+            <a:ln>
+              <a:noFill/>
+            </a:ln>
+          </p:spPr>
+          <p:style>
+            <a:lnRef idx="2">
+              <a:schemeClr val="accent1">
+                <a:shade val="50000"/>
+              </a:schemeClr>
+            </a:lnRef>
+            <a:fillRef idx="1">
+              <a:schemeClr val="accent1"/>
+            </a:fillRef>
+            <a:effectRef idx="0">
+              <a:schemeClr val="accent1"/>
+            </a:effectRef>
+            <a:fontRef idx="minor">
+              <a:schemeClr val="lt1"/>
+            </a:fontRef>
+          </p:style>
+          <p:txBody>
+            <a:bodyPr rot="0" spcFirstLastPara="0" vert="horz" wrap="square" lIns="91440" tIns="45720" rIns="91440" bIns="45720" numCol="1" spcCol="0" rtlCol="0" fromWordArt="0" anchor="ctr" anchorCtr="0" forceAA="0" compatLnSpc="1">
+              <a:prstTxWarp prst="textNoShape">
+                <a:avLst/>
+              </a:prstTxWarp>
+              <a:noAutofit/>
+            </a:bodyPr>
+            <a:lstStyle/>
+            <a:p>
+              <a:pPr>
+                <a:lnSpc>
+                  <a:spcPct val="107000"/>
+                </a:lnSpc>
+                <a:spcAft>
+                  <a:spcPts val="800"/>
+                </a:spcAft>
+              </a:pPr>
+              <a:r>
+                <a:rPr lang="pt-BR" sz="1100">
+                  <a:effectLst/>
+                  <a:ea typeface="Calibri" panose="020F0502020204030204" pitchFamily="34" charset="0"/>
+                  <a:cs typeface="Times New Roman" panose="02020603050405020304" pitchFamily="18" charset="0"/>
+                </a:rPr>
+                <a:t> </a:t>
+              </a:r>
+            </a:p>
+          </p:txBody>
+        </p:sp>
+        <p:sp>
+          <p:nvSpPr>
+            <p:cNvPr id="86" name="CaixaDeTexto 85">
+              <a:extLst>
+                <a:ext uri="{FF2B5EF4-FFF2-40B4-BE49-F238E27FC236}">
+                  <a16:creationId xmlns:a16="http://schemas.microsoft.com/office/drawing/2014/main" id="{CED76CDC-1809-4DEB-BF4A-89E947EFE8D6}"/>
+                </a:ext>
+              </a:extLst>
+            </p:cNvPr>
+            <p:cNvSpPr txBox="1"/>
+            <p:nvPr/>
+          </p:nvSpPr>
+          <p:spPr>
+            <a:xfrm>
+              <a:off x="4575236" y="2634825"/>
+              <a:ext cx="3338880" cy="498239"/>
+            </a:xfrm>
+            <a:prstGeom prst="rect">
+              <a:avLst/>
+            </a:prstGeom>
+            <a:noFill/>
+          </p:spPr>
+          <p:txBody>
+            <a:bodyPr wrap="square" rtlCol="0">
+              <a:spAutoFit/>
+            </a:bodyPr>
+            <a:lstStyle/>
+            <a:p>
+              <a:pPr algn="ctr"/>
+              <a:r>
+                <a:rPr lang="pt-BR" sz="2200" dirty="0">
+                  <a:solidFill>
+                    <a:schemeClr val="tx1">
+                      <a:lumMod val="85000"/>
+                      <a:lumOff val="15000"/>
+                    </a:schemeClr>
+                  </a:solidFill>
+                </a:rPr>
+                <a:t>Graziela Lucena</a:t>
+              </a:r>
+            </a:p>
+          </p:txBody>
+        </p:sp>
+      </p:grpSp>
+      <p:grpSp>
+        <p:nvGrpSpPr>
+          <p:cNvPr id="88" name="Agrupar 87">
+            <a:extLst>
+              <a:ext uri="{FF2B5EF4-FFF2-40B4-BE49-F238E27FC236}">
+                <a16:creationId xmlns:a16="http://schemas.microsoft.com/office/drawing/2014/main" id="{23B0B3AF-1CB3-40A7-B344-A3E2FEEEF1D6}"/>
+              </a:ext>
+            </a:extLst>
+          </p:cNvPr>
+          <p:cNvGrpSpPr/>
+          <p:nvPr/>
+        </p:nvGrpSpPr>
+        <p:grpSpPr>
+          <a:xfrm>
+            <a:off x="3093504" y="4389927"/>
+            <a:ext cx="3038781" cy="1576196"/>
+            <a:chOff x="4487791" y="1310492"/>
+            <a:chExt cx="3513774" cy="1822572"/>
+          </a:xfrm>
+        </p:grpSpPr>
+        <p:sp>
+          <p:nvSpPr>
+            <p:cNvPr id="89" name="Retângulo 88">
+              <a:extLst>
+                <a:ext uri="{FF2B5EF4-FFF2-40B4-BE49-F238E27FC236}">
+                  <a16:creationId xmlns:a16="http://schemas.microsoft.com/office/drawing/2014/main" id="{C8B98E58-93C8-4A06-A347-E1B1D8ECAAA5}"/>
+                </a:ext>
+              </a:extLst>
+            </p:cNvPr>
+            <p:cNvSpPr/>
+            <p:nvPr/>
+          </p:nvSpPr>
+          <p:spPr>
+            <a:xfrm>
+              <a:off x="4575237" y="1310492"/>
+              <a:ext cx="3338880" cy="1812535"/>
+            </a:xfrm>
+            <a:prstGeom prst="rect">
+              <a:avLst/>
+            </a:prstGeom>
+            <a:solidFill>
+              <a:srgbClr val="237DA2"/>
+            </a:solidFill>
+            <a:ln>
+              <a:noFill/>
+            </a:ln>
+          </p:spPr>
+          <p:style>
+            <a:lnRef idx="2">
+              <a:schemeClr val="accent1">
+                <a:shade val="50000"/>
+              </a:schemeClr>
+            </a:lnRef>
+            <a:fillRef idx="1">
+              <a:schemeClr val="accent1"/>
+            </a:fillRef>
+            <a:effectRef idx="0">
+              <a:schemeClr val="accent1"/>
+            </a:effectRef>
+            <a:fontRef idx="minor">
+              <a:schemeClr val="lt1"/>
+            </a:fontRef>
+          </p:style>
+          <p:txBody>
+            <a:bodyPr rot="0" spcFirstLastPara="0" vert="horz" wrap="square" lIns="91440" tIns="45720" rIns="91440" bIns="45720" numCol="1" spcCol="0" rtlCol="0" fromWordArt="0" anchor="ctr" anchorCtr="0" forceAA="0" compatLnSpc="1">
+              <a:prstTxWarp prst="textNoShape">
+                <a:avLst/>
+              </a:prstTxWarp>
+              <a:noAutofit/>
+            </a:bodyPr>
+            <a:lstStyle/>
+            <a:p>
+              <a:endParaRPr lang="pt-BR" dirty="0"/>
+            </a:p>
+          </p:txBody>
+        </p:sp>
+        <p:sp>
+          <p:nvSpPr>
+            <p:cNvPr id="90" name="Retângulo 89">
+              <a:extLst>
+                <a:ext uri="{FF2B5EF4-FFF2-40B4-BE49-F238E27FC236}">
+                  <a16:creationId xmlns:a16="http://schemas.microsoft.com/office/drawing/2014/main" id="{A9E9BBE6-FC8B-42A3-9668-81018E97EF9C}"/>
+                </a:ext>
+              </a:extLst>
+            </p:cNvPr>
+            <p:cNvSpPr/>
+            <p:nvPr/>
+          </p:nvSpPr>
+          <p:spPr>
+            <a:xfrm>
+              <a:off x="4737411" y="1678298"/>
+              <a:ext cx="1076922" cy="1076921"/>
+            </a:xfrm>
+            <a:prstGeom prst="rect">
+              <a:avLst/>
+            </a:prstGeom>
+            <a:solidFill>
+              <a:schemeClr val="bg1"/>
+            </a:solidFill>
+            <a:ln>
+              <a:noFill/>
+            </a:ln>
+          </p:spPr>
+          <p:style>
+            <a:lnRef idx="2">
+              <a:schemeClr val="accent1">
+                <a:shade val="50000"/>
+              </a:schemeClr>
+            </a:lnRef>
+            <a:fillRef idx="1">
+              <a:schemeClr val="accent1"/>
+            </a:fillRef>
+            <a:effectRef idx="0">
+              <a:schemeClr val="accent1"/>
+            </a:effectRef>
+            <a:fontRef idx="minor">
+              <a:schemeClr val="lt1"/>
+            </a:fontRef>
+          </p:style>
+          <p:txBody>
+            <a:bodyPr rot="0" spcFirstLastPara="0" vert="horz" wrap="square" lIns="91440" tIns="45720" rIns="91440" bIns="45720" numCol="1" spcCol="0" rtlCol="0" fromWordArt="0" anchor="ctr" anchorCtr="0" forceAA="0" compatLnSpc="1">
+              <a:prstTxWarp prst="textNoShape">
+                <a:avLst/>
+              </a:prstTxWarp>
+              <a:noAutofit/>
+            </a:bodyPr>
+            <a:lstStyle/>
+            <a:p>
+              <a:endParaRPr lang="pt-BR"/>
+            </a:p>
+          </p:txBody>
+        </p:sp>
+        <p:sp>
+          <p:nvSpPr>
+            <p:cNvPr id="91" name="Retângulo 90">
+              <a:extLst>
+                <a:ext uri="{FF2B5EF4-FFF2-40B4-BE49-F238E27FC236}">
+                  <a16:creationId xmlns:a16="http://schemas.microsoft.com/office/drawing/2014/main" id="{BC3BB698-520A-49BF-96B5-7DAB88504A4E}"/>
+                </a:ext>
+              </a:extLst>
+            </p:cNvPr>
+            <p:cNvSpPr/>
+            <p:nvPr/>
+          </p:nvSpPr>
+          <p:spPr>
+            <a:xfrm>
+              <a:off x="4487791" y="2700090"/>
+              <a:ext cx="3513774" cy="322228"/>
+            </a:xfrm>
+            <a:prstGeom prst="rect">
+              <a:avLst/>
+            </a:prstGeom>
+            <a:solidFill>
+              <a:schemeClr val="bg1"/>
+            </a:solidFill>
+            <a:ln>
+              <a:noFill/>
+            </a:ln>
+          </p:spPr>
+          <p:style>
+            <a:lnRef idx="2">
+              <a:schemeClr val="accent1">
+                <a:shade val="50000"/>
+              </a:schemeClr>
+            </a:lnRef>
+            <a:fillRef idx="1">
+              <a:schemeClr val="accent1"/>
+            </a:fillRef>
+            <a:effectRef idx="0">
+              <a:schemeClr val="accent1"/>
+            </a:effectRef>
+            <a:fontRef idx="minor">
+              <a:schemeClr val="lt1"/>
+            </a:fontRef>
+          </p:style>
+          <p:txBody>
+            <a:bodyPr rot="0" spcFirstLastPara="0" vert="horz" wrap="square" lIns="91440" tIns="45720" rIns="91440" bIns="45720" numCol="1" spcCol="0" rtlCol="0" fromWordArt="0" anchor="ctr" anchorCtr="0" forceAA="0" compatLnSpc="1">
+              <a:prstTxWarp prst="textNoShape">
+                <a:avLst/>
+              </a:prstTxWarp>
+              <a:noAutofit/>
+            </a:bodyPr>
+            <a:lstStyle/>
+            <a:p>
+              <a:pPr>
+                <a:lnSpc>
+                  <a:spcPct val="107000"/>
+                </a:lnSpc>
+                <a:spcAft>
+                  <a:spcPts val="800"/>
+                </a:spcAft>
+              </a:pPr>
+              <a:r>
+                <a:rPr lang="pt-BR" sz="1100">
+                  <a:effectLst/>
+                  <a:ea typeface="Calibri" panose="020F0502020204030204" pitchFamily="34" charset="0"/>
+                  <a:cs typeface="Times New Roman" panose="02020603050405020304" pitchFamily="18" charset="0"/>
+                </a:rPr>
+                <a:t> </a:t>
+              </a:r>
+            </a:p>
+          </p:txBody>
+        </p:sp>
+        <p:sp>
+          <p:nvSpPr>
+            <p:cNvPr id="92" name="CaixaDeTexto 91">
+              <a:extLst>
+                <a:ext uri="{FF2B5EF4-FFF2-40B4-BE49-F238E27FC236}">
+                  <a16:creationId xmlns:a16="http://schemas.microsoft.com/office/drawing/2014/main" id="{80862DB2-38CD-4EBC-AAFF-34460843D08B}"/>
+                </a:ext>
+              </a:extLst>
+            </p:cNvPr>
+            <p:cNvSpPr txBox="1"/>
+            <p:nvPr/>
+          </p:nvSpPr>
+          <p:spPr>
+            <a:xfrm>
+              <a:off x="4575236" y="2634825"/>
+              <a:ext cx="3338880" cy="498239"/>
+            </a:xfrm>
+            <a:prstGeom prst="rect">
+              <a:avLst/>
+            </a:prstGeom>
+            <a:noFill/>
+          </p:spPr>
+          <p:txBody>
+            <a:bodyPr wrap="square" rtlCol="0">
+              <a:spAutoFit/>
+            </a:bodyPr>
+            <a:lstStyle/>
+            <a:p>
+              <a:pPr algn="ctr"/>
+              <a:r>
+                <a:rPr lang="pt-BR" sz="2200" dirty="0">
+                  <a:solidFill>
+                    <a:schemeClr val="tx1">
+                      <a:lumMod val="85000"/>
+                      <a:lumOff val="15000"/>
+                    </a:schemeClr>
+                  </a:solidFill>
+                </a:rPr>
+                <a:t>Yuri de Jesus</a:t>
+              </a:r>
+            </a:p>
+          </p:txBody>
+        </p:sp>
+        <p:sp>
+          <p:nvSpPr>
+            <p:cNvPr id="93" name="CaixaDeTexto 92">
+              <a:extLst>
+                <a:ext uri="{FF2B5EF4-FFF2-40B4-BE49-F238E27FC236}">
+                  <a16:creationId xmlns:a16="http://schemas.microsoft.com/office/drawing/2014/main" id="{C2D799CE-5F8A-4440-B304-C7D16537CD3F}"/>
+                </a:ext>
+              </a:extLst>
+            </p:cNvPr>
+            <p:cNvSpPr txBox="1"/>
+            <p:nvPr/>
+          </p:nvSpPr>
+          <p:spPr>
+            <a:xfrm>
+              <a:off x="5705263" y="1858298"/>
+              <a:ext cx="2164494" cy="462651"/>
+            </a:xfrm>
+            <a:prstGeom prst="rect">
+              <a:avLst/>
+            </a:prstGeom>
+            <a:noFill/>
+          </p:spPr>
+          <p:txBody>
+            <a:bodyPr wrap="square" rtlCol="0">
+              <a:spAutoFit/>
+            </a:bodyPr>
+            <a:lstStyle/>
+            <a:p>
+              <a:pPr algn="ctr"/>
+              <a:r>
+                <a:rPr lang="pt-BR" sz="2000" b="1" dirty="0">
+                  <a:solidFill>
+                    <a:schemeClr val="bg1"/>
+                  </a:solidFill>
+                </a:rPr>
+                <a:t>Dev.Back- End</a:t>
+              </a:r>
+            </a:p>
+          </p:txBody>
+        </p:sp>
+      </p:grpSp>
+      <p:grpSp>
+        <p:nvGrpSpPr>
+          <p:cNvPr id="94" name="Agrupar 93">
+            <a:extLst>
+              <a:ext uri="{FF2B5EF4-FFF2-40B4-BE49-F238E27FC236}">
+                <a16:creationId xmlns:a16="http://schemas.microsoft.com/office/drawing/2014/main" id="{E3015141-665A-494D-AC8F-36C696D70310}"/>
+              </a:ext>
+            </a:extLst>
+          </p:cNvPr>
+          <p:cNvGrpSpPr/>
+          <p:nvPr/>
+        </p:nvGrpSpPr>
+        <p:grpSpPr>
+          <a:xfrm>
+            <a:off x="19318" y="4405511"/>
+            <a:ext cx="3038781" cy="1576196"/>
+            <a:chOff x="4487791" y="1310492"/>
+            <a:chExt cx="3513774" cy="1822572"/>
+          </a:xfrm>
+        </p:grpSpPr>
+        <p:sp>
+          <p:nvSpPr>
+            <p:cNvPr id="95" name="Retângulo 94">
+              <a:extLst>
+                <a:ext uri="{FF2B5EF4-FFF2-40B4-BE49-F238E27FC236}">
+                  <a16:creationId xmlns:a16="http://schemas.microsoft.com/office/drawing/2014/main" id="{B3A6EDBD-F861-4379-8838-B47A545BF4C6}"/>
+                </a:ext>
+              </a:extLst>
+            </p:cNvPr>
+            <p:cNvSpPr/>
+            <p:nvPr/>
+          </p:nvSpPr>
+          <p:spPr>
+            <a:xfrm>
+              <a:off x="4575237" y="1310492"/>
+              <a:ext cx="3338880" cy="1812535"/>
+            </a:xfrm>
+            <a:prstGeom prst="rect">
+              <a:avLst/>
+            </a:prstGeom>
+            <a:solidFill>
+              <a:srgbClr val="237DA2"/>
+            </a:solidFill>
+            <a:ln>
+              <a:noFill/>
+            </a:ln>
+          </p:spPr>
+          <p:style>
+            <a:lnRef idx="2">
+              <a:schemeClr val="accent1">
+                <a:shade val="50000"/>
+              </a:schemeClr>
+            </a:lnRef>
+            <a:fillRef idx="1">
+              <a:schemeClr val="accent1"/>
+            </a:fillRef>
+            <a:effectRef idx="0">
+              <a:schemeClr val="accent1"/>
+            </a:effectRef>
+            <a:fontRef idx="minor">
+              <a:schemeClr val="lt1"/>
+            </a:fontRef>
+          </p:style>
+          <p:txBody>
+            <a:bodyPr rot="0" spcFirstLastPara="0" vert="horz" wrap="square" lIns="91440" tIns="45720" rIns="91440" bIns="45720" numCol="1" spcCol="0" rtlCol="0" fromWordArt="0" anchor="ctr" anchorCtr="0" forceAA="0" compatLnSpc="1">
+              <a:prstTxWarp prst="textNoShape">
+                <a:avLst/>
+              </a:prstTxWarp>
+              <a:noAutofit/>
+            </a:bodyPr>
+            <a:lstStyle/>
+            <a:p>
+              <a:endParaRPr lang="pt-BR" dirty="0"/>
+            </a:p>
+          </p:txBody>
+        </p:sp>
+        <p:sp>
+          <p:nvSpPr>
+            <p:cNvPr id="96" name="Retângulo 95">
+              <a:extLst>
+                <a:ext uri="{FF2B5EF4-FFF2-40B4-BE49-F238E27FC236}">
+                  <a16:creationId xmlns:a16="http://schemas.microsoft.com/office/drawing/2014/main" id="{6FE7DE5C-CEAD-495A-A434-7D387005F5A5}"/>
+                </a:ext>
+              </a:extLst>
+            </p:cNvPr>
+            <p:cNvSpPr/>
+            <p:nvPr/>
+          </p:nvSpPr>
+          <p:spPr>
+            <a:xfrm>
+              <a:off x="4737411" y="1678298"/>
+              <a:ext cx="1076922" cy="1076921"/>
+            </a:xfrm>
+            <a:prstGeom prst="rect">
+              <a:avLst/>
+            </a:prstGeom>
+            <a:solidFill>
+              <a:schemeClr val="bg1"/>
+            </a:solidFill>
+            <a:ln>
+              <a:noFill/>
+            </a:ln>
+          </p:spPr>
+          <p:style>
+            <a:lnRef idx="2">
+              <a:schemeClr val="accent1">
+                <a:shade val="50000"/>
+              </a:schemeClr>
+            </a:lnRef>
+            <a:fillRef idx="1">
+              <a:schemeClr val="accent1"/>
+            </a:fillRef>
+            <a:effectRef idx="0">
+              <a:schemeClr val="accent1"/>
+            </a:effectRef>
+            <a:fontRef idx="minor">
+              <a:schemeClr val="lt1"/>
+            </a:fontRef>
+          </p:style>
+          <p:txBody>
+            <a:bodyPr rot="0" spcFirstLastPara="0" vert="horz" wrap="square" lIns="91440" tIns="45720" rIns="91440" bIns="45720" numCol="1" spcCol="0" rtlCol="0" fromWordArt="0" anchor="ctr" anchorCtr="0" forceAA="0" compatLnSpc="1">
+              <a:prstTxWarp prst="textNoShape">
+                <a:avLst/>
+              </a:prstTxWarp>
+              <a:noAutofit/>
+            </a:bodyPr>
+            <a:lstStyle/>
+            <a:p>
+              <a:endParaRPr lang="pt-BR"/>
+            </a:p>
+          </p:txBody>
+        </p:sp>
+        <p:sp>
+          <p:nvSpPr>
+            <p:cNvPr id="97" name="Retângulo 96">
+              <a:extLst>
+                <a:ext uri="{FF2B5EF4-FFF2-40B4-BE49-F238E27FC236}">
+                  <a16:creationId xmlns:a16="http://schemas.microsoft.com/office/drawing/2014/main" id="{90811631-6530-45FB-B5BE-932C7C7672EB}"/>
+                </a:ext>
+              </a:extLst>
+            </p:cNvPr>
+            <p:cNvSpPr/>
+            <p:nvPr/>
+          </p:nvSpPr>
+          <p:spPr>
+            <a:xfrm>
+              <a:off x="4487791" y="2700090"/>
+              <a:ext cx="3513774" cy="322228"/>
+            </a:xfrm>
+            <a:prstGeom prst="rect">
+              <a:avLst/>
+            </a:prstGeom>
+            <a:solidFill>
+              <a:schemeClr val="bg1"/>
+            </a:solidFill>
+            <a:ln>
+              <a:noFill/>
+            </a:ln>
+          </p:spPr>
+          <p:style>
+            <a:lnRef idx="2">
+              <a:schemeClr val="accent1">
+                <a:shade val="50000"/>
+              </a:schemeClr>
+            </a:lnRef>
+            <a:fillRef idx="1">
+              <a:schemeClr val="accent1"/>
+            </a:fillRef>
+            <a:effectRef idx="0">
+              <a:schemeClr val="accent1"/>
+            </a:effectRef>
+            <a:fontRef idx="minor">
+              <a:schemeClr val="lt1"/>
+            </a:fontRef>
+          </p:style>
+          <p:txBody>
+            <a:bodyPr rot="0" spcFirstLastPara="0" vert="horz" wrap="square" lIns="91440" tIns="45720" rIns="91440" bIns="45720" numCol="1" spcCol="0" rtlCol="0" fromWordArt="0" anchor="ctr" anchorCtr="0" forceAA="0" compatLnSpc="1">
+              <a:prstTxWarp prst="textNoShape">
+                <a:avLst/>
+              </a:prstTxWarp>
+              <a:noAutofit/>
+            </a:bodyPr>
+            <a:lstStyle/>
+            <a:p>
+              <a:pPr>
+                <a:lnSpc>
+                  <a:spcPct val="107000"/>
+                </a:lnSpc>
+                <a:spcAft>
+                  <a:spcPts val="800"/>
+                </a:spcAft>
+              </a:pPr>
+              <a:r>
+                <a:rPr lang="pt-BR" sz="1100">
+                  <a:effectLst/>
+                  <a:ea typeface="Calibri" panose="020F0502020204030204" pitchFamily="34" charset="0"/>
+                  <a:cs typeface="Times New Roman" panose="02020603050405020304" pitchFamily="18" charset="0"/>
+                </a:rPr>
+                <a:t> </a:t>
+              </a:r>
+            </a:p>
+          </p:txBody>
+        </p:sp>
+        <p:sp>
+          <p:nvSpPr>
+            <p:cNvPr id="98" name="CaixaDeTexto 97">
+              <a:extLst>
+                <a:ext uri="{FF2B5EF4-FFF2-40B4-BE49-F238E27FC236}">
+                  <a16:creationId xmlns:a16="http://schemas.microsoft.com/office/drawing/2014/main" id="{C0DD0560-5322-494C-8653-56A24B348B73}"/>
+                </a:ext>
+              </a:extLst>
+            </p:cNvPr>
+            <p:cNvSpPr txBox="1"/>
+            <p:nvPr/>
+          </p:nvSpPr>
+          <p:spPr>
+            <a:xfrm>
+              <a:off x="4575236" y="2634825"/>
+              <a:ext cx="3338880" cy="498239"/>
+            </a:xfrm>
+            <a:prstGeom prst="rect">
+              <a:avLst/>
+            </a:prstGeom>
+            <a:noFill/>
+          </p:spPr>
+          <p:txBody>
+            <a:bodyPr wrap="square" rtlCol="0">
+              <a:spAutoFit/>
+            </a:bodyPr>
+            <a:lstStyle/>
+            <a:p>
+              <a:pPr algn="ctr"/>
+              <a:r>
+                <a:rPr lang="pt-BR" sz="2200" dirty="0">
+                  <a:solidFill>
+                    <a:schemeClr val="tx1">
+                      <a:lumMod val="85000"/>
+                      <a:lumOff val="15000"/>
+                    </a:schemeClr>
+                  </a:solidFill>
+                </a:rPr>
+                <a:t> Raphael Moitinho</a:t>
+              </a:r>
+            </a:p>
+          </p:txBody>
+        </p:sp>
+        <p:sp>
+          <p:nvSpPr>
+            <p:cNvPr id="99" name="CaixaDeTexto 98">
+              <a:extLst>
+                <a:ext uri="{FF2B5EF4-FFF2-40B4-BE49-F238E27FC236}">
+                  <a16:creationId xmlns:a16="http://schemas.microsoft.com/office/drawing/2014/main" id="{FDF31298-CBDE-4E06-B5F8-69953256F3A4}"/>
+                </a:ext>
+              </a:extLst>
+            </p:cNvPr>
+            <p:cNvSpPr txBox="1"/>
+            <p:nvPr/>
+          </p:nvSpPr>
+          <p:spPr>
+            <a:xfrm>
+              <a:off x="5832873" y="1840278"/>
+              <a:ext cx="2099784" cy="462651"/>
+            </a:xfrm>
+            <a:prstGeom prst="rect">
+              <a:avLst/>
+            </a:prstGeom>
+            <a:noFill/>
+          </p:spPr>
+          <p:txBody>
+            <a:bodyPr wrap="square" rtlCol="0">
+              <a:spAutoFit/>
+            </a:bodyPr>
+            <a:lstStyle/>
+            <a:p>
+              <a:pPr algn="ctr"/>
+              <a:r>
+                <a:rPr lang="pt-BR" sz="2000" b="1" dirty="0">
+                  <a:solidFill>
+                    <a:schemeClr val="bg1"/>
+                  </a:solidFill>
+                </a:rPr>
+                <a:t>Dev. Front- End</a:t>
+              </a:r>
+            </a:p>
+          </p:txBody>
+        </p:sp>
+      </p:grpSp>
+      <p:grpSp>
+        <p:nvGrpSpPr>
+          <p:cNvPr id="100" name="Agrupar 99">
+            <a:extLst>
+              <a:ext uri="{FF2B5EF4-FFF2-40B4-BE49-F238E27FC236}">
+                <a16:creationId xmlns:a16="http://schemas.microsoft.com/office/drawing/2014/main" id="{CC6D2C6A-D54D-4BF7-B960-2313F8886517}"/>
+              </a:ext>
+            </a:extLst>
+          </p:cNvPr>
+          <p:cNvGrpSpPr/>
+          <p:nvPr/>
+        </p:nvGrpSpPr>
+        <p:grpSpPr>
+          <a:xfrm>
+            <a:off x="4960146" y="1231033"/>
+            <a:ext cx="3103405" cy="2871853"/>
+            <a:chOff x="4487791" y="-197728"/>
+            <a:chExt cx="3588499" cy="3320755"/>
+          </a:xfrm>
+        </p:grpSpPr>
+        <p:sp>
+          <p:nvSpPr>
+            <p:cNvPr id="101" name="Retângulo 100">
+              <a:extLst>
+                <a:ext uri="{FF2B5EF4-FFF2-40B4-BE49-F238E27FC236}">
+                  <a16:creationId xmlns:a16="http://schemas.microsoft.com/office/drawing/2014/main" id="{A658C65F-88AC-4D8D-8E0C-1B5B5DAFE9EA}"/>
+                </a:ext>
+              </a:extLst>
+            </p:cNvPr>
+            <p:cNvSpPr/>
+            <p:nvPr/>
+          </p:nvSpPr>
+          <p:spPr>
+            <a:xfrm>
+              <a:off x="4575237" y="1310492"/>
+              <a:ext cx="3338881" cy="1812535"/>
+            </a:xfrm>
+            <a:prstGeom prst="rect">
+              <a:avLst/>
+            </a:prstGeom>
+            <a:solidFill>
+              <a:srgbClr val="237DA2"/>
+            </a:solidFill>
+            <a:ln>
+              <a:noFill/>
+            </a:ln>
+          </p:spPr>
+          <p:style>
+            <a:lnRef idx="2">
+              <a:schemeClr val="accent1">
+                <a:shade val="50000"/>
+              </a:schemeClr>
+            </a:lnRef>
+            <a:fillRef idx="1">
+              <a:schemeClr val="accent1"/>
+            </a:fillRef>
+            <a:effectRef idx="0">
+              <a:schemeClr val="accent1"/>
+            </a:effectRef>
+            <a:fontRef idx="minor">
+              <a:schemeClr val="lt1"/>
+            </a:fontRef>
+          </p:style>
+          <p:txBody>
+            <a:bodyPr rot="0" spcFirstLastPara="0" vert="horz" wrap="square" lIns="91440" tIns="45720" rIns="91440" bIns="45720" numCol="1" spcCol="0" rtlCol="0" fromWordArt="0" anchor="ctr" anchorCtr="0" forceAA="0" compatLnSpc="1">
+              <a:prstTxWarp prst="textNoShape">
+                <a:avLst/>
+              </a:prstTxWarp>
+              <a:noAutofit/>
+            </a:bodyPr>
+            <a:lstStyle/>
+            <a:p>
+              <a:endParaRPr lang="pt-BR" dirty="0"/>
+            </a:p>
+          </p:txBody>
+        </p:sp>
+        <p:sp>
+          <p:nvSpPr>
+            <p:cNvPr id="102" name="Retângulo 101">
+              <a:extLst>
+                <a:ext uri="{FF2B5EF4-FFF2-40B4-BE49-F238E27FC236}">
+                  <a16:creationId xmlns:a16="http://schemas.microsoft.com/office/drawing/2014/main" id="{3AC565A8-50C1-470A-92BB-242FBC454C09}"/>
+                </a:ext>
+              </a:extLst>
+            </p:cNvPr>
+            <p:cNvSpPr/>
+            <p:nvPr/>
+          </p:nvSpPr>
+          <p:spPr>
+            <a:xfrm>
+              <a:off x="4737411" y="1678298"/>
+              <a:ext cx="1076922" cy="1076921"/>
+            </a:xfrm>
+            <a:prstGeom prst="rect">
+              <a:avLst/>
+            </a:prstGeom>
+            <a:solidFill>
+              <a:schemeClr val="bg1"/>
+            </a:solidFill>
+            <a:ln>
+              <a:noFill/>
+            </a:ln>
+          </p:spPr>
+          <p:style>
+            <a:lnRef idx="2">
+              <a:schemeClr val="accent1">
+                <a:shade val="50000"/>
+              </a:schemeClr>
+            </a:lnRef>
+            <a:fillRef idx="1">
+              <a:schemeClr val="accent1"/>
+            </a:fillRef>
+            <a:effectRef idx="0">
+              <a:schemeClr val="accent1"/>
+            </a:effectRef>
+            <a:fontRef idx="minor">
+              <a:schemeClr val="lt1"/>
+            </a:fontRef>
+          </p:style>
+          <p:txBody>
+            <a:bodyPr rot="0" spcFirstLastPara="0" vert="horz" wrap="square" lIns="91440" tIns="45720" rIns="91440" bIns="45720" numCol="1" spcCol="0" rtlCol="0" fromWordArt="0" anchor="ctr" anchorCtr="0" forceAA="0" compatLnSpc="1">
+              <a:prstTxWarp prst="textNoShape">
+                <a:avLst/>
+              </a:prstTxWarp>
+              <a:noAutofit/>
+            </a:bodyPr>
+            <a:lstStyle/>
+            <a:p>
+              <a:endParaRPr lang="pt-BR"/>
+            </a:p>
+          </p:txBody>
+        </p:sp>
+        <p:sp>
+          <p:nvSpPr>
+            <p:cNvPr id="103" name="Retângulo 102">
+              <a:extLst>
+                <a:ext uri="{FF2B5EF4-FFF2-40B4-BE49-F238E27FC236}">
+                  <a16:creationId xmlns:a16="http://schemas.microsoft.com/office/drawing/2014/main" id="{27537E10-C326-43D1-B970-B57CDD0D4772}"/>
+                </a:ext>
+              </a:extLst>
+            </p:cNvPr>
+            <p:cNvSpPr/>
+            <p:nvPr/>
+          </p:nvSpPr>
+          <p:spPr>
+            <a:xfrm>
+              <a:off x="4487791" y="2700090"/>
+              <a:ext cx="3513774" cy="322228"/>
+            </a:xfrm>
+            <a:prstGeom prst="rect">
+              <a:avLst/>
+            </a:prstGeom>
+            <a:solidFill>
+              <a:schemeClr val="bg1"/>
+            </a:solidFill>
+            <a:ln>
+              <a:noFill/>
+            </a:ln>
+          </p:spPr>
+          <p:style>
+            <a:lnRef idx="2">
+              <a:schemeClr val="accent1">
+                <a:shade val="50000"/>
+              </a:schemeClr>
+            </a:lnRef>
+            <a:fillRef idx="1">
+              <a:schemeClr val="accent1"/>
+            </a:fillRef>
+            <a:effectRef idx="0">
+              <a:schemeClr val="accent1"/>
+            </a:effectRef>
+            <a:fontRef idx="minor">
+              <a:schemeClr val="lt1"/>
+            </a:fontRef>
+          </p:style>
+          <p:txBody>
+            <a:bodyPr rot="0" spcFirstLastPara="0" vert="horz" wrap="square" lIns="91440" tIns="45720" rIns="91440" bIns="45720" numCol="1" spcCol="0" rtlCol="0" fromWordArt="0" anchor="ctr" anchorCtr="0" forceAA="0" compatLnSpc="1">
+              <a:prstTxWarp prst="textNoShape">
+                <a:avLst/>
+              </a:prstTxWarp>
+              <a:noAutofit/>
+            </a:bodyPr>
+            <a:lstStyle/>
+            <a:p>
+              <a:pPr>
+                <a:lnSpc>
+                  <a:spcPct val="107000"/>
+                </a:lnSpc>
+                <a:spcAft>
+                  <a:spcPts val="800"/>
+                </a:spcAft>
+              </a:pPr>
+              <a:r>
+                <a:rPr lang="pt-BR" sz="1100">
+                  <a:effectLst/>
+                  <a:ea typeface="Calibri" panose="020F0502020204030204" pitchFamily="34" charset="0"/>
+                  <a:cs typeface="Times New Roman" panose="02020603050405020304" pitchFamily="18" charset="0"/>
+                </a:rPr>
+                <a:t> </a:t>
+              </a:r>
+            </a:p>
+          </p:txBody>
+        </p:sp>
+        <p:sp>
+          <p:nvSpPr>
+            <p:cNvPr id="104" name="CaixaDeTexto 103">
+              <a:extLst>
+                <a:ext uri="{FF2B5EF4-FFF2-40B4-BE49-F238E27FC236}">
+                  <a16:creationId xmlns:a16="http://schemas.microsoft.com/office/drawing/2014/main" id="{38492C67-EA2A-494E-9D3B-49686F420ABD}"/>
+                </a:ext>
+              </a:extLst>
+            </p:cNvPr>
+            <p:cNvSpPr txBox="1"/>
+            <p:nvPr/>
+          </p:nvSpPr>
+          <p:spPr>
+            <a:xfrm>
+              <a:off x="4544352" y="2605577"/>
+              <a:ext cx="3338881" cy="498239"/>
+            </a:xfrm>
+            <a:prstGeom prst="rect">
+              <a:avLst/>
+            </a:prstGeom>
+            <a:noFill/>
+          </p:spPr>
+          <p:txBody>
+            <a:bodyPr wrap="square" rtlCol="0">
+              <a:spAutoFit/>
+            </a:bodyPr>
+            <a:lstStyle/>
+            <a:p>
+              <a:pPr algn="ctr"/>
+              <a:r>
+                <a:rPr lang="pt-BR" sz="2200" dirty="0">
+                  <a:solidFill>
+                    <a:schemeClr val="bg2">
+                      <a:lumMod val="25000"/>
+                    </a:schemeClr>
+                  </a:solidFill>
+                </a:rPr>
+                <a:t>Stefany Batista</a:t>
+              </a:r>
+            </a:p>
+          </p:txBody>
+        </p:sp>
+        <p:sp>
+          <p:nvSpPr>
+            <p:cNvPr id="105" name="CaixaDeTexto 104">
+              <a:extLst>
+                <a:ext uri="{FF2B5EF4-FFF2-40B4-BE49-F238E27FC236}">
+                  <a16:creationId xmlns:a16="http://schemas.microsoft.com/office/drawing/2014/main" id="{67E83BDF-8132-4BF4-89D9-87AF4185E0F7}"/>
+                </a:ext>
+              </a:extLst>
+            </p:cNvPr>
+            <p:cNvSpPr txBox="1"/>
+            <p:nvPr/>
+          </p:nvSpPr>
+          <p:spPr>
+            <a:xfrm>
+              <a:off x="5599575" y="-197728"/>
+              <a:ext cx="2476715" cy="462651"/>
+            </a:xfrm>
+            <a:prstGeom prst="rect">
+              <a:avLst/>
+            </a:prstGeom>
+            <a:noFill/>
+          </p:spPr>
+          <p:txBody>
+            <a:bodyPr wrap="square" rtlCol="0">
+              <a:spAutoFit/>
+            </a:bodyPr>
+            <a:lstStyle/>
+            <a:p>
+              <a:pPr algn="ctr"/>
+              <a:r>
+                <a:rPr lang="pt-BR" sz="2000" b="1" dirty="0">
+                  <a:solidFill>
+                    <a:schemeClr val="bg1"/>
+                  </a:solidFill>
+                </a:rPr>
+                <a:t>Product Owner</a:t>
+              </a:r>
+            </a:p>
+          </p:txBody>
+        </p:sp>
+      </p:grpSp>
+      <p:cxnSp>
+        <p:nvCxnSpPr>
+          <p:cNvPr id="8" name="Conector reto 7">
+            <a:extLst>
+              <a:ext uri="{FF2B5EF4-FFF2-40B4-BE49-F238E27FC236}">
+                <a16:creationId xmlns:a16="http://schemas.microsoft.com/office/drawing/2014/main" id="{7F6E00DE-C1A2-4777-B42E-19888A66D19B}"/>
+              </a:ext>
+            </a:extLst>
+          </p:cNvPr>
+          <p:cNvCxnSpPr>
+            <a:cxnSpLocks/>
+          </p:cNvCxnSpPr>
+          <p:nvPr/>
+        </p:nvCxnSpPr>
+        <p:spPr>
+          <a:xfrm>
+            <a:off x="1538706" y="4186890"/>
+            <a:ext cx="9152906" cy="23257"/>
+          </a:xfrm>
+          <a:prstGeom prst="line">
+            <a:avLst/>
+          </a:prstGeom>
+          <a:ln>
+            <a:solidFill>
+              <a:srgbClr val="7F0E31"/>
+            </a:solidFill>
+          </a:ln>
+        </p:spPr>
+        <p:style>
+          <a:lnRef idx="1">
+            <a:schemeClr val="accent1"/>
+          </a:lnRef>
+          <a:fillRef idx="0">
+            <a:schemeClr val="accent1"/>
+          </a:fillRef>
+          <a:effectRef idx="0">
+            <a:schemeClr val="accent1"/>
+          </a:effectRef>
+          <a:fontRef idx="minor">
+            <a:schemeClr val="tx1"/>
+          </a:fontRef>
+        </p:style>
+      </p:cxnSp>
+      <p:cxnSp>
+        <p:nvCxnSpPr>
+          <p:cNvPr id="109" name="Conector reto 108">
+            <a:extLst>
+              <a:ext uri="{FF2B5EF4-FFF2-40B4-BE49-F238E27FC236}">
+                <a16:creationId xmlns:a16="http://schemas.microsoft.com/office/drawing/2014/main" id="{63E79097-58D6-478E-9848-509A3F449EFF}"/>
+              </a:ext>
+            </a:extLst>
+          </p:cNvPr>
+          <p:cNvCxnSpPr>
+            <a:cxnSpLocks/>
+            <a:endCxn id="95" idx="0"/>
+          </p:cNvCxnSpPr>
+          <p:nvPr/>
+        </p:nvCxnSpPr>
+        <p:spPr>
+          <a:xfrm>
+            <a:off x="1538706" y="4180806"/>
+            <a:ext cx="2" cy="224705"/>
+          </a:xfrm>
+          <a:prstGeom prst="line">
+            <a:avLst/>
+          </a:prstGeom>
+          <a:ln>
+            <a:solidFill>
+              <a:srgbClr val="7F0E31"/>
+            </a:solidFill>
+          </a:ln>
+        </p:spPr>
+        <p:style>
+          <a:lnRef idx="1">
+            <a:schemeClr val="accent1"/>
+          </a:lnRef>
+          <a:fillRef idx="0">
+            <a:schemeClr val="accent1"/>
+          </a:fillRef>
+          <a:effectRef idx="0">
+            <a:schemeClr val="accent1"/>
+          </a:effectRef>
+          <a:fontRef idx="minor">
+            <a:schemeClr val="tx1"/>
+          </a:fontRef>
+        </p:style>
+      </p:cxnSp>
+      <p:cxnSp>
+        <p:nvCxnSpPr>
+          <p:cNvPr id="111" name="Conector reto 110">
+            <a:extLst>
+              <a:ext uri="{FF2B5EF4-FFF2-40B4-BE49-F238E27FC236}">
+                <a16:creationId xmlns:a16="http://schemas.microsoft.com/office/drawing/2014/main" id="{1886B8F9-72CD-49DE-B80C-E3DDB157950A}"/>
+              </a:ext>
+            </a:extLst>
+          </p:cNvPr>
+          <p:cNvCxnSpPr>
+            <a:cxnSpLocks/>
+          </p:cNvCxnSpPr>
+          <p:nvPr/>
+        </p:nvCxnSpPr>
+        <p:spPr>
+          <a:xfrm>
+            <a:off x="4586177" y="4203954"/>
+            <a:ext cx="2" cy="158707"/>
+          </a:xfrm>
+          <a:prstGeom prst="line">
+            <a:avLst/>
+          </a:prstGeom>
+          <a:ln>
+            <a:solidFill>
+              <a:srgbClr val="7F0E31"/>
+            </a:solidFill>
+          </a:ln>
+        </p:spPr>
+        <p:style>
+          <a:lnRef idx="1">
+            <a:schemeClr val="accent1"/>
+          </a:lnRef>
+          <a:fillRef idx="0">
+            <a:schemeClr val="accent1"/>
+          </a:fillRef>
+          <a:effectRef idx="0">
+            <a:schemeClr val="accent1"/>
+          </a:effectRef>
+          <a:fontRef idx="minor">
+            <a:schemeClr val="tx1"/>
+          </a:fontRef>
+        </p:style>
+      </p:cxnSp>
+      <p:sp>
+        <p:nvSpPr>
+          <p:cNvPr id="56" name="CaixaDeTexto 55">
+            <a:extLst>
+              <a:ext uri="{FF2B5EF4-FFF2-40B4-BE49-F238E27FC236}">
+                <a16:creationId xmlns:a16="http://schemas.microsoft.com/office/drawing/2014/main" id="{372917FB-330B-428B-9E24-70341D790084}"/>
+              </a:ext>
+            </a:extLst>
+          </p:cNvPr>
+          <p:cNvSpPr txBox="1"/>
+          <p:nvPr/>
+        </p:nvSpPr>
+        <p:spPr>
+          <a:xfrm>
+            <a:off x="3865082" y="3056465"/>
+            <a:ext cx="6255026" cy="400110"/>
+          </a:xfrm>
+          <a:prstGeom prst="rect">
+            <a:avLst/>
+          </a:prstGeom>
+          <a:noFill/>
+        </p:spPr>
+        <p:txBody>
+          <a:bodyPr wrap="square">
+            <a:spAutoFit/>
+          </a:bodyPr>
+          <a:lstStyle/>
+          <a:p>
+            <a:pPr algn="ctr"/>
+            <a:r>
+              <a:rPr lang="pt-BR" sz="2000" b="1" dirty="0">
+                <a:solidFill>
+                  <a:schemeClr val="bg1"/>
+                </a:solidFill>
+              </a:rPr>
+              <a:t>Scrum Master</a:t>
+            </a:r>
+          </a:p>
+        </p:txBody>
+      </p:sp>
+      <p:pic>
+        <p:nvPicPr>
+          <p:cNvPr id="24" name="Imagem 23" descr="Uma imagem contendo pessoa, mulher, janela, óculos&#10;&#10;Descrição gerada automaticamente">
+            <a:extLst>
+              <a:ext uri="{FF2B5EF4-FFF2-40B4-BE49-F238E27FC236}">
+                <a16:creationId xmlns:a16="http://schemas.microsoft.com/office/drawing/2014/main" id="{8E9895E8-2007-418B-A54C-C3CC77583E14}"/>
+              </a:ext>
+            </a:extLst>
+          </p:cNvPr>
+          <p:cNvPicPr>
+            <a:picLocks noChangeAspect="1"/>
+          </p:cNvPicPr>
+          <p:nvPr/>
+        </p:nvPicPr>
+        <p:blipFill>
+          <a:blip r:embed="rId2" cstate="print">
+            <a:extLst>
+              <a:ext uri="{28A0092B-C50C-407E-A947-70E740481C1C}">
+                <a14:useLocalDpi xmlns:a14="http://schemas.microsoft.com/office/drawing/2010/main" val="0"/>
+              </a:ext>
+            </a:extLst>
+          </a:blip>
+          <a:stretch>
+            <a:fillRect/>
+          </a:stretch>
+        </p:blipFill>
+        <p:spPr>
+          <a:xfrm>
+            <a:off x="6264590" y="4558574"/>
+            <a:ext cx="1032259" cy="1019097"/>
+          </a:xfrm>
+          <a:prstGeom prst="rect">
+            <a:avLst/>
+          </a:prstGeom>
+        </p:spPr>
+      </p:pic>
+      <p:pic>
+        <p:nvPicPr>
+          <p:cNvPr id="30" name="Imagem 29" descr="Homem em pé posando para foto na grama&#10;&#10;Descrição gerada automaticamente">
+            <a:extLst>
+              <a:ext uri="{FF2B5EF4-FFF2-40B4-BE49-F238E27FC236}">
+                <a16:creationId xmlns:a16="http://schemas.microsoft.com/office/drawing/2014/main" id="{B0CA94F4-568E-424E-91B6-8FC18E62F139}"/>
+              </a:ext>
+            </a:extLst>
+          </p:cNvPr>
+          <p:cNvPicPr>
+            <a:picLocks noChangeAspect="1"/>
+          </p:cNvPicPr>
+          <p:nvPr/>
+        </p:nvPicPr>
+        <p:blipFill>
+          <a:blip r:embed="rId3" cstate="print">
+            <a:extLst>
+              <a:ext uri="{28A0092B-C50C-407E-A947-70E740481C1C}">
+                <a14:useLocalDpi xmlns:a14="http://schemas.microsoft.com/office/drawing/2010/main" val="0"/>
+              </a:ext>
+            </a:extLst>
+          </a:blip>
+          <a:stretch>
+            <a:fillRect/>
+          </a:stretch>
+        </p:blipFill>
+        <p:spPr>
+          <a:xfrm>
+            <a:off x="5136196" y="928243"/>
+            <a:ext cx="1038676" cy="1034191"/>
+          </a:xfrm>
+          <a:prstGeom prst="rect">
+            <a:avLst/>
+          </a:prstGeom>
+        </p:spPr>
+      </p:pic>
+      <p:pic>
+        <p:nvPicPr>
+          <p:cNvPr id="32" name="Imagem 31" descr="Uma imagem contendo no interior, pessoa, celular, telefone&#10;&#10;Descrição gerada automaticamente">
+            <a:extLst>
+              <a:ext uri="{FF2B5EF4-FFF2-40B4-BE49-F238E27FC236}">
+                <a16:creationId xmlns:a16="http://schemas.microsoft.com/office/drawing/2014/main" id="{4BCAD6D2-2933-4275-8C02-00FA9BDB1B12}"/>
+              </a:ext>
+            </a:extLst>
+          </p:cNvPr>
+          <p:cNvPicPr>
+            <a:picLocks noChangeAspect="1"/>
+          </p:cNvPicPr>
+          <p:nvPr/>
+        </p:nvPicPr>
+        <p:blipFill>
+          <a:blip r:embed="rId4" cstate="print">
+            <a:extLst>
+              <a:ext uri="{28A0092B-C50C-407E-A947-70E740481C1C}">
+                <a14:useLocalDpi xmlns:a14="http://schemas.microsoft.com/office/drawing/2010/main" val="0"/>
+              </a:ext>
+            </a:extLst>
+          </a:blip>
+          <a:stretch>
+            <a:fillRect/>
+          </a:stretch>
+        </p:blipFill>
+        <p:spPr>
+          <a:xfrm>
+            <a:off x="9292093" y="4557069"/>
+            <a:ext cx="1032258" cy="1032258"/>
+          </a:xfrm>
+          <a:prstGeom prst="rect">
+            <a:avLst/>
+          </a:prstGeom>
+        </p:spPr>
+      </p:pic>
+      <p:pic>
+        <p:nvPicPr>
+          <p:cNvPr id="40" name="Imagem 39" descr="Pessoa com cabelo comprido&#10;&#10;Descrição gerada automaticamente">
+            <a:extLst>
+              <a:ext uri="{FF2B5EF4-FFF2-40B4-BE49-F238E27FC236}">
+                <a16:creationId xmlns:a16="http://schemas.microsoft.com/office/drawing/2014/main" id="{DB437936-25D9-4552-92DE-5E34BAF2DAAE}"/>
+              </a:ext>
+            </a:extLst>
+          </p:cNvPr>
+          <p:cNvPicPr>
+            <a:picLocks noChangeAspect="1"/>
+          </p:cNvPicPr>
+          <p:nvPr/>
+        </p:nvPicPr>
+        <p:blipFill>
+          <a:blip r:embed="rId5" cstate="print">
+            <a:extLst>
+              <a:ext uri="{28A0092B-C50C-407E-A947-70E740481C1C}">
+                <a14:useLocalDpi xmlns:a14="http://schemas.microsoft.com/office/drawing/2010/main" val="0"/>
+              </a:ext>
+            </a:extLst>
+          </a:blip>
+          <a:stretch>
+            <a:fillRect/>
+          </a:stretch>
+        </p:blipFill>
+        <p:spPr>
+          <a:xfrm>
+            <a:off x="5122477" y="2717788"/>
+            <a:ext cx="1066114" cy="1022974"/>
+          </a:xfrm>
+          <a:prstGeom prst="rect">
+            <a:avLst/>
+          </a:prstGeom>
+        </p:spPr>
+      </p:pic>
+      <p:sp>
+        <p:nvSpPr>
+          <p:cNvPr id="106" name="CaixaDeTexto 105">
+            <a:extLst>
+              <a:ext uri="{FF2B5EF4-FFF2-40B4-BE49-F238E27FC236}">
+                <a16:creationId xmlns:a16="http://schemas.microsoft.com/office/drawing/2014/main" id="{77BB7DB5-06B9-49BC-81AE-3F573C924353}"/>
+              </a:ext>
+            </a:extLst>
+          </p:cNvPr>
+          <p:cNvSpPr txBox="1"/>
+          <p:nvPr/>
+        </p:nvSpPr>
+        <p:spPr>
+          <a:xfrm>
+            <a:off x="9299561" y="4788204"/>
+            <a:ext cx="3756011" cy="400110"/>
+          </a:xfrm>
+          <a:prstGeom prst="rect">
+            <a:avLst/>
+          </a:prstGeom>
+          <a:noFill/>
+        </p:spPr>
+        <p:txBody>
+          <a:bodyPr wrap="square">
+            <a:spAutoFit/>
+          </a:bodyPr>
+          <a:lstStyle/>
+          <a:p>
+            <a:pPr algn="ctr"/>
+            <a:r>
+              <a:rPr lang="pt-BR" sz="2000" b="1" dirty="0">
+                <a:solidFill>
+                  <a:schemeClr val="bg1"/>
+                </a:solidFill>
+              </a:rPr>
+              <a:t>Dev.Back- End</a:t>
+            </a:r>
+          </a:p>
+        </p:txBody>
+      </p:sp>
+      <p:sp>
+        <p:nvSpPr>
+          <p:cNvPr id="107" name="CaixaDeTexto 106">
+            <a:extLst>
+              <a:ext uri="{FF2B5EF4-FFF2-40B4-BE49-F238E27FC236}">
+                <a16:creationId xmlns:a16="http://schemas.microsoft.com/office/drawing/2014/main" id="{A28646DD-397B-452D-AE40-2635D28D7720}"/>
+              </a:ext>
+            </a:extLst>
+          </p:cNvPr>
+          <p:cNvSpPr txBox="1"/>
+          <p:nvPr/>
+        </p:nvSpPr>
+        <p:spPr>
+          <a:xfrm>
+            <a:off x="7048836" y="4816587"/>
+            <a:ext cx="2270308" cy="400110"/>
+          </a:xfrm>
+          <a:prstGeom prst="rect">
+            <a:avLst/>
+          </a:prstGeom>
+          <a:noFill/>
+        </p:spPr>
+        <p:txBody>
+          <a:bodyPr wrap="square">
+            <a:spAutoFit/>
+          </a:bodyPr>
+          <a:lstStyle/>
+          <a:p>
+            <a:pPr algn="ctr"/>
+            <a:r>
+              <a:rPr lang="pt-BR" sz="2000" b="1" dirty="0">
+                <a:solidFill>
+                  <a:schemeClr val="bg1"/>
+                </a:solidFill>
+              </a:rPr>
+              <a:t>Dev. Front- End</a:t>
+            </a:r>
+          </a:p>
+        </p:txBody>
+      </p:sp>
+      <p:pic>
+        <p:nvPicPr>
+          <p:cNvPr id="44" name="Imagem 43" descr="Homem de terno e gravata&#10;&#10;Descrição gerada automaticamente">
+            <a:extLst>
+              <a:ext uri="{FF2B5EF4-FFF2-40B4-BE49-F238E27FC236}">
+                <a16:creationId xmlns:a16="http://schemas.microsoft.com/office/drawing/2014/main" id="{83107FBD-F5CC-43F2-8870-4808CBF2FFE1}"/>
+              </a:ext>
+            </a:extLst>
+          </p:cNvPr>
+          <p:cNvPicPr>
+            <a:picLocks noChangeAspect="1"/>
+          </p:cNvPicPr>
+          <p:nvPr/>
+        </p:nvPicPr>
+        <p:blipFill rotWithShape="1">
+          <a:blip r:embed="rId6" cstate="print">
+            <a:extLst>
+              <a:ext uri="{28A0092B-C50C-407E-A947-70E740481C1C}">
+                <a14:useLocalDpi xmlns:a14="http://schemas.microsoft.com/office/drawing/2010/main" val="0"/>
+              </a:ext>
+            </a:extLst>
+          </a:blip>
+          <a:srcRect t="28767" b="15846"/>
+          <a:stretch/>
+        </p:blipFill>
+        <p:spPr>
+          <a:xfrm>
+            <a:off x="223743" y="4575570"/>
+            <a:ext cx="1010415" cy="1031693"/>
+          </a:xfrm>
+          <a:prstGeom prst="rect">
+            <a:avLst/>
+          </a:prstGeom>
+        </p:spPr>
+      </p:pic>
+      <p:pic>
+        <p:nvPicPr>
+          <p:cNvPr id="48" name="Imagem 47" descr="Homem pousando para foto&#10;&#10;Descrição gerada automaticamente">
+            <a:extLst>
+              <a:ext uri="{FF2B5EF4-FFF2-40B4-BE49-F238E27FC236}">
+                <a16:creationId xmlns:a16="http://schemas.microsoft.com/office/drawing/2014/main" id="{3B1D4B2F-E70C-4644-82CB-0BB6F72D4B1E}"/>
+              </a:ext>
+            </a:extLst>
+          </p:cNvPr>
+          <p:cNvPicPr>
+            <a:picLocks noChangeAspect="1"/>
+          </p:cNvPicPr>
+          <p:nvPr/>
+        </p:nvPicPr>
+        <p:blipFill rotWithShape="1">
+          <a:blip r:embed="rId7" cstate="print">
+            <a:extLst>
+              <a:ext uri="{28A0092B-C50C-407E-A947-70E740481C1C}">
+                <a14:useLocalDpi xmlns:a14="http://schemas.microsoft.com/office/drawing/2010/main" val="0"/>
+              </a:ext>
+            </a:extLst>
+          </a:blip>
+          <a:srcRect t="20951"/>
+          <a:stretch/>
+        </p:blipFill>
+        <p:spPr>
+          <a:xfrm>
+            <a:off x="3303010" y="4557773"/>
+            <a:ext cx="985093" cy="1039354"/>
+          </a:xfrm>
+          <a:prstGeom prst="rect">
+            <a:avLst/>
+          </a:prstGeom>
+        </p:spPr>
+      </p:pic>
+      <p:sp>
+        <p:nvSpPr>
+          <p:cNvPr id="2" name="Seta: Pentágono 2">
+            <a:extLst>
+              <a:ext uri="{FF2B5EF4-FFF2-40B4-BE49-F238E27FC236}">
+                <a16:creationId xmlns:a16="http://schemas.microsoft.com/office/drawing/2014/main" id="{8D5E2365-E865-4746-B4C5-1FEBACFD8DE9}"/>
               </a:ext>
             </a:extLst>
           </p:cNvPr>
@@ -10286,369 +12563,10 @@
           </a:p>
         </p:txBody>
       </p:sp>
-      <p:pic>
-        <p:nvPicPr>
-          <p:cNvPr id="15" name="Imagem 14"/>
-          <p:cNvPicPr>
-            <a:picLocks noChangeAspect="1"/>
-          </p:cNvPicPr>
-          <p:nvPr/>
-        </p:nvPicPr>
-        <p:blipFill>
-          <a:blip r:embed="rId2" cstate="print">
-            <a:extLst>
-              <a:ext uri="{28A0092B-C50C-407E-A947-70E740481C1C}">
-                <a14:useLocalDpi xmlns:a14="http://schemas.microsoft.com/office/drawing/2010/main" val="0"/>
-              </a:ext>
-            </a:extLst>
-          </a:blip>
-          <a:stretch>
-            <a:fillRect/>
-          </a:stretch>
-        </p:blipFill>
-        <p:spPr>
-          <a:xfrm>
-            <a:off x="447698" y="3848100"/>
-            <a:ext cx="4797555" cy="3009900"/>
-          </a:xfrm>
-          <a:prstGeom prst="rect">
-            <a:avLst/>
-          </a:prstGeom>
-        </p:spPr>
-      </p:pic>
-      <p:sp>
-        <p:nvSpPr>
-          <p:cNvPr id="23" name="CaixaDeTexto 22"/>
-          <p:cNvSpPr txBox="1"/>
-          <p:nvPr/>
-        </p:nvSpPr>
-        <p:spPr>
-          <a:xfrm>
-            <a:off x="447698" y="1734275"/>
-            <a:ext cx="7658100" cy="830997"/>
-          </a:xfrm>
-          <a:prstGeom prst="rect">
-            <a:avLst/>
-          </a:prstGeom>
-          <a:noFill/>
-        </p:spPr>
-        <p:txBody>
-          <a:bodyPr wrap="square" rtlCol="0">
-            <a:spAutoFit/>
-          </a:bodyPr>
-          <a:lstStyle/>
-          <a:p>
-            <a:r>
-              <a:rPr lang="pt-BR" sz="2400" dirty="0">
-                <a:latin typeface="+mj-lt"/>
-              </a:rPr>
-              <a:t> Fazemos parte da MIT, criada para revolucionar e trazer novas maneira de lidar com o lixo.</a:t>
-            </a:r>
-          </a:p>
-        </p:txBody>
-      </p:sp>
-      <p:sp>
-        <p:nvSpPr>
-          <p:cNvPr id="59" name="Espaço Reservado para Conteúdo 2"/>
-          <p:cNvSpPr txBox="1">
-            <a:spLocks/>
-          </p:cNvSpPr>
-          <p:nvPr/>
-        </p:nvSpPr>
-        <p:spPr>
-          <a:xfrm>
-            <a:off x="5245252" y="3169797"/>
-            <a:ext cx="5387913" cy="3557573"/>
-          </a:xfrm>
-          <a:prstGeom prst="rect">
-            <a:avLst/>
-          </a:prstGeom>
-        </p:spPr>
-        <p:txBody>
-          <a:bodyPr numCol="1">
-            <a:normAutofit/>
-          </a:bodyPr>
-          <a:lstStyle>
-            <a:lvl1pPr marL="342900" indent="-342900" algn="l" defTabSz="457200" rtl="0" eaLnBrk="1" latinLnBrk="0" hangingPunct="1">
-              <a:spcBef>
-                <a:spcPts val="1000"/>
-              </a:spcBef>
-              <a:spcAft>
-                <a:spcPts val="0"/>
-              </a:spcAft>
-              <a:buClr>
-                <a:schemeClr val="accent1"/>
-              </a:buClr>
-              <a:buSzPct val="80000"/>
-              <a:buFont typeface="Wingdings 3" charset="2"/>
-              <a:buChar char=""/>
-              <a:defRPr sz="1800" kern="1200">
-                <a:solidFill>
-                  <a:schemeClr val="tx1">
-                    <a:lumMod val="75000"/>
-                    <a:lumOff val="25000"/>
-                  </a:schemeClr>
-                </a:solidFill>
-                <a:latin typeface="+mn-lt"/>
-                <a:ea typeface="+mn-ea"/>
-                <a:cs typeface="+mn-cs"/>
-              </a:defRPr>
-            </a:lvl1pPr>
-            <a:lvl2pPr marL="742950" indent="-285750" algn="l" defTabSz="457200" rtl="0" eaLnBrk="1" latinLnBrk="0" hangingPunct="1">
-              <a:spcBef>
-                <a:spcPts val="1000"/>
-              </a:spcBef>
-              <a:spcAft>
-                <a:spcPts val="0"/>
-              </a:spcAft>
-              <a:buClr>
-                <a:schemeClr val="accent1"/>
-              </a:buClr>
-              <a:buSzPct val="80000"/>
-              <a:buFont typeface="Wingdings 3" charset="2"/>
-              <a:buChar char=""/>
-              <a:defRPr sz="1600" kern="1200">
-                <a:solidFill>
-                  <a:schemeClr val="tx1">
-                    <a:lumMod val="75000"/>
-                    <a:lumOff val="25000"/>
-                  </a:schemeClr>
-                </a:solidFill>
-                <a:latin typeface="+mn-lt"/>
-                <a:ea typeface="+mn-ea"/>
-                <a:cs typeface="+mn-cs"/>
-              </a:defRPr>
-            </a:lvl2pPr>
-            <a:lvl3pPr marL="1143000" indent="-228600" algn="l" defTabSz="457200" rtl="0" eaLnBrk="1" latinLnBrk="0" hangingPunct="1">
-              <a:spcBef>
-                <a:spcPts val="1000"/>
-              </a:spcBef>
-              <a:spcAft>
-                <a:spcPts val="0"/>
-              </a:spcAft>
-              <a:buClr>
-                <a:schemeClr val="accent1"/>
-              </a:buClr>
-              <a:buSzPct val="80000"/>
-              <a:buFont typeface="Wingdings 3" charset="2"/>
-              <a:buChar char=""/>
-              <a:defRPr sz="1400" kern="1200">
-                <a:solidFill>
-                  <a:schemeClr val="tx1">
-                    <a:lumMod val="75000"/>
-                    <a:lumOff val="25000"/>
-                  </a:schemeClr>
-                </a:solidFill>
-                <a:latin typeface="+mn-lt"/>
-                <a:ea typeface="+mn-ea"/>
-                <a:cs typeface="+mn-cs"/>
-              </a:defRPr>
-            </a:lvl3pPr>
-            <a:lvl4pPr marL="1600200" indent="-228600" algn="l" defTabSz="457200" rtl="0" eaLnBrk="1" latinLnBrk="0" hangingPunct="1">
-              <a:spcBef>
-                <a:spcPts val="1000"/>
-              </a:spcBef>
-              <a:spcAft>
-                <a:spcPts val="0"/>
-              </a:spcAft>
-              <a:buClr>
-                <a:schemeClr val="accent1"/>
-              </a:buClr>
-              <a:buSzPct val="80000"/>
-              <a:buFont typeface="Wingdings 3" charset="2"/>
-              <a:buChar char=""/>
-              <a:defRPr sz="1200" kern="1200">
-                <a:solidFill>
-                  <a:schemeClr val="tx1">
-                    <a:lumMod val="75000"/>
-                    <a:lumOff val="25000"/>
-                  </a:schemeClr>
-                </a:solidFill>
-                <a:latin typeface="+mn-lt"/>
-                <a:ea typeface="+mn-ea"/>
-                <a:cs typeface="+mn-cs"/>
-              </a:defRPr>
-            </a:lvl4pPr>
-            <a:lvl5pPr marL="2057400" indent="-228600" algn="l" defTabSz="457200" rtl="0" eaLnBrk="1" latinLnBrk="0" hangingPunct="1">
-              <a:spcBef>
-                <a:spcPts val="1000"/>
-              </a:spcBef>
-              <a:spcAft>
-                <a:spcPts val="0"/>
-              </a:spcAft>
-              <a:buClr>
-                <a:schemeClr val="accent1"/>
-              </a:buClr>
-              <a:buSzPct val="80000"/>
-              <a:buFont typeface="Wingdings 3" charset="2"/>
-              <a:buChar char=""/>
-              <a:defRPr sz="1200" kern="1200">
-                <a:solidFill>
-                  <a:schemeClr val="tx1">
-                    <a:lumMod val="75000"/>
-                    <a:lumOff val="25000"/>
-                  </a:schemeClr>
-                </a:solidFill>
-                <a:latin typeface="+mn-lt"/>
-                <a:ea typeface="+mn-ea"/>
-                <a:cs typeface="+mn-cs"/>
-              </a:defRPr>
-            </a:lvl5pPr>
-            <a:lvl6pPr marL="2514600" indent="-228600" algn="l" defTabSz="457200" rtl="0" eaLnBrk="1" latinLnBrk="0" hangingPunct="1">
-              <a:spcBef>
-                <a:spcPts val="1000"/>
-              </a:spcBef>
-              <a:spcAft>
-                <a:spcPts val="0"/>
-              </a:spcAft>
-              <a:buClr>
-                <a:schemeClr val="accent1"/>
-              </a:buClr>
-              <a:buSzPct val="80000"/>
-              <a:buFont typeface="Wingdings 3" charset="2"/>
-              <a:buChar char=""/>
-              <a:defRPr sz="1200" kern="1200">
-                <a:solidFill>
-                  <a:schemeClr val="tx1">
-                    <a:lumMod val="75000"/>
-                    <a:lumOff val="25000"/>
-                  </a:schemeClr>
-                </a:solidFill>
-                <a:latin typeface="+mn-lt"/>
-                <a:ea typeface="+mn-ea"/>
-                <a:cs typeface="+mn-cs"/>
-              </a:defRPr>
-            </a:lvl6pPr>
-            <a:lvl7pPr marL="2971800" indent="-228600" algn="l" defTabSz="457200" rtl="0" eaLnBrk="1" latinLnBrk="0" hangingPunct="1">
-              <a:spcBef>
-                <a:spcPts val="1000"/>
-              </a:spcBef>
-              <a:spcAft>
-                <a:spcPts val="0"/>
-              </a:spcAft>
-              <a:buClr>
-                <a:schemeClr val="accent1"/>
-              </a:buClr>
-              <a:buSzPct val="80000"/>
-              <a:buFont typeface="Wingdings 3" charset="2"/>
-              <a:buChar char=""/>
-              <a:defRPr sz="1200" kern="1200">
-                <a:solidFill>
-                  <a:schemeClr val="tx1">
-                    <a:lumMod val="75000"/>
-                    <a:lumOff val="25000"/>
-                  </a:schemeClr>
-                </a:solidFill>
-                <a:latin typeface="+mn-lt"/>
-                <a:ea typeface="+mn-ea"/>
-                <a:cs typeface="+mn-cs"/>
-              </a:defRPr>
-            </a:lvl7pPr>
-            <a:lvl8pPr marL="3429000" indent="-228600" algn="l" defTabSz="457200" rtl="0" eaLnBrk="1" latinLnBrk="0" hangingPunct="1">
-              <a:spcBef>
-                <a:spcPts val="1000"/>
-              </a:spcBef>
-              <a:spcAft>
-                <a:spcPts val="0"/>
-              </a:spcAft>
-              <a:buClr>
-                <a:schemeClr val="accent1"/>
-              </a:buClr>
-              <a:buSzPct val="80000"/>
-              <a:buFont typeface="Wingdings 3" charset="2"/>
-              <a:buChar char=""/>
-              <a:defRPr sz="1200" kern="1200">
-                <a:solidFill>
-                  <a:schemeClr val="tx1">
-                    <a:lumMod val="75000"/>
-                    <a:lumOff val="25000"/>
-                  </a:schemeClr>
-                </a:solidFill>
-                <a:latin typeface="+mn-lt"/>
-                <a:ea typeface="+mn-ea"/>
-                <a:cs typeface="+mn-cs"/>
-              </a:defRPr>
-            </a:lvl8pPr>
-            <a:lvl9pPr marL="3886200" indent="-228600" algn="l" defTabSz="457200" rtl="0" eaLnBrk="1" latinLnBrk="0" hangingPunct="1">
-              <a:spcBef>
-                <a:spcPts val="1000"/>
-              </a:spcBef>
-              <a:spcAft>
-                <a:spcPts val="0"/>
-              </a:spcAft>
-              <a:buClr>
-                <a:schemeClr val="accent1"/>
-              </a:buClr>
-              <a:buSzPct val="80000"/>
-              <a:buFont typeface="Wingdings 3" charset="2"/>
-              <a:buChar char=""/>
-              <a:defRPr sz="1200" kern="1200">
-                <a:solidFill>
-                  <a:schemeClr val="tx1">
-                    <a:lumMod val="75000"/>
-                    <a:lumOff val="25000"/>
-                  </a:schemeClr>
-                </a:solidFill>
-                <a:latin typeface="+mn-lt"/>
-                <a:ea typeface="+mn-ea"/>
-                <a:cs typeface="+mn-cs"/>
-              </a:defRPr>
-            </a:lvl9pPr>
-          </a:lstStyle>
-          <a:p>
-            <a:r>
-              <a:rPr lang="pt-BR" altLang="pt-BR" sz="2800" dirty="0">
-                <a:latin typeface="+mj-lt"/>
-              </a:rPr>
-              <a:t>Bruno Sampaio Santana</a:t>
-            </a:r>
-          </a:p>
-          <a:p>
-            <a:r>
-              <a:rPr lang="pt-BR" altLang="pt-BR" sz="2800" dirty="0">
-                <a:latin typeface="+mj-lt"/>
-              </a:rPr>
-              <a:t>Gabriel Bezerra Pinheiro</a:t>
-            </a:r>
-          </a:p>
-          <a:p>
-            <a:r>
-              <a:rPr lang="pt-BR" altLang="pt-BR" sz="2800" dirty="0">
-                <a:latin typeface="+mj-lt"/>
-              </a:rPr>
-              <a:t>Graziela Batista De Lucena Lima</a:t>
-            </a:r>
-          </a:p>
-          <a:p>
-            <a:r>
-              <a:rPr lang="pt-BR" altLang="pt-BR" sz="2800" dirty="0">
-                <a:latin typeface="+mj-lt"/>
-              </a:rPr>
-              <a:t>Raphael De Oliveira Moitinho</a:t>
-            </a:r>
-          </a:p>
-          <a:p>
-            <a:r>
-              <a:rPr lang="pt-BR" altLang="pt-BR" sz="2800" dirty="0">
-                <a:latin typeface="+mj-lt"/>
-              </a:rPr>
-              <a:t>Stefany Batista De Lima Silva</a:t>
-            </a:r>
-          </a:p>
-          <a:p>
-            <a:r>
-              <a:rPr lang="pt-BR" altLang="pt-BR" sz="2800" dirty="0">
-                <a:latin typeface="+mj-lt"/>
-              </a:rPr>
-              <a:t>Yuri De Jesus Morais Vedovate</a:t>
-            </a:r>
-          </a:p>
-        </p:txBody>
-      </p:sp>
     </p:spTree>
     <p:extLst>
       <p:ext uri="{BB962C8B-B14F-4D97-AF65-F5344CB8AC3E}">
-        <p14:creationId xmlns:p14="http://schemas.microsoft.com/office/powerpoint/2010/main" val="673680471"/>
+        <p14:creationId xmlns:p14="http://schemas.microsoft.com/office/powerpoint/2010/main" val="74437588"/>
       </p:ext>
     </p:extLst>
   </p:cSld>

</xml_diff>

<commit_message>
Slide quem somos atualizado
</commit_message>
<xml_diff>
--- a/apresentação/MIT PPT (Projeto 2.0).pptx
+++ b/apresentação/MIT PPT (Projeto 2.0).pptx
@@ -12287,10 +12287,10 @@
       </p:pic>
       <p:pic>
         <p:nvPicPr>
-          <p:cNvPr id="32" name="Imagem 31" descr="Uma imagem contendo no interior, pessoa, celular, telefone&#10;&#10;Descrição gerada automaticamente">
+          <p:cNvPr id="40" name="Imagem 39" descr="Pessoa com cabelo comprido&#10;&#10;Descrição gerada automaticamente">
             <a:extLst>
               <a:ext uri="{FF2B5EF4-FFF2-40B4-BE49-F238E27FC236}">
-                <a16:creationId xmlns:a16="http://schemas.microsoft.com/office/drawing/2014/main" id="{4BCAD6D2-2933-4275-8C02-00FA9BDB1B12}"/>
+                <a16:creationId xmlns:a16="http://schemas.microsoft.com/office/drawing/2014/main" id="{DB437936-25D9-4552-92DE-5E34BAF2DAAE}"/>
               </a:ext>
             </a:extLst>
           </p:cNvPr>
@@ -12313,42 +12313,6 @@
         </p:blipFill>
         <p:spPr>
           <a:xfrm>
-            <a:off x="9292093" y="4557069"/>
-            <a:ext cx="1032258" cy="1032258"/>
-          </a:xfrm>
-          <a:prstGeom prst="rect">
-            <a:avLst/>
-          </a:prstGeom>
-        </p:spPr>
-      </p:pic>
-      <p:pic>
-        <p:nvPicPr>
-          <p:cNvPr id="40" name="Imagem 39" descr="Pessoa com cabelo comprido&#10;&#10;Descrição gerada automaticamente">
-            <a:extLst>
-              <a:ext uri="{FF2B5EF4-FFF2-40B4-BE49-F238E27FC236}">
-                <a16:creationId xmlns:a16="http://schemas.microsoft.com/office/drawing/2014/main" id="{DB437936-25D9-4552-92DE-5E34BAF2DAAE}"/>
-              </a:ext>
-            </a:extLst>
-          </p:cNvPr>
-          <p:cNvPicPr>
-            <a:picLocks noChangeAspect="1"/>
-          </p:cNvPicPr>
-          <p:nvPr/>
-        </p:nvPicPr>
-        <p:blipFill>
-          <a:blip r:embed="rId5" cstate="print">
-            <a:extLst>
-              <a:ext uri="{28A0092B-C50C-407E-A947-70E740481C1C}">
-                <a14:useLocalDpi xmlns:a14="http://schemas.microsoft.com/office/drawing/2010/main" val="0"/>
-              </a:ext>
-            </a:extLst>
-          </a:blip>
-          <a:stretch>
-            <a:fillRect/>
-          </a:stretch>
-        </p:blipFill>
-        <p:spPr>
-          <a:xfrm>
             <a:off x="5122477" y="2717788"/>
             <a:ext cx="1066114" cy="1022974"/>
           </a:xfrm>
@@ -12452,7 +12416,7 @@
           <p:nvPr/>
         </p:nvPicPr>
         <p:blipFill rotWithShape="1">
-          <a:blip r:embed="rId6" cstate="print">
+          <a:blip r:embed="rId5" cstate="print">
             <a:extLst>
               <a:ext uri="{28A0092B-C50C-407E-A947-70E740481C1C}">
                 <a14:useLocalDpi xmlns:a14="http://schemas.microsoft.com/office/drawing/2010/main" val="0"/>
@@ -12487,7 +12451,7 @@
           <p:nvPr/>
         </p:nvPicPr>
         <p:blipFill rotWithShape="1">
-          <a:blip r:embed="rId7" cstate="print">
+          <a:blip r:embed="rId6" cstate="print">
             <a:extLst>
               <a:ext uri="{28A0092B-C50C-407E-A947-70E740481C1C}">
                 <a14:useLocalDpi xmlns:a14="http://schemas.microsoft.com/office/drawing/2010/main" val="0"/>
@@ -12563,6 +12527,41 @@
           </a:p>
         </p:txBody>
       </p:sp>
+      <p:pic>
+        <p:nvPicPr>
+          <p:cNvPr id="5" name="Imagem 4" descr="Homem segurando celular em frente ao espelho&#10;&#10;Descrição gerada automaticamente">
+            <a:extLst>
+              <a:ext uri="{FF2B5EF4-FFF2-40B4-BE49-F238E27FC236}">
+                <a16:creationId xmlns:a16="http://schemas.microsoft.com/office/drawing/2014/main" id="{9F1D29D6-043E-4BE0-B28F-5C19004DC154}"/>
+              </a:ext>
+            </a:extLst>
+          </p:cNvPr>
+          <p:cNvPicPr>
+            <a:picLocks noChangeAspect="1"/>
+          </p:cNvPicPr>
+          <p:nvPr/>
+        </p:nvPicPr>
+        <p:blipFill rotWithShape="1">
+          <a:blip r:embed="rId7" cstate="print">
+            <a:extLst>
+              <a:ext uri="{28A0092B-C50C-407E-A947-70E740481C1C}">
+                <a14:useLocalDpi xmlns:a14="http://schemas.microsoft.com/office/drawing/2010/main" val="0"/>
+              </a:ext>
+            </a:extLst>
+          </a:blip>
+          <a:srcRect t="20690" r="16939"/>
+          <a:stretch/>
+        </p:blipFill>
+        <p:spPr>
+          <a:xfrm>
+            <a:off x="9256357" y="4550502"/>
+            <a:ext cx="1103730" cy="1053896"/>
+          </a:xfrm>
+          <a:prstGeom prst="rect">
+            <a:avLst/>
+          </a:prstGeom>
+        </p:spPr>
+      </p:pic>
     </p:spTree>
     <p:extLst>
       <p:ext uri="{BB962C8B-B14F-4D97-AF65-F5344CB8AC3E}">

</xml_diff>

<commit_message>
PPT com novo HLD
</commit_message>
<xml_diff>
--- a/apresentação/MIT PPT (Projeto 2.0).pptx
+++ b/apresentação/MIT PPT (Projeto 2.0).pptx
@@ -282,7 +282,7 @@
           <a:p>
             <a:fld id="{4132B5A0-3D7C-4A8B-9857-D57DB7BEA661}" type="datetimeFigureOut">
               <a:rPr lang="pt-BR" smtClean="0"/>
-              <a:t>06/05/2020</a:t>
+              <a:t>07/05/2020</a:t>
             </a:fld>
             <a:endParaRPr lang="pt-BR"/>
           </a:p>
@@ -1271,7 +1271,7 @@
           <a:p>
             <a:fld id="{51C1A2F9-5E2E-41AF-8CA8-6F6A8CA531AC}" type="datetimeFigureOut">
               <a:rPr lang="pt-BR" smtClean="0"/>
-              <a:t>06/05/2020</a:t>
+              <a:t>07/05/2020</a:t>
             </a:fld>
             <a:endParaRPr lang="pt-BR"/>
           </a:p>
@@ -1522,7 +1522,7 @@
           <a:p>
             <a:fld id="{51C1A2F9-5E2E-41AF-8CA8-6F6A8CA531AC}" type="datetimeFigureOut">
               <a:rPr lang="pt-BR" smtClean="0"/>
-              <a:t>06/05/2020</a:t>
+              <a:t>07/05/2020</a:t>
             </a:fld>
             <a:endParaRPr lang="pt-BR"/>
           </a:p>
@@ -1836,7 +1836,7 @@
           <a:p>
             <a:fld id="{51C1A2F9-5E2E-41AF-8CA8-6F6A8CA531AC}" type="datetimeFigureOut">
               <a:rPr lang="pt-BR" smtClean="0"/>
-              <a:t>06/05/2020</a:t>
+              <a:t>07/05/2020</a:t>
             </a:fld>
             <a:endParaRPr lang="pt-BR"/>
           </a:p>
@@ -2177,7 +2177,7 @@
           <a:p>
             <a:fld id="{51C1A2F9-5E2E-41AF-8CA8-6F6A8CA531AC}" type="datetimeFigureOut">
               <a:rPr lang="pt-BR" smtClean="0"/>
-              <a:t>06/05/2020</a:t>
+              <a:t>07/05/2020</a:t>
             </a:fld>
             <a:endParaRPr lang="pt-BR"/>
           </a:p>
@@ -2491,7 +2491,7 @@
           <a:p>
             <a:fld id="{51C1A2F9-5E2E-41AF-8CA8-6F6A8CA531AC}" type="datetimeFigureOut">
               <a:rPr lang="pt-BR" smtClean="0"/>
-              <a:t>06/05/2020</a:t>
+              <a:t>07/05/2020</a:t>
             </a:fld>
             <a:endParaRPr lang="pt-BR"/>
           </a:p>
@@ -2884,7 +2884,7 @@
           <a:p>
             <a:fld id="{51C1A2F9-5E2E-41AF-8CA8-6F6A8CA531AC}" type="datetimeFigureOut">
               <a:rPr lang="pt-BR" smtClean="0"/>
-              <a:t>06/05/2020</a:t>
+              <a:t>07/05/2020</a:t>
             </a:fld>
             <a:endParaRPr lang="pt-BR"/>
           </a:p>
@@ -3054,7 +3054,7 @@
           <a:p>
             <a:fld id="{51C1A2F9-5E2E-41AF-8CA8-6F6A8CA531AC}" type="datetimeFigureOut">
               <a:rPr lang="pt-BR" smtClean="0"/>
-              <a:t>06/05/2020</a:t>
+              <a:t>07/05/2020</a:t>
             </a:fld>
             <a:endParaRPr lang="pt-BR"/>
           </a:p>
@@ -3234,7 +3234,7 @@
           <a:p>
             <a:fld id="{51C1A2F9-5E2E-41AF-8CA8-6F6A8CA531AC}" type="datetimeFigureOut">
               <a:rPr lang="pt-BR" smtClean="0"/>
-              <a:t>06/05/2020</a:t>
+              <a:t>07/05/2020</a:t>
             </a:fld>
             <a:endParaRPr lang="pt-BR"/>
           </a:p>
@@ -3393,7 +3393,7 @@
           <a:p>
             <a:fld id="{51C1A2F9-5E2E-41AF-8CA8-6F6A8CA531AC}" type="datetimeFigureOut">
               <a:rPr lang="pt-BR" smtClean="0"/>
-              <a:t>06/05/2020</a:t>
+              <a:t>07/05/2020</a:t>
             </a:fld>
             <a:endParaRPr lang="pt-BR"/>
           </a:p>
@@ -3550,7 +3550,7 @@
           <a:p>
             <a:fld id="{51C1A2F9-5E2E-41AF-8CA8-6F6A8CA531AC}" type="datetimeFigureOut">
               <a:rPr lang="pt-BR" smtClean="0"/>
-              <a:t>06/05/2020</a:t>
+              <a:t>07/05/2020</a:t>
             </a:fld>
             <a:endParaRPr lang="pt-BR"/>
           </a:p>
@@ -3691,7 +3691,7 @@
           <a:p>
             <a:fld id="{51C1A2F9-5E2E-41AF-8CA8-6F6A8CA531AC}" type="datetimeFigureOut">
               <a:rPr lang="pt-BR" smtClean="0"/>
-              <a:t>06/05/2020</a:t>
+              <a:t>07/05/2020</a:t>
             </a:fld>
             <a:endParaRPr lang="pt-BR"/>
           </a:p>
@@ -3879,7 +3879,7 @@
           <a:p>
             <a:fld id="{51C1A2F9-5E2E-41AF-8CA8-6F6A8CA531AC}" type="datetimeFigureOut">
               <a:rPr lang="pt-BR" smtClean="0"/>
-              <a:t>06/05/2020</a:t>
+              <a:t>07/05/2020</a:t>
             </a:fld>
             <a:endParaRPr lang="pt-BR"/>
           </a:p>
@@ -4008,7 +4008,7 @@
           <a:p>
             <a:fld id="{51C1A2F9-5E2E-41AF-8CA8-6F6A8CA531AC}" type="datetimeFigureOut">
               <a:rPr lang="pt-BR" smtClean="0"/>
-              <a:t>06/05/2020</a:t>
+              <a:t>07/05/2020</a:t>
             </a:fld>
             <a:endParaRPr lang="pt-BR"/>
           </a:p>
@@ -4267,7 +4267,7 @@
           <a:p>
             <a:fld id="{51C1A2F9-5E2E-41AF-8CA8-6F6A8CA531AC}" type="datetimeFigureOut">
               <a:rPr lang="pt-BR" smtClean="0"/>
-              <a:t>06/05/2020</a:t>
+              <a:t>07/05/2020</a:t>
             </a:fld>
             <a:endParaRPr lang="pt-BR"/>
           </a:p>
@@ -4499,7 +4499,7 @@
           <a:p>
             <a:fld id="{51C1A2F9-5E2E-41AF-8CA8-6F6A8CA531AC}" type="datetimeFigureOut">
               <a:rPr lang="pt-BR" smtClean="0"/>
-              <a:t>06/05/2020</a:t>
+              <a:t>07/05/2020</a:t>
             </a:fld>
             <a:endParaRPr lang="pt-BR"/>
           </a:p>
@@ -4873,7 +4873,7 @@
           <a:p>
             <a:fld id="{51C1A2F9-5E2E-41AF-8CA8-6F6A8CA531AC}" type="datetimeFigureOut">
               <a:rPr lang="pt-BR" smtClean="0"/>
-              <a:t>06/05/2020</a:t>
+              <a:t>07/05/2020</a:t>
             </a:fld>
             <a:endParaRPr lang="pt-BR"/>
           </a:p>
@@ -4996,7 +4996,7 @@
           <a:p>
             <a:fld id="{51C1A2F9-5E2E-41AF-8CA8-6F6A8CA531AC}" type="datetimeFigureOut">
               <a:rPr lang="pt-BR" smtClean="0"/>
-              <a:t>06/05/2020</a:t>
+              <a:t>07/05/2020</a:t>
             </a:fld>
             <a:endParaRPr lang="pt-BR"/>
           </a:p>
@@ -5091,7 +5091,7 @@
           <a:p>
             <a:fld id="{51C1A2F9-5E2E-41AF-8CA8-6F6A8CA531AC}" type="datetimeFigureOut">
               <a:rPr lang="pt-BR" smtClean="0"/>
-              <a:t>06/05/2020</a:t>
+              <a:t>07/05/2020</a:t>
             </a:fld>
             <a:endParaRPr lang="pt-BR"/>
           </a:p>
@@ -5346,7 +5346,7 @@
           <a:p>
             <a:fld id="{51C1A2F9-5E2E-41AF-8CA8-6F6A8CA531AC}" type="datetimeFigureOut">
               <a:rPr lang="pt-BR" smtClean="0"/>
-              <a:t>06/05/2020</a:t>
+              <a:t>07/05/2020</a:t>
             </a:fld>
             <a:endParaRPr lang="pt-BR"/>
           </a:p>
@@ -5609,7 +5609,7 @@
           <a:p>
             <a:fld id="{51C1A2F9-5E2E-41AF-8CA8-6F6A8CA531AC}" type="datetimeFigureOut">
               <a:rPr lang="pt-BR" smtClean="0"/>
-              <a:t>06/05/2020</a:t>
+              <a:t>07/05/2020</a:t>
             </a:fld>
             <a:endParaRPr lang="pt-BR"/>
           </a:p>
@@ -6352,7 +6352,7 @@
           <a:p>
             <a:fld id="{51C1A2F9-5E2E-41AF-8CA8-6F6A8CA531AC}" type="datetimeFigureOut">
               <a:rPr lang="pt-BR" smtClean="0"/>
-              <a:t>06/05/2020</a:t>
+              <a:t>07/05/2020</a:t>
             </a:fld>
             <a:endParaRPr lang="pt-BR"/>
           </a:p>
@@ -7125,7 +7125,7 @@
         </p:nvSpPr>
         <p:spPr>
           <a:xfrm>
-            <a:off x="0" y="119851"/>
+            <a:off x="0" y="746868"/>
             <a:ext cx="1881051" cy="676257"/>
           </a:xfrm>
           <a:prstGeom prst="homePlate">
@@ -7169,7 +7169,7 @@
       </p:sp>
       <p:pic>
         <p:nvPicPr>
-          <p:cNvPr id="3" name="Imagem 2"/>
+          <p:cNvPr id="4" name="Imagem 3"/>
           <p:cNvPicPr>
             <a:picLocks noChangeAspect="1"/>
           </p:cNvPicPr>
@@ -7189,8 +7189,8 @@
         </p:blipFill>
         <p:spPr>
           <a:xfrm>
-            <a:off x="0" y="1449977"/>
-            <a:ext cx="9522210" cy="5408023"/>
+            <a:off x="-248194" y="1553870"/>
+            <a:ext cx="10200250" cy="5304130"/>
           </a:xfrm>
           <a:prstGeom prst="rect">
             <a:avLst/>

</xml_diff>